<commit_message>
Információk a RAM típusokról 1. felvonás (PPT)
</commit_message>
<xml_diff>
--- a/processzor + memoria.pptx
+++ b/processzor + memoria.pptx
@@ -6,6 +6,14 @@
   </p:sldMasterIdLst>
   <p:sldIdLst>
     <p:sldId id="256" r:id="rId2"/>
+    <p:sldId id="258" r:id="rId3"/>
+    <p:sldId id="259" r:id="rId4"/>
+    <p:sldId id="262" r:id="rId5"/>
+    <p:sldId id="260" r:id="rId6"/>
+    <p:sldId id="263" r:id="rId7"/>
+    <p:sldId id="264" r:id="rId8"/>
+    <p:sldId id="265" r:id="rId9"/>
+    <p:sldId id="266" r:id="rId10"/>
   </p:sldIdLst>
   <p:sldSz cx="12192000" cy="6858000"/>
   <p:notesSz cx="6858000" cy="9144000"/>
@@ -104,6 +112,11 @@
       </a:defRPr>
     </a:lvl9pPr>
   </p:defaultTextStyle>
+  <p:extLst>
+    <p:ext uri="{EFAFB233-063F-42B5-8137-9DF3F51BA10A}">
+      <p15:sldGuideLst xmlns:p15="http://schemas.microsoft.com/office/powerpoint/2012/main"/>
+    </p:ext>
+  </p:extLst>
 </p:presentation>
 </file>
 
@@ -238,7 +251,7 @@
           <a:p>
             <a:fld id="{397604E0-0D2C-4780-BF54-3C57F83D7B51}" type="datetimeFigureOut">
               <a:rPr lang="hu-HU" smtClean="0"/>
-              <a:t>2023.10.03.</a:t>
+              <a:t>2023.10.04.</a:t>
             </a:fld>
             <a:endParaRPr lang="hu-HU"/>
           </a:p>
@@ -408,7 +421,7 @@
           <a:p>
             <a:fld id="{397604E0-0D2C-4780-BF54-3C57F83D7B51}" type="datetimeFigureOut">
               <a:rPr lang="hu-HU" smtClean="0"/>
-              <a:t>2023.10.03.</a:t>
+              <a:t>2023.10.04.</a:t>
             </a:fld>
             <a:endParaRPr lang="hu-HU"/>
           </a:p>
@@ -588,7 +601,7 @@
           <a:p>
             <a:fld id="{397604E0-0D2C-4780-BF54-3C57F83D7B51}" type="datetimeFigureOut">
               <a:rPr lang="hu-HU" smtClean="0"/>
-              <a:t>2023.10.03.</a:t>
+              <a:t>2023.10.04.</a:t>
             </a:fld>
             <a:endParaRPr lang="hu-HU"/>
           </a:p>
@@ -758,7 +771,7 @@
           <a:p>
             <a:fld id="{397604E0-0D2C-4780-BF54-3C57F83D7B51}" type="datetimeFigureOut">
               <a:rPr lang="hu-HU" smtClean="0"/>
-              <a:t>2023.10.03.</a:t>
+              <a:t>2023.10.04.</a:t>
             </a:fld>
             <a:endParaRPr lang="hu-HU"/>
           </a:p>
@@ -1004,7 +1017,7 @@
           <a:p>
             <a:fld id="{397604E0-0D2C-4780-BF54-3C57F83D7B51}" type="datetimeFigureOut">
               <a:rPr lang="hu-HU" smtClean="0"/>
-              <a:t>2023.10.03.</a:t>
+              <a:t>2023.10.04.</a:t>
             </a:fld>
             <a:endParaRPr lang="hu-HU"/>
           </a:p>
@@ -1236,7 +1249,7 @@
           <a:p>
             <a:fld id="{397604E0-0D2C-4780-BF54-3C57F83D7B51}" type="datetimeFigureOut">
               <a:rPr lang="hu-HU" smtClean="0"/>
-              <a:t>2023.10.03.</a:t>
+              <a:t>2023.10.04.</a:t>
             </a:fld>
             <a:endParaRPr lang="hu-HU"/>
           </a:p>
@@ -1603,7 +1616,7 @@
           <a:p>
             <a:fld id="{397604E0-0D2C-4780-BF54-3C57F83D7B51}" type="datetimeFigureOut">
               <a:rPr lang="hu-HU" smtClean="0"/>
-              <a:t>2023.10.03.</a:t>
+              <a:t>2023.10.04.</a:t>
             </a:fld>
             <a:endParaRPr lang="hu-HU"/>
           </a:p>
@@ -1721,7 +1734,7 @@
           <a:p>
             <a:fld id="{397604E0-0D2C-4780-BF54-3C57F83D7B51}" type="datetimeFigureOut">
               <a:rPr lang="hu-HU" smtClean="0"/>
-              <a:t>2023.10.03.</a:t>
+              <a:t>2023.10.04.</a:t>
             </a:fld>
             <a:endParaRPr lang="hu-HU"/>
           </a:p>
@@ -1816,7 +1829,7 @@
           <a:p>
             <a:fld id="{397604E0-0D2C-4780-BF54-3C57F83D7B51}" type="datetimeFigureOut">
               <a:rPr lang="hu-HU" smtClean="0"/>
-              <a:t>2023.10.03.</a:t>
+              <a:t>2023.10.04.</a:t>
             </a:fld>
             <a:endParaRPr lang="hu-HU"/>
           </a:p>
@@ -2093,7 +2106,7 @@
           <a:p>
             <a:fld id="{397604E0-0D2C-4780-BF54-3C57F83D7B51}" type="datetimeFigureOut">
               <a:rPr lang="hu-HU" smtClean="0"/>
-              <a:t>2023.10.03.</a:t>
+              <a:t>2023.10.04.</a:t>
             </a:fld>
             <a:endParaRPr lang="hu-HU"/>
           </a:p>
@@ -2346,7 +2359,7 @@
           <a:p>
             <a:fld id="{397604E0-0D2C-4780-BF54-3C57F83D7B51}" type="datetimeFigureOut">
               <a:rPr lang="hu-HU" smtClean="0"/>
-              <a:t>2023.10.03.</a:t>
+              <a:t>2023.10.04.</a:t>
             </a:fld>
             <a:endParaRPr lang="hu-HU"/>
           </a:p>
@@ -2411,9 +2424,18 @@
 <p:sldMaster xmlns:a="http://schemas.openxmlformats.org/drawingml/2006/main" xmlns:r="http://schemas.openxmlformats.org/officeDocument/2006/relationships" xmlns:p="http://schemas.openxmlformats.org/presentationml/2006/main">
   <p:cSld>
     <p:bg>
-      <p:bgRef idx="1001">
-        <a:schemeClr val="bg1"/>
-      </p:bgRef>
+      <p:bgPr>
+        <a:blipFill dpi="0" rotWithShape="1">
+          <a:blip r:embed="rId13">
+            <a:lum/>
+          </a:blip>
+          <a:srcRect/>
+          <a:stretch>
+            <a:fillRect/>
+          </a:stretch>
+        </a:blipFill>
+        <a:effectLst/>
+      </p:bgPr>
     </p:bg>
     <p:spTree>
       <p:nvGrpSpPr>
@@ -2559,7 +2581,7 @@
           <a:p>
             <a:fld id="{397604E0-0D2C-4780-BF54-3C57F83D7B51}" type="datetimeFigureOut">
               <a:rPr lang="hu-HU" smtClean="0"/>
-              <a:t>2023.10.03.</a:t>
+              <a:t>2023.10.04.</a:t>
             </a:fld>
             <a:endParaRPr lang="hu-HU"/>
           </a:p>
@@ -3185,6 +3207,18 @@
   <p:clrMapOvr>
     <a:masterClrMapping/>
   </p:clrMapOvr>
+  <mc:AlternateContent xmlns:mc="http://schemas.openxmlformats.org/markup-compatibility/2006">
+    <mc:Choice xmlns:p14="http://schemas.microsoft.com/office/powerpoint/2010/main" Requires="p14">
+      <p:transition spd="med" p14:dur="700">
+        <p:fade/>
+      </p:transition>
+    </mc:Choice>
+    <mc:Fallback>
+      <p:transition spd="med">
+        <p:fade/>
+      </p:transition>
+    </mc:Fallback>
+  </mc:AlternateContent>
   <p:timing>
     <p:tnLst>
       <p:par>
@@ -3755,6 +3789,4798 @@
       <p:bldP spid="2" grpId="0"/>
       <p:bldP spid="3" grpId="0" build="p"/>
     </p:bldLst>
+  </p:timing>
+</p:sld>
+</file>
+
+<file path=ppt/slides/slide2.xml><?xml version="1.0" encoding="utf-8"?>
+<p:sld xmlns:a="http://schemas.openxmlformats.org/drawingml/2006/main" xmlns:r="http://schemas.openxmlformats.org/officeDocument/2006/relationships" xmlns:p="http://schemas.openxmlformats.org/presentationml/2006/main">
+  <p:cSld>
+    <p:spTree>
+      <p:nvGrpSpPr>
+        <p:cNvPr id="1" name=""/>
+        <p:cNvGrpSpPr/>
+        <p:nvPr/>
+      </p:nvGrpSpPr>
+      <p:grpSpPr>
+        <a:xfrm>
+          <a:off x="0" y="0"/>
+          <a:ext cx="0" cy="0"/>
+          <a:chOff x="0" y="0"/>
+          <a:chExt cx="0" cy="0"/>
+        </a:xfrm>
+      </p:grpSpPr>
+      <p:sp>
+        <p:nvSpPr>
+          <p:cNvPr id="2" name="Cím 1"/>
+          <p:cNvSpPr>
+            <a:spLocks noGrp="1"/>
+          </p:cNvSpPr>
+          <p:nvPr>
+            <p:ph type="title"/>
+          </p:nvPr>
+        </p:nvSpPr>
+        <p:spPr>
+          <a:xfrm>
+            <a:off x="838200" y="283238"/>
+            <a:ext cx="10515600" cy="1325563"/>
+          </a:xfrm>
+        </p:spPr>
+        <p:txBody>
+          <a:bodyPr/>
+          <a:lstStyle/>
+          <a:p>
+            <a:r>
+              <a:rPr lang="hu-HU" dirty="0" smtClean="0">
+                <a:solidFill>
+                  <a:schemeClr val="bg1"/>
+                </a:solidFill>
+                <a:latin typeface="Algerian" panose="04020705040A02060702" pitchFamily="82" charset="0"/>
+              </a:rPr>
+              <a:t>Mi a RAM?</a:t>
+            </a:r>
+            <a:endParaRPr lang="hu-HU" dirty="0">
+              <a:solidFill>
+                <a:schemeClr val="bg1"/>
+              </a:solidFill>
+              <a:latin typeface="Algerian" panose="04020705040A02060702" pitchFamily="82" charset="0"/>
+            </a:endParaRPr>
+          </a:p>
+        </p:txBody>
+      </p:sp>
+      <p:sp>
+        <p:nvSpPr>
+          <p:cNvPr id="3" name="Tartalom helye 2"/>
+          <p:cNvSpPr>
+            <a:spLocks noGrp="1"/>
+          </p:cNvSpPr>
+          <p:nvPr>
+            <p:ph idx="1"/>
+          </p:nvPr>
+        </p:nvSpPr>
+        <p:spPr>
+          <a:xfrm>
+            <a:off x="838200" y="2030341"/>
+            <a:ext cx="10515600" cy="3851844"/>
+          </a:xfrm>
+        </p:spPr>
+        <p:txBody>
+          <a:bodyPr/>
+          <a:lstStyle/>
+          <a:p>
+            <a:pPr>
+              <a:lnSpc>
+                <a:spcPct val="100000"/>
+              </a:lnSpc>
+            </a:pPr>
+            <a:r>
+              <a:rPr lang="hu-HU" dirty="0">
+                <a:solidFill>
+                  <a:schemeClr val="bg1"/>
+                </a:solidFill>
+              </a:rPr>
+              <a:t>A RAM (Random Access </a:t>
+            </a:r>
+            <a:r>
+              <a:rPr lang="hu-HU" dirty="0" err="1">
+                <a:solidFill>
+                  <a:schemeClr val="bg1"/>
+                </a:solidFill>
+              </a:rPr>
+              <a:t>Memory</a:t>
+            </a:r>
+            <a:r>
+              <a:rPr lang="hu-HU" dirty="0">
+                <a:solidFill>
+                  <a:schemeClr val="bg1"/>
+                </a:solidFill>
+              </a:rPr>
+              <a:t>) egy olyan típusú számítógépes memória, amely gyors és véletlenszerű hozzáférést biztosít az adatokhoz.</a:t>
+            </a:r>
+          </a:p>
+          <a:p>
+            <a:pPr>
+              <a:lnSpc>
+                <a:spcPct val="100000"/>
+              </a:lnSpc>
+            </a:pPr>
+            <a:r>
+              <a:rPr lang="hu-HU" dirty="0">
+                <a:solidFill>
+                  <a:schemeClr val="bg1"/>
+                </a:solidFill>
+              </a:rPr>
+              <a:t>Ez a memória típus ideiglenes </a:t>
+            </a:r>
+            <a:r>
+              <a:rPr lang="hu-HU" dirty="0" err="1">
+                <a:solidFill>
+                  <a:schemeClr val="bg1"/>
+                </a:solidFill>
+              </a:rPr>
+              <a:t>tárolóhelyet</a:t>
+            </a:r>
+            <a:r>
+              <a:rPr lang="hu-HU" dirty="0">
+                <a:solidFill>
+                  <a:schemeClr val="bg1"/>
+                </a:solidFill>
+              </a:rPr>
+              <a:t> biztosít a futó alkalmazások számára.</a:t>
+            </a:r>
+          </a:p>
+          <a:p>
+            <a:pPr>
+              <a:lnSpc>
+                <a:spcPct val="100000"/>
+              </a:lnSpc>
+            </a:pPr>
+            <a:r>
+              <a:rPr lang="hu-HU" dirty="0">
+                <a:solidFill>
+                  <a:schemeClr val="bg1"/>
+                </a:solidFill>
+              </a:rPr>
+              <a:t>A RAM kapacitása nagyban befolyásolja a számítógép teljesítményét, mivel a nagyobb RAM kapacitás lehetővé teszi több program futtatását és azok gyorsabb működését.</a:t>
+            </a:r>
+          </a:p>
+          <a:p>
+            <a:pPr marL="0" indent="0">
+              <a:buNone/>
+            </a:pPr>
+            <a:endParaRPr lang="hu-HU" dirty="0"/>
+          </a:p>
+        </p:txBody>
+      </p:sp>
+    </p:spTree>
+    <p:extLst>
+      <p:ext uri="{BB962C8B-B14F-4D97-AF65-F5344CB8AC3E}">
+        <p14:creationId xmlns:p14="http://schemas.microsoft.com/office/powerpoint/2010/main" val="699268622"/>
+      </p:ext>
+    </p:extLst>
+  </p:cSld>
+  <p:clrMapOvr>
+    <a:masterClrMapping/>
+  </p:clrMapOvr>
+  <mc:AlternateContent xmlns:mc="http://schemas.openxmlformats.org/markup-compatibility/2006">
+    <mc:Choice xmlns:p14="http://schemas.microsoft.com/office/powerpoint/2010/main" Requires="p14">
+      <p:transition spd="slow" p14:dur="3400">
+        <p14:reveal/>
+      </p:transition>
+    </mc:Choice>
+    <mc:Fallback>
+      <p:transition spd="slow">
+        <p:fade/>
+      </p:transition>
+    </mc:Fallback>
+  </mc:AlternateContent>
+  <p:timing>
+    <p:tnLst>
+      <p:par>
+        <p:cTn id="1" dur="indefinite" restart="never" nodeType="tmRoot">
+          <p:childTnLst>
+            <p:seq concurrent="1" nextAc="seek">
+              <p:cTn id="2" dur="indefinite" nodeType="mainSeq">
+                <p:childTnLst>
+                  <p:par>
+                    <p:cTn id="3" fill="hold">
+                      <p:stCondLst>
+                        <p:cond delay="indefinite"/>
+                      </p:stCondLst>
+                      <p:childTnLst>
+                        <p:par>
+                          <p:cTn id="4" fill="hold">
+                            <p:stCondLst>
+                              <p:cond delay="0"/>
+                            </p:stCondLst>
+                            <p:childTnLst>
+                              <p:par>
+                                <p:cTn id="5" presetID="42" presetClass="entr" presetSubtype="0" fill="hold" nodeType="clickEffect">
+                                  <p:stCondLst>
+                                    <p:cond delay="0"/>
+                                  </p:stCondLst>
+                                  <p:childTnLst>
+                                    <p:set>
+                                      <p:cBhvr>
+                                        <p:cTn id="6" dur="1" fill="hold">
+                                          <p:stCondLst>
+                                            <p:cond delay="0"/>
+                                          </p:stCondLst>
+                                        </p:cTn>
+                                        <p:tgtEl>
+                                          <p:spTgt spid="3">
+                                            <p:txEl>
+                                              <p:pRg st="0" end="0"/>
+                                            </p:txEl>
+                                          </p:spTgt>
+                                        </p:tgtEl>
+                                        <p:attrNameLst>
+                                          <p:attrName>style.visibility</p:attrName>
+                                        </p:attrNameLst>
+                                      </p:cBhvr>
+                                      <p:to>
+                                        <p:strVal val="visible"/>
+                                      </p:to>
+                                    </p:set>
+                                    <p:animEffect transition="in" filter="fade">
+                                      <p:cBhvr>
+                                        <p:cTn id="7" dur="1000"/>
+                                        <p:tgtEl>
+                                          <p:spTgt spid="3">
+                                            <p:txEl>
+                                              <p:pRg st="0" end="0"/>
+                                            </p:txEl>
+                                          </p:spTgt>
+                                        </p:tgtEl>
+                                      </p:cBhvr>
+                                    </p:animEffect>
+                                    <p:anim calcmode="lin" valueType="num">
+                                      <p:cBhvr>
+                                        <p:cTn id="8" dur="1000" fill="hold"/>
+                                        <p:tgtEl>
+                                          <p:spTgt spid="3">
+                                            <p:txEl>
+                                              <p:pRg st="0" end="0"/>
+                                            </p:txEl>
+                                          </p:spTgt>
+                                        </p:tgtEl>
+                                        <p:attrNameLst>
+                                          <p:attrName>ppt_x</p:attrName>
+                                        </p:attrNameLst>
+                                      </p:cBhvr>
+                                      <p:tavLst>
+                                        <p:tav tm="0">
+                                          <p:val>
+                                            <p:strVal val="#ppt_x"/>
+                                          </p:val>
+                                        </p:tav>
+                                        <p:tav tm="100000">
+                                          <p:val>
+                                            <p:strVal val="#ppt_x"/>
+                                          </p:val>
+                                        </p:tav>
+                                      </p:tavLst>
+                                    </p:anim>
+                                    <p:anim calcmode="lin" valueType="num">
+                                      <p:cBhvr>
+                                        <p:cTn id="9" dur="1000" fill="hold"/>
+                                        <p:tgtEl>
+                                          <p:spTgt spid="3">
+                                            <p:txEl>
+                                              <p:pRg st="0" end="0"/>
+                                            </p:txEl>
+                                          </p:spTgt>
+                                        </p:tgtEl>
+                                        <p:attrNameLst>
+                                          <p:attrName>ppt_y</p:attrName>
+                                        </p:attrNameLst>
+                                      </p:cBhvr>
+                                      <p:tavLst>
+                                        <p:tav tm="0">
+                                          <p:val>
+                                            <p:strVal val="#ppt_y+.1"/>
+                                          </p:val>
+                                        </p:tav>
+                                        <p:tav tm="100000">
+                                          <p:val>
+                                            <p:strVal val="#ppt_y"/>
+                                          </p:val>
+                                        </p:tav>
+                                      </p:tavLst>
+                                    </p:anim>
+                                  </p:childTnLst>
+                                </p:cTn>
+                              </p:par>
+                            </p:childTnLst>
+                          </p:cTn>
+                        </p:par>
+                        <p:par>
+                          <p:cTn id="10" fill="hold">
+                            <p:stCondLst>
+                              <p:cond delay="1000"/>
+                            </p:stCondLst>
+                            <p:childTnLst>
+                              <p:par>
+                                <p:cTn id="11" presetID="42" presetClass="entr" presetSubtype="0" fill="hold" nodeType="afterEffect">
+                                  <p:stCondLst>
+                                    <p:cond delay="0"/>
+                                  </p:stCondLst>
+                                  <p:childTnLst>
+                                    <p:set>
+                                      <p:cBhvr>
+                                        <p:cTn id="12" dur="1" fill="hold">
+                                          <p:stCondLst>
+                                            <p:cond delay="0"/>
+                                          </p:stCondLst>
+                                        </p:cTn>
+                                        <p:tgtEl>
+                                          <p:spTgt spid="3">
+                                            <p:txEl>
+                                              <p:pRg st="1" end="1"/>
+                                            </p:txEl>
+                                          </p:spTgt>
+                                        </p:tgtEl>
+                                        <p:attrNameLst>
+                                          <p:attrName>style.visibility</p:attrName>
+                                        </p:attrNameLst>
+                                      </p:cBhvr>
+                                      <p:to>
+                                        <p:strVal val="visible"/>
+                                      </p:to>
+                                    </p:set>
+                                    <p:animEffect transition="in" filter="fade">
+                                      <p:cBhvr>
+                                        <p:cTn id="13" dur="1000"/>
+                                        <p:tgtEl>
+                                          <p:spTgt spid="3">
+                                            <p:txEl>
+                                              <p:pRg st="1" end="1"/>
+                                            </p:txEl>
+                                          </p:spTgt>
+                                        </p:tgtEl>
+                                      </p:cBhvr>
+                                    </p:animEffect>
+                                    <p:anim calcmode="lin" valueType="num">
+                                      <p:cBhvr>
+                                        <p:cTn id="14" dur="1000" fill="hold"/>
+                                        <p:tgtEl>
+                                          <p:spTgt spid="3">
+                                            <p:txEl>
+                                              <p:pRg st="1" end="1"/>
+                                            </p:txEl>
+                                          </p:spTgt>
+                                        </p:tgtEl>
+                                        <p:attrNameLst>
+                                          <p:attrName>ppt_x</p:attrName>
+                                        </p:attrNameLst>
+                                      </p:cBhvr>
+                                      <p:tavLst>
+                                        <p:tav tm="0">
+                                          <p:val>
+                                            <p:strVal val="#ppt_x"/>
+                                          </p:val>
+                                        </p:tav>
+                                        <p:tav tm="100000">
+                                          <p:val>
+                                            <p:strVal val="#ppt_x"/>
+                                          </p:val>
+                                        </p:tav>
+                                      </p:tavLst>
+                                    </p:anim>
+                                    <p:anim calcmode="lin" valueType="num">
+                                      <p:cBhvr>
+                                        <p:cTn id="15" dur="1000" fill="hold"/>
+                                        <p:tgtEl>
+                                          <p:spTgt spid="3">
+                                            <p:txEl>
+                                              <p:pRg st="1" end="1"/>
+                                            </p:txEl>
+                                          </p:spTgt>
+                                        </p:tgtEl>
+                                        <p:attrNameLst>
+                                          <p:attrName>ppt_y</p:attrName>
+                                        </p:attrNameLst>
+                                      </p:cBhvr>
+                                      <p:tavLst>
+                                        <p:tav tm="0">
+                                          <p:val>
+                                            <p:strVal val="#ppt_y+.1"/>
+                                          </p:val>
+                                        </p:tav>
+                                        <p:tav tm="100000">
+                                          <p:val>
+                                            <p:strVal val="#ppt_y"/>
+                                          </p:val>
+                                        </p:tav>
+                                      </p:tavLst>
+                                    </p:anim>
+                                  </p:childTnLst>
+                                </p:cTn>
+                              </p:par>
+                            </p:childTnLst>
+                          </p:cTn>
+                        </p:par>
+                        <p:par>
+                          <p:cTn id="16" fill="hold">
+                            <p:stCondLst>
+                              <p:cond delay="2000"/>
+                            </p:stCondLst>
+                            <p:childTnLst>
+                              <p:par>
+                                <p:cTn id="17" presetID="42" presetClass="entr" presetSubtype="0" fill="hold" nodeType="afterEffect">
+                                  <p:stCondLst>
+                                    <p:cond delay="0"/>
+                                  </p:stCondLst>
+                                  <p:childTnLst>
+                                    <p:set>
+                                      <p:cBhvr>
+                                        <p:cTn id="18" dur="1" fill="hold">
+                                          <p:stCondLst>
+                                            <p:cond delay="0"/>
+                                          </p:stCondLst>
+                                        </p:cTn>
+                                        <p:tgtEl>
+                                          <p:spTgt spid="3">
+                                            <p:txEl>
+                                              <p:pRg st="2" end="2"/>
+                                            </p:txEl>
+                                          </p:spTgt>
+                                        </p:tgtEl>
+                                        <p:attrNameLst>
+                                          <p:attrName>style.visibility</p:attrName>
+                                        </p:attrNameLst>
+                                      </p:cBhvr>
+                                      <p:to>
+                                        <p:strVal val="visible"/>
+                                      </p:to>
+                                    </p:set>
+                                    <p:animEffect transition="in" filter="fade">
+                                      <p:cBhvr>
+                                        <p:cTn id="19" dur="1000"/>
+                                        <p:tgtEl>
+                                          <p:spTgt spid="3">
+                                            <p:txEl>
+                                              <p:pRg st="2" end="2"/>
+                                            </p:txEl>
+                                          </p:spTgt>
+                                        </p:tgtEl>
+                                      </p:cBhvr>
+                                    </p:animEffect>
+                                    <p:anim calcmode="lin" valueType="num">
+                                      <p:cBhvr>
+                                        <p:cTn id="20" dur="1000" fill="hold"/>
+                                        <p:tgtEl>
+                                          <p:spTgt spid="3">
+                                            <p:txEl>
+                                              <p:pRg st="2" end="2"/>
+                                            </p:txEl>
+                                          </p:spTgt>
+                                        </p:tgtEl>
+                                        <p:attrNameLst>
+                                          <p:attrName>ppt_x</p:attrName>
+                                        </p:attrNameLst>
+                                      </p:cBhvr>
+                                      <p:tavLst>
+                                        <p:tav tm="0">
+                                          <p:val>
+                                            <p:strVal val="#ppt_x"/>
+                                          </p:val>
+                                        </p:tav>
+                                        <p:tav tm="100000">
+                                          <p:val>
+                                            <p:strVal val="#ppt_x"/>
+                                          </p:val>
+                                        </p:tav>
+                                      </p:tavLst>
+                                    </p:anim>
+                                    <p:anim calcmode="lin" valueType="num">
+                                      <p:cBhvr>
+                                        <p:cTn id="21" dur="1000" fill="hold"/>
+                                        <p:tgtEl>
+                                          <p:spTgt spid="3">
+                                            <p:txEl>
+                                              <p:pRg st="2" end="2"/>
+                                            </p:txEl>
+                                          </p:spTgt>
+                                        </p:tgtEl>
+                                        <p:attrNameLst>
+                                          <p:attrName>ppt_y</p:attrName>
+                                        </p:attrNameLst>
+                                      </p:cBhvr>
+                                      <p:tavLst>
+                                        <p:tav tm="0">
+                                          <p:val>
+                                            <p:strVal val="#ppt_y+.1"/>
+                                          </p:val>
+                                        </p:tav>
+                                        <p:tav tm="100000">
+                                          <p:val>
+                                            <p:strVal val="#ppt_y"/>
+                                          </p:val>
+                                        </p:tav>
+                                      </p:tavLst>
+                                    </p:anim>
+                                  </p:childTnLst>
+                                </p:cTn>
+                              </p:par>
+                            </p:childTnLst>
+                          </p:cTn>
+                        </p:par>
+                      </p:childTnLst>
+                    </p:cTn>
+                  </p:par>
+                </p:childTnLst>
+              </p:cTn>
+              <p:prevCondLst>
+                <p:cond evt="onPrev" delay="0">
+                  <p:tgtEl>
+                    <p:sldTgt/>
+                  </p:tgtEl>
+                </p:cond>
+              </p:prevCondLst>
+              <p:nextCondLst>
+                <p:cond evt="onNext" delay="0">
+                  <p:tgtEl>
+                    <p:sldTgt/>
+                  </p:tgtEl>
+                </p:cond>
+              </p:nextCondLst>
+            </p:seq>
+          </p:childTnLst>
+        </p:cTn>
+      </p:par>
+    </p:tnLst>
+  </p:timing>
+</p:sld>
+</file>
+
+<file path=ppt/slides/slide3.xml><?xml version="1.0" encoding="utf-8"?>
+<p:sld xmlns:a="http://schemas.openxmlformats.org/drawingml/2006/main" xmlns:r="http://schemas.openxmlformats.org/officeDocument/2006/relationships" xmlns:p="http://schemas.openxmlformats.org/presentationml/2006/main">
+  <p:cSld>
+    <p:spTree>
+      <p:nvGrpSpPr>
+        <p:cNvPr id="1" name=""/>
+        <p:cNvGrpSpPr/>
+        <p:nvPr/>
+      </p:nvGrpSpPr>
+      <p:grpSpPr>
+        <a:xfrm>
+          <a:off x="0" y="0"/>
+          <a:ext cx="0" cy="0"/>
+          <a:chOff x="0" y="0"/>
+          <a:chExt cx="0" cy="0"/>
+        </a:xfrm>
+      </p:grpSpPr>
+      <p:sp>
+        <p:nvSpPr>
+          <p:cNvPr id="2" name="Cím 1"/>
+          <p:cNvSpPr>
+            <a:spLocks noGrp="1"/>
+          </p:cNvSpPr>
+          <p:nvPr>
+            <p:ph type="title"/>
+          </p:nvPr>
+        </p:nvSpPr>
+        <p:spPr>
+          <a:xfrm>
+            <a:off x="291721" y="474306"/>
+            <a:ext cx="11608558" cy="1325563"/>
+          </a:xfrm>
+        </p:spPr>
+        <p:txBody>
+          <a:bodyPr/>
+          <a:lstStyle/>
+          <a:p>
+            <a:r>
+              <a:rPr lang="hu-HU" dirty="0">
+                <a:solidFill>
+                  <a:schemeClr val="bg1"/>
+                </a:solidFill>
+                <a:latin typeface="Algerian" panose="04020705040A02060702" pitchFamily="82" charset="0"/>
+              </a:rPr>
+              <a:t>Fontosabb félvezető </a:t>
+            </a:r>
+            <a:r>
+              <a:rPr lang="hu-HU" dirty="0" smtClean="0">
+                <a:solidFill>
+                  <a:schemeClr val="bg1"/>
+                </a:solidFill>
+                <a:latin typeface="Algerian" panose="04020705040A02060702" pitchFamily="82" charset="0"/>
+              </a:rPr>
+              <a:t>memóriatípusok</a:t>
+            </a:r>
+            <a:endParaRPr lang="hu-HU" dirty="0">
+              <a:solidFill>
+                <a:schemeClr val="bg1"/>
+              </a:solidFill>
+              <a:latin typeface="Algerian" panose="04020705040A02060702" pitchFamily="82" charset="0"/>
+            </a:endParaRPr>
+          </a:p>
+        </p:txBody>
+      </p:sp>
+      <p:sp>
+        <p:nvSpPr>
+          <p:cNvPr id="3" name="Tartalom helye 2"/>
+          <p:cNvSpPr>
+            <a:spLocks noGrp="1"/>
+          </p:cNvSpPr>
+          <p:nvPr>
+            <p:ph idx="1"/>
+          </p:nvPr>
+        </p:nvSpPr>
+        <p:spPr>
+          <a:xfrm>
+            <a:off x="838200" y="2084933"/>
+            <a:ext cx="10515600" cy="3524298"/>
+          </a:xfrm>
+        </p:spPr>
+        <p:txBody>
+          <a:bodyPr>
+            <a:normAutofit/>
+          </a:bodyPr>
+          <a:lstStyle/>
+          <a:p>
+            <a:pPr>
+              <a:lnSpc>
+                <a:spcPct val="100000"/>
+              </a:lnSpc>
+            </a:pPr>
+            <a:r>
+              <a:rPr lang="hu-HU" b="1" dirty="0">
+                <a:solidFill>
+                  <a:schemeClr val="bg1"/>
+                </a:solidFill>
+              </a:rPr>
+              <a:t>ROM </a:t>
+            </a:r>
+            <a:r>
+              <a:rPr lang="hu-HU" dirty="0">
+                <a:solidFill>
+                  <a:schemeClr val="bg1"/>
+                </a:solidFill>
+              </a:rPr>
+              <a:t>(csak olvasható memória): Gyártó által beégetett adatot tartalmaz, amely nem módosítható.</a:t>
+            </a:r>
+          </a:p>
+          <a:p>
+            <a:pPr>
+              <a:lnSpc>
+                <a:spcPct val="100000"/>
+              </a:lnSpc>
+            </a:pPr>
+            <a:r>
+              <a:rPr lang="hu-HU" b="1" dirty="0">
+                <a:solidFill>
+                  <a:schemeClr val="bg1"/>
+                </a:solidFill>
+              </a:rPr>
+              <a:t>PROM</a:t>
+            </a:r>
+            <a:r>
+              <a:rPr lang="hu-HU" dirty="0">
+                <a:solidFill>
+                  <a:schemeClr val="bg1"/>
+                </a:solidFill>
+              </a:rPr>
+              <a:t> (programozható ROM): Olyan memória, amely egyszer írható, de később nem módosítható.</a:t>
+            </a:r>
+          </a:p>
+          <a:p>
+            <a:pPr>
+              <a:lnSpc>
+                <a:spcPct val="100000"/>
+              </a:lnSpc>
+            </a:pPr>
+            <a:r>
+              <a:rPr lang="hu-HU" b="1" dirty="0">
+                <a:solidFill>
+                  <a:schemeClr val="bg1"/>
+                </a:solidFill>
+              </a:rPr>
+              <a:t>EPROM</a:t>
+            </a:r>
+            <a:r>
+              <a:rPr lang="hu-HU" dirty="0">
+                <a:solidFill>
+                  <a:schemeClr val="bg1"/>
+                </a:solidFill>
+              </a:rPr>
+              <a:t> (törölhető PROM): Törölhető és többször újraírható</a:t>
+            </a:r>
+            <a:r>
+              <a:rPr lang="hu-HU" dirty="0" smtClean="0">
+                <a:solidFill>
+                  <a:schemeClr val="bg1"/>
+                </a:solidFill>
+              </a:rPr>
+              <a:t>;</a:t>
+            </a:r>
+          </a:p>
+          <a:p>
+            <a:pPr>
+              <a:lnSpc>
+                <a:spcPct val="100000"/>
+              </a:lnSpc>
+            </a:pPr>
+            <a:r>
+              <a:rPr lang="hu-HU" dirty="0" smtClean="0">
+                <a:solidFill>
+                  <a:schemeClr val="bg1"/>
+                </a:solidFill>
+              </a:rPr>
+              <a:t> </a:t>
+            </a:r>
+            <a:r>
+              <a:rPr lang="hu-HU" b="1" dirty="0" smtClean="0">
+                <a:solidFill>
+                  <a:schemeClr val="bg1"/>
+                </a:solidFill>
+              </a:rPr>
+              <a:t>EEPROM</a:t>
+            </a:r>
+            <a:r>
+              <a:rPr lang="hu-HU" dirty="0" smtClean="0">
+                <a:solidFill>
+                  <a:schemeClr val="bg1"/>
+                </a:solidFill>
+              </a:rPr>
+              <a:t> </a:t>
+            </a:r>
+            <a:r>
+              <a:rPr lang="hu-HU" dirty="0">
+                <a:solidFill>
+                  <a:schemeClr val="bg1"/>
+                </a:solidFill>
+              </a:rPr>
+              <a:t>(elektronikusan törölhető PROM): Elektromos feszültséggel törölhető és újraírható. Ilyenek például a </a:t>
+            </a:r>
+            <a:r>
+              <a:rPr lang="hu-HU" dirty="0" err="1">
+                <a:solidFill>
+                  <a:schemeClr val="bg1"/>
+                </a:solidFill>
+              </a:rPr>
+              <a:t>Flash</a:t>
+            </a:r>
+            <a:r>
+              <a:rPr lang="hu-HU" dirty="0">
+                <a:solidFill>
+                  <a:schemeClr val="bg1"/>
+                </a:solidFill>
+              </a:rPr>
+              <a:t> memóriák is</a:t>
+            </a:r>
+            <a:r>
+              <a:rPr lang="hu-HU" dirty="0" smtClean="0">
+                <a:solidFill>
+                  <a:schemeClr val="bg1"/>
+                </a:solidFill>
+              </a:rPr>
+              <a:t>.</a:t>
+            </a:r>
+            <a:endParaRPr lang="hu-HU" dirty="0">
+              <a:solidFill>
+                <a:schemeClr val="bg1"/>
+              </a:solidFill>
+            </a:endParaRPr>
+          </a:p>
+        </p:txBody>
+      </p:sp>
+    </p:spTree>
+    <p:extLst>
+      <p:ext uri="{BB962C8B-B14F-4D97-AF65-F5344CB8AC3E}">
+        <p14:creationId xmlns:p14="http://schemas.microsoft.com/office/powerpoint/2010/main" val="1084063932"/>
+      </p:ext>
+    </p:extLst>
+  </p:cSld>
+  <p:clrMapOvr>
+    <a:masterClrMapping/>
+  </p:clrMapOvr>
+  <mc:AlternateContent xmlns:mc="http://schemas.openxmlformats.org/markup-compatibility/2006">
+    <mc:Choice xmlns:p14="http://schemas.microsoft.com/office/powerpoint/2010/main" Requires="p14">
+      <p:transition spd="slow" p14:dur="3400">
+        <p14:reveal/>
+      </p:transition>
+    </mc:Choice>
+    <mc:Fallback>
+      <p:transition spd="slow">
+        <p:fade/>
+      </p:transition>
+    </mc:Fallback>
+  </mc:AlternateContent>
+  <p:timing>
+    <p:tnLst>
+      <p:par>
+        <p:cTn id="1" dur="indefinite" restart="never" nodeType="tmRoot">
+          <p:childTnLst>
+            <p:seq concurrent="1" nextAc="seek">
+              <p:cTn id="2" dur="indefinite" nodeType="mainSeq">
+                <p:childTnLst>
+                  <p:par>
+                    <p:cTn id="3" fill="hold">
+                      <p:stCondLst>
+                        <p:cond delay="indefinite"/>
+                        <p:cond evt="onBegin" delay="0">
+                          <p:tn val="2"/>
+                        </p:cond>
+                      </p:stCondLst>
+                      <p:childTnLst>
+                        <p:par>
+                          <p:cTn id="4" fill="hold">
+                            <p:stCondLst>
+                              <p:cond delay="0"/>
+                            </p:stCondLst>
+                            <p:childTnLst>
+                              <p:par>
+                                <p:cTn id="5" presetID="2" presetClass="entr" presetSubtype="4" fill="hold" nodeType="afterEffect">
+                                  <p:stCondLst>
+                                    <p:cond delay="0"/>
+                                  </p:stCondLst>
+                                  <p:childTnLst>
+                                    <p:set>
+                                      <p:cBhvr>
+                                        <p:cTn id="6" dur="1" fill="hold">
+                                          <p:stCondLst>
+                                            <p:cond delay="0"/>
+                                          </p:stCondLst>
+                                        </p:cTn>
+                                        <p:tgtEl>
+                                          <p:spTgt spid="3">
+                                            <p:txEl>
+                                              <p:pRg st="0" end="0"/>
+                                            </p:txEl>
+                                          </p:spTgt>
+                                        </p:tgtEl>
+                                        <p:attrNameLst>
+                                          <p:attrName>style.visibility</p:attrName>
+                                        </p:attrNameLst>
+                                      </p:cBhvr>
+                                      <p:to>
+                                        <p:strVal val="visible"/>
+                                      </p:to>
+                                    </p:set>
+                                    <p:anim calcmode="lin" valueType="num">
+                                      <p:cBhvr additive="base">
+                                        <p:cTn id="7" dur="500" fill="hold"/>
+                                        <p:tgtEl>
+                                          <p:spTgt spid="3">
+                                            <p:txEl>
+                                              <p:pRg st="0" end="0"/>
+                                            </p:txEl>
+                                          </p:spTgt>
+                                        </p:tgtEl>
+                                        <p:attrNameLst>
+                                          <p:attrName>ppt_x</p:attrName>
+                                        </p:attrNameLst>
+                                      </p:cBhvr>
+                                      <p:tavLst>
+                                        <p:tav tm="0">
+                                          <p:val>
+                                            <p:strVal val="#ppt_x"/>
+                                          </p:val>
+                                        </p:tav>
+                                        <p:tav tm="100000">
+                                          <p:val>
+                                            <p:strVal val="#ppt_x"/>
+                                          </p:val>
+                                        </p:tav>
+                                      </p:tavLst>
+                                    </p:anim>
+                                    <p:anim calcmode="lin" valueType="num">
+                                      <p:cBhvr additive="base">
+                                        <p:cTn id="8" dur="500" fill="hold"/>
+                                        <p:tgtEl>
+                                          <p:spTgt spid="3">
+                                            <p:txEl>
+                                              <p:pRg st="0" end="0"/>
+                                            </p:txEl>
+                                          </p:spTgt>
+                                        </p:tgtEl>
+                                        <p:attrNameLst>
+                                          <p:attrName>ppt_y</p:attrName>
+                                        </p:attrNameLst>
+                                      </p:cBhvr>
+                                      <p:tavLst>
+                                        <p:tav tm="0">
+                                          <p:val>
+                                            <p:strVal val="1+#ppt_h/2"/>
+                                          </p:val>
+                                        </p:tav>
+                                        <p:tav tm="100000">
+                                          <p:val>
+                                            <p:strVal val="#ppt_y"/>
+                                          </p:val>
+                                        </p:tav>
+                                      </p:tavLst>
+                                    </p:anim>
+                                  </p:childTnLst>
+                                </p:cTn>
+                              </p:par>
+                            </p:childTnLst>
+                          </p:cTn>
+                        </p:par>
+                        <p:par>
+                          <p:cTn id="9" fill="hold">
+                            <p:stCondLst>
+                              <p:cond delay="500"/>
+                            </p:stCondLst>
+                            <p:childTnLst>
+                              <p:par>
+                                <p:cTn id="10" presetID="2" presetClass="entr" presetSubtype="4" fill="hold" nodeType="afterEffect">
+                                  <p:stCondLst>
+                                    <p:cond delay="0"/>
+                                  </p:stCondLst>
+                                  <p:childTnLst>
+                                    <p:set>
+                                      <p:cBhvr>
+                                        <p:cTn id="11" dur="1" fill="hold">
+                                          <p:stCondLst>
+                                            <p:cond delay="0"/>
+                                          </p:stCondLst>
+                                        </p:cTn>
+                                        <p:tgtEl>
+                                          <p:spTgt spid="3">
+                                            <p:txEl>
+                                              <p:pRg st="1" end="1"/>
+                                            </p:txEl>
+                                          </p:spTgt>
+                                        </p:tgtEl>
+                                        <p:attrNameLst>
+                                          <p:attrName>style.visibility</p:attrName>
+                                        </p:attrNameLst>
+                                      </p:cBhvr>
+                                      <p:to>
+                                        <p:strVal val="visible"/>
+                                      </p:to>
+                                    </p:set>
+                                    <p:anim calcmode="lin" valueType="num">
+                                      <p:cBhvr additive="base">
+                                        <p:cTn id="12" dur="500" fill="hold"/>
+                                        <p:tgtEl>
+                                          <p:spTgt spid="3">
+                                            <p:txEl>
+                                              <p:pRg st="1" end="1"/>
+                                            </p:txEl>
+                                          </p:spTgt>
+                                        </p:tgtEl>
+                                        <p:attrNameLst>
+                                          <p:attrName>ppt_x</p:attrName>
+                                        </p:attrNameLst>
+                                      </p:cBhvr>
+                                      <p:tavLst>
+                                        <p:tav tm="0">
+                                          <p:val>
+                                            <p:strVal val="#ppt_x"/>
+                                          </p:val>
+                                        </p:tav>
+                                        <p:tav tm="100000">
+                                          <p:val>
+                                            <p:strVal val="#ppt_x"/>
+                                          </p:val>
+                                        </p:tav>
+                                      </p:tavLst>
+                                    </p:anim>
+                                    <p:anim calcmode="lin" valueType="num">
+                                      <p:cBhvr additive="base">
+                                        <p:cTn id="13" dur="500" fill="hold"/>
+                                        <p:tgtEl>
+                                          <p:spTgt spid="3">
+                                            <p:txEl>
+                                              <p:pRg st="1" end="1"/>
+                                            </p:txEl>
+                                          </p:spTgt>
+                                        </p:tgtEl>
+                                        <p:attrNameLst>
+                                          <p:attrName>ppt_y</p:attrName>
+                                        </p:attrNameLst>
+                                      </p:cBhvr>
+                                      <p:tavLst>
+                                        <p:tav tm="0">
+                                          <p:val>
+                                            <p:strVal val="1+#ppt_h/2"/>
+                                          </p:val>
+                                        </p:tav>
+                                        <p:tav tm="100000">
+                                          <p:val>
+                                            <p:strVal val="#ppt_y"/>
+                                          </p:val>
+                                        </p:tav>
+                                      </p:tavLst>
+                                    </p:anim>
+                                  </p:childTnLst>
+                                </p:cTn>
+                              </p:par>
+                            </p:childTnLst>
+                          </p:cTn>
+                        </p:par>
+                        <p:par>
+                          <p:cTn id="14" fill="hold">
+                            <p:stCondLst>
+                              <p:cond delay="1000"/>
+                            </p:stCondLst>
+                            <p:childTnLst>
+                              <p:par>
+                                <p:cTn id="15" presetID="2" presetClass="entr" presetSubtype="4" fill="hold" nodeType="afterEffect">
+                                  <p:stCondLst>
+                                    <p:cond delay="0"/>
+                                  </p:stCondLst>
+                                  <p:childTnLst>
+                                    <p:set>
+                                      <p:cBhvr>
+                                        <p:cTn id="16" dur="1" fill="hold">
+                                          <p:stCondLst>
+                                            <p:cond delay="0"/>
+                                          </p:stCondLst>
+                                        </p:cTn>
+                                        <p:tgtEl>
+                                          <p:spTgt spid="3">
+                                            <p:txEl>
+                                              <p:pRg st="2" end="2"/>
+                                            </p:txEl>
+                                          </p:spTgt>
+                                        </p:tgtEl>
+                                        <p:attrNameLst>
+                                          <p:attrName>style.visibility</p:attrName>
+                                        </p:attrNameLst>
+                                      </p:cBhvr>
+                                      <p:to>
+                                        <p:strVal val="visible"/>
+                                      </p:to>
+                                    </p:set>
+                                    <p:anim calcmode="lin" valueType="num">
+                                      <p:cBhvr additive="base">
+                                        <p:cTn id="17" dur="500" fill="hold"/>
+                                        <p:tgtEl>
+                                          <p:spTgt spid="3">
+                                            <p:txEl>
+                                              <p:pRg st="2" end="2"/>
+                                            </p:txEl>
+                                          </p:spTgt>
+                                        </p:tgtEl>
+                                        <p:attrNameLst>
+                                          <p:attrName>ppt_x</p:attrName>
+                                        </p:attrNameLst>
+                                      </p:cBhvr>
+                                      <p:tavLst>
+                                        <p:tav tm="0">
+                                          <p:val>
+                                            <p:strVal val="#ppt_x"/>
+                                          </p:val>
+                                        </p:tav>
+                                        <p:tav tm="100000">
+                                          <p:val>
+                                            <p:strVal val="#ppt_x"/>
+                                          </p:val>
+                                        </p:tav>
+                                      </p:tavLst>
+                                    </p:anim>
+                                    <p:anim calcmode="lin" valueType="num">
+                                      <p:cBhvr additive="base">
+                                        <p:cTn id="18" dur="500" fill="hold"/>
+                                        <p:tgtEl>
+                                          <p:spTgt spid="3">
+                                            <p:txEl>
+                                              <p:pRg st="2" end="2"/>
+                                            </p:txEl>
+                                          </p:spTgt>
+                                        </p:tgtEl>
+                                        <p:attrNameLst>
+                                          <p:attrName>ppt_y</p:attrName>
+                                        </p:attrNameLst>
+                                      </p:cBhvr>
+                                      <p:tavLst>
+                                        <p:tav tm="0">
+                                          <p:val>
+                                            <p:strVal val="1+#ppt_h/2"/>
+                                          </p:val>
+                                        </p:tav>
+                                        <p:tav tm="100000">
+                                          <p:val>
+                                            <p:strVal val="#ppt_y"/>
+                                          </p:val>
+                                        </p:tav>
+                                      </p:tavLst>
+                                    </p:anim>
+                                  </p:childTnLst>
+                                </p:cTn>
+                              </p:par>
+                            </p:childTnLst>
+                          </p:cTn>
+                        </p:par>
+                        <p:par>
+                          <p:cTn id="19" fill="hold">
+                            <p:stCondLst>
+                              <p:cond delay="1500"/>
+                            </p:stCondLst>
+                            <p:childTnLst>
+                              <p:par>
+                                <p:cTn id="20" presetID="2" presetClass="entr" presetSubtype="4" fill="hold" nodeType="afterEffect">
+                                  <p:stCondLst>
+                                    <p:cond delay="0"/>
+                                  </p:stCondLst>
+                                  <p:childTnLst>
+                                    <p:set>
+                                      <p:cBhvr>
+                                        <p:cTn id="21" dur="1" fill="hold">
+                                          <p:stCondLst>
+                                            <p:cond delay="0"/>
+                                          </p:stCondLst>
+                                        </p:cTn>
+                                        <p:tgtEl>
+                                          <p:spTgt spid="3">
+                                            <p:txEl>
+                                              <p:pRg st="3" end="3"/>
+                                            </p:txEl>
+                                          </p:spTgt>
+                                        </p:tgtEl>
+                                        <p:attrNameLst>
+                                          <p:attrName>style.visibility</p:attrName>
+                                        </p:attrNameLst>
+                                      </p:cBhvr>
+                                      <p:to>
+                                        <p:strVal val="visible"/>
+                                      </p:to>
+                                    </p:set>
+                                    <p:anim calcmode="lin" valueType="num">
+                                      <p:cBhvr additive="base">
+                                        <p:cTn id="22" dur="500" fill="hold"/>
+                                        <p:tgtEl>
+                                          <p:spTgt spid="3">
+                                            <p:txEl>
+                                              <p:pRg st="3" end="3"/>
+                                            </p:txEl>
+                                          </p:spTgt>
+                                        </p:tgtEl>
+                                        <p:attrNameLst>
+                                          <p:attrName>ppt_x</p:attrName>
+                                        </p:attrNameLst>
+                                      </p:cBhvr>
+                                      <p:tavLst>
+                                        <p:tav tm="0">
+                                          <p:val>
+                                            <p:strVal val="#ppt_x"/>
+                                          </p:val>
+                                        </p:tav>
+                                        <p:tav tm="100000">
+                                          <p:val>
+                                            <p:strVal val="#ppt_x"/>
+                                          </p:val>
+                                        </p:tav>
+                                      </p:tavLst>
+                                    </p:anim>
+                                    <p:anim calcmode="lin" valueType="num">
+                                      <p:cBhvr additive="base">
+                                        <p:cTn id="23" dur="500" fill="hold"/>
+                                        <p:tgtEl>
+                                          <p:spTgt spid="3">
+                                            <p:txEl>
+                                              <p:pRg st="3" end="3"/>
+                                            </p:txEl>
+                                          </p:spTgt>
+                                        </p:tgtEl>
+                                        <p:attrNameLst>
+                                          <p:attrName>ppt_y</p:attrName>
+                                        </p:attrNameLst>
+                                      </p:cBhvr>
+                                      <p:tavLst>
+                                        <p:tav tm="0">
+                                          <p:val>
+                                            <p:strVal val="1+#ppt_h/2"/>
+                                          </p:val>
+                                        </p:tav>
+                                        <p:tav tm="100000">
+                                          <p:val>
+                                            <p:strVal val="#ppt_y"/>
+                                          </p:val>
+                                        </p:tav>
+                                      </p:tavLst>
+                                    </p:anim>
+                                  </p:childTnLst>
+                                </p:cTn>
+                              </p:par>
+                            </p:childTnLst>
+                          </p:cTn>
+                        </p:par>
+                      </p:childTnLst>
+                    </p:cTn>
+                  </p:par>
+                </p:childTnLst>
+              </p:cTn>
+              <p:prevCondLst>
+                <p:cond evt="onPrev" delay="0">
+                  <p:tgtEl>
+                    <p:sldTgt/>
+                  </p:tgtEl>
+                </p:cond>
+              </p:prevCondLst>
+              <p:nextCondLst>
+                <p:cond evt="onNext" delay="0">
+                  <p:tgtEl>
+                    <p:sldTgt/>
+                  </p:tgtEl>
+                </p:cond>
+              </p:nextCondLst>
+            </p:seq>
+          </p:childTnLst>
+        </p:cTn>
+      </p:par>
+    </p:tnLst>
+  </p:timing>
+</p:sld>
+</file>
+
+<file path=ppt/slides/slide4.xml><?xml version="1.0" encoding="utf-8"?>
+<p:sld xmlns:a="http://schemas.openxmlformats.org/drawingml/2006/main" xmlns:r="http://schemas.openxmlformats.org/officeDocument/2006/relationships" xmlns:p="http://schemas.openxmlformats.org/presentationml/2006/main">
+  <p:cSld>
+    <p:spTree>
+      <p:nvGrpSpPr>
+        <p:cNvPr id="1" name=""/>
+        <p:cNvGrpSpPr/>
+        <p:nvPr/>
+      </p:nvGrpSpPr>
+      <p:grpSpPr>
+        <a:xfrm>
+          <a:off x="0" y="0"/>
+          <a:ext cx="0" cy="0"/>
+          <a:chOff x="0" y="0"/>
+          <a:chExt cx="0" cy="0"/>
+        </a:xfrm>
+      </p:grpSpPr>
+      <p:sp>
+        <p:nvSpPr>
+          <p:cNvPr id="2" name="Cím 1"/>
+          <p:cNvSpPr>
+            <a:spLocks noGrp="1"/>
+          </p:cNvSpPr>
+          <p:nvPr>
+            <p:ph type="title"/>
+          </p:nvPr>
+        </p:nvSpPr>
+        <p:spPr/>
+        <p:txBody>
+          <a:bodyPr/>
+          <a:lstStyle/>
+          <a:p>
+            <a:r>
+              <a:rPr lang="hu-HU" dirty="0" smtClean="0">
+                <a:solidFill>
+                  <a:schemeClr val="bg1"/>
+                </a:solidFill>
+                <a:latin typeface="Algerian" panose="04020705040A02060702" pitchFamily="82" charset="0"/>
+              </a:rPr>
+              <a:t>Memória típusok</a:t>
+            </a:r>
+            <a:endParaRPr lang="hu-HU" dirty="0">
+              <a:solidFill>
+                <a:schemeClr val="bg1"/>
+              </a:solidFill>
+              <a:latin typeface="Algerian" panose="04020705040A02060702" pitchFamily="82" charset="0"/>
+            </a:endParaRPr>
+          </a:p>
+        </p:txBody>
+      </p:sp>
+      <p:sp>
+        <p:nvSpPr>
+          <p:cNvPr id="3" name="Tartalom helye 2"/>
+          <p:cNvSpPr>
+            <a:spLocks noGrp="1"/>
+          </p:cNvSpPr>
+          <p:nvPr>
+            <p:ph idx="1"/>
+          </p:nvPr>
+        </p:nvSpPr>
+        <p:spPr>
+          <a:xfrm>
+            <a:off x="838200" y="3494934"/>
+            <a:ext cx="10515600" cy="1910034"/>
+          </a:xfrm>
+        </p:spPr>
+        <p:txBody>
+          <a:bodyPr/>
+          <a:lstStyle/>
+          <a:p>
+            <a:r>
+              <a:rPr lang="hu-HU" dirty="0">
+                <a:solidFill>
+                  <a:schemeClr val="bg1"/>
+                </a:solidFill>
+              </a:rPr>
+              <a:t>Ez egy további régebbi RAM típus, amelyet a </a:t>
+            </a:r>
+            <a:r>
+              <a:rPr lang="hu-HU" dirty="0" err="1">
+                <a:solidFill>
+                  <a:schemeClr val="bg1"/>
+                </a:solidFill>
+              </a:rPr>
+              <a:t>Rambus</a:t>
+            </a:r>
+            <a:r>
+              <a:rPr lang="hu-HU" dirty="0">
+                <a:solidFill>
+                  <a:schemeClr val="bg1"/>
+                </a:solidFill>
+              </a:rPr>
+              <a:t> Inc. fejlesztett ki. </a:t>
+            </a:r>
+          </a:p>
+          <a:p>
+            <a:r>
+              <a:rPr lang="hu-HU" dirty="0">
+                <a:solidFill>
+                  <a:schemeClr val="bg1"/>
+                </a:solidFill>
+              </a:rPr>
+              <a:t>M</a:t>
+            </a:r>
+            <a:r>
+              <a:rPr lang="hu-HU" dirty="0" smtClean="0">
+                <a:solidFill>
+                  <a:schemeClr val="bg1"/>
+                </a:solidFill>
+              </a:rPr>
+              <a:t>agasabb </a:t>
+            </a:r>
+            <a:r>
+              <a:rPr lang="hu-HU" dirty="0">
+                <a:solidFill>
+                  <a:schemeClr val="bg1"/>
+                </a:solidFill>
+              </a:rPr>
+              <a:t>adatátviteli sebességet kínál, de kevésbé elterjedt és korlátozottan kompatibilis más rendszerekkel</a:t>
+            </a:r>
+          </a:p>
+          <a:p>
+            <a:endParaRPr lang="hu-HU" dirty="0"/>
+          </a:p>
+        </p:txBody>
+      </p:sp>
+      <p:sp>
+        <p:nvSpPr>
+          <p:cNvPr id="4" name="Szövegdoboz 3"/>
+          <p:cNvSpPr txBox="1"/>
+          <p:nvPr/>
+        </p:nvSpPr>
+        <p:spPr>
+          <a:xfrm>
+            <a:off x="1915222" y="2608877"/>
+            <a:ext cx="8361556" cy="800219"/>
+          </a:xfrm>
+          <a:prstGeom prst="rect">
+            <a:avLst/>
+          </a:prstGeom>
+          <a:noFill/>
+        </p:spPr>
+        <p:txBody>
+          <a:bodyPr wrap="square" rtlCol="0">
+            <a:spAutoFit/>
+          </a:bodyPr>
+          <a:lstStyle/>
+          <a:p>
+            <a:pPr algn="ctr"/>
+            <a:r>
+              <a:rPr lang="hu-HU" sz="2800" b="1" u="sng" dirty="0">
+                <a:solidFill>
+                  <a:schemeClr val="bg1"/>
+                </a:solidFill>
+              </a:rPr>
+              <a:t>RDRAM (</a:t>
+            </a:r>
+            <a:r>
+              <a:rPr lang="hu-HU" sz="2800" b="1" u="sng" dirty="0" err="1">
+                <a:solidFill>
+                  <a:schemeClr val="bg1"/>
+                </a:solidFill>
+              </a:rPr>
+              <a:t>Rambus</a:t>
+            </a:r>
+            <a:r>
+              <a:rPr lang="hu-HU" sz="2800" b="1" u="sng" dirty="0">
+                <a:solidFill>
+                  <a:schemeClr val="bg1"/>
+                </a:solidFill>
+              </a:rPr>
+              <a:t> </a:t>
+            </a:r>
+            <a:r>
+              <a:rPr lang="hu-HU" sz="2800" b="1" u="sng" dirty="0" err="1">
+                <a:solidFill>
+                  <a:schemeClr val="bg1"/>
+                </a:solidFill>
+              </a:rPr>
+              <a:t>Dynamic</a:t>
+            </a:r>
+            <a:r>
+              <a:rPr lang="hu-HU" sz="2800" b="1" u="sng" dirty="0">
+                <a:solidFill>
+                  <a:schemeClr val="bg1"/>
+                </a:solidFill>
+              </a:rPr>
+              <a:t> Random Access </a:t>
+            </a:r>
+            <a:r>
+              <a:rPr lang="hu-HU" sz="2800" b="1" u="sng" dirty="0" err="1">
+                <a:solidFill>
+                  <a:schemeClr val="bg1"/>
+                </a:solidFill>
+              </a:rPr>
+              <a:t>Memory</a:t>
+            </a:r>
+            <a:r>
+              <a:rPr lang="hu-HU" sz="2800" b="1" u="sng" dirty="0" smtClean="0">
+                <a:solidFill>
+                  <a:schemeClr val="bg1"/>
+                </a:solidFill>
+              </a:rPr>
+              <a:t>)</a:t>
+            </a:r>
+            <a:r>
+              <a:rPr lang="hu-HU" sz="2800" u="sng" dirty="0" smtClean="0">
+                <a:solidFill>
+                  <a:schemeClr val="bg1"/>
+                </a:solidFill>
+              </a:rPr>
+              <a:t> </a:t>
+            </a:r>
+            <a:endParaRPr lang="hu-HU" sz="2800" u="sng" dirty="0">
+              <a:solidFill>
+                <a:schemeClr val="bg1"/>
+              </a:solidFill>
+            </a:endParaRPr>
+          </a:p>
+          <a:p>
+            <a:pPr algn="ctr"/>
+            <a:endParaRPr lang="hu-HU" dirty="0">
+              <a:solidFill>
+                <a:schemeClr val="bg1"/>
+              </a:solidFill>
+            </a:endParaRPr>
+          </a:p>
+        </p:txBody>
+      </p:sp>
+    </p:spTree>
+    <p:extLst>
+      <p:ext uri="{BB962C8B-B14F-4D97-AF65-F5344CB8AC3E}">
+        <p14:creationId xmlns:p14="http://schemas.microsoft.com/office/powerpoint/2010/main" val="2562855163"/>
+      </p:ext>
+    </p:extLst>
+  </p:cSld>
+  <p:clrMapOvr>
+    <a:masterClrMapping/>
+  </p:clrMapOvr>
+  <mc:AlternateContent xmlns:mc="http://schemas.openxmlformats.org/markup-compatibility/2006">
+    <mc:Choice xmlns:p14="http://schemas.microsoft.com/office/powerpoint/2010/main" Requires="p14">
+      <p:transition spd="slow" p14:dur="3400">
+        <p14:reveal/>
+      </p:transition>
+    </mc:Choice>
+    <mc:Fallback>
+      <p:transition spd="slow">
+        <p:fade/>
+      </p:transition>
+    </mc:Fallback>
+  </mc:AlternateContent>
+  <p:timing>
+    <p:tnLst>
+      <p:par>
+        <p:cTn id="1" dur="indefinite" restart="never" nodeType="tmRoot">
+          <p:childTnLst>
+            <p:seq concurrent="1" nextAc="seek">
+              <p:cTn id="2" dur="indefinite" nodeType="mainSeq">
+                <p:childTnLst>
+                  <p:par>
+                    <p:cTn id="3" fill="hold">
+                      <p:stCondLst>
+                        <p:cond delay="indefinite"/>
+                        <p:cond evt="onBegin" delay="0">
+                          <p:tn val="2"/>
+                        </p:cond>
+                      </p:stCondLst>
+                      <p:childTnLst>
+                        <p:par>
+                          <p:cTn id="4" fill="hold">
+                            <p:stCondLst>
+                              <p:cond delay="0"/>
+                            </p:stCondLst>
+                            <p:childTnLst>
+                              <p:par>
+                                <p:cTn id="5" presetID="2" presetClass="entr" presetSubtype="8" fill="hold" nodeType="afterEffect">
+                                  <p:stCondLst>
+                                    <p:cond delay="0"/>
+                                  </p:stCondLst>
+                                  <p:childTnLst>
+                                    <p:set>
+                                      <p:cBhvr>
+                                        <p:cTn id="6" dur="1" fill="hold">
+                                          <p:stCondLst>
+                                            <p:cond delay="0"/>
+                                          </p:stCondLst>
+                                        </p:cTn>
+                                        <p:tgtEl>
+                                          <p:spTgt spid="4">
+                                            <p:txEl>
+                                              <p:pRg st="0" end="0"/>
+                                            </p:txEl>
+                                          </p:spTgt>
+                                        </p:tgtEl>
+                                        <p:attrNameLst>
+                                          <p:attrName>style.visibility</p:attrName>
+                                        </p:attrNameLst>
+                                      </p:cBhvr>
+                                      <p:to>
+                                        <p:strVal val="visible"/>
+                                      </p:to>
+                                    </p:set>
+                                    <p:anim calcmode="lin" valueType="num">
+                                      <p:cBhvr additive="base">
+                                        <p:cTn id="7" dur="500" fill="hold"/>
+                                        <p:tgtEl>
+                                          <p:spTgt spid="4">
+                                            <p:txEl>
+                                              <p:pRg st="0" end="0"/>
+                                            </p:txEl>
+                                          </p:spTgt>
+                                        </p:tgtEl>
+                                        <p:attrNameLst>
+                                          <p:attrName>ppt_x</p:attrName>
+                                        </p:attrNameLst>
+                                      </p:cBhvr>
+                                      <p:tavLst>
+                                        <p:tav tm="0">
+                                          <p:val>
+                                            <p:strVal val="0-#ppt_w/2"/>
+                                          </p:val>
+                                        </p:tav>
+                                        <p:tav tm="100000">
+                                          <p:val>
+                                            <p:strVal val="#ppt_x"/>
+                                          </p:val>
+                                        </p:tav>
+                                      </p:tavLst>
+                                    </p:anim>
+                                    <p:anim calcmode="lin" valueType="num">
+                                      <p:cBhvr additive="base">
+                                        <p:cTn id="8" dur="500" fill="hold"/>
+                                        <p:tgtEl>
+                                          <p:spTgt spid="4">
+                                            <p:txEl>
+                                              <p:pRg st="0" end="0"/>
+                                            </p:txEl>
+                                          </p:spTgt>
+                                        </p:tgtEl>
+                                        <p:attrNameLst>
+                                          <p:attrName>ppt_y</p:attrName>
+                                        </p:attrNameLst>
+                                      </p:cBhvr>
+                                      <p:tavLst>
+                                        <p:tav tm="0">
+                                          <p:val>
+                                            <p:strVal val="#ppt_y"/>
+                                          </p:val>
+                                        </p:tav>
+                                        <p:tav tm="100000">
+                                          <p:val>
+                                            <p:strVal val="#ppt_y"/>
+                                          </p:val>
+                                        </p:tav>
+                                      </p:tavLst>
+                                    </p:anim>
+                                  </p:childTnLst>
+                                </p:cTn>
+                              </p:par>
+                            </p:childTnLst>
+                          </p:cTn>
+                        </p:par>
+                        <p:par>
+                          <p:cTn id="9" fill="hold">
+                            <p:stCondLst>
+                              <p:cond delay="500"/>
+                            </p:stCondLst>
+                            <p:childTnLst>
+                              <p:par>
+                                <p:cTn id="10" presetID="2" presetClass="entr" presetSubtype="8" fill="hold" nodeType="afterEffect">
+                                  <p:stCondLst>
+                                    <p:cond delay="0"/>
+                                  </p:stCondLst>
+                                  <p:childTnLst>
+                                    <p:set>
+                                      <p:cBhvr>
+                                        <p:cTn id="11" dur="1" fill="hold">
+                                          <p:stCondLst>
+                                            <p:cond delay="0"/>
+                                          </p:stCondLst>
+                                        </p:cTn>
+                                        <p:tgtEl>
+                                          <p:spTgt spid="3">
+                                            <p:txEl>
+                                              <p:pRg st="0" end="0"/>
+                                            </p:txEl>
+                                          </p:spTgt>
+                                        </p:tgtEl>
+                                        <p:attrNameLst>
+                                          <p:attrName>style.visibility</p:attrName>
+                                        </p:attrNameLst>
+                                      </p:cBhvr>
+                                      <p:to>
+                                        <p:strVal val="visible"/>
+                                      </p:to>
+                                    </p:set>
+                                    <p:anim calcmode="lin" valueType="num">
+                                      <p:cBhvr additive="base">
+                                        <p:cTn id="12" dur="500" fill="hold"/>
+                                        <p:tgtEl>
+                                          <p:spTgt spid="3">
+                                            <p:txEl>
+                                              <p:pRg st="0" end="0"/>
+                                            </p:txEl>
+                                          </p:spTgt>
+                                        </p:tgtEl>
+                                        <p:attrNameLst>
+                                          <p:attrName>ppt_x</p:attrName>
+                                        </p:attrNameLst>
+                                      </p:cBhvr>
+                                      <p:tavLst>
+                                        <p:tav tm="0">
+                                          <p:val>
+                                            <p:strVal val="0-#ppt_w/2"/>
+                                          </p:val>
+                                        </p:tav>
+                                        <p:tav tm="100000">
+                                          <p:val>
+                                            <p:strVal val="#ppt_x"/>
+                                          </p:val>
+                                        </p:tav>
+                                      </p:tavLst>
+                                    </p:anim>
+                                    <p:anim calcmode="lin" valueType="num">
+                                      <p:cBhvr additive="base">
+                                        <p:cTn id="13" dur="500" fill="hold"/>
+                                        <p:tgtEl>
+                                          <p:spTgt spid="3">
+                                            <p:txEl>
+                                              <p:pRg st="0" end="0"/>
+                                            </p:txEl>
+                                          </p:spTgt>
+                                        </p:tgtEl>
+                                        <p:attrNameLst>
+                                          <p:attrName>ppt_y</p:attrName>
+                                        </p:attrNameLst>
+                                      </p:cBhvr>
+                                      <p:tavLst>
+                                        <p:tav tm="0">
+                                          <p:val>
+                                            <p:strVal val="#ppt_y"/>
+                                          </p:val>
+                                        </p:tav>
+                                        <p:tav tm="100000">
+                                          <p:val>
+                                            <p:strVal val="#ppt_y"/>
+                                          </p:val>
+                                        </p:tav>
+                                      </p:tavLst>
+                                    </p:anim>
+                                  </p:childTnLst>
+                                </p:cTn>
+                              </p:par>
+                            </p:childTnLst>
+                          </p:cTn>
+                        </p:par>
+                        <p:par>
+                          <p:cTn id="14" fill="hold">
+                            <p:stCondLst>
+                              <p:cond delay="1000"/>
+                            </p:stCondLst>
+                            <p:childTnLst>
+                              <p:par>
+                                <p:cTn id="15" presetID="2" presetClass="entr" presetSubtype="8" fill="hold" nodeType="afterEffect">
+                                  <p:stCondLst>
+                                    <p:cond delay="0"/>
+                                  </p:stCondLst>
+                                  <p:childTnLst>
+                                    <p:set>
+                                      <p:cBhvr>
+                                        <p:cTn id="16" dur="1" fill="hold">
+                                          <p:stCondLst>
+                                            <p:cond delay="0"/>
+                                          </p:stCondLst>
+                                        </p:cTn>
+                                        <p:tgtEl>
+                                          <p:spTgt spid="3">
+                                            <p:txEl>
+                                              <p:pRg st="1" end="1"/>
+                                            </p:txEl>
+                                          </p:spTgt>
+                                        </p:tgtEl>
+                                        <p:attrNameLst>
+                                          <p:attrName>style.visibility</p:attrName>
+                                        </p:attrNameLst>
+                                      </p:cBhvr>
+                                      <p:to>
+                                        <p:strVal val="visible"/>
+                                      </p:to>
+                                    </p:set>
+                                    <p:anim calcmode="lin" valueType="num">
+                                      <p:cBhvr additive="base">
+                                        <p:cTn id="17" dur="500" fill="hold"/>
+                                        <p:tgtEl>
+                                          <p:spTgt spid="3">
+                                            <p:txEl>
+                                              <p:pRg st="1" end="1"/>
+                                            </p:txEl>
+                                          </p:spTgt>
+                                        </p:tgtEl>
+                                        <p:attrNameLst>
+                                          <p:attrName>ppt_x</p:attrName>
+                                        </p:attrNameLst>
+                                      </p:cBhvr>
+                                      <p:tavLst>
+                                        <p:tav tm="0">
+                                          <p:val>
+                                            <p:strVal val="0-#ppt_w/2"/>
+                                          </p:val>
+                                        </p:tav>
+                                        <p:tav tm="100000">
+                                          <p:val>
+                                            <p:strVal val="#ppt_x"/>
+                                          </p:val>
+                                        </p:tav>
+                                      </p:tavLst>
+                                    </p:anim>
+                                    <p:anim calcmode="lin" valueType="num">
+                                      <p:cBhvr additive="base">
+                                        <p:cTn id="18" dur="500" fill="hold"/>
+                                        <p:tgtEl>
+                                          <p:spTgt spid="3">
+                                            <p:txEl>
+                                              <p:pRg st="1" end="1"/>
+                                            </p:txEl>
+                                          </p:spTgt>
+                                        </p:tgtEl>
+                                        <p:attrNameLst>
+                                          <p:attrName>ppt_y</p:attrName>
+                                        </p:attrNameLst>
+                                      </p:cBhvr>
+                                      <p:tavLst>
+                                        <p:tav tm="0">
+                                          <p:val>
+                                            <p:strVal val="#ppt_y"/>
+                                          </p:val>
+                                        </p:tav>
+                                        <p:tav tm="100000">
+                                          <p:val>
+                                            <p:strVal val="#ppt_y"/>
+                                          </p:val>
+                                        </p:tav>
+                                      </p:tavLst>
+                                    </p:anim>
+                                  </p:childTnLst>
+                                </p:cTn>
+                              </p:par>
+                            </p:childTnLst>
+                          </p:cTn>
+                        </p:par>
+                      </p:childTnLst>
+                    </p:cTn>
+                  </p:par>
+                </p:childTnLst>
+              </p:cTn>
+              <p:prevCondLst>
+                <p:cond evt="onPrev" delay="0">
+                  <p:tgtEl>
+                    <p:sldTgt/>
+                  </p:tgtEl>
+                </p:cond>
+              </p:prevCondLst>
+              <p:nextCondLst>
+                <p:cond evt="onNext" delay="0">
+                  <p:tgtEl>
+                    <p:sldTgt/>
+                  </p:tgtEl>
+                </p:cond>
+              </p:nextCondLst>
+            </p:seq>
+          </p:childTnLst>
+        </p:cTn>
+      </p:par>
+    </p:tnLst>
+  </p:timing>
+</p:sld>
+</file>
+
+<file path=ppt/slides/slide5.xml><?xml version="1.0" encoding="utf-8"?>
+<p:sld xmlns:a="http://schemas.openxmlformats.org/drawingml/2006/main" xmlns:r="http://schemas.openxmlformats.org/officeDocument/2006/relationships" xmlns:p="http://schemas.openxmlformats.org/presentationml/2006/main">
+  <p:cSld>
+    <p:spTree>
+      <p:nvGrpSpPr>
+        <p:cNvPr id="1" name=""/>
+        <p:cNvGrpSpPr/>
+        <p:nvPr/>
+      </p:nvGrpSpPr>
+      <p:grpSpPr>
+        <a:xfrm>
+          <a:off x="0" y="0"/>
+          <a:ext cx="0" cy="0"/>
+          <a:chOff x="0" y="0"/>
+          <a:chExt cx="0" cy="0"/>
+        </a:xfrm>
+      </p:grpSpPr>
+      <p:sp>
+        <p:nvSpPr>
+          <p:cNvPr id="2" name="Cím 1"/>
+          <p:cNvSpPr>
+            <a:spLocks noGrp="1"/>
+          </p:cNvSpPr>
+          <p:nvPr>
+            <p:ph type="title"/>
+          </p:nvPr>
+        </p:nvSpPr>
+        <p:spPr/>
+        <p:txBody>
+          <a:bodyPr/>
+          <a:lstStyle/>
+          <a:p>
+            <a:r>
+              <a:rPr lang="hu-HU" dirty="0" smtClean="0">
+                <a:solidFill>
+                  <a:schemeClr val="bg1"/>
+                </a:solidFill>
+                <a:latin typeface="Algerian" panose="04020705040A02060702" pitchFamily="82" charset="0"/>
+              </a:rPr>
+              <a:t>Memória típusok</a:t>
+            </a:r>
+            <a:endParaRPr lang="hu-HU" dirty="0">
+              <a:solidFill>
+                <a:schemeClr val="bg1"/>
+              </a:solidFill>
+              <a:latin typeface="Algerian" panose="04020705040A02060702" pitchFamily="82" charset="0"/>
+            </a:endParaRPr>
+          </a:p>
+        </p:txBody>
+      </p:sp>
+      <p:sp>
+        <p:nvSpPr>
+          <p:cNvPr id="3" name="Tartalom helye 2"/>
+          <p:cNvSpPr>
+            <a:spLocks noGrp="1"/>
+          </p:cNvSpPr>
+          <p:nvPr>
+            <p:ph idx="1"/>
+          </p:nvPr>
+        </p:nvSpPr>
+        <p:spPr>
+          <a:xfrm>
+            <a:off x="838200" y="3494934"/>
+            <a:ext cx="10515600" cy="1640737"/>
+          </a:xfrm>
+        </p:spPr>
+        <p:txBody>
+          <a:bodyPr/>
+          <a:lstStyle/>
+          <a:p>
+            <a:r>
+              <a:rPr lang="hu-HU" dirty="0">
+                <a:solidFill>
+                  <a:schemeClr val="bg1"/>
+                </a:solidFill>
+              </a:rPr>
+              <a:t>R</a:t>
+            </a:r>
+            <a:r>
+              <a:rPr lang="hu-HU" dirty="0" smtClean="0">
+                <a:solidFill>
+                  <a:schemeClr val="bg1"/>
+                </a:solidFill>
+              </a:rPr>
+              <a:t>égebbi </a:t>
+            </a:r>
+            <a:r>
+              <a:rPr lang="hu-HU" dirty="0">
+                <a:solidFill>
+                  <a:schemeClr val="bg1"/>
+                </a:solidFill>
+              </a:rPr>
+              <a:t>típusú RAM, amelyet a DDR generációk váltottak fel</a:t>
+            </a:r>
+          </a:p>
+          <a:p>
+            <a:r>
+              <a:rPr lang="hu-HU" dirty="0">
+                <a:solidFill>
+                  <a:schemeClr val="bg1"/>
+                </a:solidFill>
+              </a:rPr>
+              <a:t>Kisebb sebesség és adatátvitel</a:t>
+            </a:r>
+          </a:p>
+          <a:p>
+            <a:r>
+              <a:rPr lang="hu-HU" dirty="0">
+                <a:solidFill>
+                  <a:schemeClr val="bg1"/>
+                </a:solidFill>
+              </a:rPr>
+              <a:t>Á</a:t>
+            </a:r>
+            <a:r>
+              <a:rPr lang="hu-HU" dirty="0" smtClean="0">
+                <a:solidFill>
+                  <a:schemeClr val="bg1"/>
+                </a:solidFill>
+              </a:rPr>
+              <a:t>ltalában régebbi (nagyon régi) </a:t>
+            </a:r>
+            <a:r>
+              <a:rPr lang="hu-HU" dirty="0">
+                <a:solidFill>
+                  <a:schemeClr val="bg1"/>
+                </a:solidFill>
+              </a:rPr>
+              <a:t>számítógépekben </a:t>
+            </a:r>
+          </a:p>
+          <a:p>
+            <a:endParaRPr lang="hu-HU" dirty="0"/>
+          </a:p>
+        </p:txBody>
+      </p:sp>
+      <p:sp>
+        <p:nvSpPr>
+          <p:cNvPr id="5" name="Szövegdoboz 4"/>
+          <p:cNvSpPr txBox="1"/>
+          <p:nvPr/>
+        </p:nvSpPr>
+        <p:spPr>
+          <a:xfrm>
+            <a:off x="1698734" y="2694715"/>
+            <a:ext cx="8794531" cy="800219"/>
+          </a:xfrm>
+          <a:prstGeom prst="rect">
+            <a:avLst/>
+          </a:prstGeom>
+          <a:noFill/>
+        </p:spPr>
+        <p:txBody>
+          <a:bodyPr wrap="square" rtlCol="0">
+            <a:spAutoFit/>
+          </a:bodyPr>
+          <a:lstStyle/>
+          <a:p>
+            <a:pPr algn="ctr"/>
+            <a:r>
+              <a:rPr lang="hu-HU" sz="2800" b="1" u="sng" dirty="0" smtClean="0">
+                <a:solidFill>
+                  <a:schemeClr val="bg1"/>
+                </a:solidFill>
+              </a:rPr>
+              <a:t>SDRAM (</a:t>
+            </a:r>
+            <a:r>
+              <a:rPr lang="hu-HU" sz="2800" b="1" u="sng" dirty="0" err="1">
+                <a:solidFill>
+                  <a:schemeClr val="bg1"/>
+                </a:solidFill>
+              </a:rPr>
+              <a:t>Synchronous</a:t>
+            </a:r>
+            <a:r>
+              <a:rPr lang="hu-HU" sz="2800" b="1" u="sng" dirty="0">
+                <a:solidFill>
+                  <a:schemeClr val="bg1"/>
+                </a:solidFill>
+              </a:rPr>
+              <a:t> </a:t>
+            </a:r>
+            <a:r>
+              <a:rPr lang="hu-HU" sz="2800" b="1" u="sng" dirty="0" err="1">
+                <a:solidFill>
+                  <a:schemeClr val="bg1"/>
+                </a:solidFill>
+              </a:rPr>
+              <a:t>Dynamic</a:t>
+            </a:r>
+            <a:r>
+              <a:rPr lang="hu-HU" sz="2800" b="1" u="sng" dirty="0">
+                <a:solidFill>
+                  <a:schemeClr val="bg1"/>
+                </a:solidFill>
+              </a:rPr>
+              <a:t> Random Access </a:t>
+            </a:r>
+            <a:r>
+              <a:rPr lang="hu-HU" sz="2800" b="1" u="sng" dirty="0" err="1">
+                <a:solidFill>
+                  <a:schemeClr val="bg1"/>
+                </a:solidFill>
+              </a:rPr>
+              <a:t>Memory</a:t>
+            </a:r>
+            <a:r>
+              <a:rPr lang="hu-HU" sz="2800" b="1" u="sng" dirty="0" smtClean="0">
+                <a:solidFill>
+                  <a:schemeClr val="bg1"/>
+                </a:solidFill>
+              </a:rPr>
+              <a:t>)</a:t>
+            </a:r>
+            <a:r>
+              <a:rPr lang="hu-HU" sz="2800" u="sng" dirty="0" smtClean="0">
+                <a:solidFill>
+                  <a:schemeClr val="bg1"/>
+                </a:solidFill>
+              </a:rPr>
+              <a:t> </a:t>
+            </a:r>
+            <a:endParaRPr lang="hu-HU" sz="2800" u="sng" dirty="0">
+              <a:solidFill>
+                <a:schemeClr val="bg1"/>
+              </a:solidFill>
+            </a:endParaRPr>
+          </a:p>
+          <a:p>
+            <a:pPr algn="ctr"/>
+            <a:endParaRPr lang="hu-HU" dirty="0">
+              <a:solidFill>
+                <a:schemeClr val="bg1"/>
+              </a:solidFill>
+            </a:endParaRPr>
+          </a:p>
+        </p:txBody>
+      </p:sp>
+    </p:spTree>
+    <p:extLst>
+      <p:ext uri="{BB962C8B-B14F-4D97-AF65-F5344CB8AC3E}">
+        <p14:creationId xmlns:p14="http://schemas.microsoft.com/office/powerpoint/2010/main" val="474864359"/>
+      </p:ext>
+    </p:extLst>
+  </p:cSld>
+  <p:clrMapOvr>
+    <a:masterClrMapping/>
+  </p:clrMapOvr>
+  <mc:AlternateContent xmlns:mc="http://schemas.openxmlformats.org/markup-compatibility/2006">
+    <mc:Choice xmlns:p14="http://schemas.microsoft.com/office/powerpoint/2010/main" Requires="p14">
+      <p:transition spd="med" p14:dur="700">
+        <p:fade/>
+      </p:transition>
+    </mc:Choice>
+    <mc:Fallback>
+      <p:transition spd="med">
+        <p:fade/>
+      </p:transition>
+    </mc:Fallback>
+  </mc:AlternateContent>
+  <p:timing>
+    <p:tnLst>
+      <p:par>
+        <p:cTn id="1" dur="indefinite" restart="never" nodeType="tmRoot">
+          <p:childTnLst>
+            <p:seq concurrent="1" nextAc="seek">
+              <p:cTn id="2" dur="indefinite" nodeType="mainSeq">
+                <p:childTnLst>
+                  <p:par>
+                    <p:cTn id="3" fill="hold">
+                      <p:stCondLst>
+                        <p:cond delay="indefinite"/>
+                        <p:cond evt="onBegin" delay="0">
+                          <p:tn val="2"/>
+                        </p:cond>
+                      </p:stCondLst>
+                      <p:childTnLst>
+                        <p:par>
+                          <p:cTn id="4" fill="hold">
+                            <p:stCondLst>
+                              <p:cond delay="0"/>
+                            </p:stCondLst>
+                            <p:childTnLst>
+                              <p:par>
+                                <p:cTn id="5" presetID="2" presetClass="entr" presetSubtype="8" fill="hold" nodeType="afterEffect">
+                                  <p:stCondLst>
+                                    <p:cond delay="0"/>
+                                  </p:stCondLst>
+                                  <p:childTnLst>
+                                    <p:set>
+                                      <p:cBhvr>
+                                        <p:cTn id="6" dur="1" fill="hold">
+                                          <p:stCondLst>
+                                            <p:cond delay="0"/>
+                                          </p:stCondLst>
+                                        </p:cTn>
+                                        <p:tgtEl>
+                                          <p:spTgt spid="5">
+                                            <p:txEl>
+                                              <p:pRg st="0" end="0"/>
+                                            </p:txEl>
+                                          </p:spTgt>
+                                        </p:tgtEl>
+                                        <p:attrNameLst>
+                                          <p:attrName>style.visibility</p:attrName>
+                                        </p:attrNameLst>
+                                      </p:cBhvr>
+                                      <p:to>
+                                        <p:strVal val="visible"/>
+                                      </p:to>
+                                    </p:set>
+                                    <p:anim calcmode="lin" valueType="num">
+                                      <p:cBhvr additive="base">
+                                        <p:cTn id="7" dur="500" fill="hold"/>
+                                        <p:tgtEl>
+                                          <p:spTgt spid="5">
+                                            <p:txEl>
+                                              <p:pRg st="0" end="0"/>
+                                            </p:txEl>
+                                          </p:spTgt>
+                                        </p:tgtEl>
+                                        <p:attrNameLst>
+                                          <p:attrName>ppt_x</p:attrName>
+                                        </p:attrNameLst>
+                                      </p:cBhvr>
+                                      <p:tavLst>
+                                        <p:tav tm="0">
+                                          <p:val>
+                                            <p:strVal val="0-#ppt_w/2"/>
+                                          </p:val>
+                                        </p:tav>
+                                        <p:tav tm="100000">
+                                          <p:val>
+                                            <p:strVal val="#ppt_x"/>
+                                          </p:val>
+                                        </p:tav>
+                                      </p:tavLst>
+                                    </p:anim>
+                                    <p:anim calcmode="lin" valueType="num">
+                                      <p:cBhvr additive="base">
+                                        <p:cTn id="8" dur="500" fill="hold"/>
+                                        <p:tgtEl>
+                                          <p:spTgt spid="5">
+                                            <p:txEl>
+                                              <p:pRg st="0" end="0"/>
+                                            </p:txEl>
+                                          </p:spTgt>
+                                        </p:tgtEl>
+                                        <p:attrNameLst>
+                                          <p:attrName>ppt_y</p:attrName>
+                                        </p:attrNameLst>
+                                      </p:cBhvr>
+                                      <p:tavLst>
+                                        <p:tav tm="0">
+                                          <p:val>
+                                            <p:strVal val="#ppt_y"/>
+                                          </p:val>
+                                        </p:tav>
+                                        <p:tav tm="100000">
+                                          <p:val>
+                                            <p:strVal val="#ppt_y"/>
+                                          </p:val>
+                                        </p:tav>
+                                      </p:tavLst>
+                                    </p:anim>
+                                  </p:childTnLst>
+                                </p:cTn>
+                              </p:par>
+                            </p:childTnLst>
+                          </p:cTn>
+                        </p:par>
+                        <p:par>
+                          <p:cTn id="9" fill="hold">
+                            <p:stCondLst>
+                              <p:cond delay="500"/>
+                            </p:stCondLst>
+                            <p:childTnLst>
+                              <p:par>
+                                <p:cTn id="10" presetID="2" presetClass="entr" presetSubtype="6" fill="hold" nodeType="afterEffect">
+                                  <p:stCondLst>
+                                    <p:cond delay="0"/>
+                                  </p:stCondLst>
+                                  <p:childTnLst>
+                                    <p:set>
+                                      <p:cBhvr>
+                                        <p:cTn id="11" dur="1" fill="hold">
+                                          <p:stCondLst>
+                                            <p:cond delay="0"/>
+                                          </p:stCondLst>
+                                        </p:cTn>
+                                        <p:tgtEl>
+                                          <p:spTgt spid="3">
+                                            <p:txEl>
+                                              <p:pRg st="0" end="0"/>
+                                            </p:txEl>
+                                          </p:spTgt>
+                                        </p:tgtEl>
+                                        <p:attrNameLst>
+                                          <p:attrName>style.visibility</p:attrName>
+                                        </p:attrNameLst>
+                                      </p:cBhvr>
+                                      <p:to>
+                                        <p:strVal val="visible"/>
+                                      </p:to>
+                                    </p:set>
+                                    <p:anim calcmode="lin" valueType="num">
+                                      <p:cBhvr additive="base">
+                                        <p:cTn id="12" dur="500" fill="hold"/>
+                                        <p:tgtEl>
+                                          <p:spTgt spid="3">
+                                            <p:txEl>
+                                              <p:pRg st="0" end="0"/>
+                                            </p:txEl>
+                                          </p:spTgt>
+                                        </p:tgtEl>
+                                        <p:attrNameLst>
+                                          <p:attrName>ppt_x</p:attrName>
+                                        </p:attrNameLst>
+                                      </p:cBhvr>
+                                      <p:tavLst>
+                                        <p:tav tm="0">
+                                          <p:val>
+                                            <p:strVal val="1+#ppt_w/2"/>
+                                          </p:val>
+                                        </p:tav>
+                                        <p:tav tm="100000">
+                                          <p:val>
+                                            <p:strVal val="#ppt_x"/>
+                                          </p:val>
+                                        </p:tav>
+                                      </p:tavLst>
+                                    </p:anim>
+                                    <p:anim calcmode="lin" valueType="num">
+                                      <p:cBhvr additive="base">
+                                        <p:cTn id="13" dur="500" fill="hold"/>
+                                        <p:tgtEl>
+                                          <p:spTgt spid="3">
+                                            <p:txEl>
+                                              <p:pRg st="0" end="0"/>
+                                            </p:txEl>
+                                          </p:spTgt>
+                                        </p:tgtEl>
+                                        <p:attrNameLst>
+                                          <p:attrName>ppt_y</p:attrName>
+                                        </p:attrNameLst>
+                                      </p:cBhvr>
+                                      <p:tavLst>
+                                        <p:tav tm="0">
+                                          <p:val>
+                                            <p:strVal val="1+#ppt_h/2"/>
+                                          </p:val>
+                                        </p:tav>
+                                        <p:tav tm="100000">
+                                          <p:val>
+                                            <p:strVal val="#ppt_y"/>
+                                          </p:val>
+                                        </p:tav>
+                                      </p:tavLst>
+                                    </p:anim>
+                                  </p:childTnLst>
+                                </p:cTn>
+                              </p:par>
+                            </p:childTnLst>
+                          </p:cTn>
+                        </p:par>
+                        <p:par>
+                          <p:cTn id="14" fill="hold">
+                            <p:stCondLst>
+                              <p:cond delay="1000"/>
+                            </p:stCondLst>
+                            <p:childTnLst>
+                              <p:par>
+                                <p:cTn id="15" presetID="2" presetClass="entr" presetSubtype="6" fill="hold" nodeType="afterEffect">
+                                  <p:stCondLst>
+                                    <p:cond delay="0"/>
+                                  </p:stCondLst>
+                                  <p:childTnLst>
+                                    <p:set>
+                                      <p:cBhvr>
+                                        <p:cTn id="16" dur="1" fill="hold">
+                                          <p:stCondLst>
+                                            <p:cond delay="0"/>
+                                          </p:stCondLst>
+                                        </p:cTn>
+                                        <p:tgtEl>
+                                          <p:spTgt spid="3">
+                                            <p:txEl>
+                                              <p:pRg st="1" end="1"/>
+                                            </p:txEl>
+                                          </p:spTgt>
+                                        </p:tgtEl>
+                                        <p:attrNameLst>
+                                          <p:attrName>style.visibility</p:attrName>
+                                        </p:attrNameLst>
+                                      </p:cBhvr>
+                                      <p:to>
+                                        <p:strVal val="visible"/>
+                                      </p:to>
+                                    </p:set>
+                                    <p:anim calcmode="lin" valueType="num">
+                                      <p:cBhvr additive="base">
+                                        <p:cTn id="17" dur="500" fill="hold"/>
+                                        <p:tgtEl>
+                                          <p:spTgt spid="3">
+                                            <p:txEl>
+                                              <p:pRg st="1" end="1"/>
+                                            </p:txEl>
+                                          </p:spTgt>
+                                        </p:tgtEl>
+                                        <p:attrNameLst>
+                                          <p:attrName>ppt_x</p:attrName>
+                                        </p:attrNameLst>
+                                      </p:cBhvr>
+                                      <p:tavLst>
+                                        <p:tav tm="0">
+                                          <p:val>
+                                            <p:strVal val="1+#ppt_w/2"/>
+                                          </p:val>
+                                        </p:tav>
+                                        <p:tav tm="100000">
+                                          <p:val>
+                                            <p:strVal val="#ppt_x"/>
+                                          </p:val>
+                                        </p:tav>
+                                      </p:tavLst>
+                                    </p:anim>
+                                    <p:anim calcmode="lin" valueType="num">
+                                      <p:cBhvr additive="base">
+                                        <p:cTn id="18" dur="500" fill="hold"/>
+                                        <p:tgtEl>
+                                          <p:spTgt spid="3">
+                                            <p:txEl>
+                                              <p:pRg st="1" end="1"/>
+                                            </p:txEl>
+                                          </p:spTgt>
+                                        </p:tgtEl>
+                                        <p:attrNameLst>
+                                          <p:attrName>ppt_y</p:attrName>
+                                        </p:attrNameLst>
+                                      </p:cBhvr>
+                                      <p:tavLst>
+                                        <p:tav tm="0">
+                                          <p:val>
+                                            <p:strVal val="1+#ppt_h/2"/>
+                                          </p:val>
+                                        </p:tav>
+                                        <p:tav tm="100000">
+                                          <p:val>
+                                            <p:strVal val="#ppt_y"/>
+                                          </p:val>
+                                        </p:tav>
+                                      </p:tavLst>
+                                    </p:anim>
+                                  </p:childTnLst>
+                                </p:cTn>
+                              </p:par>
+                            </p:childTnLst>
+                          </p:cTn>
+                        </p:par>
+                        <p:par>
+                          <p:cTn id="19" fill="hold">
+                            <p:stCondLst>
+                              <p:cond delay="1500"/>
+                            </p:stCondLst>
+                            <p:childTnLst>
+                              <p:par>
+                                <p:cTn id="20" presetID="2" presetClass="entr" presetSubtype="6" fill="hold" nodeType="afterEffect">
+                                  <p:stCondLst>
+                                    <p:cond delay="0"/>
+                                  </p:stCondLst>
+                                  <p:childTnLst>
+                                    <p:set>
+                                      <p:cBhvr>
+                                        <p:cTn id="21" dur="1" fill="hold">
+                                          <p:stCondLst>
+                                            <p:cond delay="0"/>
+                                          </p:stCondLst>
+                                        </p:cTn>
+                                        <p:tgtEl>
+                                          <p:spTgt spid="3">
+                                            <p:txEl>
+                                              <p:pRg st="2" end="2"/>
+                                            </p:txEl>
+                                          </p:spTgt>
+                                        </p:tgtEl>
+                                        <p:attrNameLst>
+                                          <p:attrName>style.visibility</p:attrName>
+                                        </p:attrNameLst>
+                                      </p:cBhvr>
+                                      <p:to>
+                                        <p:strVal val="visible"/>
+                                      </p:to>
+                                    </p:set>
+                                    <p:anim calcmode="lin" valueType="num">
+                                      <p:cBhvr additive="base">
+                                        <p:cTn id="22" dur="500" fill="hold"/>
+                                        <p:tgtEl>
+                                          <p:spTgt spid="3">
+                                            <p:txEl>
+                                              <p:pRg st="2" end="2"/>
+                                            </p:txEl>
+                                          </p:spTgt>
+                                        </p:tgtEl>
+                                        <p:attrNameLst>
+                                          <p:attrName>ppt_x</p:attrName>
+                                        </p:attrNameLst>
+                                      </p:cBhvr>
+                                      <p:tavLst>
+                                        <p:tav tm="0">
+                                          <p:val>
+                                            <p:strVal val="1+#ppt_w/2"/>
+                                          </p:val>
+                                        </p:tav>
+                                        <p:tav tm="100000">
+                                          <p:val>
+                                            <p:strVal val="#ppt_x"/>
+                                          </p:val>
+                                        </p:tav>
+                                      </p:tavLst>
+                                    </p:anim>
+                                    <p:anim calcmode="lin" valueType="num">
+                                      <p:cBhvr additive="base">
+                                        <p:cTn id="23" dur="500" fill="hold"/>
+                                        <p:tgtEl>
+                                          <p:spTgt spid="3">
+                                            <p:txEl>
+                                              <p:pRg st="2" end="2"/>
+                                            </p:txEl>
+                                          </p:spTgt>
+                                        </p:tgtEl>
+                                        <p:attrNameLst>
+                                          <p:attrName>ppt_y</p:attrName>
+                                        </p:attrNameLst>
+                                      </p:cBhvr>
+                                      <p:tavLst>
+                                        <p:tav tm="0">
+                                          <p:val>
+                                            <p:strVal val="1+#ppt_h/2"/>
+                                          </p:val>
+                                        </p:tav>
+                                        <p:tav tm="100000">
+                                          <p:val>
+                                            <p:strVal val="#ppt_y"/>
+                                          </p:val>
+                                        </p:tav>
+                                      </p:tavLst>
+                                    </p:anim>
+                                  </p:childTnLst>
+                                </p:cTn>
+                              </p:par>
+                            </p:childTnLst>
+                          </p:cTn>
+                        </p:par>
+                      </p:childTnLst>
+                    </p:cTn>
+                  </p:par>
+                </p:childTnLst>
+              </p:cTn>
+              <p:prevCondLst>
+                <p:cond evt="onPrev" delay="0">
+                  <p:tgtEl>
+                    <p:sldTgt/>
+                  </p:tgtEl>
+                </p:cond>
+              </p:prevCondLst>
+              <p:nextCondLst>
+                <p:cond evt="onNext" delay="0">
+                  <p:tgtEl>
+                    <p:sldTgt/>
+                  </p:tgtEl>
+                </p:cond>
+              </p:nextCondLst>
+            </p:seq>
+          </p:childTnLst>
+        </p:cTn>
+      </p:par>
+    </p:tnLst>
+  </p:timing>
+</p:sld>
+</file>
+
+<file path=ppt/slides/slide6.xml><?xml version="1.0" encoding="utf-8"?>
+<p:sld xmlns:a="http://schemas.openxmlformats.org/drawingml/2006/main" xmlns:r="http://schemas.openxmlformats.org/officeDocument/2006/relationships" xmlns:p="http://schemas.openxmlformats.org/presentationml/2006/main">
+  <p:cSld>
+    <p:spTree>
+      <p:nvGrpSpPr>
+        <p:cNvPr id="1" name=""/>
+        <p:cNvGrpSpPr/>
+        <p:nvPr/>
+      </p:nvGrpSpPr>
+      <p:grpSpPr>
+        <a:xfrm>
+          <a:off x="0" y="0"/>
+          <a:ext cx="0" cy="0"/>
+          <a:chOff x="0" y="0"/>
+          <a:chExt cx="0" cy="0"/>
+        </a:xfrm>
+      </p:grpSpPr>
+      <p:sp>
+        <p:nvSpPr>
+          <p:cNvPr id="2" name="Cím 1"/>
+          <p:cNvSpPr>
+            <a:spLocks noGrp="1"/>
+          </p:cNvSpPr>
+          <p:nvPr>
+            <p:ph type="title"/>
+          </p:nvPr>
+        </p:nvSpPr>
+        <p:spPr/>
+        <p:txBody>
+          <a:bodyPr/>
+          <a:lstStyle/>
+          <a:p>
+            <a:r>
+              <a:rPr lang="hu-HU" dirty="0" smtClean="0">
+                <a:solidFill>
+                  <a:schemeClr val="bg1"/>
+                </a:solidFill>
+                <a:latin typeface="Algerian" panose="04020705040A02060702" pitchFamily="82" charset="0"/>
+              </a:rPr>
+              <a:t>Memória típusok</a:t>
+            </a:r>
+            <a:endParaRPr lang="hu-HU" dirty="0">
+              <a:solidFill>
+                <a:schemeClr val="bg1"/>
+              </a:solidFill>
+              <a:latin typeface="Algerian" panose="04020705040A02060702" pitchFamily="82" charset="0"/>
+            </a:endParaRPr>
+          </a:p>
+        </p:txBody>
+      </p:sp>
+      <p:sp>
+        <p:nvSpPr>
+          <p:cNvPr id="3" name="Tartalom helye 2"/>
+          <p:cNvSpPr>
+            <a:spLocks noGrp="1"/>
+          </p:cNvSpPr>
+          <p:nvPr>
+            <p:ph idx="1"/>
+          </p:nvPr>
+        </p:nvSpPr>
+        <p:spPr>
+          <a:xfrm>
+            <a:off x="838200" y="3494934"/>
+            <a:ext cx="10515600" cy="1640737"/>
+          </a:xfrm>
+        </p:spPr>
+        <p:txBody>
+          <a:bodyPr/>
+          <a:lstStyle/>
+          <a:p>
+            <a:r>
+              <a:rPr lang="hu-HU" dirty="0">
+                <a:solidFill>
+                  <a:schemeClr val="bg1"/>
+                </a:solidFill>
+              </a:rPr>
+              <a:t>Az eredeti DDR memória típus, amelyet a DDR2 követett </a:t>
+            </a:r>
+          </a:p>
+          <a:p>
+            <a:r>
+              <a:rPr lang="hu-HU" dirty="0">
+                <a:solidFill>
+                  <a:schemeClr val="bg1"/>
+                </a:solidFill>
+              </a:rPr>
+              <a:t>elsők között alkalmazta a kettős adatátviteli sebességet --&gt; nagyobb adatátvitel </a:t>
+            </a:r>
+            <a:r>
+              <a:rPr lang="hu-HU" dirty="0" smtClean="0">
+                <a:solidFill>
+                  <a:schemeClr val="bg1"/>
+                </a:solidFill>
+              </a:rPr>
+              <a:t>(</a:t>
+            </a:r>
+            <a:r>
+              <a:rPr lang="hu-HU" dirty="0" err="1" smtClean="0">
+                <a:solidFill>
+                  <a:schemeClr val="bg1"/>
+                </a:solidFill>
+              </a:rPr>
+              <a:t>max</a:t>
+            </a:r>
+            <a:r>
+              <a:rPr lang="hu-HU" dirty="0" smtClean="0">
+                <a:solidFill>
+                  <a:schemeClr val="bg1"/>
+                </a:solidFill>
+              </a:rPr>
+              <a:t> </a:t>
+            </a:r>
+            <a:r>
+              <a:rPr lang="hu-HU" b="1" dirty="0">
+                <a:solidFill>
+                  <a:schemeClr val="bg1"/>
+                </a:solidFill>
+              </a:rPr>
+              <a:t>400 MHz</a:t>
+            </a:r>
+            <a:r>
+              <a:rPr lang="hu-HU" dirty="0" smtClean="0">
+                <a:solidFill>
+                  <a:schemeClr val="bg1"/>
+                </a:solidFill>
+              </a:rPr>
+              <a:t>)</a:t>
+            </a:r>
+            <a:endParaRPr lang="hu-HU" dirty="0">
+              <a:solidFill>
+                <a:schemeClr val="bg1"/>
+              </a:solidFill>
+            </a:endParaRPr>
+          </a:p>
+          <a:p>
+            <a:endParaRPr lang="hu-HU" dirty="0"/>
+          </a:p>
+        </p:txBody>
+      </p:sp>
+      <p:sp>
+        <p:nvSpPr>
+          <p:cNvPr id="5" name="Szövegdoboz 4"/>
+          <p:cNvSpPr txBox="1"/>
+          <p:nvPr/>
+        </p:nvSpPr>
+        <p:spPr>
+          <a:xfrm>
+            <a:off x="1698734" y="2694715"/>
+            <a:ext cx="8794531" cy="800219"/>
+          </a:xfrm>
+          <a:prstGeom prst="rect">
+            <a:avLst/>
+          </a:prstGeom>
+          <a:noFill/>
+        </p:spPr>
+        <p:txBody>
+          <a:bodyPr wrap="square" rtlCol="0">
+            <a:spAutoFit/>
+          </a:bodyPr>
+          <a:lstStyle/>
+          <a:p>
+            <a:pPr algn="ctr"/>
+            <a:r>
+              <a:rPr lang="hu-HU" sz="2800" b="1" u="sng" dirty="0" smtClean="0">
+                <a:solidFill>
+                  <a:schemeClr val="bg1"/>
+                </a:solidFill>
+              </a:rPr>
+              <a:t>DDR (DOUBLE DATA RATE)</a:t>
+            </a:r>
+            <a:endParaRPr lang="hu-HU" sz="2800" u="sng" dirty="0">
+              <a:solidFill>
+                <a:schemeClr val="bg1"/>
+              </a:solidFill>
+            </a:endParaRPr>
+          </a:p>
+          <a:p>
+            <a:pPr algn="ctr"/>
+            <a:endParaRPr lang="hu-HU" dirty="0">
+              <a:solidFill>
+                <a:schemeClr val="bg1"/>
+              </a:solidFill>
+            </a:endParaRPr>
+          </a:p>
+        </p:txBody>
+      </p:sp>
+    </p:spTree>
+    <p:extLst>
+      <p:ext uri="{BB962C8B-B14F-4D97-AF65-F5344CB8AC3E}">
+        <p14:creationId xmlns:p14="http://schemas.microsoft.com/office/powerpoint/2010/main" val="253826506"/>
+      </p:ext>
+    </p:extLst>
+  </p:cSld>
+  <p:clrMapOvr>
+    <a:masterClrMapping/>
+  </p:clrMapOvr>
+  <mc:AlternateContent xmlns:mc="http://schemas.openxmlformats.org/markup-compatibility/2006">
+    <mc:Choice xmlns:p14="http://schemas.microsoft.com/office/powerpoint/2010/main" Requires="p14">
+      <p:transition spd="med" p14:dur="700">
+        <p:fade/>
+      </p:transition>
+    </mc:Choice>
+    <mc:Fallback>
+      <p:transition spd="med">
+        <p:fade/>
+      </p:transition>
+    </mc:Fallback>
+  </mc:AlternateContent>
+  <p:timing>
+    <p:tnLst>
+      <p:par>
+        <p:cTn id="1" dur="indefinite" restart="never" nodeType="tmRoot">
+          <p:childTnLst>
+            <p:seq concurrent="1" nextAc="seek">
+              <p:cTn id="2" dur="indefinite" nodeType="mainSeq">
+                <p:childTnLst>
+                  <p:par>
+                    <p:cTn id="3" fill="hold">
+                      <p:stCondLst>
+                        <p:cond delay="indefinite"/>
+                        <p:cond evt="onBegin" delay="0">
+                          <p:tn val="2"/>
+                        </p:cond>
+                      </p:stCondLst>
+                      <p:childTnLst>
+                        <p:par>
+                          <p:cTn id="4" fill="hold">
+                            <p:stCondLst>
+                              <p:cond delay="0"/>
+                            </p:stCondLst>
+                            <p:childTnLst>
+                              <p:par>
+                                <p:cTn id="5" presetID="2" presetClass="entr" presetSubtype="8" fill="hold" nodeType="afterEffect">
+                                  <p:stCondLst>
+                                    <p:cond delay="0"/>
+                                  </p:stCondLst>
+                                  <p:childTnLst>
+                                    <p:set>
+                                      <p:cBhvr>
+                                        <p:cTn id="6" dur="1" fill="hold">
+                                          <p:stCondLst>
+                                            <p:cond delay="0"/>
+                                          </p:stCondLst>
+                                        </p:cTn>
+                                        <p:tgtEl>
+                                          <p:spTgt spid="5">
+                                            <p:txEl>
+                                              <p:pRg st="0" end="0"/>
+                                            </p:txEl>
+                                          </p:spTgt>
+                                        </p:tgtEl>
+                                        <p:attrNameLst>
+                                          <p:attrName>style.visibility</p:attrName>
+                                        </p:attrNameLst>
+                                      </p:cBhvr>
+                                      <p:to>
+                                        <p:strVal val="visible"/>
+                                      </p:to>
+                                    </p:set>
+                                    <p:anim calcmode="lin" valueType="num">
+                                      <p:cBhvr additive="base">
+                                        <p:cTn id="7" dur="500" fill="hold"/>
+                                        <p:tgtEl>
+                                          <p:spTgt spid="5">
+                                            <p:txEl>
+                                              <p:pRg st="0" end="0"/>
+                                            </p:txEl>
+                                          </p:spTgt>
+                                        </p:tgtEl>
+                                        <p:attrNameLst>
+                                          <p:attrName>ppt_x</p:attrName>
+                                        </p:attrNameLst>
+                                      </p:cBhvr>
+                                      <p:tavLst>
+                                        <p:tav tm="0">
+                                          <p:val>
+                                            <p:strVal val="0-#ppt_w/2"/>
+                                          </p:val>
+                                        </p:tav>
+                                        <p:tav tm="100000">
+                                          <p:val>
+                                            <p:strVal val="#ppt_x"/>
+                                          </p:val>
+                                        </p:tav>
+                                      </p:tavLst>
+                                    </p:anim>
+                                    <p:anim calcmode="lin" valueType="num">
+                                      <p:cBhvr additive="base">
+                                        <p:cTn id="8" dur="500" fill="hold"/>
+                                        <p:tgtEl>
+                                          <p:spTgt spid="5">
+                                            <p:txEl>
+                                              <p:pRg st="0" end="0"/>
+                                            </p:txEl>
+                                          </p:spTgt>
+                                        </p:tgtEl>
+                                        <p:attrNameLst>
+                                          <p:attrName>ppt_y</p:attrName>
+                                        </p:attrNameLst>
+                                      </p:cBhvr>
+                                      <p:tavLst>
+                                        <p:tav tm="0">
+                                          <p:val>
+                                            <p:strVal val="#ppt_y"/>
+                                          </p:val>
+                                        </p:tav>
+                                        <p:tav tm="100000">
+                                          <p:val>
+                                            <p:strVal val="#ppt_y"/>
+                                          </p:val>
+                                        </p:tav>
+                                      </p:tavLst>
+                                    </p:anim>
+                                  </p:childTnLst>
+                                </p:cTn>
+                              </p:par>
+                            </p:childTnLst>
+                          </p:cTn>
+                        </p:par>
+                        <p:par>
+                          <p:cTn id="9" fill="hold">
+                            <p:stCondLst>
+                              <p:cond delay="500"/>
+                            </p:stCondLst>
+                            <p:childTnLst>
+                              <p:par>
+                                <p:cTn id="10" presetID="2" presetClass="entr" presetSubtype="6" fill="hold" nodeType="afterEffect">
+                                  <p:stCondLst>
+                                    <p:cond delay="0"/>
+                                  </p:stCondLst>
+                                  <p:childTnLst>
+                                    <p:set>
+                                      <p:cBhvr>
+                                        <p:cTn id="11" dur="1" fill="hold">
+                                          <p:stCondLst>
+                                            <p:cond delay="0"/>
+                                          </p:stCondLst>
+                                        </p:cTn>
+                                        <p:tgtEl>
+                                          <p:spTgt spid="3">
+                                            <p:txEl>
+                                              <p:pRg st="0" end="0"/>
+                                            </p:txEl>
+                                          </p:spTgt>
+                                        </p:tgtEl>
+                                        <p:attrNameLst>
+                                          <p:attrName>style.visibility</p:attrName>
+                                        </p:attrNameLst>
+                                      </p:cBhvr>
+                                      <p:to>
+                                        <p:strVal val="visible"/>
+                                      </p:to>
+                                    </p:set>
+                                    <p:anim calcmode="lin" valueType="num">
+                                      <p:cBhvr additive="base">
+                                        <p:cTn id="12" dur="500" fill="hold"/>
+                                        <p:tgtEl>
+                                          <p:spTgt spid="3">
+                                            <p:txEl>
+                                              <p:pRg st="0" end="0"/>
+                                            </p:txEl>
+                                          </p:spTgt>
+                                        </p:tgtEl>
+                                        <p:attrNameLst>
+                                          <p:attrName>ppt_x</p:attrName>
+                                        </p:attrNameLst>
+                                      </p:cBhvr>
+                                      <p:tavLst>
+                                        <p:tav tm="0">
+                                          <p:val>
+                                            <p:strVal val="1+#ppt_w/2"/>
+                                          </p:val>
+                                        </p:tav>
+                                        <p:tav tm="100000">
+                                          <p:val>
+                                            <p:strVal val="#ppt_x"/>
+                                          </p:val>
+                                        </p:tav>
+                                      </p:tavLst>
+                                    </p:anim>
+                                    <p:anim calcmode="lin" valueType="num">
+                                      <p:cBhvr additive="base">
+                                        <p:cTn id="13" dur="500" fill="hold"/>
+                                        <p:tgtEl>
+                                          <p:spTgt spid="3">
+                                            <p:txEl>
+                                              <p:pRg st="0" end="0"/>
+                                            </p:txEl>
+                                          </p:spTgt>
+                                        </p:tgtEl>
+                                        <p:attrNameLst>
+                                          <p:attrName>ppt_y</p:attrName>
+                                        </p:attrNameLst>
+                                      </p:cBhvr>
+                                      <p:tavLst>
+                                        <p:tav tm="0">
+                                          <p:val>
+                                            <p:strVal val="1+#ppt_h/2"/>
+                                          </p:val>
+                                        </p:tav>
+                                        <p:tav tm="100000">
+                                          <p:val>
+                                            <p:strVal val="#ppt_y"/>
+                                          </p:val>
+                                        </p:tav>
+                                      </p:tavLst>
+                                    </p:anim>
+                                  </p:childTnLst>
+                                </p:cTn>
+                              </p:par>
+                            </p:childTnLst>
+                          </p:cTn>
+                        </p:par>
+                        <p:par>
+                          <p:cTn id="14" fill="hold">
+                            <p:stCondLst>
+                              <p:cond delay="1000"/>
+                            </p:stCondLst>
+                            <p:childTnLst>
+                              <p:par>
+                                <p:cTn id="15" presetID="2" presetClass="entr" presetSubtype="6" fill="hold" nodeType="afterEffect">
+                                  <p:stCondLst>
+                                    <p:cond delay="0"/>
+                                  </p:stCondLst>
+                                  <p:childTnLst>
+                                    <p:set>
+                                      <p:cBhvr>
+                                        <p:cTn id="16" dur="1" fill="hold">
+                                          <p:stCondLst>
+                                            <p:cond delay="0"/>
+                                          </p:stCondLst>
+                                        </p:cTn>
+                                        <p:tgtEl>
+                                          <p:spTgt spid="3">
+                                            <p:txEl>
+                                              <p:pRg st="1" end="1"/>
+                                            </p:txEl>
+                                          </p:spTgt>
+                                        </p:tgtEl>
+                                        <p:attrNameLst>
+                                          <p:attrName>style.visibility</p:attrName>
+                                        </p:attrNameLst>
+                                      </p:cBhvr>
+                                      <p:to>
+                                        <p:strVal val="visible"/>
+                                      </p:to>
+                                    </p:set>
+                                    <p:anim calcmode="lin" valueType="num">
+                                      <p:cBhvr additive="base">
+                                        <p:cTn id="17" dur="500" fill="hold"/>
+                                        <p:tgtEl>
+                                          <p:spTgt spid="3">
+                                            <p:txEl>
+                                              <p:pRg st="1" end="1"/>
+                                            </p:txEl>
+                                          </p:spTgt>
+                                        </p:tgtEl>
+                                        <p:attrNameLst>
+                                          <p:attrName>ppt_x</p:attrName>
+                                        </p:attrNameLst>
+                                      </p:cBhvr>
+                                      <p:tavLst>
+                                        <p:tav tm="0">
+                                          <p:val>
+                                            <p:strVal val="1+#ppt_w/2"/>
+                                          </p:val>
+                                        </p:tav>
+                                        <p:tav tm="100000">
+                                          <p:val>
+                                            <p:strVal val="#ppt_x"/>
+                                          </p:val>
+                                        </p:tav>
+                                      </p:tavLst>
+                                    </p:anim>
+                                    <p:anim calcmode="lin" valueType="num">
+                                      <p:cBhvr additive="base">
+                                        <p:cTn id="18" dur="500" fill="hold"/>
+                                        <p:tgtEl>
+                                          <p:spTgt spid="3">
+                                            <p:txEl>
+                                              <p:pRg st="1" end="1"/>
+                                            </p:txEl>
+                                          </p:spTgt>
+                                        </p:tgtEl>
+                                        <p:attrNameLst>
+                                          <p:attrName>ppt_y</p:attrName>
+                                        </p:attrNameLst>
+                                      </p:cBhvr>
+                                      <p:tavLst>
+                                        <p:tav tm="0">
+                                          <p:val>
+                                            <p:strVal val="1+#ppt_h/2"/>
+                                          </p:val>
+                                        </p:tav>
+                                        <p:tav tm="100000">
+                                          <p:val>
+                                            <p:strVal val="#ppt_y"/>
+                                          </p:val>
+                                        </p:tav>
+                                      </p:tavLst>
+                                    </p:anim>
+                                  </p:childTnLst>
+                                </p:cTn>
+                              </p:par>
+                            </p:childTnLst>
+                          </p:cTn>
+                        </p:par>
+                      </p:childTnLst>
+                    </p:cTn>
+                  </p:par>
+                </p:childTnLst>
+              </p:cTn>
+              <p:prevCondLst>
+                <p:cond evt="onPrev" delay="0">
+                  <p:tgtEl>
+                    <p:sldTgt/>
+                  </p:tgtEl>
+                </p:cond>
+              </p:prevCondLst>
+              <p:nextCondLst>
+                <p:cond evt="onNext" delay="0">
+                  <p:tgtEl>
+                    <p:sldTgt/>
+                  </p:tgtEl>
+                </p:cond>
+              </p:nextCondLst>
+            </p:seq>
+          </p:childTnLst>
+        </p:cTn>
+      </p:par>
+    </p:tnLst>
+  </p:timing>
+</p:sld>
+</file>
+
+<file path=ppt/slides/slide7.xml><?xml version="1.0" encoding="utf-8"?>
+<p:sld xmlns:a="http://schemas.openxmlformats.org/drawingml/2006/main" xmlns:r="http://schemas.openxmlformats.org/officeDocument/2006/relationships" xmlns:p="http://schemas.openxmlformats.org/presentationml/2006/main">
+  <p:cSld>
+    <p:spTree>
+      <p:nvGrpSpPr>
+        <p:cNvPr id="1" name=""/>
+        <p:cNvGrpSpPr/>
+        <p:nvPr/>
+      </p:nvGrpSpPr>
+      <p:grpSpPr>
+        <a:xfrm>
+          <a:off x="0" y="0"/>
+          <a:ext cx="0" cy="0"/>
+          <a:chOff x="0" y="0"/>
+          <a:chExt cx="0" cy="0"/>
+        </a:xfrm>
+      </p:grpSpPr>
+      <p:sp>
+        <p:nvSpPr>
+          <p:cNvPr id="2" name="Cím 1"/>
+          <p:cNvSpPr>
+            <a:spLocks noGrp="1"/>
+          </p:cNvSpPr>
+          <p:nvPr>
+            <p:ph type="title"/>
+          </p:nvPr>
+        </p:nvSpPr>
+        <p:spPr/>
+        <p:txBody>
+          <a:bodyPr/>
+          <a:lstStyle/>
+          <a:p>
+            <a:r>
+              <a:rPr lang="hu-HU" dirty="0" smtClean="0">
+                <a:solidFill>
+                  <a:schemeClr val="bg1"/>
+                </a:solidFill>
+                <a:latin typeface="Algerian" panose="04020705040A02060702" pitchFamily="82" charset="0"/>
+              </a:rPr>
+              <a:t>Memória típusok</a:t>
+            </a:r>
+            <a:endParaRPr lang="hu-HU" dirty="0">
+              <a:solidFill>
+                <a:schemeClr val="bg1"/>
+              </a:solidFill>
+              <a:latin typeface="Algerian" panose="04020705040A02060702" pitchFamily="82" charset="0"/>
+            </a:endParaRPr>
+          </a:p>
+        </p:txBody>
+      </p:sp>
+      <p:sp>
+        <p:nvSpPr>
+          <p:cNvPr id="3" name="Tartalom helye 2"/>
+          <p:cNvSpPr>
+            <a:spLocks noGrp="1"/>
+          </p:cNvSpPr>
+          <p:nvPr>
+            <p:ph idx="1"/>
+          </p:nvPr>
+        </p:nvSpPr>
+        <p:spPr>
+          <a:xfrm>
+            <a:off x="838200" y="3494934"/>
+            <a:ext cx="10515600" cy="1640737"/>
+          </a:xfrm>
+        </p:spPr>
+        <p:txBody>
+          <a:bodyPr>
+            <a:normAutofit fontScale="92500" lnSpcReduction="10000"/>
+          </a:bodyPr>
+          <a:lstStyle/>
+          <a:p>
+            <a:r>
+              <a:rPr lang="hu-HU" dirty="0">
+                <a:solidFill>
+                  <a:schemeClr val="bg1"/>
+                </a:solidFill>
+              </a:rPr>
+              <a:t>K</a:t>
+            </a:r>
+            <a:r>
+              <a:rPr lang="hu-HU" dirty="0" smtClean="0">
+                <a:solidFill>
+                  <a:schemeClr val="bg1"/>
+                </a:solidFill>
+              </a:rPr>
+              <a:t>evésbé </a:t>
+            </a:r>
+            <a:r>
+              <a:rPr lang="hu-HU" dirty="0">
+                <a:solidFill>
+                  <a:schemeClr val="bg1"/>
+                </a:solidFill>
+              </a:rPr>
+              <a:t>elterjedt és kevésbé használatos</a:t>
+            </a:r>
+          </a:p>
+          <a:p>
+            <a:r>
+              <a:rPr lang="hu-HU" dirty="0">
+                <a:solidFill>
+                  <a:schemeClr val="bg1"/>
+                </a:solidFill>
+              </a:rPr>
+              <a:t>Alacsonyabb sebesség és adatátviteli sebesség mint a DDR3 és a DDR4 </a:t>
+            </a:r>
+            <a:r>
+              <a:rPr lang="hu-HU" dirty="0" smtClean="0">
+                <a:solidFill>
+                  <a:schemeClr val="bg1"/>
+                </a:solidFill>
+              </a:rPr>
+              <a:t>esetében (133~200MHz)</a:t>
+            </a:r>
+            <a:endParaRPr lang="hu-HU" dirty="0">
+              <a:solidFill>
+                <a:schemeClr val="bg1"/>
+              </a:solidFill>
+            </a:endParaRPr>
+          </a:p>
+          <a:p>
+            <a:r>
+              <a:rPr lang="hu-HU" dirty="0">
+                <a:solidFill>
+                  <a:schemeClr val="bg1"/>
+                </a:solidFill>
+              </a:rPr>
+              <a:t>K</a:t>
+            </a:r>
+            <a:r>
+              <a:rPr lang="hu-HU" dirty="0" smtClean="0">
+                <a:solidFill>
+                  <a:schemeClr val="bg1"/>
+                </a:solidFill>
+              </a:rPr>
+              <a:t>evésbé </a:t>
+            </a:r>
+            <a:r>
+              <a:rPr lang="hu-HU" dirty="0">
+                <a:solidFill>
+                  <a:schemeClr val="bg1"/>
+                </a:solidFill>
+              </a:rPr>
+              <a:t>kompatibilis az újabb alaplapokkal</a:t>
+            </a:r>
+          </a:p>
+          <a:p>
+            <a:endParaRPr lang="hu-HU" dirty="0"/>
+          </a:p>
+        </p:txBody>
+      </p:sp>
+      <p:sp>
+        <p:nvSpPr>
+          <p:cNvPr id="5" name="Szövegdoboz 4"/>
+          <p:cNvSpPr txBox="1"/>
+          <p:nvPr/>
+        </p:nvSpPr>
+        <p:spPr>
+          <a:xfrm>
+            <a:off x="1698734" y="2694715"/>
+            <a:ext cx="8794531" cy="800219"/>
+          </a:xfrm>
+          <a:prstGeom prst="rect">
+            <a:avLst/>
+          </a:prstGeom>
+          <a:noFill/>
+        </p:spPr>
+        <p:txBody>
+          <a:bodyPr wrap="square" rtlCol="0">
+            <a:spAutoFit/>
+          </a:bodyPr>
+          <a:lstStyle/>
+          <a:p>
+            <a:pPr algn="ctr"/>
+            <a:r>
+              <a:rPr lang="hu-HU" sz="2800" b="1" u="sng" dirty="0" smtClean="0">
+                <a:solidFill>
+                  <a:schemeClr val="bg1"/>
+                </a:solidFill>
+              </a:rPr>
+              <a:t>DDR 2 (DOUBLE DATA RATE 2)</a:t>
+            </a:r>
+            <a:endParaRPr lang="hu-HU" sz="2800" u="sng" dirty="0">
+              <a:solidFill>
+                <a:schemeClr val="bg1"/>
+              </a:solidFill>
+            </a:endParaRPr>
+          </a:p>
+          <a:p>
+            <a:pPr algn="ctr"/>
+            <a:endParaRPr lang="hu-HU" dirty="0">
+              <a:solidFill>
+                <a:schemeClr val="bg1"/>
+              </a:solidFill>
+            </a:endParaRPr>
+          </a:p>
+        </p:txBody>
+      </p:sp>
+    </p:spTree>
+    <p:extLst>
+      <p:ext uri="{BB962C8B-B14F-4D97-AF65-F5344CB8AC3E}">
+        <p14:creationId xmlns:p14="http://schemas.microsoft.com/office/powerpoint/2010/main" val="1730912628"/>
+      </p:ext>
+    </p:extLst>
+  </p:cSld>
+  <p:clrMapOvr>
+    <a:masterClrMapping/>
+  </p:clrMapOvr>
+  <mc:AlternateContent xmlns:mc="http://schemas.openxmlformats.org/markup-compatibility/2006">
+    <mc:Choice xmlns:p14="http://schemas.microsoft.com/office/powerpoint/2010/main" Requires="p14">
+      <p:transition spd="med" p14:dur="700">
+        <p:fade/>
+      </p:transition>
+    </mc:Choice>
+    <mc:Fallback>
+      <p:transition spd="med">
+        <p:fade/>
+      </p:transition>
+    </mc:Fallback>
+  </mc:AlternateContent>
+  <p:timing>
+    <p:tnLst>
+      <p:par>
+        <p:cTn id="1" dur="indefinite" restart="never" nodeType="tmRoot">
+          <p:childTnLst>
+            <p:seq concurrent="1" nextAc="seek">
+              <p:cTn id="2" dur="indefinite" nodeType="mainSeq">
+                <p:childTnLst>
+                  <p:par>
+                    <p:cTn id="3" fill="hold">
+                      <p:stCondLst>
+                        <p:cond delay="indefinite"/>
+                        <p:cond evt="onBegin" delay="0">
+                          <p:tn val="2"/>
+                        </p:cond>
+                      </p:stCondLst>
+                      <p:childTnLst>
+                        <p:par>
+                          <p:cTn id="4" fill="hold">
+                            <p:stCondLst>
+                              <p:cond delay="0"/>
+                            </p:stCondLst>
+                            <p:childTnLst>
+                              <p:par>
+                                <p:cTn id="5" presetID="2" presetClass="entr" presetSubtype="8" fill="hold" nodeType="afterEffect">
+                                  <p:stCondLst>
+                                    <p:cond delay="0"/>
+                                  </p:stCondLst>
+                                  <p:childTnLst>
+                                    <p:set>
+                                      <p:cBhvr>
+                                        <p:cTn id="6" dur="1" fill="hold">
+                                          <p:stCondLst>
+                                            <p:cond delay="0"/>
+                                          </p:stCondLst>
+                                        </p:cTn>
+                                        <p:tgtEl>
+                                          <p:spTgt spid="5">
+                                            <p:txEl>
+                                              <p:pRg st="0" end="0"/>
+                                            </p:txEl>
+                                          </p:spTgt>
+                                        </p:tgtEl>
+                                        <p:attrNameLst>
+                                          <p:attrName>style.visibility</p:attrName>
+                                        </p:attrNameLst>
+                                      </p:cBhvr>
+                                      <p:to>
+                                        <p:strVal val="visible"/>
+                                      </p:to>
+                                    </p:set>
+                                    <p:anim calcmode="lin" valueType="num">
+                                      <p:cBhvr additive="base">
+                                        <p:cTn id="7" dur="500" fill="hold"/>
+                                        <p:tgtEl>
+                                          <p:spTgt spid="5">
+                                            <p:txEl>
+                                              <p:pRg st="0" end="0"/>
+                                            </p:txEl>
+                                          </p:spTgt>
+                                        </p:tgtEl>
+                                        <p:attrNameLst>
+                                          <p:attrName>ppt_x</p:attrName>
+                                        </p:attrNameLst>
+                                      </p:cBhvr>
+                                      <p:tavLst>
+                                        <p:tav tm="0">
+                                          <p:val>
+                                            <p:strVal val="0-#ppt_w/2"/>
+                                          </p:val>
+                                        </p:tav>
+                                        <p:tav tm="100000">
+                                          <p:val>
+                                            <p:strVal val="#ppt_x"/>
+                                          </p:val>
+                                        </p:tav>
+                                      </p:tavLst>
+                                    </p:anim>
+                                    <p:anim calcmode="lin" valueType="num">
+                                      <p:cBhvr additive="base">
+                                        <p:cTn id="8" dur="500" fill="hold"/>
+                                        <p:tgtEl>
+                                          <p:spTgt spid="5">
+                                            <p:txEl>
+                                              <p:pRg st="0" end="0"/>
+                                            </p:txEl>
+                                          </p:spTgt>
+                                        </p:tgtEl>
+                                        <p:attrNameLst>
+                                          <p:attrName>ppt_y</p:attrName>
+                                        </p:attrNameLst>
+                                      </p:cBhvr>
+                                      <p:tavLst>
+                                        <p:tav tm="0">
+                                          <p:val>
+                                            <p:strVal val="#ppt_y"/>
+                                          </p:val>
+                                        </p:tav>
+                                        <p:tav tm="100000">
+                                          <p:val>
+                                            <p:strVal val="#ppt_y"/>
+                                          </p:val>
+                                        </p:tav>
+                                      </p:tavLst>
+                                    </p:anim>
+                                  </p:childTnLst>
+                                </p:cTn>
+                              </p:par>
+                            </p:childTnLst>
+                          </p:cTn>
+                        </p:par>
+                        <p:par>
+                          <p:cTn id="9" fill="hold">
+                            <p:stCondLst>
+                              <p:cond delay="500"/>
+                            </p:stCondLst>
+                            <p:childTnLst>
+                              <p:par>
+                                <p:cTn id="10" presetID="2" presetClass="entr" presetSubtype="6" fill="hold" nodeType="afterEffect">
+                                  <p:stCondLst>
+                                    <p:cond delay="0"/>
+                                  </p:stCondLst>
+                                  <p:childTnLst>
+                                    <p:set>
+                                      <p:cBhvr>
+                                        <p:cTn id="11" dur="1" fill="hold">
+                                          <p:stCondLst>
+                                            <p:cond delay="0"/>
+                                          </p:stCondLst>
+                                        </p:cTn>
+                                        <p:tgtEl>
+                                          <p:spTgt spid="3">
+                                            <p:txEl>
+                                              <p:pRg st="0" end="0"/>
+                                            </p:txEl>
+                                          </p:spTgt>
+                                        </p:tgtEl>
+                                        <p:attrNameLst>
+                                          <p:attrName>style.visibility</p:attrName>
+                                        </p:attrNameLst>
+                                      </p:cBhvr>
+                                      <p:to>
+                                        <p:strVal val="visible"/>
+                                      </p:to>
+                                    </p:set>
+                                    <p:anim calcmode="lin" valueType="num">
+                                      <p:cBhvr additive="base">
+                                        <p:cTn id="12" dur="500" fill="hold"/>
+                                        <p:tgtEl>
+                                          <p:spTgt spid="3">
+                                            <p:txEl>
+                                              <p:pRg st="0" end="0"/>
+                                            </p:txEl>
+                                          </p:spTgt>
+                                        </p:tgtEl>
+                                        <p:attrNameLst>
+                                          <p:attrName>ppt_x</p:attrName>
+                                        </p:attrNameLst>
+                                      </p:cBhvr>
+                                      <p:tavLst>
+                                        <p:tav tm="0">
+                                          <p:val>
+                                            <p:strVal val="1+#ppt_w/2"/>
+                                          </p:val>
+                                        </p:tav>
+                                        <p:tav tm="100000">
+                                          <p:val>
+                                            <p:strVal val="#ppt_x"/>
+                                          </p:val>
+                                        </p:tav>
+                                      </p:tavLst>
+                                    </p:anim>
+                                    <p:anim calcmode="lin" valueType="num">
+                                      <p:cBhvr additive="base">
+                                        <p:cTn id="13" dur="500" fill="hold"/>
+                                        <p:tgtEl>
+                                          <p:spTgt spid="3">
+                                            <p:txEl>
+                                              <p:pRg st="0" end="0"/>
+                                            </p:txEl>
+                                          </p:spTgt>
+                                        </p:tgtEl>
+                                        <p:attrNameLst>
+                                          <p:attrName>ppt_y</p:attrName>
+                                        </p:attrNameLst>
+                                      </p:cBhvr>
+                                      <p:tavLst>
+                                        <p:tav tm="0">
+                                          <p:val>
+                                            <p:strVal val="1+#ppt_h/2"/>
+                                          </p:val>
+                                        </p:tav>
+                                        <p:tav tm="100000">
+                                          <p:val>
+                                            <p:strVal val="#ppt_y"/>
+                                          </p:val>
+                                        </p:tav>
+                                      </p:tavLst>
+                                    </p:anim>
+                                  </p:childTnLst>
+                                </p:cTn>
+                              </p:par>
+                            </p:childTnLst>
+                          </p:cTn>
+                        </p:par>
+                        <p:par>
+                          <p:cTn id="14" fill="hold">
+                            <p:stCondLst>
+                              <p:cond delay="1000"/>
+                            </p:stCondLst>
+                            <p:childTnLst>
+                              <p:par>
+                                <p:cTn id="15" presetID="2" presetClass="entr" presetSubtype="6" fill="hold" nodeType="afterEffect">
+                                  <p:stCondLst>
+                                    <p:cond delay="0"/>
+                                  </p:stCondLst>
+                                  <p:childTnLst>
+                                    <p:set>
+                                      <p:cBhvr>
+                                        <p:cTn id="16" dur="1" fill="hold">
+                                          <p:stCondLst>
+                                            <p:cond delay="0"/>
+                                          </p:stCondLst>
+                                        </p:cTn>
+                                        <p:tgtEl>
+                                          <p:spTgt spid="3">
+                                            <p:txEl>
+                                              <p:pRg st="1" end="1"/>
+                                            </p:txEl>
+                                          </p:spTgt>
+                                        </p:tgtEl>
+                                        <p:attrNameLst>
+                                          <p:attrName>style.visibility</p:attrName>
+                                        </p:attrNameLst>
+                                      </p:cBhvr>
+                                      <p:to>
+                                        <p:strVal val="visible"/>
+                                      </p:to>
+                                    </p:set>
+                                    <p:anim calcmode="lin" valueType="num">
+                                      <p:cBhvr additive="base">
+                                        <p:cTn id="17" dur="500" fill="hold"/>
+                                        <p:tgtEl>
+                                          <p:spTgt spid="3">
+                                            <p:txEl>
+                                              <p:pRg st="1" end="1"/>
+                                            </p:txEl>
+                                          </p:spTgt>
+                                        </p:tgtEl>
+                                        <p:attrNameLst>
+                                          <p:attrName>ppt_x</p:attrName>
+                                        </p:attrNameLst>
+                                      </p:cBhvr>
+                                      <p:tavLst>
+                                        <p:tav tm="0">
+                                          <p:val>
+                                            <p:strVal val="1+#ppt_w/2"/>
+                                          </p:val>
+                                        </p:tav>
+                                        <p:tav tm="100000">
+                                          <p:val>
+                                            <p:strVal val="#ppt_x"/>
+                                          </p:val>
+                                        </p:tav>
+                                      </p:tavLst>
+                                    </p:anim>
+                                    <p:anim calcmode="lin" valueType="num">
+                                      <p:cBhvr additive="base">
+                                        <p:cTn id="18" dur="500" fill="hold"/>
+                                        <p:tgtEl>
+                                          <p:spTgt spid="3">
+                                            <p:txEl>
+                                              <p:pRg st="1" end="1"/>
+                                            </p:txEl>
+                                          </p:spTgt>
+                                        </p:tgtEl>
+                                        <p:attrNameLst>
+                                          <p:attrName>ppt_y</p:attrName>
+                                        </p:attrNameLst>
+                                      </p:cBhvr>
+                                      <p:tavLst>
+                                        <p:tav tm="0">
+                                          <p:val>
+                                            <p:strVal val="1+#ppt_h/2"/>
+                                          </p:val>
+                                        </p:tav>
+                                        <p:tav tm="100000">
+                                          <p:val>
+                                            <p:strVal val="#ppt_y"/>
+                                          </p:val>
+                                        </p:tav>
+                                      </p:tavLst>
+                                    </p:anim>
+                                  </p:childTnLst>
+                                </p:cTn>
+                              </p:par>
+                            </p:childTnLst>
+                          </p:cTn>
+                        </p:par>
+                        <p:par>
+                          <p:cTn id="19" fill="hold">
+                            <p:stCondLst>
+                              <p:cond delay="1500"/>
+                            </p:stCondLst>
+                            <p:childTnLst>
+                              <p:par>
+                                <p:cTn id="20" presetID="2" presetClass="entr" presetSubtype="6" fill="hold" nodeType="afterEffect">
+                                  <p:stCondLst>
+                                    <p:cond delay="0"/>
+                                  </p:stCondLst>
+                                  <p:childTnLst>
+                                    <p:set>
+                                      <p:cBhvr>
+                                        <p:cTn id="21" dur="1" fill="hold">
+                                          <p:stCondLst>
+                                            <p:cond delay="0"/>
+                                          </p:stCondLst>
+                                        </p:cTn>
+                                        <p:tgtEl>
+                                          <p:spTgt spid="3">
+                                            <p:txEl>
+                                              <p:pRg st="2" end="2"/>
+                                            </p:txEl>
+                                          </p:spTgt>
+                                        </p:tgtEl>
+                                        <p:attrNameLst>
+                                          <p:attrName>style.visibility</p:attrName>
+                                        </p:attrNameLst>
+                                      </p:cBhvr>
+                                      <p:to>
+                                        <p:strVal val="visible"/>
+                                      </p:to>
+                                    </p:set>
+                                    <p:anim calcmode="lin" valueType="num">
+                                      <p:cBhvr additive="base">
+                                        <p:cTn id="22" dur="500" fill="hold"/>
+                                        <p:tgtEl>
+                                          <p:spTgt spid="3">
+                                            <p:txEl>
+                                              <p:pRg st="2" end="2"/>
+                                            </p:txEl>
+                                          </p:spTgt>
+                                        </p:tgtEl>
+                                        <p:attrNameLst>
+                                          <p:attrName>ppt_x</p:attrName>
+                                        </p:attrNameLst>
+                                      </p:cBhvr>
+                                      <p:tavLst>
+                                        <p:tav tm="0">
+                                          <p:val>
+                                            <p:strVal val="1+#ppt_w/2"/>
+                                          </p:val>
+                                        </p:tav>
+                                        <p:tav tm="100000">
+                                          <p:val>
+                                            <p:strVal val="#ppt_x"/>
+                                          </p:val>
+                                        </p:tav>
+                                      </p:tavLst>
+                                    </p:anim>
+                                    <p:anim calcmode="lin" valueType="num">
+                                      <p:cBhvr additive="base">
+                                        <p:cTn id="23" dur="500" fill="hold"/>
+                                        <p:tgtEl>
+                                          <p:spTgt spid="3">
+                                            <p:txEl>
+                                              <p:pRg st="2" end="2"/>
+                                            </p:txEl>
+                                          </p:spTgt>
+                                        </p:tgtEl>
+                                        <p:attrNameLst>
+                                          <p:attrName>ppt_y</p:attrName>
+                                        </p:attrNameLst>
+                                      </p:cBhvr>
+                                      <p:tavLst>
+                                        <p:tav tm="0">
+                                          <p:val>
+                                            <p:strVal val="1+#ppt_h/2"/>
+                                          </p:val>
+                                        </p:tav>
+                                        <p:tav tm="100000">
+                                          <p:val>
+                                            <p:strVal val="#ppt_y"/>
+                                          </p:val>
+                                        </p:tav>
+                                      </p:tavLst>
+                                    </p:anim>
+                                  </p:childTnLst>
+                                </p:cTn>
+                              </p:par>
+                            </p:childTnLst>
+                          </p:cTn>
+                        </p:par>
+                      </p:childTnLst>
+                    </p:cTn>
+                  </p:par>
+                </p:childTnLst>
+              </p:cTn>
+              <p:prevCondLst>
+                <p:cond evt="onPrev" delay="0">
+                  <p:tgtEl>
+                    <p:sldTgt/>
+                  </p:tgtEl>
+                </p:cond>
+              </p:prevCondLst>
+              <p:nextCondLst>
+                <p:cond evt="onNext" delay="0">
+                  <p:tgtEl>
+                    <p:sldTgt/>
+                  </p:tgtEl>
+                </p:cond>
+              </p:nextCondLst>
+            </p:seq>
+          </p:childTnLst>
+        </p:cTn>
+      </p:par>
+    </p:tnLst>
+  </p:timing>
+</p:sld>
+</file>
+
+<file path=ppt/slides/slide8.xml><?xml version="1.0" encoding="utf-8"?>
+<p:sld xmlns:a="http://schemas.openxmlformats.org/drawingml/2006/main" xmlns:r="http://schemas.openxmlformats.org/officeDocument/2006/relationships" xmlns:p="http://schemas.openxmlformats.org/presentationml/2006/main">
+  <p:cSld>
+    <p:spTree>
+      <p:nvGrpSpPr>
+        <p:cNvPr id="1" name=""/>
+        <p:cNvGrpSpPr/>
+        <p:nvPr/>
+      </p:nvGrpSpPr>
+      <p:grpSpPr>
+        <a:xfrm>
+          <a:off x="0" y="0"/>
+          <a:ext cx="0" cy="0"/>
+          <a:chOff x="0" y="0"/>
+          <a:chExt cx="0" cy="0"/>
+        </a:xfrm>
+      </p:grpSpPr>
+      <p:sp>
+        <p:nvSpPr>
+          <p:cNvPr id="2" name="Cím 1"/>
+          <p:cNvSpPr>
+            <a:spLocks noGrp="1"/>
+          </p:cNvSpPr>
+          <p:nvPr>
+            <p:ph type="title"/>
+          </p:nvPr>
+        </p:nvSpPr>
+        <p:spPr/>
+        <p:txBody>
+          <a:bodyPr/>
+          <a:lstStyle/>
+          <a:p>
+            <a:r>
+              <a:rPr lang="hu-HU" dirty="0" smtClean="0">
+                <a:solidFill>
+                  <a:schemeClr val="bg1"/>
+                </a:solidFill>
+                <a:latin typeface="Algerian" panose="04020705040A02060702" pitchFamily="82" charset="0"/>
+              </a:rPr>
+              <a:t>Memória típusok</a:t>
+            </a:r>
+            <a:endParaRPr lang="hu-HU" dirty="0">
+              <a:solidFill>
+                <a:schemeClr val="bg1"/>
+              </a:solidFill>
+              <a:latin typeface="Algerian" panose="04020705040A02060702" pitchFamily="82" charset="0"/>
+            </a:endParaRPr>
+          </a:p>
+        </p:txBody>
+      </p:sp>
+      <p:sp>
+        <p:nvSpPr>
+          <p:cNvPr id="3" name="Tartalom helye 2"/>
+          <p:cNvSpPr>
+            <a:spLocks noGrp="1"/>
+          </p:cNvSpPr>
+          <p:nvPr>
+            <p:ph idx="1"/>
+          </p:nvPr>
+        </p:nvSpPr>
+        <p:spPr>
+          <a:xfrm>
+            <a:off x="838200" y="3494934"/>
+            <a:ext cx="10515600" cy="1640737"/>
+          </a:xfrm>
+        </p:spPr>
+        <p:txBody>
+          <a:bodyPr>
+            <a:normAutofit/>
+          </a:bodyPr>
+          <a:lstStyle/>
+          <a:p>
+            <a:r>
+              <a:rPr lang="hu-HU" dirty="0" smtClean="0">
+                <a:solidFill>
+                  <a:schemeClr val="bg1"/>
+                </a:solidFill>
+              </a:rPr>
+              <a:t>Sok régebbi számítógépben jelenleg is DDR3-as </a:t>
+            </a:r>
+            <a:r>
+              <a:rPr lang="hu-HU" dirty="0" err="1" smtClean="0">
+                <a:solidFill>
+                  <a:schemeClr val="bg1"/>
+                </a:solidFill>
+              </a:rPr>
+              <a:t>ramok</a:t>
+            </a:r>
+            <a:r>
+              <a:rPr lang="hu-HU" dirty="0" smtClean="0">
+                <a:solidFill>
+                  <a:schemeClr val="bg1"/>
+                </a:solidFill>
+              </a:rPr>
+              <a:t> vannak</a:t>
+            </a:r>
+            <a:endParaRPr lang="hu-HU" dirty="0">
+              <a:solidFill>
+                <a:schemeClr val="bg1"/>
+              </a:solidFill>
+            </a:endParaRPr>
+          </a:p>
+          <a:p>
+            <a:r>
+              <a:rPr lang="hu-HU" dirty="0" smtClean="0">
+                <a:solidFill>
+                  <a:schemeClr val="bg1"/>
+                </a:solidFill>
+              </a:rPr>
+              <a:t>Sebessége: </a:t>
+            </a:r>
+            <a:r>
+              <a:rPr lang="hu-HU" dirty="0">
+                <a:solidFill>
+                  <a:schemeClr val="bg1"/>
+                </a:solidFill>
+              </a:rPr>
+              <a:t>400–1066 MHz</a:t>
+            </a:r>
+          </a:p>
+          <a:p>
+            <a:endParaRPr lang="hu-HU" dirty="0"/>
+          </a:p>
+        </p:txBody>
+      </p:sp>
+      <p:sp>
+        <p:nvSpPr>
+          <p:cNvPr id="5" name="Szövegdoboz 4"/>
+          <p:cNvSpPr txBox="1"/>
+          <p:nvPr/>
+        </p:nvSpPr>
+        <p:spPr>
+          <a:xfrm>
+            <a:off x="1698734" y="2694715"/>
+            <a:ext cx="8794531" cy="800219"/>
+          </a:xfrm>
+          <a:prstGeom prst="rect">
+            <a:avLst/>
+          </a:prstGeom>
+          <a:noFill/>
+        </p:spPr>
+        <p:txBody>
+          <a:bodyPr wrap="square" rtlCol="0">
+            <a:spAutoFit/>
+          </a:bodyPr>
+          <a:lstStyle/>
+          <a:p>
+            <a:pPr algn="ctr"/>
+            <a:r>
+              <a:rPr lang="hu-HU" sz="2800" b="1" u="sng" dirty="0" smtClean="0">
+                <a:solidFill>
+                  <a:schemeClr val="bg1"/>
+                </a:solidFill>
+              </a:rPr>
+              <a:t>DDR 3 (DOUBLE DATA RATE 3)</a:t>
+            </a:r>
+            <a:endParaRPr lang="hu-HU" sz="2800" u="sng" dirty="0">
+              <a:solidFill>
+                <a:schemeClr val="bg1"/>
+              </a:solidFill>
+            </a:endParaRPr>
+          </a:p>
+          <a:p>
+            <a:pPr algn="ctr"/>
+            <a:endParaRPr lang="hu-HU" dirty="0">
+              <a:solidFill>
+                <a:schemeClr val="bg1"/>
+              </a:solidFill>
+            </a:endParaRPr>
+          </a:p>
+        </p:txBody>
+      </p:sp>
+    </p:spTree>
+    <p:extLst>
+      <p:ext uri="{BB962C8B-B14F-4D97-AF65-F5344CB8AC3E}">
+        <p14:creationId xmlns:p14="http://schemas.microsoft.com/office/powerpoint/2010/main" val="1507068301"/>
+      </p:ext>
+    </p:extLst>
+  </p:cSld>
+  <p:clrMapOvr>
+    <a:masterClrMapping/>
+  </p:clrMapOvr>
+  <mc:AlternateContent xmlns:mc="http://schemas.openxmlformats.org/markup-compatibility/2006">
+    <mc:Choice xmlns:p14="http://schemas.microsoft.com/office/powerpoint/2010/main" Requires="p14">
+      <p:transition spd="med" p14:dur="700">
+        <p:fade/>
+      </p:transition>
+    </mc:Choice>
+    <mc:Fallback>
+      <p:transition spd="med">
+        <p:fade/>
+      </p:transition>
+    </mc:Fallback>
+  </mc:AlternateContent>
+  <p:timing>
+    <p:tnLst>
+      <p:par>
+        <p:cTn id="1" dur="indefinite" restart="never" nodeType="tmRoot">
+          <p:childTnLst>
+            <p:seq concurrent="1" nextAc="seek">
+              <p:cTn id="2" dur="indefinite" nodeType="mainSeq">
+                <p:childTnLst>
+                  <p:par>
+                    <p:cTn id="3" fill="hold">
+                      <p:stCondLst>
+                        <p:cond delay="indefinite"/>
+                        <p:cond evt="onBegin" delay="0">
+                          <p:tn val="2"/>
+                        </p:cond>
+                      </p:stCondLst>
+                      <p:childTnLst>
+                        <p:par>
+                          <p:cTn id="4" fill="hold">
+                            <p:stCondLst>
+                              <p:cond delay="0"/>
+                            </p:stCondLst>
+                            <p:childTnLst>
+                              <p:par>
+                                <p:cTn id="5" presetID="2" presetClass="entr" presetSubtype="8" fill="hold" nodeType="afterEffect">
+                                  <p:stCondLst>
+                                    <p:cond delay="0"/>
+                                  </p:stCondLst>
+                                  <p:childTnLst>
+                                    <p:set>
+                                      <p:cBhvr>
+                                        <p:cTn id="6" dur="1" fill="hold">
+                                          <p:stCondLst>
+                                            <p:cond delay="0"/>
+                                          </p:stCondLst>
+                                        </p:cTn>
+                                        <p:tgtEl>
+                                          <p:spTgt spid="5">
+                                            <p:txEl>
+                                              <p:pRg st="0" end="0"/>
+                                            </p:txEl>
+                                          </p:spTgt>
+                                        </p:tgtEl>
+                                        <p:attrNameLst>
+                                          <p:attrName>style.visibility</p:attrName>
+                                        </p:attrNameLst>
+                                      </p:cBhvr>
+                                      <p:to>
+                                        <p:strVal val="visible"/>
+                                      </p:to>
+                                    </p:set>
+                                    <p:anim calcmode="lin" valueType="num">
+                                      <p:cBhvr additive="base">
+                                        <p:cTn id="7" dur="500" fill="hold"/>
+                                        <p:tgtEl>
+                                          <p:spTgt spid="5">
+                                            <p:txEl>
+                                              <p:pRg st="0" end="0"/>
+                                            </p:txEl>
+                                          </p:spTgt>
+                                        </p:tgtEl>
+                                        <p:attrNameLst>
+                                          <p:attrName>ppt_x</p:attrName>
+                                        </p:attrNameLst>
+                                      </p:cBhvr>
+                                      <p:tavLst>
+                                        <p:tav tm="0">
+                                          <p:val>
+                                            <p:strVal val="0-#ppt_w/2"/>
+                                          </p:val>
+                                        </p:tav>
+                                        <p:tav tm="100000">
+                                          <p:val>
+                                            <p:strVal val="#ppt_x"/>
+                                          </p:val>
+                                        </p:tav>
+                                      </p:tavLst>
+                                    </p:anim>
+                                    <p:anim calcmode="lin" valueType="num">
+                                      <p:cBhvr additive="base">
+                                        <p:cTn id="8" dur="500" fill="hold"/>
+                                        <p:tgtEl>
+                                          <p:spTgt spid="5">
+                                            <p:txEl>
+                                              <p:pRg st="0" end="0"/>
+                                            </p:txEl>
+                                          </p:spTgt>
+                                        </p:tgtEl>
+                                        <p:attrNameLst>
+                                          <p:attrName>ppt_y</p:attrName>
+                                        </p:attrNameLst>
+                                      </p:cBhvr>
+                                      <p:tavLst>
+                                        <p:tav tm="0">
+                                          <p:val>
+                                            <p:strVal val="#ppt_y"/>
+                                          </p:val>
+                                        </p:tav>
+                                        <p:tav tm="100000">
+                                          <p:val>
+                                            <p:strVal val="#ppt_y"/>
+                                          </p:val>
+                                        </p:tav>
+                                      </p:tavLst>
+                                    </p:anim>
+                                  </p:childTnLst>
+                                </p:cTn>
+                              </p:par>
+                            </p:childTnLst>
+                          </p:cTn>
+                        </p:par>
+                        <p:par>
+                          <p:cTn id="9" fill="hold">
+                            <p:stCondLst>
+                              <p:cond delay="500"/>
+                            </p:stCondLst>
+                            <p:childTnLst>
+                              <p:par>
+                                <p:cTn id="10" presetID="2" presetClass="entr" presetSubtype="6" fill="hold" nodeType="afterEffect">
+                                  <p:stCondLst>
+                                    <p:cond delay="0"/>
+                                  </p:stCondLst>
+                                  <p:childTnLst>
+                                    <p:set>
+                                      <p:cBhvr>
+                                        <p:cTn id="11" dur="1" fill="hold">
+                                          <p:stCondLst>
+                                            <p:cond delay="0"/>
+                                          </p:stCondLst>
+                                        </p:cTn>
+                                        <p:tgtEl>
+                                          <p:spTgt spid="3">
+                                            <p:txEl>
+                                              <p:pRg st="0" end="0"/>
+                                            </p:txEl>
+                                          </p:spTgt>
+                                        </p:tgtEl>
+                                        <p:attrNameLst>
+                                          <p:attrName>style.visibility</p:attrName>
+                                        </p:attrNameLst>
+                                      </p:cBhvr>
+                                      <p:to>
+                                        <p:strVal val="visible"/>
+                                      </p:to>
+                                    </p:set>
+                                    <p:anim calcmode="lin" valueType="num">
+                                      <p:cBhvr additive="base">
+                                        <p:cTn id="12" dur="500" fill="hold"/>
+                                        <p:tgtEl>
+                                          <p:spTgt spid="3">
+                                            <p:txEl>
+                                              <p:pRg st="0" end="0"/>
+                                            </p:txEl>
+                                          </p:spTgt>
+                                        </p:tgtEl>
+                                        <p:attrNameLst>
+                                          <p:attrName>ppt_x</p:attrName>
+                                        </p:attrNameLst>
+                                      </p:cBhvr>
+                                      <p:tavLst>
+                                        <p:tav tm="0">
+                                          <p:val>
+                                            <p:strVal val="1+#ppt_w/2"/>
+                                          </p:val>
+                                        </p:tav>
+                                        <p:tav tm="100000">
+                                          <p:val>
+                                            <p:strVal val="#ppt_x"/>
+                                          </p:val>
+                                        </p:tav>
+                                      </p:tavLst>
+                                    </p:anim>
+                                    <p:anim calcmode="lin" valueType="num">
+                                      <p:cBhvr additive="base">
+                                        <p:cTn id="13" dur="500" fill="hold"/>
+                                        <p:tgtEl>
+                                          <p:spTgt spid="3">
+                                            <p:txEl>
+                                              <p:pRg st="0" end="0"/>
+                                            </p:txEl>
+                                          </p:spTgt>
+                                        </p:tgtEl>
+                                        <p:attrNameLst>
+                                          <p:attrName>ppt_y</p:attrName>
+                                        </p:attrNameLst>
+                                      </p:cBhvr>
+                                      <p:tavLst>
+                                        <p:tav tm="0">
+                                          <p:val>
+                                            <p:strVal val="1+#ppt_h/2"/>
+                                          </p:val>
+                                        </p:tav>
+                                        <p:tav tm="100000">
+                                          <p:val>
+                                            <p:strVal val="#ppt_y"/>
+                                          </p:val>
+                                        </p:tav>
+                                      </p:tavLst>
+                                    </p:anim>
+                                  </p:childTnLst>
+                                </p:cTn>
+                              </p:par>
+                            </p:childTnLst>
+                          </p:cTn>
+                        </p:par>
+                        <p:par>
+                          <p:cTn id="14" fill="hold">
+                            <p:stCondLst>
+                              <p:cond delay="1000"/>
+                            </p:stCondLst>
+                            <p:childTnLst>
+                              <p:par>
+                                <p:cTn id="15" presetID="2" presetClass="entr" presetSubtype="6" fill="hold" nodeType="afterEffect">
+                                  <p:stCondLst>
+                                    <p:cond delay="0"/>
+                                  </p:stCondLst>
+                                  <p:childTnLst>
+                                    <p:set>
+                                      <p:cBhvr>
+                                        <p:cTn id="16" dur="1" fill="hold">
+                                          <p:stCondLst>
+                                            <p:cond delay="0"/>
+                                          </p:stCondLst>
+                                        </p:cTn>
+                                        <p:tgtEl>
+                                          <p:spTgt spid="3">
+                                            <p:txEl>
+                                              <p:pRg st="1" end="1"/>
+                                            </p:txEl>
+                                          </p:spTgt>
+                                        </p:tgtEl>
+                                        <p:attrNameLst>
+                                          <p:attrName>style.visibility</p:attrName>
+                                        </p:attrNameLst>
+                                      </p:cBhvr>
+                                      <p:to>
+                                        <p:strVal val="visible"/>
+                                      </p:to>
+                                    </p:set>
+                                    <p:anim calcmode="lin" valueType="num">
+                                      <p:cBhvr additive="base">
+                                        <p:cTn id="17" dur="500" fill="hold"/>
+                                        <p:tgtEl>
+                                          <p:spTgt spid="3">
+                                            <p:txEl>
+                                              <p:pRg st="1" end="1"/>
+                                            </p:txEl>
+                                          </p:spTgt>
+                                        </p:tgtEl>
+                                        <p:attrNameLst>
+                                          <p:attrName>ppt_x</p:attrName>
+                                        </p:attrNameLst>
+                                      </p:cBhvr>
+                                      <p:tavLst>
+                                        <p:tav tm="0">
+                                          <p:val>
+                                            <p:strVal val="1+#ppt_w/2"/>
+                                          </p:val>
+                                        </p:tav>
+                                        <p:tav tm="100000">
+                                          <p:val>
+                                            <p:strVal val="#ppt_x"/>
+                                          </p:val>
+                                        </p:tav>
+                                      </p:tavLst>
+                                    </p:anim>
+                                    <p:anim calcmode="lin" valueType="num">
+                                      <p:cBhvr additive="base">
+                                        <p:cTn id="18" dur="500" fill="hold"/>
+                                        <p:tgtEl>
+                                          <p:spTgt spid="3">
+                                            <p:txEl>
+                                              <p:pRg st="1" end="1"/>
+                                            </p:txEl>
+                                          </p:spTgt>
+                                        </p:tgtEl>
+                                        <p:attrNameLst>
+                                          <p:attrName>ppt_y</p:attrName>
+                                        </p:attrNameLst>
+                                      </p:cBhvr>
+                                      <p:tavLst>
+                                        <p:tav tm="0">
+                                          <p:val>
+                                            <p:strVal val="1+#ppt_h/2"/>
+                                          </p:val>
+                                        </p:tav>
+                                        <p:tav tm="100000">
+                                          <p:val>
+                                            <p:strVal val="#ppt_y"/>
+                                          </p:val>
+                                        </p:tav>
+                                      </p:tavLst>
+                                    </p:anim>
+                                  </p:childTnLst>
+                                </p:cTn>
+                              </p:par>
+                            </p:childTnLst>
+                          </p:cTn>
+                        </p:par>
+                      </p:childTnLst>
+                    </p:cTn>
+                  </p:par>
+                </p:childTnLst>
+              </p:cTn>
+              <p:prevCondLst>
+                <p:cond evt="onPrev" delay="0">
+                  <p:tgtEl>
+                    <p:sldTgt/>
+                  </p:tgtEl>
+                </p:cond>
+              </p:prevCondLst>
+              <p:nextCondLst>
+                <p:cond evt="onNext" delay="0">
+                  <p:tgtEl>
+                    <p:sldTgt/>
+                  </p:tgtEl>
+                </p:cond>
+              </p:nextCondLst>
+            </p:seq>
+          </p:childTnLst>
+        </p:cTn>
+      </p:par>
+    </p:tnLst>
+  </p:timing>
+</p:sld>
+</file>
+
+<file path=ppt/slides/slide9.xml><?xml version="1.0" encoding="utf-8"?>
+<p:sld xmlns:a="http://schemas.openxmlformats.org/drawingml/2006/main" xmlns:r="http://schemas.openxmlformats.org/officeDocument/2006/relationships" xmlns:p="http://schemas.openxmlformats.org/presentationml/2006/main">
+  <p:cSld>
+    <p:spTree>
+      <p:nvGrpSpPr>
+        <p:cNvPr id="1" name=""/>
+        <p:cNvGrpSpPr/>
+        <p:nvPr/>
+      </p:nvGrpSpPr>
+      <p:grpSpPr>
+        <a:xfrm>
+          <a:off x="0" y="0"/>
+          <a:ext cx="0" cy="0"/>
+          <a:chOff x="0" y="0"/>
+          <a:chExt cx="0" cy="0"/>
+        </a:xfrm>
+      </p:grpSpPr>
+      <p:sp>
+        <p:nvSpPr>
+          <p:cNvPr id="2" name="Cím 1"/>
+          <p:cNvSpPr>
+            <a:spLocks noGrp="1"/>
+          </p:cNvSpPr>
+          <p:nvPr>
+            <p:ph type="title"/>
+          </p:nvPr>
+        </p:nvSpPr>
+        <p:spPr/>
+        <p:txBody>
+          <a:bodyPr/>
+          <a:lstStyle/>
+          <a:p>
+            <a:r>
+              <a:rPr lang="hu-HU" dirty="0" smtClean="0">
+                <a:solidFill>
+                  <a:schemeClr val="bg1"/>
+                </a:solidFill>
+                <a:latin typeface="Algerian" panose="04020705040A02060702" pitchFamily="82" charset="0"/>
+              </a:rPr>
+              <a:t>Memória típusok</a:t>
+            </a:r>
+            <a:endParaRPr lang="hu-HU" dirty="0">
+              <a:solidFill>
+                <a:schemeClr val="bg1"/>
+              </a:solidFill>
+              <a:latin typeface="Algerian" panose="04020705040A02060702" pitchFamily="82" charset="0"/>
+            </a:endParaRPr>
+          </a:p>
+        </p:txBody>
+      </p:sp>
+      <p:sp>
+        <p:nvSpPr>
+          <p:cNvPr id="3" name="Tartalom helye 2"/>
+          <p:cNvSpPr>
+            <a:spLocks noGrp="1"/>
+          </p:cNvSpPr>
+          <p:nvPr>
+            <p:ph idx="1"/>
+          </p:nvPr>
+        </p:nvSpPr>
+        <p:spPr>
+          <a:xfrm>
+            <a:off x="838200" y="3494934"/>
+            <a:ext cx="10515600" cy="1640737"/>
+          </a:xfrm>
+        </p:spPr>
+        <p:txBody>
+          <a:bodyPr>
+            <a:normAutofit/>
+          </a:bodyPr>
+          <a:lstStyle/>
+          <a:p>
+            <a:r>
+              <a:rPr lang="hu-HU" dirty="0" smtClean="0">
+                <a:solidFill>
+                  <a:schemeClr val="bg1"/>
+                </a:solidFill>
+              </a:rPr>
+              <a:t>Jelenleg a legelterjedtebb RAM típus</a:t>
+            </a:r>
+            <a:endParaRPr lang="hu-HU" dirty="0">
+              <a:solidFill>
+                <a:schemeClr val="bg1"/>
+              </a:solidFill>
+            </a:endParaRPr>
+          </a:p>
+          <a:p>
+            <a:r>
+              <a:rPr lang="hu-HU" dirty="0" smtClean="0">
+                <a:solidFill>
+                  <a:schemeClr val="bg1"/>
+                </a:solidFill>
+              </a:rPr>
+              <a:t>Sebessége: 2133MHz – 3000+Mhz (</a:t>
+            </a:r>
+            <a:r>
+              <a:rPr lang="hu-HU" dirty="0" err="1" smtClean="0">
+                <a:solidFill>
+                  <a:schemeClr val="bg1"/>
+                </a:solidFill>
+              </a:rPr>
+              <a:t>pl</a:t>
+            </a:r>
+            <a:r>
+              <a:rPr lang="hu-HU" dirty="0" smtClean="0">
+                <a:solidFill>
+                  <a:schemeClr val="bg1"/>
+                </a:solidFill>
+              </a:rPr>
+              <a:t>: 3200, 3400)</a:t>
+            </a:r>
+          </a:p>
+          <a:p>
+            <a:r>
+              <a:rPr lang="hu-HU" dirty="0" smtClean="0">
+                <a:solidFill>
+                  <a:schemeClr val="bg1"/>
+                </a:solidFill>
+              </a:rPr>
+              <a:t>Nem olyan drágák</a:t>
+            </a:r>
+            <a:endParaRPr lang="hu-HU" dirty="0">
+              <a:solidFill>
+                <a:schemeClr val="bg1"/>
+              </a:solidFill>
+            </a:endParaRPr>
+          </a:p>
+        </p:txBody>
+      </p:sp>
+      <p:sp>
+        <p:nvSpPr>
+          <p:cNvPr id="5" name="Szövegdoboz 4"/>
+          <p:cNvSpPr txBox="1"/>
+          <p:nvPr/>
+        </p:nvSpPr>
+        <p:spPr>
+          <a:xfrm>
+            <a:off x="1698734" y="2694715"/>
+            <a:ext cx="8794531" cy="800219"/>
+          </a:xfrm>
+          <a:prstGeom prst="rect">
+            <a:avLst/>
+          </a:prstGeom>
+          <a:noFill/>
+        </p:spPr>
+        <p:txBody>
+          <a:bodyPr wrap="square" rtlCol="0">
+            <a:spAutoFit/>
+          </a:bodyPr>
+          <a:lstStyle/>
+          <a:p>
+            <a:pPr algn="ctr"/>
+            <a:r>
+              <a:rPr lang="hu-HU" sz="2800" b="1" u="sng" dirty="0" smtClean="0">
+                <a:solidFill>
+                  <a:schemeClr val="bg1"/>
+                </a:solidFill>
+              </a:rPr>
+              <a:t>DDR 4 (DOUBLE DATA RATE 4)</a:t>
+            </a:r>
+            <a:endParaRPr lang="hu-HU" sz="2800" u="sng" dirty="0">
+              <a:solidFill>
+                <a:schemeClr val="bg1"/>
+              </a:solidFill>
+            </a:endParaRPr>
+          </a:p>
+          <a:p>
+            <a:pPr algn="ctr"/>
+            <a:endParaRPr lang="hu-HU" dirty="0">
+              <a:solidFill>
+                <a:schemeClr val="bg1"/>
+              </a:solidFill>
+            </a:endParaRPr>
+          </a:p>
+        </p:txBody>
+      </p:sp>
+    </p:spTree>
+    <p:extLst>
+      <p:ext uri="{BB962C8B-B14F-4D97-AF65-F5344CB8AC3E}">
+        <p14:creationId xmlns:p14="http://schemas.microsoft.com/office/powerpoint/2010/main" val="666382491"/>
+      </p:ext>
+    </p:extLst>
+  </p:cSld>
+  <p:clrMapOvr>
+    <a:masterClrMapping/>
+  </p:clrMapOvr>
+  <mc:AlternateContent xmlns:mc="http://schemas.openxmlformats.org/markup-compatibility/2006">
+    <mc:Choice xmlns:p14="http://schemas.microsoft.com/office/powerpoint/2010/main" Requires="p14">
+      <p:transition spd="med" p14:dur="700">
+        <p:fade/>
+      </p:transition>
+    </mc:Choice>
+    <mc:Fallback>
+      <p:transition spd="med">
+        <p:fade/>
+      </p:transition>
+    </mc:Fallback>
+  </mc:AlternateContent>
+  <p:timing>
+    <p:tnLst>
+      <p:par>
+        <p:cTn id="1" dur="indefinite" restart="never" nodeType="tmRoot">
+          <p:childTnLst>
+            <p:seq concurrent="1" nextAc="seek">
+              <p:cTn id="2" dur="indefinite" nodeType="mainSeq">
+                <p:childTnLst>
+                  <p:par>
+                    <p:cTn id="3" fill="hold">
+                      <p:stCondLst>
+                        <p:cond delay="indefinite"/>
+                        <p:cond evt="onBegin" delay="0">
+                          <p:tn val="2"/>
+                        </p:cond>
+                      </p:stCondLst>
+                      <p:childTnLst>
+                        <p:par>
+                          <p:cTn id="4" fill="hold">
+                            <p:stCondLst>
+                              <p:cond delay="0"/>
+                            </p:stCondLst>
+                            <p:childTnLst>
+                              <p:par>
+                                <p:cTn id="5" presetID="2" presetClass="entr" presetSubtype="8" fill="hold" nodeType="afterEffect">
+                                  <p:stCondLst>
+                                    <p:cond delay="0"/>
+                                  </p:stCondLst>
+                                  <p:childTnLst>
+                                    <p:set>
+                                      <p:cBhvr>
+                                        <p:cTn id="6" dur="1" fill="hold">
+                                          <p:stCondLst>
+                                            <p:cond delay="0"/>
+                                          </p:stCondLst>
+                                        </p:cTn>
+                                        <p:tgtEl>
+                                          <p:spTgt spid="5">
+                                            <p:txEl>
+                                              <p:pRg st="0" end="0"/>
+                                            </p:txEl>
+                                          </p:spTgt>
+                                        </p:tgtEl>
+                                        <p:attrNameLst>
+                                          <p:attrName>style.visibility</p:attrName>
+                                        </p:attrNameLst>
+                                      </p:cBhvr>
+                                      <p:to>
+                                        <p:strVal val="visible"/>
+                                      </p:to>
+                                    </p:set>
+                                    <p:anim calcmode="lin" valueType="num">
+                                      <p:cBhvr additive="base">
+                                        <p:cTn id="7" dur="500" fill="hold"/>
+                                        <p:tgtEl>
+                                          <p:spTgt spid="5">
+                                            <p:txEl>
+                                              <p:pRg st="0" end="0"/>
+                                            </p:txEl>
+                                          </p:spTgt>
+                                        </p:tgtEl>
+                                        <p:attrNameLst>
+                                          <p:attrName>ppt_x</p:attrName>
+                                        </p:attrNameLst>
+                                      </p:cBhvr>
+                                      <p:tavLst>
+                                        <p:tav tm="0">
+                                          <p:val>
+                                            <p:strVal val="0-#ppt_w/2"/>
+                                          </p:val>
+                                        </p:tav>
+                                        <p:tav tm="100000">
+                                          <p:val>
+                                            <p:strVal val="#ppt_x"/>
+                                          </p:val>
+                                        </p:tav>
+                                      </p:tavLst>
+                                    </p:anim>
+                                    <p:anim calcmode="lin" valueType="num">
+                                      <p:cBhvr additive="base">
+                                        <p:cTn id="8" dur="500" fill="hold"/>
+                                        <p:tgtEl>
+                                          <p:spTgt spid="5">
+                                            <p:txEl>
+                                              <p:pRg st="0" end="0"/>
+                                            </p:txEl>
+                                          </p:spTgt>
+                                        </p:tgtEl>
+                                        <p:attrNameLst>
+                                          <p:attrName>ppt_y</p:attrName>
+                                        </p:attrNameLst>
+                                      </p:cBhvr>
+                                      <p:tavLst>
+                                        <p:tav tm="0">
+                                          <p:val>
+                                            <p:strVal val="#ppt_y"/>
+                                          </p:val>
+                                        </p:tav>
+                                        <p:tav tm="100000">
+                                          <p:val>
+                                            <p:strVal val="#ppt_y"/>
+                                          </p:val>
+                                        </p:tav>
+                                      </p:tavLst>
+                                    </p:anim>
+                                  </p:childTnLst>
+                                </p:cTn>
+                              </p:par>
+                            </p:childTnLst>
+                          </p:cTn>
+                        </p:par>
+                        <p:par>
+                          <p:cTn id="9" fill="hold">
+                            <p:stCondLst>
+                              <p:cond delay="500"/>
+                            </p:stCondLst>
+                            <p:childTnLst>
+                              <p:par>
+                                <p:cTn id="10" presetID="2" presetClass="entr" presetSubtype="6" fill="hold" nodeType="afterEffect">
+                                  <p:stCondLst>
+                                    <p:cond delay="0"/>
+                                  </p:stCondLst>
+                                  <p:childTnLst>
+                                    <p:set>
+                                      <p:cBhvr>
+                                        <p:cTn id="11" dur="1" fill="hold">
+                                          <p:stCondLst>
+                                            <p:cond delay="0"/>
+                                          </p:stCondLst>
+                                        </p:cTn>
+                                        <p:tgtEl>
+                                          <p:spTgt spid="3">
+                                            <p:txEl>
+                                              <p:pRg st="0" end="0"/>
+                                            </p:txEl>
+                                          </p:spTgt>
+                                        </p:tgtEl>
+                                        <p:attrNameLst>
+                                          <p:attrName>style.visibility</p:attrName>
+                                        </p:attrNameLst>
+                                      </p:cBhvr>
+                                      <p:to>
+                                        <p:strVal val="visible"/>
+                                      </p:to>
+                                    </p:set>
+                                    <p:anim calcmode="lin" valueType="num">
+                                      <p:cBhvr additive="base">
+                                        <p:cTn id="12" dur="500" fill="hold"/>
+                                        <p:tgtEl>
+                                          <p:spTgt spid="3">
+                                            <p:txEl>
+                                              <p:pRg st="0" end="0"/>
+                                            </p:txEl>
+                                          </p:spTgt>
+                                        </p:tgtEl>
+                                        <p:attrNameLst>
+                                          <p:attrName>ppt_x</p:attrName>
+                                        </p:attrNameLst>
+                                      </p:cBhvr>
+                                      <p:tavLst>
+                                        <p:tav tm="0">
+                                          <p:val>
+                                            <p:strVal val="1+#ppt_w/2"/>
+                                          </p:val>
+                                        </p:tav>
+                                        <p:tav tm="100000">
+                                          <p:val>
+                                            <p:strVal val="#ppt_x"/>
+                                          </p:val>
+                                        </p:tav>
+                                      </p:tavLst>
+                                    </p:anim>
+                                    <p:anim calcmode="lin" valueType="num">
+                                      <p:cBhvr additive="base">
+                                        <p:cTn id="13" dur="500" fill="hold"/>
+                                        <p:tgtEl>
+                                          <p:spTgt spid="3">
+                                            <p:txEl>
+                                              <p:pRg st="0" end="0"/>
+                                            </p:txEl>
+                                          </p:spTgt>
+                                        </p:tgtEl>
+                                        <p:attrNameLst>
+                                          <p:attrName>ppt_y</p:attrName>
+                                        </p:attrNameLst>
+                                      </p:cBhvr>
+                                      <p:tavLst>
+                                        <p:tav tm="0">
+                                          <p:val>
+                                            <p:strVal val="1+#ppt_h/2"/>
+                                          </p:val>
+                                        </p:tav>
+                                        <p:tav tm="100000">
+                                          <p:val>
+                                            <p:strVal val="#ppt_y"/>
+                                          </p:val>
+                                        </p:tav>
+                                      </p:tavLst>
+                                    </p:anim>
+                                  </p:childTnLst>
+                                </p:cTn>
+                              </p:par>
+                            </p:childTnLst>
+                          </p:cTn>
+                        </p:par>
+                        <p:par>
+                          <p:cTn id="14" fill="hold">
+                            <p:stCondLst>
+                              <p:cond delay="1000"/>
+                            </p:stCondLst>
+                            <p:childTnLst>
+                              <p:par>
+                                <p:cTn id="15" presetID="2" presetClass="entr" presetSubtype="6" fill="hold" nodeType="afterEffect">
+                                  <p:stCondLst>
+                                    <p:cond delay="0"/>
+                                  </p:stCondLst>
+                                  <p:childTnLst>
+                                    <p:set>
+                                      <p:cBhvr>
+                                        <p:cTn id="16" dur="1" fill="hold">
+                                          <p:stCondLst>
+                                            <p:cond delay="0"/>
+                                          </p:stCondLst>
+                                        </p:cTn>
+                                        <p:tgtEl>
+                                          <p:spTgt spid="3">
+                                            <p:txEl>
+                                              <p:pRg st="1" end="1"/>
+                                            </p:txEl>
+                                          </p:spTgt>
+                                        </p:tgtEl>
+                                        <p:attrNameLst>
+                                          <p:attrName>style.visibility</p:attrName>
+                                        </p:attrNameLst>
+                                      </p:cBhvr>
+                                      <p:to>
+                                        <p:strVal val="visible"/>
+                                      </p:to>
+                                    </p:set>
+                                    <p:anim calcmode="lin" valueType="num">
+                                      <p:cBhvr additive="base">
+                                        <p:cTn id="17" dur="500" fill="hold"/>
+                                        <p:tgtEl>
+                                          <p:spTgt spid="3">
+                                            <p:txEl>
+                                              <p:pRg st="1" end="1"/>
+                                            </p:txEl>
+                                          </p:spTgt>
+                                        </p:tgtEl>
+                                        <p:attrNameLst>
+                                          <p:attrName>ppt_x</p:attrName>
+                                        </p:attrNameLst>
+                                      </p:cBhvr>
+                                      <p:tavLst>
+                                        <p:tav tm="0">
+                                          <p:val>
+                                            <p:strVal val="1+#ppt_w/2"/>
+                                          </p:val>
+                                        </p:tav>
+                                        <p:tav tm="100000">
+                                          <p:val>
+                                            <p:strVal val="#ppt_x"/>
+                                          </p:val>
+                                        </p:tav>
+                                      </p:tavLst>
+                                    </p:anim>
+                                    <p:anim calcmode="lin" valueType="num">
+                                      <p:cBhvr additive="base">
+                                        <p:cTn id="18" dur="500" fill="hold"/>
+                                        <p:tgtEl>
+                                          <p:spTgt spid="3">
+                                            <p:txEl>
+                                              <p:pRg st="1" end="1"/>
+                                            </p:txEl>
+                                          </p:spTgt>
+                                        </p:tgtEl>
+                                        <p:attrNameLst>
+                                          <p:attrName>ppt_y</p:attrName>
+                                        </p:attrNameLst>
+                                      </p:cBhvr>
+                                      <p:tavLst>
+                                        <p:tav tm="0">
+                                          <p:val>
+                                            <p:strVal val="1+#ppt_h/2"/>
+                                          </p:val>
+                                        </p:tav>
+                                        <p:tav tm="100000">
+                                          <p:val>
+                                            <p:strVal val="#ppt_y"/>
+                                          </p:val>
+                                        </p:tav>
+                                      </p:tavLst>
+                                    </p:anim>
+                                  </p:childTnLst>
+                                </p:cTn>
+                              </p:par>
+                            </p:childTnLst>
+                          </p:cTn>
+                        </p:par>
+                        <p:par>
+                          <p:cTn id="19" fill="hold">
+                            <p:stCondLst>
+                              <p:cond delay="1500"/>
+                            </p:stCondLst>
+                            <p:childTnLst>
+                              <p:par>
+                                <p:cTn id="20" presetID="2" presetClass="entr" presetSubtype="6" fill="hold" nodeType="afterEffect">
+                                  <p:stCondLst>
+                                    <p:cond delay="0"/>
+                                  </p:stCondLst>
+                                  <p:childTnLst>
+                                    <p:set>
+                                      <p:cBhvr>
+                                        <p:cTn id="21" dur="1" fill="hold">
+                                          <p:stCondLst>
+                                            <p:cond delay="0"/>
+                                          </p:stCondLst>
+                                        </p:cTn>
+                                        <p:tgtEl>
+                                          <p:spTgt spid="3">
+                                            <p:txEl>
+                                              <p:pRg st="2" end="2"/>
+                                            </p:txEl>
+                                          </p:spTgt>
+                                        </p:tgtEl>
+                                        <p:attrNameLst>
+                                          <p:attrName>style.visibility</p:attrName>
+                                        </p:attrNameLst>
+                                      </p:cBhvr>
+                                      <p:to>
+                                        <p:strVal val="visible"/>
+                                      </p:to>
+                                    </p:set>
+                                    <p:anim calcmode="lin" valueType="num">
+                                      <p:cBhvr additive="base">
+                                        <p:cTn id="22" dur="500" fill="hold"/>
+                                        <p:tgtEl>
+                                          <p:spTgt spid="3">
+                                            <p:txEl>
+                                              <p:pRg st="2" end="2"/>
+                                            </p:txEl>
+                                          </p:spTgt>
+                                        </p:tgtEl>
+                                        <p:attrNameLst>
+                                          <p:attrName>ppt_x</p:attrName>
+                                        </p:attrNameLst>
+                                      </p:cBhvr>
+                                      <p:tavLst>
+                                        <p:tav tm="0">
+                                          <p:val>
+                                            <p:strVal val="1+#ppt_w/2"/>
+                                          </p:val>
+                                        </p:tav>
+                                        <p:tav tm="100000">
+                                          <p:val>
+                                            <p:strVal val="#ppt_x"/>
+                                          </p:val>
+                                        </p:tav>
+                                      </p:tavLst>
+                                    </p:anim>
+                                    <p:anim calcmode="lin" valueType="num">
+                                      <p:cBhvr additive="base">
+                                        <p:cTn id="23" dur="500" fill="hold"/>
+                                        <p:tgtEl>
+                                          <p:spTgt spid="3">
+                                            <p:txEl>
+                                              <p:pRg st="2" end="2"/>
+                                            </p:txEl>
+                                          </p:spTgt>
+                                        </p:tgtEl>
+                                        <p:attrNameLst>
+                                          <p:attrName>ppt_y</p:attrName>
+                                        </p:attrNameLst>
+                                      </p:cBhvr>
+                                      <p:tavLst>
+                                        <p:tav tm="0">
+                                          <p:val>
+                                            <p:strVal val="1+#ppt_h/2"/>
+                                          </p:val>
+                                        </p:tav>
+                                        <p:tav tm="100000">
+                                          <p:val>
+                                            <p:strVal val="#ppt_y"/>
+                                          </p:val>
+                                        </p:tav>
+                                      </p:tavLst>
+                                    </p:anim>
+                                  </p:childTnLst>
+                                </p:cTn>
+                              </p:par>
+                            </p:childTnLst>
+                          </p:cTn>
+                        </p:par>
+                      </p:childTnLst>
+                    </p:cTn>
+                  </p:par>
+                </p:childTnLst>
+              </p:cTn>
+              <p:prevCondLst>
+                <p:cond evt="onPrev" delay="0">
+                  <p:tgtEl>
+                    <p:sldTgt/>
+                  </p:tgtEl>
+                </p:cond>
+              </p:prevCondLst>
+              <p:nextCondLst>
+                <p:cond evt="onNext" delay="0">
+                  <p:tgtEl>
+                    <p:sldTgt/>
+                  </p:tgtEl>
+                </p:cond>
+              </p:nextCondLst>
+            </p:seq>
+          </p:childTnLst>
+        </p:cTn>
+      </p:par>
+    </p:tnLst>
   </p:timing>
 </p:sld>
 </file>

</xml_diff>

<commit_message>
Procceszorokról szóló diák bővítése
</commit_message>
<xml_diff>
--- a/processzor + memoria.pptx
+++ b/processzor + memoria.pptx
@@ -5,7 +5,7 @@
     <p:sldMasterId id="2147483648" r:id="rId1"/>
   </p:sldMasterIdLst>
   <p:notesMasterIdLst>
-    <p:notesMasterId r:id="rId19"/>
+    <p:notesMasterId r:id="rId22"/>
   </p:notesMasterIdLst>
   <p:sldIdLst>
     <p:sldId id="256" r:id="rId2"/>
@@ -25,6 +25,9 @@
     <p:sldId id="273" r:id="rId16"/>
     <p:sldId id="274" r:id="rId17"/>
     <p:sldId id="275" r:id="rId18"/>
+    <p:sldId id="276" r:id="rId19"/>
+    <p:sldId id="277" r:id="rId20"/>
+    <p:sldId id="278" r:id="rId21"/>
   </p:sldIdLst>
   <p:sldSz cx="12192000" cy="6858000"/>
   <p:notesSz cx="6858000" cy="9144000"/>
@@ -213,7 +216,7 @@
           <a:p>
             <a:fld id="{DD3D37D4-9C9F-4041-B555-73D2DBC35CFF}" type="datetimeFigureOut">
               <a:rPr lang="hu-HU" smtClean="0"/>
-              <a:t>2023.10.11.</a:t>
+              <a:t>2023.10.16.</a:t>
             </a:fld>
             <a:endParaRPr lang="hu-HU"/>
           </a:p>
@@ -780,7 +783,7 @@
           <a:p>
             <a:fld id="{397604E0-0D2C-4780-BF54-3C57F83D7B51}" type="datetimeFigureOut">
               <a:rPr lang="hu-HU" smtClean="0"/>
-              <a:t>2023.10.11.</a:t>
+              <a:t>2023.10.16.</a:t>
             </a:fld>
             <a:endParaRPr lang="hu-HU"/>
           </a:p>
@@ -950,7 +953,7 @@
           <a:p>
             <a:fld id="{397604E0-0D2C-4780-BF54-3C57F83D7B51}" type="datetimeFigureOut">
               <a:rPr lang="hu-HU" smtClean="0"/>
-              <a:t>2023.10.11.</a:t>
+              <a:t>2023.10.16.</a:t>
             </a:fld>
             <a:endParaRPr lang="hu-HU"/>
           </a:p>
@@ -1130,7 +1133,7 @@
           <a:p>
             <a:fld id="{397604E0-0D2C-4780-BF54-3C57F83D7B51}" type="datetimeFigureOut">
               <a:rPr lang="hu-HU" smtClean="0"/>
-              <a:t>2023.10.11.</a:t>
+              <a:t>2023.10.16.</a:t>
             </a:fld>
             <a:endParaRPr lang="hu-HU"/>
           </a:p>
@@ -1300,7 +1303,7 @@
           <a:p>
             <a:fld id="{397604E0-0D2C-4780-BF54-3C57F83D7B51}" type="datetimeFigureOut">
               <a:rPr lang="hu-HU" smtClean="0"/>
-              <a:t>2023.10.11.</a:t>
+              <a:t>2023.10.16.</a:t>
             </a:fld>
             <a:endParaRPr lang="hu-HU"/>
           </a:p>
@@ -1546,7 +1549,7 @@
           <a:p>
             <a:fld id="{397604E0-0D2C-4780-BF54-3C57F83D7B51}" type="datetimeFigureOut">
               <a:rPr lang="hu-HU" smtClean="0"/>
-              <a:t>2023.10.11.</a:t>
+              <a:t>2023.10.16.</a:t>
             </a:fld>
             <a:endParaRPr lang="hu-HU"/>
           </a:p>
@@ -1778,7 +1781,7 @@
           <a:p>
             <a:fld id="{397604E0-0D2C-4780-BF54-3C57F83D7B51}" type="datetimeFigureOut">
               <a:rPr lang="hu-HU" smtClean="0"/>
-              <a:t>2023.10.11.</a:t>
+              <a:t>2023.10.16.</a:t>
             </a:fld>
             <a:endParaRPr lang="hu-HU"/>
           </a:p>
@@ -2145,7 +2148,7 @@
           <a:p>
             <a:fld id="{397604E0-0D2C-4780-BF54-3C57F83D7B51}" type="datetimeFigureOut">
               <a:rPr lang="hu-HU" smtClean="0"/>
-              <a:t>2023.10.11.</a:t>
+              <a:t>2023.10.16.</a:t>
             </a:fld>
             <a:endParaRPr lang="hu-HU"/>
           </a:p>
@@ -2263,7 +2266,7 @@
           <a:p>
             <a:fld id="{397604E0-0D2C-4780-BF54-3C57F83D7B51}" type="datetimeFigureOut">
               <a:rPr lang="hu-HU" smtClean="0"/>
-              <a:t>2023.10.11.</a:t>
+              <a:t>2023.10.16.</a:t>
             </a:fld>
             <a:endParaRPr lang="hu-HU"/>
           </a:p>
@@ -2358,7 +2361,7 @@
           <a:p>
             <a:fld id="{397604E0-0D2C-4780-BF54-3C57F83D7B51}" type="datetimeFigureOut">
               <a:rPr lang="hu-HU" smtClean="0"/>
-              <a:t>2023.10.11.</a:t>
+              <a:t>2023.10.16.</a:t>
             </a:fld>
             <a:endParaRPr lang="hu-HU"/>
           </a:p>
@@ -2635,7 +2638,7 @@
           <a:p>
             <a:fld id="{397604E0-0D2C-4780-BF54-3C57F83D7B51}" type="datetimeFigureOut">
               <a:rPr lang="hu-HU" smtClean="0"/>
-              <a:t>2023.10.11.</a:t>
+              <a:t>2023.10.16.</a:t>
             </a:fld>
             <a:endParaRPr lang="hu-HU"/>
           </a:p>
@@ -2888,7 +2891,7 @@
           <a:p>
             <a:fld id="{397604E0-0D2C-4780-BF54-3C57F83D7B51}" type="datetimeFigureOut">
               <a:rPr lang="hu-HU" smtClean="0"/>
-              <a:t>2023.10.11.</a:t>
+              <a:t>2023.10.16.</a:t>
             </a:fld>
             <a:endParaRPr lang="hu-HU"/>
           </a:p>
@@ -3110,7 +3113,7 @@
           <a:p>
             <a:fld id="{397604E0-0D2C-4780-BF54-3C57F83D7B51}" type="datetimeFigureOut">
               <a:rPr lang="hu-HU" smtClean="0"/>
-              <a:t>2023.10.11.</a:t>
+              <a:t>2023.10.16.</a:t>
             </a:fld>
             <a:endParaRPr lang="hu-HU"/>
           </a:p>
@@ -5555,21 +5558,18 @@
                   <a:schemeClr val="bg1"/>
                 </a:solidFill>
               </a:rPr>
-              <a:t>Sebessége</a:t>
-            </a:r>
+              <a:t>Sebessége: 3200 - 6400 MHz (átlagosan: 4800 MHz)</a:t>
+            </a:r>
+          </a:p>
+          <a:p>
             <a:r>
               <a:rPr lang="hu-HU" dirty="0" smtClean="0">
                 <a:solidFill>
                   <a:schemeClr val="bg1"/>
                 </a:solidFill>
               </a:rPr>
-              <a:t>: 3200 - 6400 MHz (átlagosan: 4800 MHz)</a:t>
-            </a:r>
-            <a:endParaRPr lang="hu-HU" dirty="0" smtClean="0">
-              <a:solidFill>
-                <a:schemeClr val="bg1"/>
-              </a:solidFill>
-            </a:endParaRPr>
+              <a:t>Alacsonyabb feszültségen működnek  (energiahatékonyabb)</a:t>
+            </a:r>
           </a:p>
           <a:p>
             <a:r>
@@ -5578,25 +5578,7 @@
                   <a:schemeClr val="bg1"/>
                 </a:solidFill>
               </a:rPr>
-              <a:t>Alacsonyabb feszültségen működnek  (energiahatékonyabb)</a:t>
-            </a:r>
-          </a:p>
-          <a:p>
-            <a:r>
-              <a:rPr lang="hu-HU" dirty="0" smtClean="0">
-                <a:solidFill>
-                  <a:schemeClr val="bg1"/>
-                </a:solidFill>
-              </a:rPr>
-              <a:t>Nem annyir</a:t>
-            </a:r>
-            <a:r>
-              <a:rPr lang="hu-HU" dirty="0" smtClean="0">
-                <a:solidFill>
-                  <a:schemeClr val="bg1"/>
-                </a:solidFill>
-              </a:rPr>
-              <a:t>a elterjedt </a:t>
+              <a:t>Nem annyira elterjedt </a:t>
             </a:r>
             <a:r>
               <a:rPr lang="hu-HU" i="1" dirty="0" smtClean="0">
@@ -5643,31 +5625,7 @@
                   <a:schemeClr val="bg1"/>
                 </a:solidFill>
               </a:rPr>
-              <a:t>DDR </a:t>
-            </a:r>
-            <a:r>
-              <a:rPr lang="hu-HU" sz="2800" b="1" u="sng" dirty="0" smtClean="0">
-                <a:solidFill>
-                  <a:schemeClr val="bg1"/>
-                </a:solidFill>
-              </a:rPr>
-              <a:t>5 </a:t>
-            </a:r>
-            <a:r>
-              <a:rPr lang="hu-HU" sz="2800" b="1" u="sng" dirty="0" smtClean="0">
-                <a:solidFill>
-                  <a:schemeClr val="bg1"/>
-                </a:solidFill>
-              </a:rPr>
-              <a:t>(DOUBLE DATA RATE </a:t>
-            </a:r>
-            <a:r>
-              <a:rPr lang="hu-HU" sz="2800" b="1" u="sng" dirty="0" smtClean="0">
-                <a:solidFill>
-                  <a:schemeClr val="bg1"/>
-                </a:solidFill>
-              </a:rPr>
-              <a:t>5)</a:t>
+              <a:t>DDR 5 (DOUBLE DATA RATE 5)</a:t>
             </a:r>
             <a:endParaRPr lang="hu-HU" sz="2800" u="sng" dirty="0">
               <a:solidFill>
@@ -6333,11 +6291,6 @@
               </a:rPr>
               <a:t>Alacsony feszültségen működnek</a:t>
             </a:r>
-            <a:endParaRPr lang="hu-HU" dirty="0" smtClean="0">
-              <a:solidFill>
-                <a:schemeClr val="bg1"/>
-              </a:solidFill>
-            </a:endParaRPr>
           </a:p>
           <a:p>
             <a:r>
@@ -7790,16 +7743,7 @@
                 </a:solidFill>
                 <a:latin typeface="Algerian" panose="04020705040A02060702" pitchFamily="82" charset="0"/>
               </a:rPr>
-              <a:t>Mi </a:t>
-            </a:r>
-            <a:r>
-              <a:rPr lang="hu-HU" dirty="0" smtClean="0">
-                <a:solidFill>
-                  <a:schemeClr val="bg1"/>
-                </a:solidFill>
-                <a:latin typeface="Algerian" panose="04020705040A02060702" pitchFamily="82" charset="0"/>
-              </a:rPr>
-              <a:t>az a processzor?</a:t>
+              <a:t>Mi az a processzor?</a:t>
             </a:r>
             <a:endParaRPr lang="hu-HU" dirty="0">
               <a:solidFill>
@@ -7887,11 +7831,6 @@
               </a:rPr>
               <a:t>Félvezetős kivitelezésű, összetett elektronikus áramkör. Egy szilícium kristályra integrált, sok tízmillió tranzisztort tartalmazó egység</a:t>
             </a:r>
-            <a:endParaRPr lang="hu-HU" dirty="0">
-              <a:solidFill>
-                <a:schemeClr val="bg1"/>
-              </a:solidFill>
-            </a:endParaRPr>
           </a:p>
         </p:txBody>
       </p:sp>
@@ -9053,6 +8992,1618 @@
 </p:sld>
 </file>
 
+<file path=ppt/slides/slide18.xml><?xml version="1.0" encoding="utf-8"?>
+<p:sld xmlns:a="http://schemas.openxmlformats.org/drawingml/2006/main" xmlns:r="http://schemas.openxmlformats.org/officeDocument/2006/relationships" xmlns:p="http://schemas.openxmlformats.org/presentationml/2006/main">
+  <p:cSld>
+    <p:spTree>
+      <p:nvGrpSpPr>
+        <p:cNvPr id="1" name=""/>
+        <p:cNvGrpSpPr/>
+        <p:nvPr/>
+      </p:nvGrpSpPr>
+      <p:grpSpPr>
+        <a:xfrm>
+          <a:off x="0" y="0"/>
+          <a:ext cx="0" cy="0"/>
+          <a:chOff x="0" y="0"/>
+          <a:chExt cx="0" cy="0"/>
+        </a:xfrm>
+      </p:grpSpPr>
+      <p:sp>
+        <p:nvSpPr>
+          <p:cNvPr id="2" name="Cím 1"/>
+          <p:cNvSpPr>
+            <a:spLocks noGrp="1"/>
+          </p:cNvSpPr>
+          <p:nvPr>
+            <p:ph type="title"/>
+          </p:nvPr>
+        </p:nvSpPr>
+        <p:spPr>
+          <a:xfrm>
+            <a:off x="838200" y="283238"/>
+            <a:ext cx="10515600" cy="1325563"/>
+          </a:xfrm>
+        </p:spPr>
+        <p:txBody>
+          <a:bodyPr/>
+          <a:lstStyle/>
+          <a:p>
+            <a:r>
+              <a:rPr lang="hu-HU" dirty="0" smtClean="0">
+                <a:solidFill>
+                  <a:schemeClr val="bg1"/>
+                </a:solidFill>
+                <a:latin typeface="Algerian" panose="04020705040A02060702" pitchFamily="82" charset="0"/>
+              </a:rPr>
+              <a:t>PROCESSZOR RÉSZEI</a:t>
+            </a:r>
+            <a:endParaRPr lang="hu-HU" dirty="0">
+              <a:solidFill>
+                <a:schemeClr val="bg1"/>
+              </a:solidFill>
+              <a:latin typeface="Algerian" panose="04020705040A02060702" pitchFamily="82" charset="0"/>
+            </a:endParaRPr>
+          </a:p>
+        </p:txBody>
+      </p:sp>
+      <p:sp>
+        <p:nvSpPr>
+          <p:cNvPr id="3" name="Tartalom helye 2"/>
+          <p:cNvSpPr>
+            <a:spLocks noGrp="1"/>
+          </p:cNvSpPr>
+          <p:nvPr>
+            <p:ph idx="1"/>
+          </p:nvPr>
+        </p:nvSpPr>
+        <p:spPr>
+          <a:xfrm>
+            <a:off x="838200" y="2297327"/>
+            <a:ext cx="10515600" cy="3707820"/>
+          </a:xfrm>
+        </p:spPr>
+        <p:txBody>
+          <a:bodyPr/>
+          <a:lstStyle/>
+          <a:p>
+            <a:pPr>
+              <a:lnSpc>
+                <a:spcPct val="100000"/>
+              </a:lnSpc>
+            </a:pPr>
+            <a:r>
+              <a:rPr lang="hu-HU" b="1" dirty="0" smtClean="0">
+                <a:solidFill>
+                  <a:schemeClr val="bg1"/>
+                </a:solidFill>
+              </a:rPr>
+              <a:t>ALU: </a:t>
+            </a:r>
+            <a:r>
+              <a:rPr lang="hu-HU" dirty="0" smtClean="0">
+                <a:solidFill>
+                  <a:schemeClr val="bg1"/>
+                </a:solidFill>
+              </a:rPr>
+              <a:t>matematikai és logikai műveletek</a:t>
+            </a:r>
+            <a:endParaRPr lang="hu-HU" dirty="0">
+              <a:solidFill>
+                <a:schemeClr val="bg1"/>
+              </a:solidFill>
+            </a:endParaRPr>
+          </a:p>
+          <a:p>
+            <a:pPr>
+              <a:lnSpc>
+                <a:spcPct val="100000"/>
+              </a:lnSpc>
+            </a:pPr>
+            <a:r>
+              <a:rPr lang="hu-HU" b="1" dirty="0" smtClean="0">
+                <a:solidFill>
+                  <a:schemeClr val="bg1"/>
+                </a:solidFill>
+              </a:rPr>
+              <a:t>AGU: </a:t>
+            </a:r>
+            <a:r>
+              <a:rPr lang="hu-HU" dirty="0" smtClean="0">
+                <a:solidFill>
+                  <a:schemeClr val="bg1"/>
+                </a:solidFill>
+              </a:rPr>
+              <a:t>címszámító egység</a:t>
+            </a:r>
+            <a:endParaRPr lang="hu-HU" dirty="0"/>
+          </a:p>
+          <a:p>
+            <a:pPr>
+              <a:lnSpc>
+                <a:spcPct val="100000"/>
+              </a:lnSpc>
+            </a:pPr>
+            <a:r>
+              <a:rPr lang="hu-HU" b="1" dirty="0" smtClean="0">
+                <a:solidFill>
+                  <a:schemeClr val="bg1"/>
+                </a:solidFill>
+              </a:rPr>
+              <a:t>CU: </a:t>
+            </a:r>
+            <a:r>
+              <a:rPr lang="hu-HU" dirty="0">
+                <a:solidFill>
+                  <a:schemeClr val="bg1"/>
+                </a:solidFill>
+              </a:rPr>
+              <a:t>Ez szervezi, ütemezi a processzor egész </a:t>
+            </a:r>
+            <a:r>
+              <a:rPr lang="hu-HU" dirty="0" smtClean="0">
+                <a:solidFill>
+                  <a:schemeClr val="bg1"/>
+                </a:solidFill>
+              </a:rPr>
+              <a:t>munkáját</a:t>
+            </a:r>
+          </a:p>
+          <a:p>
+            <a:pPr>
+              <a:lnSpc>
+                <a:spcPct val="100000"/>
+              </a:lnSpc>
+            </a:pPr>
+            <a:r>
+              <a:rPr lang="hu-HU" b="1" dirty="0" err="1" smtClean="0">
+                <a:solidFill>
+                  <a:schemeClr val="bg1"/>
+                </a:solidFill>
+              </a:rPr>
+              <a:t>Register</a:t>
+            </a:r>
+            <a:r>
+              <a:rPr lang="hu-HU" b="1" dirty="0" smtClean="0">
+                <a:solidFill>
+                  <a:schemeClr val="bg1"/>
+                </a:solidFill>
+              </a:rPr>
+              <a:t>:</a:t>
+            </a:r>
+            <a:r>
+              <a:rPr lang="hu-HU" dirty="0" smtClean="0">
+                <a:solidFill>
+                  <a:schemeClr val="bg1"/>
+                </a:solidFill>
+              </a:rPr>
+              <a:t> gyors, kisméretű memória (ideiglenes információknak)</a:t>
+            </a:r>
+          </a:p>
+          <a:p>
+            <a:pPr>
+              <a:lnSpc>
+                <a:spcPct val="100000"/>
+              </a:lnSpc>
+            </a:pPr>
+            <a:r>
+              <a:rPr lang="hu-HU" b="1" dirty="0" smtClean="0">
+                <a:solidFill>
+                  <a:schemeClr val="bg1"/>
+                </a:solidFill>
+              </a:rPr>
+              <a:t>Buszvezérlő</a:t>
+            </a:r>
+            <a:r>
+              <a:rPr lang="hu-HU" dirty="0" smtClean="0">
+                <a:solidFill>
+                  <a:schemeClr val="bg1"/>
+                </a:solidFill>
+              </a:rPr>
+              <a:t>: továbbítja az adatokat</a:t>
+            </a:r>
+          </a:p>
+          <a:p>
+            <a:pPr>
+              <a:lnSpc>
+                <a:spcPct val="100000"/>
+              </a:lnSpc>
+            </a:pPr>
+            <a:r>
+              <a:rPr lang="hu-HU" b="1" dirty="0" smtClean="0">
+                <a:solidFill>
+                  <a:schemeClr val="bg1"/>
+                </a:solidFill>
+              </a:rPr>
+              <a:t>Cache: </a:t>
+            </a:r>
+            <a:r>
+              <a:rPr lang="hu-HU" dirty="0" smtClean="0">
+                <a:solidFill>
+                  <a:schemeClr val="bg1"/>
+                </a:solidFill>
+              </a:rPr>
+              <a:t>gyorsítótár</a:t>
+            </a:r>
+            <a:endParaRPr lang="hu-HU" dirty="0" smtClean="0">
+              <a:solidFill>
+                <a:schemeClr val="bg1"/>
+              </a:solidFill>
+            </a:endParaRPr>
+          </a:p>
+          <a:p>
+            <a:pPr>
+              <a:lnSpc>
+                <a:spcPct val="100000"/>
+              </a:lnSpc>
+            </a:pPr>
+            <a:endParaRPr lang="hu-HU" dirty="0">
+              <a:solidFill>
+                <a:schemeClr val="bg1"/>
+              </a:solidFill>
+            </a:endParaRPr>
+          </a:p>
+        </p:txBody>
+      </p:sp>
+    </p:spTree>
+    <p:extLst>
+      <p:ext uri="{BB962C8B-B14F-4D97-AF65-F5344CB8AC3E}">
+        <p14:creationId xmlns:p14="http://schemas.microsoft.com/office/powerpoint/2010/main" val="1999680024"/>
+      </p:ext>
+    </p:extLst>
+  </p:cSld>
+  <p:clrMapOvr>
+    <a:masterClrMapping/>
+  </p:clrMapOvr>
+  <mc:AlternateContent xmlns:mc="http://schemas.openxmlformats.org/markup-compatibility/2006" xmlns:p14="http://schemas.microsoft.com/office/powerpoint/2010/main">
+    <mc:Choice Requires="p14">
+      <p:transition spd="slow" p14:dur="3400">
+        <p14:reveal/>
+      </p:transition>
+    </mc:Choice>
+    <mc:Fallback xmlns="">
+      <p:transition spd="slow">
+        <p:fade/>
+      </p:transition>
+    </mc:Fallback>
+  </mc:AlternateContent>
+  <p:timing>
+    <p:tnLst>
+      <p:par>
+        <p:cTn id="1" dur="indefinite" restart="never" nodeType="tmRoot">
+          <p:childTnLst>
+            <p:seq concurrent="1" nextAc="seek">
+              <p:cTn id="2" dur="indefinite" nodeType="mainSeq">
+                <p:childTnLst>
+                  <p:par>
+                    <p:cTn id="3" fill="hold">
+                      <p:stCondLst>
+                        <p:cond delay="indefinite"/>
+                      </p:stCondLst>
+                      <p:childTnLst>
+                        <p:par>
+                          <p:cTn id="4" fill="hold">
+                            <p:stCondLst>
+                              <p:cond delay="0"/>
+                            </p:stCondLst>
+                            <p:childTnLst>
+                              <p:par>
+                                <p:cTn id="5" presetID="42" presetClass="entr" presetSubtype="0" fill="hold" nodeType="clickEffect">
+                                  <p:stCondLst>
+                                    <p:cond delay="0"/>
+                                  </p:stCondLst>
+                                  <p:childTnLst>
+                                    <p:set>
+                                      <p:cBhvr>
+                                        <p:cTn id="6" dur="1" fill="hold">
+                                          <p:stCondLst>
+                                            <p:cond delay="0"/>
+                                          </p:stCondLst>
+                                        </p:cTn>
+                                        <p:tgtEl>
+                                          <p:spTgt spid="3">
+                                            <p:txEl>
+                                              <p:pRg st="0" end="0"/>
+                                            </p:txEl>
+                                          </p:spTgt>
+                                        </p:tgtEl>
+                                        <p:attrNameLst>
+                                          <p:attrName>style.visibility</p:attrName>
+                                        </p:attrNameLst>
+                                      </p:cBhvr>
+                                      <p:to>
+                                        <p:strVal val="visible"/>
+                                      </p:to>
+                                    </p:set>
+                                    <p:animEffect transition="in" filter="fade">
+                                      <p:cBhvr>
+                                        <p:cTn id="7" dur="1000"/>
+                                        <p:tgtEl>
+                                          <p:spTgt spid="3">
+                                            <p:txEl>
+                                              <p:pRg st="0" end="0"/>
+                                            </p:txEl>
+                                          </p:spTgt>
+                                        </p:tgtEl>
+                                      </p:cBhvr>
+                                    </p:animEffect>
+                                    <p:anim calcmode="lin" valueType="num">
+                                      <p:cBhvr>
+                                        <p:cTn id="8" dur="1000" fill="hold"/>
+                                        <p:tgtEl>
+                                          <p:spTgt spid="3">
+                                            <p:txEl>
+                                              <p:pRg st="0" end="0"/>
+                                            </p:txEl>
+                                          </p:spTgt>
+                                        </p:tgtEl>
+                                        <p:attrNameLst>
+                                          <p:attrName>ppt_x</p:attrName>
+                                        </p:attrNameLst>
+                                      </p:cBhvr>
+                                      <p:tavLst>
+                                        <p:tav tm="0">
+                                          <p:val>
+                                            <p:strVal val="#ppt_x"/>
+                                          </p:val>
+                                        </p:tav>
+                                        <p:tav tm="100000">
+                                          <p:val>
+                                            <p:strVal val="#ppt_x"/>
+                                          </p:val>
+                                        </p:tav>
+                                      </p:tavLst>
+                                    </p:anim>
+                                    <p:anim calcmode="lin" valueType="num">
+                                      <p:cBhvr>
+                                        <p:cTn id="9" dur="1000" fill="hold"/>
+                                        <p:tgtEl>
+                                          <p:spTgt spid="3">
+                                            <p:txEl>
+                                              <p:pRg st="0" end="0"/>
+                                            </p:txEl>
+                                          </p:spTgt>
+                                        </p:tgtEl>
+                                        <p:attrNameLst>
+                                          <p:attrName>ppt_y</p:attrName>
+                                        </p:attrNameLst>
+                                      </p:cBhvr>
+                                      <p:tavLst>
+                                        <p:tav tm="0">
+                                          <p:val>
+                                            <p:strVal val="#ppt_y+.1"/>
+                                          </p:val>
+                                        </p:tav>
+                                        <p:tav tm="100000">
+                                          <p:val>
+                                            <p:strVal val="#ppt_y"/>
+                                          </p:val>
+                                        </p:tav>
+                                      </p:tavLst>
+                                    </p:anim>
+                                  </p:childTnLst>
+                                </p:cTn>
+                              </p:par>
+                            </p:childTnLst>
+                          </p:cTn>
+                        </p:par>
+                        <p:par>
+                          <p:cTn id="10" fill="hold">
+                            <p:stCondLst>
+                              <p:cond delay="1000"/>
+                            </p:stCondLst>
+                            <p:childTnLst>
+                              <p:par>
+                                <p:cTn id="11" presetID="42" presetClass="entr" presetSubtype="0" fill="hold" nodeType="afterEffect">
+                                  <p:stCondLst>
+                                    <p:cond delay="0"/>
+                                  </p:stCondLst>
+                                  <p:childTnLst>
+                                    <p:set>
+                                      <p:cBhvr>
+                                        <p:cTn id="12" dur="1" fill="hold">
+                                          <p:stCondLst>
+                                            <p:cond delay="0"/>
+                                          </p:stCondLst>
+                                        </p:cTn>
+                                        <p:tgtEl>
+                                          <p:spTgt spid="3">
+                                            <p:txEl>
+                                              <p:pRg st="1" end="1"/>
+                                            </p:txEl>
+                                          </p:spTgt>
+                                        </p:tgtEl>
+                                        <p:attrNameLst>
+                                          <p:attrName>style.visibility</p:attrName>
+                                        </p:attrNameLst>
+                                      </p:cBhvr>
+                                      <p:to>
+                                        <p:strVal val="visible"/>
+                                      </p:to>
+                                    </p:set>
+                                    <p:animEffect transition="in" filter="fade">
+                                      <p:cBhvr>
+                                        <p:cTn id="13" dur="1000"/>
+                                        <p:tgtEl>
+                                          <p:spTgt spid="3">
+                                            <p:txEl>
+                                              <p:pRg st="1" end="1"/>
+                                            </p:txEl>
+                                          </p:spTgt>
+                                        </p:tgtEl>
+                                      </p:cBhvr>
+                                    </p:animEffect>
+                                    <p:anim calcmode="lin" valueType="num">
+                                      <p:cBhvr>
+                                        <p:cTn id="14" dur="1000" fill="hold"/>
+                                        <p:tgtEl>
+                                          <p:spTgt spid="3">
+                                            <p:txEl>
+                                              <p:pRg st="1" end="1"/>
+                                            </p:txEl>
+                                          </p:spTgt>
+                                        </p:tgtEl>
+                                        <p:attrNameLst>
+                                          <p:attrName>ppt_x</p:attrName>
+                                        </p:attrNameLst>
+                                      </p:cBhvr>
+                                      <p:tavLst>
+                                        <p:tav tm="0">
+                                          <p:val>
+                                            <p:strVal val="#ppt_x"/>
+                                          </p:val>
+                                        </p:tav>
+                                        <p:tav tm="100000">
+                                          <p:val>
+                                            <p:strVal val="#ppt_x"/>
+                                          </p:val>
+                                        </p:tav>
+                                      </p:tavLst>
+                                    </p:anim>
+                                    <p:anim calcmode="lin" valueType="num">
+                                      <p:cBhvr>
+                                        <p:cTn id="15" dur="1000" fill="hold"/>
+                                        <p:tgtEl>
+                                          <p:spTgt spid="3">
+                                            <p:txEl>
+                                              <p:pRg st="1" end="1"/>
+                                            </p:txEl>
+                                          </p:spTgt>
+                                        </p:tgtEl>
+                                        <p:attrNameLst>
+                                          <p:attrName>ppt_y</p:attrName>
+                                        </p:attrNameLst>
+                                      </p:cBhvr>
+                                      <p:tavLst>
+                                        <p:tav tm="0">
+                                          <p:val>
+                                            <p:strVal val="#ppt_y+.1"/>
+                                          </p:val>
+                                        </p:tav>
+                                        <p:tav tm="100000">
+                                          <p:val>
+                                            <p:strVal val="#ppt_y"/>
+                                          </p:val>
+                                        </p:tav>
+                                      </p:tavLst>
+                                    </p:anim>
+                                  </p:childTnLst>
+                                </p:cTn>
+                              </p:par>
+                            </p:childTnLst>
+                          </p:cTn>
+                        </p:par>
+                        <p:par>
+                          <p:cTn id="16" fill="hold">
+                            <p:stCondLst>
+                              <p:cond delay="2000"/>
+                            </p:stCondLst>
+                            <p:childTnLst>
+                              <p:par>
+                                <p:cTn id="17" presetID="42" presetClass="entr" presetSubtype="0" fill="hold" nodeType="afterEffect">
+                                  <p:stCondLst>
+                                    <p:cond delay="0"/>
+                                  </p:stCondLst>
+                                  <p:childTnLst>
+                                    <p:set>
+                                      <p:cBhvr>
+                                        <p:cTn id="18" dur="1" fill="hold">
+                                          <p:stCondLst>
+                                            <p:cond delay="0"/>
+                                          </p:stCondLst>
+                                        </p:cTn>
+                                        <p:tgtEl>
+                                          <p:spTgt spid="3">
+                                            <p:txEl>
+                                              <p:pRg st="2" end="2"/>
+                                            </p:txEl>
+                                          </p:spTgt>
+                                        </p:tgtEl>
+                                        <p:attrNameLst>
+                                          <p:attrName>style.visibility</p:attrName>
+                                        </p:attrNameLst>
+                                      </p:cBhvr>
+                                      <p:to>
+                                        <p:strVal val="visible"/>
+                                      </p:to>
+                                    </p:set>
+                                    <p:animEffect transition="in" filter="fade">
+                                      <p:cBhvr>
+                                        <p:cTn id="19" dur="1000"/>
+                                        <p:tgtEl>
+                                          <p:spTgt spid="3">
+                                            <p:txEl>
+                                              <p:pRg st="2" end="2"/>
+                                            </p:txEl>
+                                          </p:spTgt>
+                                        </p:tgtEl>
+                                      </p:cBhvr>
+                                    </p:animEffect>
+                                    <p:anim calcmode="lin" valueType="num">
+                                      <p:cBhvr>
+                                        <p:cTn id="20" dur="1000" fill="hold"/>
+                                        <p:tgtEl>
+                                          <p:spTgt spid="3">
+                                            <p:txEl>
+                                              <p:pRg st="2" end="2"/>
+                                            </p:txEl>
+                                          </p:spTgt>
+                                        </p:tgtEl>
+                                        <p:attrNameLst>
+                                          <p:attrName>ppt_x</p:attrName>
+                                        </p:attrNameLst>
+                                      </p:cBhvr>
+                                      <p:tavLst>
+                                        <p:tav tm="0">
+                                          <p:val>
+                                            <p:strVal val="#ppt_x"/>
+                                          </p:val>
+                                        </p:tav>
+                                        <p:tav tm="100000">
+                                          <p:val>
+                                            <p:strVal val="#ppt_x"/>
+                                          </p:val>
+                                        </p:tav>
+                                      </p:tavLst>
+                                    </p:anim>
+                                    <p:anim calcmode="lin" valueType="num">
+                                      <p:cBhvr>
+                                        <p:cTn id="21" dur="1000" fill="hold"/>
+                                        <p:tgtEl>
+                                          <p:spTgt spid="3">
+                                            <p:txEl>
+                                              <p:pRg st="2" end="2"/>
+                                            </p:txEl>
+                                          </p:spTgt>
+                                        </p:tgtEl>
+                                        <p:attrNameLst>
+                                          <p:attrName>ppt_y</p:attrName>
+                                        </p:attrNameLst>
+                                      </p:cBhvr>
+                                      <p:tavLst>
+                                        <p:tav tm="0">
+                                          <p:val>
+                                            <p:strVal val="#ppt_y+.1"/>
+                                          </p:val>
+                                        </p:tav>
+                                        <p:tav tm="100000">
+                                          <p:val>
+                                            <p:strVal val="#ppt_y"/>
+                                          </p:val>
+                                        </p:tav>
+                                      </p:tavLst>
+                                    </p:anim>
+                                  </p:childTnLst>
+                                </p:cTn>
+                              </p:par>
+                            </p:childTnLst>
+                          </p:cTn>
+                        </p:par>
+                        <p:par>
+                          <p:cTn id="22" fill="hold">
+                            <p:stCondLst>
+                              <p:cond delay="3000"/>
+                            </p:stCondLst>
+                            <p:childTnLst>
+                              <p:par>
+                                <p:cTn id="23" presetID="42" presetClass="entr" presetSubtype="0" fill="hold" nodeType="afterEffect">
+                                  <p:stCondLst>
+                                    <p:cond delay="0"/>
+                                  </p:stCondLst>
+                                  <p:childTnLst>
+                                    <p:set>
+                                      <p:cBhvr>
+                                        <p:cTn id="24" dur="1" fill="hold">
+                                          <p:stCondLst>
+                                            <p:cond delay="0"/>
+                                          </p:stCondLst>
+                                        </p:cTn>
+                                        <p:tgtEl>
+                                          <p:spTgt spid="3">
+                                            <p:txEl>
+                                              <p:pRg st="3" end="3"/>
+                                            </p:txEl>
+                                          </p:spTgt>
+                                        </p:tgtEl>
+                                        <p:attrNameLst>
+                                          <p:attrName>style.visibility</p:attrName>
+                                        </p:attrNameLst>
+                                      </p:cBhvr>
+                                      <p:to>
+                                        <p:strVal val="visible"/>
+                                      </p:to>
+                                    </p:set>
+                                    <p:animEffect transition="in" filter="fade">
+                                      <p:cBhvr>
+                                        <p:cTn id="25" dur="1000"/>
+                                        <p:tgtEl>
+                                          <p:spTgt spid="3">
+                                            <p:txEl>
+                                              <p:pRg st="3" end="3"/>
+                                            </p:txEl>
+                                          </p:spTgt>
+                                        </p:tgtEl>
+                                      </p:cBhvr>
+                                    </p:animEffect>
+                                    <p:anim calcmode="lin" valueType="num">
+                                      <p:cBhvr>
+                                        <p:cTn id="26" dur="1000" fill="hold"/>
+                                        <p:tgtEl>
+                                          <p:spTgt spid="3">
+                                            <p:txEl>
+                                              <p:pRg st="3" end="3"/>
+                                            </p:txEl>
+                                          </p:spTgt>
+                                        </p:tgtEl>
+                                        <p:attrNameLst>
+                                          <p:attrName>ppt_x</p:attrName>
+                                        </p:attrNameLst>
+                                      </p:cBhvr>
+                                      <p:tavLst>
+                                        <p:tav tm="0">
+                                          <p:val>
+                                            <p:strVal val="#ppt_x"/>
+                                          </p:val>
+                                        </p:tav>
+                                        <p:tav tm="100000">
+                                          <p:val>
+                                            <p:strVal val="#ppt_x"/>
+                                          </p:val>
+                                        </p:tav>
+                                      </p:tavLst>
+                                    </p:anim>
+                                    <p:anim calcmode="lin" valueType="num">
+                                      <p:cBhvr>
+                                        <p:cTn id="27" dur="1000" fill="hold"/>
+                                        <p:tgtEl>
+                                          <p:spTgt spid="3">
+                                            <p:txEl>
+                                              <p:pRg st="3" end="3"/>
+                                            </p:txEl>
+                                          </p:spTgt>
+                                        </p:tgtEl>
+                                        <p:attrNameLst>
+                                          <p:attrName>ppt_y</p:attrName>
+                                        </p:attrNameLst>
+                                      </p:cBhvr>
+                                      <p:tavLst>
+                                        <p:tav tm="0">
+                                          <p:val>
+                                            <p:strVal val="#ppt_y+.1"/>
+                                          </p:val>
+                                        </p:tav>
+                                        <p:tav tm="100000">
+                                          <p:val>
+                                            <p:strVal val="#ppt_y"/>
+                                          </p:val>
+                                        </p:tav>
+                                      </p:tavLst>
+                                    </p:anim>
+                                  </p:childTnLst>
+                                </p:cTn>
+                              </p:par>
+                            </p:childTnLst>
+                          </p:cTn>
+                        </p:par>
+                        <p:par>
+                          <p:cTn id="28" fill="hold">
+                            <p:stCondLst>
+                              <p:cond delay="4000"/>
+                            </p:stCondLst>
+                            <p:childTnLst>
+                              <p:par>
+                                <p:cTn id="29" presetID="42" presetClass="entr" presetSubtype="0" fill="hold" nodeType="afterEffect">
+                                  <p:stCondLst>
+                                    <p:cond delay="0"/>
+                                  </p:stCondLst>
+                                  <p:childTnLst>
+                                    <p:set>
+                                      <p:cBhvr>
+                                        <p:cTn id="30" dur="1" fill="hold">
+                                          <p:stCondLst>
+                                            <p:cond delay="0"/>
+                                          </p:stCondLst>
+                                        </p:cTn>
+                                        <p:tgtEl>
+                                          <p:spTgt spid="3">
+                                            <p:txEl>
+                                              <p:pRg st="4" end="4"/>
+                                            </p:txEl>
+                                          </p:spTgt>
+                                        </p:tgtEl>
+                                        <p:attrNameLst>
+                                          <p:attrName>style.visibility</p:attrName>
+                                        </p:attrNameLst>
+                                      </p:cBhvr>
+                                      <p:to>
+                                        <p:strVal val="visible"/>
+                                      </p:to>
+                                    </p:set>
+                                    <p:animEffect transition="in" filter="fade">
+                                      <p:cBhvr>
+                                        <p:cTn id="31" dur="1000"/>
+                                        <p:tgtEl>
+                                          <p:spTgt spid="3">
+                                            <p:txEl>
+                                              <p:pRg st="4" end="4"/>
+                                            </p:txEl>
+                                          </p:spTgt>
+                                        </p:tgtEl>
+                                      </p:cBhvr>
+                                    </p:animEffect>
+                                    <p:anim calcmode="lin" valueType="num">
+                                      <p:cBhvr>
+                                        <p:cTn id="32" dur="1000" fill="hold"/>
+                                        <p:tgtEl>
+                                          <p:spTgt spid="3">
+                                            <p:txEl>
+                                              <p:pRg st="4" end="4"/>
+                                            </p:txEl>
+                                          </p:spTgt>
+                                        </p:tgtEl>
+                                        <p:attrNameLst>
+                                          <p:attrName>ppt_x</p:attrName>
+                                        </p:attrNameLst>
+                                      </p:cBhvr>
+                                      <p:tavLst>
+                                        <p:tav tm="0">
+                                          <p:val>
+                                            <p:strVal val="#ppt_x"/>
+                                          </p:val>
+                                        </p:tav>
+                                        <p:tav tm="100000">
+                                          <p:val>
+                                            <p:strVal val="#ppt_x"/>
+                                          </p:val>
+                                        </p:tav>
+                                      </p:tavLst>
+                                    </p:anim>
+                                    <p:anim calcmode="lin" valueType="num">
+                                      <p:cBhvr>
+                                        <p:cTn id="33" dur="1000" fill="hold"/>
+                                        <p:tgtEl>
+                                          <p:spTgt spid="3">
+                                            <p:txEl>
+                                              <p:pRg st="4" end="4"/>
+                                            </p:txEl>
+                                          </p:spTgt>
+                                        </p:tgtEl>
+                                        <p:attrNameLst>
+                                          <p:attrName>ppt_y</p:attrName>
+                                        </p:attrNameLst>
+                                      </p:cBhvr>
+                                      <p:tavLst>
+                                        <p:tav tm="0">
+                                          <p:val>
+                                            <p:strVal val="#ppt_y+.1"/>
+                                          </p:val>
+                                        </p:tav>
+                                        <p:tav tm="100000">
+                                          <p:val>
+                                            <p:strVal val="#ppt_y"/>
+                                          </p:val>
+                                        </p:tav>
+                                      </p:tavLst>
+                                    </p:anim>
+                                  </p:childTnLst>
+                                </p:cTn>
+                              </p:par>
+                            </p:childTnLst>
+                          </p:cTn>
+                        </p:par>
+                        <p:par>
+                          <p:cTn id="34" fill="hold">
+                            <p:stCondLst>
+                              <p:cond delay="5000"/>
+                            </p:stCondLst>
+                            <p:childTnLst>
+                              <p:par>
+                                <p:cTn id="35" presetID="42" presetClass="entr" presetSubtype="0" fill="hold" nodeType="afterEffect">
+                                  <p:stCondLst>
+                                    <p:cond delay="0"/>
+                                  </p:stCondLst>
+                                  <p:childTnLst>
+                                    <p:set>
+                                      <p:cBhvr>
+                                        <p:cTn id="36" dur="1" fill="hold">
+                                          <p:stCondLst>
+                                            <p:cond delay="0"/>
+                                          </p:stCondLst>
+                                        </p:cTn>
+                                        <p:tgtEl>
+                                          <p:spTgt spid="3">
+                                            <p:txEl>
+                                              <p:pRg st="5" end="5"/>
+                                            </p:txEl>
+                                          </p:spTgt>
+                                        </p:tgtEl>
+                                        <p:attrNameLst>
+                                          <p:attrName>style.visibility</p:attrName>
+                                        </p:attrNameLst>
+                                      </p:cBhvr>
+                                      <p:to>
+                                        <p:strVal val="visible"/>
+                                      </p:to>
+                                    </p:set>
+                                    <p:animEffect transition="in" filter="fade">
+                                      <p:cBhvr>
+                                        <p:cTn id="37" dur="1000"/>
+                                        <p:tgtEl>
+                                          <p:spTgt spid="3">
+                                            <p:txEl>
+                                              <p:pRg st="5" end="5"/>
+                                            </p:txEl>
+                                          </p:spTgt>
+                                        </p:tgtEl>
+                                      </p:cBhvr>
+                                    </p:animEffect>
+                                    <p:anim calcmode="lin" valueType="num">
+                                      <p:cBhvr>
+                                        <p:cTn id="38" dur="1000" fill="hold"/>
+                                        <p:tgtEl>
+                                          <p:spTgt spid="3">
+                                            <p:txEl>
+                                              <p:pRg st="5" end="5"/>
+                                            </p:txEl>
+                                          </p:spTgt>
+                                        </p:tgtEl>
+                                        <p:attrNameLst>
+                                          <p:attrName>ppt_x</p:attrName>
+                                        </p:attrNameLst>
+                                      </p:cBhvr>
+                                      <p:tavLst>
+                                        <p:tav tm="0">
+                                          <p:val>
+                                            <p:strVal val="#ppt_x"/>
+                                          </p:val>
+                                        </p:tav>
+                                        <p:tav tm="100000">
+                                          <p:val>
+                                            <p:strVal val="#ppt_x"/>
+                                          </p:val>
+                                        </p:tav>
+                                      </p:tavLst>
+                                    </p:anim>
+                                    <p:anim calcmode="lin" valueType="num">
+                                      <p:cBhvr>
+                                        <p:cTn id="39" dur="1000" fill="hold"/>
+                                        <p:tgtEl>
+                                          <p:spTgt spid="3">
+                                            <p:txEl>
+                                              <p:pRg st="5" end="5"/>
+                                            </p:txEl>
+                                          </p:spTgt>
+                                        </p:tgtEl>
+                                        <p:attrNameLst>
+                                          <p:attrName>ppt_y</p:attrName>
+                                        </p:attrNameLst>
+                                      </p:cBhvr>
+                                      <p:tavLst>
+                                        <p:tav tm="0">
+                                          <p:val>
+                                            <p:strVal val="#ppt_y+.1"/>
+                                          </p:val>
+                                        </p:tav>
+                                        <p:tav tm="100000">
+                                          <p:val>
+                                            <p:strVal val="#ppt_y"/>
+                                          </p:val>
+                                        </p:tav>
+                                      </p:tavLst>
+                                    </p:anim>
+                                  </p:childTnLst>
+                                </p:cTn>
+                              </p:par>
+                            </p:childTnLst>
+                          </p:cTn>
+                        </p:par>
+                      </p:childTnLst>
+                    </p:cTn>
+                  </p:par>
+                </p:childTnLst>
+              </p:cTn>
+              <p:prevCondLst>
+                <p:cond evt="onPrev" delay="0">
+                  <p:tgtEl>
+                    <p:sldTgt/>
+                  </p:tgtEl>
+                </p:cond>
+              </p:prevCondLst>
+              <p:nextCondLst>
+                <p:cond evt="onNext" delay="0">
+                  <p:tgtEl>
+                    <p:sldTgt/>
+                  </p:tgtEl>
+                </p:cond>
+              </p:nextCondLst>
+            </p:seq>
+          </p:childTnLst>
+        </p:cTn>
+      </p:par>
+    </p:tnLst>
+  </p:timing>
+</p:sld>
+</file>
+
+<file path=ppt/slides/slide19.xml><?xml version="1.0" encoding="utf-8"?>
+<p:sld xmlns:a="http://schemas.openxmlformats.org/drawingml/2006/main" xmlns:r="http://schemas.openxmlformats.org/officeDocument/2006/relationships" xmlns:p="http://schemas.openxmlformats.org/presentationml/2006/main">
+  <p:cSld>
+    <p:spTree>
+      <p:nvGrpSpPr>
+        <p:cNvPr id="1" name=""/>
+        <p:cNvGrpSpPr/>
+        <p:nvPr/>
+      </p:nvGrpSpPr>
+      <p:grpSpPr>
+        <a:xfrm>
+          <a:off x="0" y="0"/>
+          <a:ext cx="0" cy="0"/>
+          <a:chOff x="0" y="0"/>
+          <a:chExt cx="0" cy="0"/>
+        </a:xfrm>
+      </p:grpSpPr>
+      <p:sp>
+        <p:nvSpPr>
+          <p:cNvPr id="2" name="Cím 1"/>
+          <p:cNvSpPr>
+            <a:spLocks noGrp="1"/>
+          </p:cNvSpPr>
+          <p:nvPr>
+            <p:ph type="title"/>
+          </p:nvPr>
+        </p:nvSpPr>
+        <p:spPr>
+          <a:xfrm>
+            <a:off x="838200" y="283238"/>
+            <a:ext cx="10515600" cy="1325563"/>
+          </a:xfrm>
+        </p:spPr>
+        <p:txBody>
+          <a:bodyPr/>
+          <a:lstStyle/>
+          <a:p>
+            <a:r>
+              <a:rPr lang="hu-HU" dirty="0" smtClean="0">
+                <a:solidFill>
+                  <a:schemeClr val="bg1"/>
+                </a:solidFill>
+                <a:latin typeface="Algerian" panose="04020705040A02060702" pitchFamily="82" charset="0"/>
+              </a:rPr>
+              <a:t>PROCESSZOR feladatai</a:t>
+            </a:r>
+            <a:endParaRPr lang="hu-HU" dirty="0">
+              <a:solidFill>
+                <a:schemeClr val="bg1"/>
+              </a:solidFill>
+              <a:latin typeface="Algerian" panose="04020705040A02060702" pitchFamily="82" charset="0"/>
+            </a:endParaRPr>
+          </a:p>
+        </p:txBody>
+      </p:sp>
+      <p:sp>
+        <p:nvSpPr>
+          <p:cNvPr id="3" name="Tartalom helye 2"/>
+          <p:cNvSpPr>
+            <a:spLocks noGrp="1"/>
+          </p:cNvSpPr>
+          <p:nvPr>
+            <p:ph idx="1"/>
+          </p:nvPr>
+        </p:nvSpPr>
+        <p:spPr>
+          <a:xfrm>
+            <a:off x="838200" y="2983127"/>
+            <a:ext cx="10515600" cy="1817473"/>
+          </a:xfrm>
+        </p:spPr>
+        <p:txBody>
+          <a:bodyPr>
+            <a:normAutofit fontScale="92500" lnSpcReduction="20000"/>
+          </a:bodyPr>
+          <a:lstStyle/>
+          <a:p>
+            <a:pPr>
+              <a:lnSpc>
+                <a:spcPct val="100000"/>
+              </a:lnSpc>
+            </a:pPr>
+            <a:r>
+              <a:rPr lang="hu-HU" b="1" dirty="0" smtClean="0">
+                <a:solidFill>
+                  <a:schemeClr val="bg1"/>
+                </a:solidFill>
+              </a:rPr>
+              <a:t>Számítás és vezérlés</a:t>
+            </a:r>
+            <a:endParaRPr lang="hu-HU" dirty="0"/>
+          </a:p>
+          <a:p>
+            <a:pPr>
+              <a:lnSpc>
+                <a:spcPct val="100000"/>
+              </a:lnSpc>
+            </a:pPr>
+            <a:r>
+              <a:rPr lang="hu-HU" dirty="0" smtClean="0">
+                <a:solidFill>
+                  <a:schemeClr val="bg1"/>
+                </a:solidFill>
+              </a:rPr>
+              <a:t>Feldolgozza és </a:t>
+            </a:r>
+            <a:r>
+              <a:rPr lang="hu-HU" dirty="0" err="1" smtClean="0">
+                <a:solidFill>
+                  <a:schemeClr val="bg1"/>
+                </a:solidFill>
+              </a:rPr>
+              <a:t>vezérli</a:t>
+            </a:r>
+            <a:r>
+              <a:rPr lang="hu-HU" dirty="0" smtClean="0">
+                <a:solidFill>
+                  <a:schemeClr val="bg1"/>
+                </a:solidFill>
+              </a:rPr>
+              <a:t> az eszköz funkcióit</a:t>
+            </a:r>
+          </a:p>
+          <a:p>
+            <a:pPr>
+              <a:lnSpc>
+                <a:spcPct val="100000"/>
+              </a:lnSpc>
+            </a:pPr>
+            <a:r>
+              <a:rPr lang="hu-HU" dirty="0" err="1" smtClean="0">
+                <a:solidFill>
+                  <a:schemeClr val="bg1"/>
+                </a:solidFill>
+              </a:rPr>
+              <a:t>Pl</a:t>
+            </a:r>
+            <a:r>
+              <a:rPr lang="hu-HU" dirty="0" smtClean="0">
+                <a:solidFill>
+                  <a:schemeClr val="bg1"/>
+                </a:solidFill>
+              </a:rPr>
+              <a:t>: gomblenyomás a billentyűzeten</a:t>
+            </a:r>
+          </a:p>
+          <a:p>
+            <a:pPr>
+              <a:lnSpc>
+                <a:spcPct val="100000"/>
+              </a:lnSpc>
+            </a:pPr>
+            <a:r>
+              <a:rPr lang="hu-HU" dirty="0" smtClean="0">
+                <a:solidFill>
+                  <a:schemeClr val="bg1"/>
+                </a:solidFill>
+              </a:rPr>
+              <a:t>Binárisan kódolt adatok (0, 1)</a:t>
+            </a:r>
+            <a:endParaRPr lang="hu-HU" dirty="0">
+              <a:solidFill>
+                <a:schemeClr val="bg1"/>
+              </a:solidFill>
+            </a:endParaRPr>
+          </a:p>
+        </p:txBody>
+      </p:sp>
+    </p:spTree>
+    <p:extLst>
+      <p:ext uri="{BB962C8B-B14F-4D97-AF65-F5344CB8AC3E}">
+        <p14:creationId xmlns:p14="http://schemas.microsoft.com/office/powerpoint/2010/main" val="3774249625"/>
+      </p:ext>
+    </p:extLst>
+  </p:cSld>
+  <p:clrMapOvr>
+    <a:masterClrMapping/>
+  </p:clrMapOvr>
+  <mc:AlternateContent xmlns:mc="http://schemas.openxmlformats.org/markup-compatibility/2006" xmlns:p14="http://schemas.microsoft.com/office/powerpoint/2010/main">
+    <mc:Choice Requires="p14">
+      <p:transition spd="slow" p14:dur="3400">
+        <p14:reveal/>
+      </p:transition>
+    </mc:Choice>
+    <mc:Fallback xmlns="">
+      <p:transition spd="slow">
+        <p:fade/>
+      </p:transition>
+    </mc:Fallback>
+  </mc:AlternateContent>
+  <p:timing>
+    <p:tnLst>
+      <p:par>
+        <p:cTn id="1" dur="indefinite" restart="never" nodeType="tmRoot">
+          <p:childTnLst>
+            <p:seq concurrent="1" nextAc="seek">
+              <p:cTn id="2" dur="indefinite" nodeType="mainSeq">
+                <p:childTnLst>
+                  <p:par>
+                    <p:cTn id="3" fill="hold">
+                      <p:stCondLst>
+                        <p:cond delay="indefinite"/>
+                        <p:cond evt="onBegin" delay="0">
+                          <p:tn val="2"/>
+                        </p:cond>
+                      </p:stCondLst>
+                      <p:childTnLst>
+                        <p:par>
+                          <p:cTn id="4" fill="hold">
+                            <p:stCondLst>
+                              <p:cond delay="0"/>
+                            </p:stCondLst>
+                            <p:childTnLst>
+                              <p:par>
+                                <p:cTn id="5" presetID="42" presetClass="entr" presetSubtype="0" fill="hold" nodeType="afterEffect">
+                                  <p:stCondLst>
+                                    <p:cond delay="0"/>
+                                  </p:stCondLst>
+                                  <p:childTnLst>
+                                    <p:set>
+                                      <p:cBhvr>
+                                        <p:cTn id="6" dur="1" fill="hold">
+                                          <p:stCondLst>
+                                            <p:cond delay="0"/>
+                                          </p:stCondLst>
+                                        </p:cTn>
+                                        <p:tgtEl>
+                                          <p:spTgt spid="3">
+                                            <p:txEl>
+                                              <p:pRg st="0" end="0"/>
+                                            </p:txEl>
+                                          </p:spTgt>
+                                        </p:tgtEl>
+                                        <p:attrNameLst>
+                                          <p:attrName>style.visibility</p:attrName>
+                                        </p:attrNameLst>
+                                      </p:cBhvr>
+                                      <p:to>
+                                        <p:strVal val="visible"/>
+                                      </p:to>
+                                    </p:set>
+                                    <p:animEffect transition="in" filter="fade">
+                                      <p:cBhvr>
+                                        <p:cTn id="7" dur="1000"/>
+                                        <p:tgtEl>
+                                          <p:spTgt spid="3">
+                                            <p:txEl>
+                                              <p:pRg st="0" end="0"/>
+                                            </p:txEl>
+                                          </p:spTgt>
+                                        </p:tgtEl>
+                                      </p:cBhvr>
+                                    </p:animEffect>
+                                    <p:anim calcmode="lin" valueType="num">
+                                      <p:cBhvr>
+                                        <p:cTn id="8" dur="1000" fill="hold"/>
+                                        <p:tgtEl>
+                                          <p:spTgt spid="3">
+                                            <p:txEl>
+                                              <p:pRg st="0" end="0"/>
+                                            </p:txEl>
+                                          </p:spTgt>
+                                        </p:tgtEl>
+                                        <p:attrNameLst>
+                                          <p:attrName>ppt_x</p:attrName>
+                                        </p:attrNameLst>
+                                      </p:cBhvr>
+                                      <p:tavLst>
+                                        <p:tav tm="0">
+                                          <p:val>
+                                            <p:strVal val="#ppt_x"/>
+                                          </p:val>
+                                        </p:tav>
+                                        <p:tav tm="100000">
+                                          <p:val>
+                                            <p:strVal val="#ppt_x"/>
+                                          </p:val>
+                                        </p:tav>
+                                      </p:tavLst>
+                                    </p:anim>
+                                    <p:anim calcmode="lin" valueType="num">
+                                      <p:cBhvr>
+                                        <p:cTn id="9" dur="1000" fill="hold"/>
+                                        <p:tgtEl>
+                                          <p:spTgt spid="3">
+                                            <p:txEl>
+                                              <p:pRg st="0" end="0"/>
+                                            </p:txEl>
+                                          </p:spTgt>
+                                        </p:tgtEl>
+                                        <p:attrNameLst>
+                                          <p:attrName>ppt_y</p:attrName>
+                                        </p:attrNameLst>
+                                      </p:cBhvr>
+                                      <p:tavLst>
+                                        <p:tav tm="0">
+                                          <p:val>
+                                            <p:strVal val="#ppt_y+.1"/>
+                                          </p:val>
+                                        </p:tav>
+                                        <p:tav tm="100000">
+                                          <p:val>
+                                            <p:strVal val="#ppt_y"/>
+                                          </p:val>
+                                        </p:tav>
+                                      </p:tavLst>
+                                    </p:anim>
+                                  </p:childTnLst>
+                                </p:cTn>
+                              </p:par>
+                            </p:childTnLst>
+                          </p:cTn>
+                        </p:par>
+                        <p:par>
+                          <p:cTn id="10" fill="hold">
+                            <p:stCondLst>
+                              <p:cond delay="1000"/>
+                            </p:stCondLst>
+                            <p:childTnLst>
+                              <p:par>
+                                <p:cTn id="11" presetID="42" presetClass="entr" presetSubtype="0" fill="hold" nodeType="afterEffect">
+                                  <p:stCondLst>
+                                    <p:cond delay="0"/>
+                                  </p:stCondLst>
+                                  <p:childTnLst>
+                                    <p:set>
+                                      <p:cBhvr>
+                                        <p:cTn id="12" dur="1" fill="hold">
+                                          <p:stCondLst>
+                                            <p:cond delay="0"/>
+                                          </p:stCondLst>
+                                        </p:cTn>
+                                        <p:tgtEl>
+                                          <p:spTgt spid="3">
+                                            <p:txEl>
+                                              <p:pRg st="1" end="1"/>
+                                            </p:txEl>
+                                          </p:spTgt>
+                                        </p:tgtEl>
+                                        <p:attrNameLst>
+                                          <p:attrName>style.visibility</p:attrName>
+                                        </p:attrNameLst>
+                                      </p:cBhvr>
+                                      <p:to>
+                                        <p:strVal val="visible"/>
+                                      </p:to>
+                                    </p:set>
+                                    <p:animEffect transition="in" filter="fade">
+                                      <p:cBhvr>
+                                        <p:cTn id="13" dur="1000"/>
+                                        <p:tgtEl>
+                                          <p:spTgt spid="3">
+                                            <p:txEl>
+                                              <p:pRg st="1" end="1"/>
+                                            </p:txEl>
+                                          </p:spTgt>
+                                        </p:tgtEl>
+                                      </p:cBhvr>
+                                    </p:animEffect>
+                                    <p:anim calcmode="lin" valueType="num">
+                                      <p:cBhvr>
+                                        <p:cTn id="14" dur="1000" fill="hold"/>
+                                        <p:tgtEl>
+                                          <p:spTgt spid="3">
+                                            <p:txEl>
+                                              <p:pRg st="1" end="1"/>
+                                            </p:txEl>
+                                          </p:spTgt>
+                                        </p:tgtEl>
+                                        <p:attrNameLst>
+                                          <p:attrName>ppt_x</p:attrName>
+                                        </p:attrNameLst>
+                                      </p:cBhvr>
+                                      <p:tavLst>
+                                        <p:tav tm="0">
+                                          <p:val>
+                                            <p:strVal val="#ppt_x"/>
+                                          </p:val>
+                                        </p:tav>
+                                        <p:tav tm="100000">
+                                          <p:val>
+                                            <p:strVal val="#ppt_x"/>
+                                          </p:val>
+                                        </p:tav>
+                                      </p:tavLst>
+                                    </p:anim>
+                                    <p:anim calcmode="lin" valueType="num">
+                                      <p:cBhvr>
+                                        <p:cTn id="15" dur="1000" fill="hold"/>
+                                        <p:tgtEl>
+                                          <p:spTgt spid="3">
+                                            <p:txEl>
+                                              <p:pRg st="1" end="1"/>
+                                            </p:txEl>
+                                          </p:spTgt>
+                                        </p:tgtEl>
+                                        <p:attrNameLst>
+                                          <p:attrName>ppt_y</p:attrName>
+                                        </p:attrNameLst>
+                                      </p:cBhvr>
+                                      <p:tavLst>
+                                        <p:tav tm="0">
+                                          <p:val>
+                                            <p:strVal val="#ppt_y+.1"/>
+                                          </p:val>
+                                        </p:tav>
+                                        <p:tav tm="100000">
+                                          <p:val>
+                                            <p:strVal val="#ppt_y"/>
+                                          </p:val>
+                                        </p:tav>
+                                      </p:tavLst>
+                                    </p:anim>
+                                  </p:childTnLst>
+                                </p:cTn>
+                              </p:par>
+                            </p:childTnLst>
+                          </p:cTn>
+                        </p:par>
+                        <p:par>
+                          <p:cTn id="16" fill="hold">
+                            <p:stCondLst>
+                              <p:cond delay="2000"/>
+                            </p:stCondLst>
+                            <p:childTnLst>
+                              <p:par>
+                                <p:cTn id="17" presetID="42" presetClass="entr" presetSubtype="0" fill="hold" nodeType="afterEffect">
+                                  <p:stCondLst>
+                                    <p:cond delay="0"/>
+                                  </p:stCondLst>
+                                  <p:childTnLst>
+                                    <p:set>
+                                      <p:cBhvr>
+                                        <p:cTn id="18" dur="1" fill="hold">
+                                          <p:stCondLst>
+                                            <p:cond delay="0"/>
+                                          </p:stCondLst>
+                                        </p:cTn>
+                                        <p:tgtEl>
+                                          <p:spTgt spid="3">
+                                            <p:txEl>
+                                              <p:pRg st="2" end="2"/>
+                                            </p:txEl>
+                                          </p:spTgt>
+                                        </p:tgtEl>
+                                        <p:attrNameLst>
+                                          <p:attrName>style.visibility</p:attrName>
+                                        </p:attrNameLst>
+                                      </p:cBhvr>
+                                      <p:to>
+                                        <p:strVal val="visible"/>
+                                      </p:to>
+                                    </p:set>
+                                    <p:animEffect transition="in" filter="fade">
+                                      <p:cBhvr>
+                                        <p:cTn id="19" dur="1000"/>
+                                        <p:tgtEl>
+                                          <p:spTgt spid="3">
+                                            <p:txEl>
+                                              <p:pRg st="2" end="2"/>
+                                            </p:txEl>
+                                          </p:spTgt>
+                                        </p:tgtEl>
+                                      </p:cBhvr>
+                                    </p:animEffect>
+                                    <p:anim calcmode="lin" valueType="num">
+                                      <p:cBhvr>
+                                        <p:cTn id="20" dur="1000" fill="hold"/>
+                                        <p:tgtEl>
+                                          <p:spTgt spid="3">
+                                            <p:txEl>
+                                              <p:pRg st="2" end="2"/>
+                                            </p:txEl>
+                                          </p:spTgt>
+                                        </p:tgtEl>
+                                        <p:attrNameLst>
+                                          <p:attrName>ppt_x</p:attrName>
+                                        </p:attrNameLst>
+                                      </p:cBhvr>
+                                      <p:tavLst>
+                                        <p:tav tm="0">
+                                          <p:val>
+                                            <p:strVal val="#ppt_x"/>
+                                          </p:val>
+                                        </p:tav>
+                                        <p:tav tm="100000">
+                                          <p:val>
+                                            <p:strVal val="#ppt_x"/>
+                                          </p:val>
+                                        </p:tav>
+                                      </p:tavLst>
+                                    </p:anim>
+                                    <p:anim calcmode="lin" valueType="num">
+                                      <p:cBhvr>
+                                        <p:cTn id="21" dur="1000" fill="hold"/>
+                                        <p:tgtEl>
+                                          <p:spTgt spid="3">
+                                            <p:txEl>
+                                              <p:pRg st="2" end="2"/>
+                                            </p:txEl>
+                                          </p:spTgt>
+                                        </p:tgtEl>
+                                        <p:attrNameLst>
+                                          <p:attrName>ppt_y</p:attrName>
+                                        </p:attrNameLst>
+                                      </p:cBhvr>
+                                      <p:tavLst>
+                                        <p:tav tm="0">
+                                          <p:val>
+                                            <p:strVal val="#ppt_y+.1"/>
+                                          </p:val>
+                                        </p:tav>
+                                        <p:tav tm="100000">
+                                          <p:val>
+                                            <p:strVal val="#ppt_y"/>
+                                          </p:val>
+                                        </p:tav>
+                                      </p:tavLst>
+                                    </p:anim>
+                                  </p:childTnLst>
+                                </p:cTn>
+                              </p:par>
+                            </p:childTnLst>
+                          </p:cTn>
+                        </p:par>
+                        <p:par>
+                          <p:cTn id="22" fill="hold">
+                            <p:stCondLst>
+                              <p:cond delay="3000"/>
+                            </p:stCondLst>
+                            <p:childTnLst>
+                              <p:par>
+                                <p:cTn id="23" presetID="42" presetClass="entr" presetSubtype="0" fill="hold" nodeType="afterEffect">
+                                  <p:stCondLst>
+                                    <p:cond delay="0"/>
+                                  </p:stCondLst>
+                                  <p:childTnLst>
+                                    <p:set>
+                                      <p:cBhvr>
+                                        <p:cTn id="24" dur="1" fill="hold">
+                                          <p:stCondLst>
+                                            <p:cond delay="0"/>
+                                          </p:stCondLst>
+                                        </p:cTn>
+                                        <p:tgtEl>
+                                          <p:spTgt spid="3">
+                                            <p:txEl>
+                                              <p:pRg st="3" end="3"/>
+                                            </p:txEl>
+                                          </p:spTgt>
+                                        </p:tgtEl>
+                                        <p:attrNameLst>
+                                          <p:attrName>style.visibility</p:attrName>
+                                        </p:attrNameLst>
+                                      </p:cBhvr>
+                                      <p:to>
+                                        <p:strVal val="visible"/>
+                                      </p:to>
+                                    </p:set>
+                                    <p:animEffect transition="in" filter="fade">
+                                      <p:cBhvr>
+                                        <p:cTn id="25" dur="1000"/>
+                                        <p:tgtEl>
+                                          <p:spTgt spid="3">
+                                            <p:txEl>
+                                              <p:pRg st="3" end="3"/>
+                                            </p:txEl>
+                                          </p:spTgt>
+                                        </p:tgtEl>
+                                      </p:cBhvr>
+                                    </p:animEffect>
+                                    <p:anim calcmode="lin" valueType="num">
+                                      <p:cBhvr>
+                                        <p:cTn id="26" dur="1000" fill="hold"/>
+                                        <p:tgtEl>
+                                          <p:spTgt spid="3">
+                                            <p:txEl>
+                                              <p:pRg st="3" end="3"/>
+                                            </p:txEl>
+                                          </p:spTgt>
+                                        </p:tgtEl>
+                                        <p:attrNameLst>
+                                          <p:attrName>ppt_x</p:attrName>
+                                        </p:attrNameLst>
+                                      </p:cBhvr>
+                                      <p:tavLst>
+                                        <p:tav tm="0">
+                                          <p:val>
+                                            <p:strVal val="#ppt_x"/>
+                                          </p:val>
+                                        </p:tav>
+                                        <p:tav tm="100000">
+                                          <p:val>
+                                            <p:strVal val="#ppt_x"/>
+                                          </p:val>
+                                        </p:tav>
+                                      </p:tavLst>
+                                    </p:anim>
+                                    <p:anim calcmode="lin" valueType="num">
+                                      <p:cBhvr>
+                                        <p:cTn id="27" dur="1000" fill="hold"/>
+                                        <p:tgtEl>
+                                          <p:spTgt spid="3">
+                                            <p:txEl>
+                                              <p:pRg st="3" end="3"/>
+                                            </p:txEl>
+                                          </p:spTgt>
+                                        </p:tgtEl>
+                                        <p:attrNameLst>
+                                          <p:attrName>ppt_y</p:attrName>
+                                        </p:attrNameLst>
+                                      </p:cBhvr>
+                                      <p:tavLst>
+                                        <p:tav tm="0">
+                                          <p:val>
+                                            <p:strVal val="#ppt_y+.1"/>
+                                          </p:val>
+                                        </p:tav>
+                                        <p:tav tm="100000">
+                                          <p:val>
+                                            <p:strVal val="#ppt_y"/>
+                                          </p:val>
+                                        </p:tav>
+                                      </p:tavLst>
+                                    </p:anim>
+                                  </p:childTnLst>
+                                </p:cTn>
+                              </p:par>
+                            </p:childTnLst>
+                          </p:cTn>
+                        </p:par>
+                      </p:childTnLst>
+                    </p:cTn>
+                  </p:par>
+                </p:childTnLst>
+              </p:cTn>
+              <p:prevCondLst>
+                <p:cond evt="onPrev" delay="0">
+                  <p:tgtEl>
+                    <p:sldTgt/>
+                  </p:tgtEl>
+                </p:cond>
+              </p:prevCondLst>
+              <p:nextCondLst>
+                <p:cond evt="onNext" delay="0">
+                  <p:tgtEl>
+                    <p:sldTgt/>
+                  </p:tgtEl>
+                </p:cond>
+              </p:nextCondLst>
+            </p:seq>
+          </p:childTnLst>
+        </p:cTn>
+      </p:par>
+    </p:tnLst>
+  </p:timing>
+</p:sld>
+</file>
+
 <file path=ppt/slides/slide2.xml><?xml version="1.0" encoding="utf-8"?>
 <p:sld xmlns:a="http://schemas.openxmlformats.org/drawingml/2006/main" xmlns:r="http://schemas.openxmlformats.org/officeDocument/2006/relationships" xmlns:p="http://schemas.openxmlformats.org/presentationml/2006/main">
   <p:cSld>
@@ -9135,6 +10686,801 @@
     <p:tnLst>
       <p:par>
         <p:cTn id="1" dur="indefinite" restart="never" nodeType="tmRoot"/>
+      </p:par>
+    </p:tnLst>
+  </p:timing>
+</p:sld>
+</file>
+
+<file path=ppt/slides/slide20.xml><?xml version="1.0" encoding="utf-8"?>
+<p:sld xmlns:a="http://schemas.openxmlformats.org/drawingml/2006/main" xmlns:r="http://schemas.openxmlformats.org/officeDocument/2006/relationships" xmlns:p="http://schemas.openxmlformats.org/presentationml/2006/main">
+  <p:cSld>
+    <p:spTree>
+      <p:nvGrpSpPr>
+        <p:cNvPr id="1" name=""/>
+        <p:cNvGrpSpPr/>
+        <p:nvPr/>
+      </p:nvGrpSpPr>
+      <p:grpSpPr>
+        <a:xfrm>
+          <a:off x="0" y="0"/>
+          <a:ext cx="0" cy="0"/>
+          <a:chOff x="0" y="0"/>
+          <a:chExt cx="0" cy="0"/>
+        </a:xfrm>
+      </p:grpSpPr>
+      <p:sp>
+        <p:nvSpPr>
+          <p:cNvPr id="2" name="Cím 1"/>
+          <p:cNvSpPr>
+            <a:spLocks noGrp="1"/>
+          </p:cNvSpPr>
+          <p:nvPr>
+            <p:ph type="title"/>
+          </p:nvPr>
+        </p:nvSpPr>
+        <p:spPr>
+          <a:xfrm>
+            <a:off x="838200" y="283238"/>
+            <a:ext cx="10515600" cy="1325563"/>
+          </a:xfrm>
+        </p:spPr>
+        <p:txBody>
+          <a:bodyPr/>
+          <a:lstStyle/>
+          <a:p>
+            <a:r>
+              <a:rPr lang="hu-HU" dirty="0" smtClean="0">
+                <a:solidFill>
+                  <a:schemeClr val="bg1"/>
+                </a:solidFill>
+                <a:latin typeface="Algerian" panose="04020705040A02060702" pitchFamily="82" charset="0"/>
+              </a:rPr>
+              <a:t>PROCESSZOR frekvencia</a:t>
+            </a:r>
+            <a:endParaRPr lang="hu-HU" dirty="0">
+              <a:solidFill>
+                <a:schemeClr val="bg1"/>
+              </a:solidFill>
+              <a:latin typeface="Algerian" panose="04020705040A02060702" pitchFamily="82" charset="0"/>
+            </a:endParaRPr>
+          </a:p>
+        </p:txBody>
+      </p:sp>
+      <p:sp>
+        <p:nvSpPr>
+          <p:cNvPr id="3" name="Tartalom helye 2"/>
+          <p:cNvSpPr>
+            <a:spLocks noGrp="1"/>
+          </p:cNvSpPr>
+          <p:nvPr>
+            <p:ph idx="1"/>
+          </p:nvPr>
+        </p:nvSpPr>
+        <p:spPr>
+          <a:xfrm>
+            <a:off x="838200" y="2297327"/>
+            <a:ext cx="10515600" cy="3707820"/>
+          </a:xfrm>
+        </p:spPr>
+        <p:txBody>
+          <a:bodyPr/>
+          <a:lstStyle/>
+          <a:p>
+            <a:pPr>
+              <a:lnSpc>
+                <a:spcPct val="100000"/>
+              </a:lnSpc>
+            </a:pPr>
+            <a:r>
+              <a:rPr lang="hu-HU" b="1" dirty="0" smtClean="0">
+                <a:solidFill>
+                  <a:schemeClr val="bg1"/>
+                </a:solidFill>
+              </a:rPr>
+              <a:t>Állapotváltozás 0-ról 1-re,  vagy 1-ről 0-ra</a:t>
+            </a:r>
+            <a:endParaRPr lang="hu-HU" dirty="0">
+              <a:solidFill>
+                <a:schemeClr val="bg1"/>
+              </a:solidFill>
+            </a:endParaRPr>
+          </a:p>
+          <a:p>
+            <a:pPr>
+              <a:lnSpc>
+                <a:spcPct val="100000"/>
+              </a:lnSpc>
+            </a:pPr>
+            <a:r>
+              <a:rPr lang="hu-HU" dirty="0">
+                <a:solidFill>
+                  <a:schemeClr val="bg1"/>
+                </a:solidFill>
+              </a:rPr>
+              <a:t>A két impulzus közötti intervallumot frekvenciaciklusnak </a:t>
+            </a:r>
+            <a:r>
+              <a:rPr lang="hu-HU" dirty="0" smtClean="0">
+                <a:solidFill>
+                  <a:schemeClr val="bg1"/>
+                </a:solidFill>
+              </a:rPr>
+              <a:t>nevezzük</a:t>
+            </a:r>
+          </a:p>
+          <a:p>
+            <a:pPr>
+              <a:lnSpc>
+                <a:spcPct val="100000"/>
+              </a:lnSpc>
+            </a:pPr>
+            <a:r>
+              <a:rPr lang="hu-HU" dirty="0">
+                <a:solidFill>
+                  <a:schemeClr val="bg1"/>
+                </a:solidFill>
+              </a:rPr>
+              <a:t>Ezen ciklusok mennyisége egy másodperc alatt adja a processzor </a:t>
+            </a:r>
+            <a:r>
+              <a:rPr lang="hu-HU" dirty="0" smtClean="0">
+                <a:solidFill>
+                  <a:schemeClr val="bg1"/>
+                </a:solidFill>
+              </a:rPr>
+              <a:t>frekvenciáját (Hertz - Hz)</a:t>
+            </a:r>
+          </a:p>
+          <a:p>
+            <a:pPr>
+              <a:lnSpc>
+                <a:spcPct val="100000"/>
+              </a:lnSpc>
+            </a:pPr>
+            <a:r>
+              <a:rPr lang="hu-HU" dirty="0" smtClean="0">
+                <a:solidFill>
+                  <a:schemeClr val="bg1"/>
+                </a:solidFill>
+              </a:rPr>
+              <a:t>Manapság </a:t>
+            </a:r>
+            <a:r>
+              <a:rPr lang="hu-HU" dirty="0" err="1" smtClean="0">
+                <a:solidFill>
+                  <a:schemeClr val="bg1"/>
+                </a:solidFill>
+              </a:rPr>
+              <a:t>GHz</a:t>
+            </a:r>
+            <a:endParaRPr lang="hu-HU" dirty="0" smtClean="0">
+              <a:solidFill>
+                <a:schemeClr val="bg1"/>
+              </a:solidFill>
+            </a:endParaRPr>
+          </a:p>
+          <a:p>
+            <a:pPr>
+              <a:lnSpc>
+                <a:spcPct val="100000"/>
+              </a:lnSpc>
+            </a:pPr>
+            <a:r>
+              <a:rPr lang="hu-HU" dirty="0" err="1" smtClean="0">
+                <a:solidFill>
+                  <a:schemeClr val="bg1"/>
+                </a:solidFill>
+              </a:rPr>
+              <a:t>Miné</a:t>
+            </a:r>
+            <a:r>
+              <a:rPr lang="hu-HU" dirty="0" smtClean="0">
+                <a:solidFill>
+                  <a:schemeClr val="bg1"/>
+                </a:solidFill>
+              </a:rPr>
+              <a:t> nagyobb, anná jobb!</a:t>
+            </a:r>
+            <a:endParaRPr lang="hu-HU" dirty="0">
+              <a:solidFill>
+                <a:schemeClr val="bg1"/>
+              </a:solidFill>
+            </a:endParaRPr>
+          </a:p>
+        </p:txBody>
+      </p:sp>
+    </p:spTree>
+    <p:extLst>
+      <p:ext uri="{BB962C8B-B14F-4D97-AF65-F5344CB8AC3E}">
+        <p14:creationId xmlns:p14="http://schemas.microsoft.com/office/powerpoint/2010/main" val="1900633613"/>
+      </p:ext>
+    </p:extLst>
+  </p:cSld>
+  <p:clrMapOvr>
+    <a:masterClrMapping/>
+  </p:clrMapOvr>
+  <mc:AlternateContent xmlns:mc="http://schemas.openxmlformats.org/markup-compatibility/2006" xmlns:p14="http://schemas.microsoft.com/office/powerpoint/2010/main">
+    <mc:Choice Requires="p14">
+      <p:transition spd="slow" p14:dur="3400">
+        <p14:reveal/>
+      </p:transition>
+    </mc:Choice>
+    <mc:Fallback xmlns="">
+      <p:transition spd="slow">
+        <p:fade/>
+      </p:transition>
+    </mc:Fallback>
+  </mc:AlternateContent>
+  <p:timing>
+    <p:tnLst>
+      <p:par>
+        <p:cTn id="1" dur="indefinite" restart="never" nodeType="tmRoot">
+          <p:childTnLst>
+            <p:seq concurrent="1" nextAc="seek">
+              <p:cTn id="2" dur="indefinite" nodeType="mainSeq">
+                <p:childTnLst>
+                  <p:par>
+                    <p:cTn id="3" fill="hold">
+                      <p:stCondLst>
+                        <p:cond delay="indefinite"/>
+                        <p:cond evt="onBegin" delay="0">
+                          <p:tn val="2"/>
+                        </p:cond>
+                      </p:stCondLst>
+                      <p:childTnLst>
+                        <p:par>
+                          <p:cTn id="4" fill="hold">
+                            <p:stCondLst>
+                              <p:cond delay="0"/>
+                            </p:stCondLst>
+                            <p:childTnLst>
+                              <p:par>
+                                <p:cTn id="5" presetID="42" presetClass="entr" presetSubtype="0" fill="hold" nodeType="afterEffect">
+                                  <p:stCondLst>
+                                    <p:cond delay="0"/>
+                                  </p:stCondLst>
+                                  <p:childTnLst>
+                                    <p:set>
+                                      <p:cBhvr>
+                                        <p:cTn id="6" dur="1" fill="hold">
+                                          <p:stCondLst>
+                                            <p:cond delay="0"/>
+                                          </p:stCondLst>
+                                        </p:cTn>
+                                        <p:tgtEl>
+                                          <p:spTgt spid="3">
+                                            <p:txEl>
+                                              <p:pRg st="0" end="0"/>
+                                            </p:txEl>
+                                          </p:spTgt>
+                                        </p:tgtEl>
+                                        <p:attrNameLst>
+                                          <p:attrName>style.visibility</p:attrName>
+                                        </p:attrNameLst>
+                                      </p:cBhvr>
+                                      <p:to>
+                                        <p:strVal val="visible"/>
+                                      </p:to>
+                                    </p:set>
+                                    <p:animEffect transition="in" filter="fade">
+                                      <p:cBhvr>
+                                        <p:cTn id="7" dur="1000"/>
+                                        <p:tgtEl>
+                                          <p:spTgt spid="3">
+                                            <p:txEl>
+                                              <p:pRg st="0" end="0"/>
+                                            </p:txEl>
+                                          </p:spTgt>
+                                        </p:tgtEl>
+                                      </p:cBhvr>
+                                    </p:animEffect>
+                                    <p:anim calcmode="lin" valueType="num">
+                                      <p:cBhvr>
+                                        <p:cTn id="8" dur="1000" fill="hold"/>
+                                        <p:tgtEl>
+                                          <p:spTgt spid="3">
+                                            <p:txEl>
+                                              <p:pRg st="0" end="0"/>
+                                            </p:txEl>
+                                          </p:spTgt>
+                                        </p:tgtEl>
+                                        <p:attrNameLst>
+                                          <p:attrName>ppt_x</p:attrName>
+                                        </p:attrNameLst>
+                                      </p:cBhvr>
+                                      <p:tavLst>
+                                        <p:tav tm="0">
+                                          <p:val>
+                                            <p:strVal val="#ppt_x"/>
+                                          </p:val>
+                                        </p:tav>
+                                        <p:tav tm="100000">
+                                          <p:val>
+                                            <p:strVal val="#ppt_x"/>
+                                          </p:val>
+                                        </p:tav>
+                                      </p:tavLst>
+                                    </p:anim>
+                                    <p:anim calcmode="lin" valueType="num">
+                                      <p:cBhvr>
+                                        <p:cTn id="9" dur="1000" fill="hold"/>
+                                        <p:tgtEl>
+                                          <p:spTgt spid="3">
+                                            <p:txEl>
+                                              <p:pRg st="0" end="0"/>
+                                            </p:txEl>
+                                          </p:spTgt>
+                                        </p:tgtEl>
+                                        <p:attrNameLst>
+                                          <p:attrName>ppt_y</p:attrName>
+                                        </p:attrNameLst>
+                                      </p:cBhvr>
+                                      <p:tavLst>
+                                        <p:tav tm="0">
+                                          <p:val>
+                                            <p:strVal val="#ppt_y+.1"/>
+                                          </p:val>
+                                        </p:tav>
+                                        <p:tav tm="100000">
+                                          <p:val>
+                                            <p:strVal val="#ppt_y"/>
+                                          </p:val>
+                                        </p:tav>
+                                      </p:tavLst>
+                                    </p:anim>
+                                  </p:childTnLst>
+                                </p:cTn>
+                              </p:par>
+                            </p:childTnLst>
+                          </p:cTn>
+                        </p:par>
+                        <p:par>
+                          <p:cTn id="10" fill="hold">
+                            <p:stCondLst>
+                              <p:cond delay="1000"/>
+                            </p:stCondLst>
+                            <p:childTnLst>
+                              <p:par>
+                                <p:cTn id="11" presetID="42" presetClass="entr" presetSubtype="0" fill="hold" nodeType="afterEffect">
+                                  <p:stCondLst>
+                                    <p:cond delay="0"/>
+                                  </p:stCondLst>
+                                  <p:childTnLst>
+                                    <p:set>
+                                      <p:cBhvr>
+                                        <p:cTn id="12" dur="1" fill="hold">
+                                          <p:stCondLst>
+                                            <p:cond delay="0"/>
+                                          </p:stCondLst>
+                                        </p:cTn>
+                                        <p:tgtEl>
+                                          <p:spTgt spid="3">
+                                            <p:txEl>
+                                              <p:pRg st="1" end="1"/>
+                                            </p:txEl>
+                                          </p:spTgt>
+                                        </p:tgtEl>
+                                        <p:attrNameLst>
+                                          <p:attrName>style.visibility</p:attrName>
+                                        </p:attrNameLst>
+                                      </p:cBhvr>
+                                      <p:to>
+                                        <p:strVal val="visible"/>
+                                      </p:to>
+                                    </p:set>
+                                    <p:animEffect transition="in" filter="fade">
+                                      <p:cBhvr>
+                                        <p:cTn id="13" dur="1000"/>
+                                        <p:tgtEl>
+                                          <p:spTgt spid="3">
+                                            <p:txEl>
+                                              <p:pRg st="1" end="1"/>
+                                            </p:txEl>
+                                          </p:spTgt>
+                                        </p:tgtEl>
+                                      </p:cBhvr>
+                                    </p:animEffect>
+                                    <p:anim calcmode="lin" valueType="num">
+                                      <p:cBhvr>
+                                        <p:cTn id="14" dur="1000" fill="hold"/>
+                                        <p:tgtEl>
+                                          <p:spTgt spid="3">
+                                            <p:txEl>
+                                              <p:pRg st="1" end="1"/>
+                                            </p:txEl>
+                                          </p:spTgt>
+                                        </p:tgtEl>
+                                        <p:attrNameLst>
+                                          <p:attrName>ppt_x</p:attrName>
+                                        </p:attrNameLst>
+                                      </p:cBhvr>
+                                      <p:tavLst>
+                                        <p:tav tm="0">
+                                          <p:val>
+                                            <p:strVal val="#ppt_x"/>
+                                          </p:val>
+                                        </p:tav>
+                                        <p:tav tm="100000">
+                                          <p:val>
+                                            <p:strVal val="#ppt_x"/>
+                                          </p:val>
+                                        </p:tav>
+                                      </p:tavLst>
+                                    </p:anim>
+                                    <p:anim calcmode="lin" valueType="num">
+                                      <p:cBhvr>
+                                        <p:cTn id="15" dur="1000" fill="hold"/>
+                                        <p:tgtEl>
+                                          <p:spTgt spid="3">
+                                            <p:txEl>
+                                              <p:pRg st="1" end="1"/>
+                                            </p:txEl>
+                                          </p:spTgt>
+                                        </p:tgtEl>
+                                        <p:attrNameLst>
+                                          <p:attrName>ppt_y</p:attrName>
+                                        </p:attrNameLst>
+                                      </p:cBhvr>
+                                      <p:tavLst>
+                                        <p:tav tm="0">
+                                          <p:val>
+                                            <p:strVal val="#ppt_y+.1"/>
+                                          </p:val>
+                                        </p:tav>
+                                        <p:tav tm="100000">
+                                          <p:val>
+                                            <p:strVal val="#ppt_y"/>
+                                          </p:val>
+                                        </p:tav>
+                                      </p:tavLst>
+                                    </p:anim>
+                                  </p:childTnLst>
+                                </p:cTn>
+                              </p:par>
+                            </p:childTnLst>
+                          </p:cTn>
+                        </p:par>
+                        <p:par>
+                          <p:cTn id="16" fill="hold">
+                            <p:stCondLst>
+                              <p:cond delay="2000"/>
+                            </p:stCondLst>
+                            <p:childTnLst>
+                              <p:par>
+                                <p:cTn id="17" presetID="42" presetClass="entr" presetSubtype="0" fill="hold" nodeType="afterEffect">
+                                  <p:stCondLst>
+                                    <p:cond delay="0"/>
+                                  </p:stCondLst>
+                                  <p:childTnLst>
+                                    <p:set>
+                                      <p:cBhvr>
+                                        <p:cTn id="18" dur="1" fill="hold">
+                                          <p:stCondLst>
+                                            <p:cond delay="0"/>
+                                          </p:stCondLst>
+                                        </p:cTn>
+                                        <p:tgtEl>
+                                          <p:spTgt spid="3">
+                                            <p:txEl>
+                                              <p:pRg st="2" end="2"/>
+                                            </p:txEl>
+                                          </p:spTgt>
+                                        </p:tgtEl>
+                                        <p:attrNameLst>
+                                          <p:attrName>style.visibility</p:attrName>
+                                        </p:attrNameLst>
+                                      </p:cBhvr>
+                                      <p:to>
+                                        <p:strVal val="visible"/>
+                                      </p:to>
+                                    </p:set>
+                                    <p:animEffect transition="in" filter="fade">
+                                      <p:cBhvr>
+                                        <p:cTn id="19" dur="1000"/>
+                                        <p:tgtEl>
+                                          <p:spTgt spid="3">
+                                            <p:txEl>
+                                              <p:pRg st="2" end="2"/>
+                                            </p:txEl>
+                                          </p:spTgt>
+                                        </p:tgtEl>
+                                      </p:cBhvr>
+                                    </p:animEffect>
+                                    <p:anim calcmode="lin" valueType="num">
+                                      <p:cBhvr>
+                                        <p:cTn id="20" dur="1000" fill="hold"/>
+                                        <p:tgtEl>
+                                          <p:spTgt spid="3">
+                                            <p:txEl>
+                                              <p:pRg st="2" end="2"/>
+                                            </p:txEl>
+                                          </p:spTgt>
+                                        </p:tgtEl>
+                                        <p:attrNameLst>
+                                          <p:attrName>ppt_x</p:attrName>
+                                        </p:attrNameLst>
+                                      </p:cBhvr>
+                                      <p:tavLst>
+                                        <p:tav tm="0">
+                                          <p:val>
+                                            <p:strVal val="#ppt_x"/>
+                                          </p:val>
+                                        </p:tav>
+                                        <p:tav tm="100000">
+                                          <p:val>
+                                            <p:strVal val="#ppt_x"/>
+                                          </p:val>
+                                        </p:tav>
+                                      </p:tavLst>
+                                    </p:anim>
+                                    <p:anim calcmode="lin" valueType="num">
+                                      <p:cBhvr>
+                                        <p:cTn id="21" dur="1000" fill="hold"/>
+                                        <p:tgtEl>
+                                          <p:spTgt spid="3">
+                                            <p:txEl>
+                                              <p:pRg st="2" end="2"/>
+                                            </p:txEl>
+                                          </p:spTgt>
+                                        </p:tgtEl>
+                                        <p:attrNameLst>
+                                          <p:attrName>ppt_y</p:attrName>
+                                        </p:attrNameLst>
+                                      </p:cBhvr>
+                                      <p:tavLst>
+                                        <p:tav tm="0">
+                                          <p:val>
+                                            <p:strVal val="#ppt_y+.1"/>
+                                          </p:val>
+                                        </p:tav>
+                                        <p:tav tm="100000">
+                                          <p:val>
+                                            <p:strVal val="#ppt_y"/>
+                                          </p:val>
+                                        </p:tav>
+                                      </p:tavLst>
+                                    </p:anim>
+                                  </p:childTnLst>
+                                </p:cTn>
+                              </p:par>
+                            </p:childTnLst>
+                          </p:cTn>
+                        </p:par>
+                        <p:par>
+                          <p:cTn id="22" fill="hold">
+                            <p:stCondLst>
+                              <p:cond delay="3000"/>
+                            </p:stCondLst>
+                            <p:childTnLst>
+                              <p:par>
+                                <p:cTn id="23" presetID="42" presetClass="entr" presetSubtype="0" fill="hold" nodeType="afterEffect">
+                                  <p:stCondLst>
+                                    <p:cond delay="0"/>
+                                  </p:stCondLst>
+                                  <p:childTnLst>
+                                    <p:set>
+                                      <p:cBhvr>
+                                        <p:cTn id="24" dur="1" fill="hold">
+                                          <p:stCondLst>
+                                            <p:cond delay="0"/>
+                                          </p:stCondLst>
+                                        </p:cTn>
+                                        <p:tgtEl>
+                                          <p:spTgt spid="3">
+                                            <p:txEl>
+                                              <p:pRg st="3" end="3"/>
+                                            </p:txEl>
+                                          </p:spTgt>
+                                        </p:tgtEl>
+                                        <p:attrNameLst>
+                                          <p:attrName>style.visibility</p:attrName>
+                                        </p:attrNameLst>
+                                      </p:cBhvr>
+                                      <p:to>
+                                        <p:strVal val="visible"/>
+                                      </p:to>
+                                    </p:set>
+                                    <p:animEffect transition="in" filter="fade">
+                                      <p:cBhvr>
+                                        <p:cTn id="25" dur="1000"/>
+                                        <p:tgtEl>
+                                          <p:spTgt spid="3">
+                                            <p:txEl>
+                                              <p:pRg st="3" end="3"/>
+                                            </p:txEl>
+                                          </p:spTgt>
+                                        </p:tgtEl>
+                                      </p:cBhvr>
+                                    </p:animEffect>
+                                    <p:anim calcmode="lin" valueType="num">
+                                      <p:cBhvr>
+                                        <p:cTn id="26" dur="1000" fill="hold"/>
+                                        <p:tgtEl>
+                                          <p:spTgt spid="3">
+                                            <p:txEl>
+                                              <p:pRg st="3" end="3"/>
+                                            </p:txEl>
+                                          </p:spTgt>
+                                        </p:tgtEl>
+                                        <p:attrNameLst>
+                                          <p:attrName>ppt_x</p:attrName>
+                                        </p:attrNameLst>
+                                      </p:cBhvr>
+                                      <p:tavLst>
+                                        <p:tav tm="0">
+                                          <p:val>
+                                            <p:strVal val="#ppt_x"/>
+                                          </p:val>
+                                        </p:tav>
+                                        <p:tav tm="100000">
+                                          <p:val>
+                                            <p:strVal val="#ppt_x"/>
+                                          </p:val>
+                                        </p:tav>
+                                      </p:tavLst>
+                                    </p:anim>
+                                    <p:anim calcmode="lin" valueType="num">
+                                      <p:cBhvr>
+                                        <p:cTn id="27" dur="1000" fill="hold"/>
+                                        <p:tgtEl>
+                                          <p:spTgt spid="3">
+                                            <p:txEl>
+                                              <p:pRg st="3" end="3"/>
+                                            </p:txEl>
+                                          </p:spTgt>
+                                        </p:tgtEl>
+                                        <p:attrNameLst>
+                                          <p:attrName>ppt_y</p:attrName>
+                                        </p:attrNameLst>
+                                      </p:cBhvr>
+                                      <p:tavLst>
+                                        <p:tav tm="0">
+                                          <p:val>
+                                            <p:strVal val="#ppt_y+.1"/>
+                                          </p:val>
+                                        </p:tav>
+                                        <p:tav tm="100000">
+                                          <p:val>
+                                            <p:strVal val="#ppt_y"/>
+                                          </p:val>
+                                        </p:tav>
+                                      </p:tavLst>
+                                    </p:anim>
+                                  </p:childTnLst>
+                                </p:cTn>
+                              </p:par>
+                            </p:childTnLst>
+                          </p:cTn>
+                        </p:par>
+                        <p:par>
+                          <p:cTn id="28" fill="hold">
+                            <p:stCondLst>
+                              <p:cond delay="4000"/>
+                            </p:stCondLst>
+                            <p:childTnLst>
+                              <p:par>
+                                <p:cTn id="29" presetID="42" presetClass="entr" presetSubtype="0" fill="hold" nodeType="afterEffect">
+                                  <p:stCondLst>
+                                    <p:cond delay="0"/>
+                                  </p:stCondLst>
+                                  <p:childTnLst>
+                                    <p:set>
+                                      <p:cBhvr>
+                                        <p:cTn id="30" dur="1" fill="hold">
+                                          <p:stCondLst>
+                                            <p:cond delay="0"/>
+                                          </p:stCondLst>
+                                        </p:cTn>
+                                        <p:tgtEl>
+                                          <p:spTgt spid="3">
+                                            <p:txEl>
+                                              <p:pRg st="4" end="4"/>
+                                            </p:txEl>
+                                          </p:spTgt>
+                                        </p:tgtEl>
+                                        <p:attrNameLst>
+                                          <p:attrName>style.visibility</p:attrName>
+                                        </p:attrNameLst>
+                                      </p:cBhvr>
+                                      <p:to>
+                                        <p:strVal val="visible"/>
+                                      </p:to>
+                                    </p:set>
+                                    <p:animEffect transition="in" filter="fade">
+                                      <p:cBhvr>
+                                        <p:cTn id="31" dur="1000"/>
+                                        <p:tgtEl>
+                                          <p:spTgt spid="3">
+                                            <p:txEl>
+                                              <p:pRg st="4" end="4"/>
+                                            </p:txEl>
+                                          </p:spTgt>
+                                        </p:tgtEl>
+                                      </p:cBhvr>
+                                    </p:animEffect>
+                                    <p:anim calcmode="lin" valueType="num">
+                                      <p:cBhvr>
+                                        <p:cTn id="32" dur="1000" fill="hold"/>
+                                        <p:tgtEl>
+                                          <p:spTgt spid="3">
+                                            <p:txEl>
+                                              <p:pRg st="4" end="4"/>
+                                            </p:txEl>
+                                          </p:spTgt>
+                                        </p:tgtEl>
+                                        <p:attrNameLst>
+                                          <p:attrName>ppt_x</p:attrName>
+                                        </p:attrNameLst>
+                                      </p:cBhvr>
+                                      <p:tavLst>
+                                        <p:tav tm="0">
+                                          <p:val>
+                                            <p:strVal val="#ppt_x"/>
+                                          </p:val>
+                                        </p:tav>
+                                        <p:tav tm="100000">
+                                          <p:val>
+                                            <p:strVal val="#ppt_x"/>
+                                          </p:val>
+                                        </p:tav>
+                                      </p:tavLst>
+                                    </p:anim>
+                                    <p:anim calcmode="lin" valueType="num">
+                                      <p:cBhvr>
+                                        <p:cTn id="33" dur="1000" fill="hold"/>
+                                        <p:tgtEl>
+                                          <p:spTgt spid="3">
+                                            <p:txEl>
+                                              <p:pRg st="4" end="4"/>
+                                            </p:txEl>
+                                          </p:spTgt>
+                                        </p:tgtEl>
+                                        <p:attrNameLst>
+                                          <p:attrName>ppt_y</p:attrName>
+                                        </p:attrNameLst>
+                                      </p:cBhvr>
+                                      <p:tavLst>
+                                        <p:tav tm="0">
+                                          <p:val>
+                                            <p:strVal val="#ppt_y+.1"/>
+                                          </p:val>
+                                        </p:tav>
+                                        <p:tav tm="100000">
+                                          <p:val>
+                                            <p:strVal val="#ppt_y"/>
+                                          </p:val>
+                                        </p:tav>
+                                      </p:tavLst>
+                                    </p:anim>
+                                  </p:childTnLst>
+                                </p:cTn>
+                              </p:par>
+                            </p:childTnLst>
+                          </p:cTn>
+                        </p:par>
+                      </p:childTnLst>
+                    </p:cTn>
+                  </p:par>
+                </p:childTnLst>
+              </p:cTn>
+              <p:prevCondLst>
+                <p:cond evt="onPrev" delay="0">
+                  <p:tgtEl>
+                    <p:sldTgt/>
+                  </p:tgtEl>
+                </p:cond>
+              </p:prevCondLst>
+              <p:nextCondLst>
+                <p:cond evt="onNext" delay="0">
+                  <p:tgtEl>
+                    <p:sldTgt/>
+                  </p:tgtEl>
+                </p:cond>
+              </p:nextCondLst>
+            </p:seq>
+          </p:childTnLst>
+        </p:cTn>
       </p:par>
     </p:tnLst>
   </p:timing>

</xml_diff>

<commit_message>
Főbb processzor gyártók felsorolása
</commit_message>
<xml_diff>
--- a/processzor + memoria.pptx
+++ b/processzor + memoria.pptx
@@ -5,7 +5,7 @@
     <p:sldMasterId id="2147483648" r:id="rId1"/>
   </p:sldMasterIdLst>
   <p:notesMasterIdLst>
-    <p:notesMasterId r:id="rId22"/>
+    <p:notesMasterId r:id="rId25"/>
   </p:notesMasterIdLst>
   <p:sldIdLst>
     <p:sldId id="256" r:id="rId2"/>
@@ -28,6 +28,9 @@
     <p:sldId id="276" r:id="rId19"/>
     <p:sldId id="277" r:id="rId20"/>
     <p:sldId id="278" r:id="rId21"/>
+    <p:sldId id="279" r:id="rId22"/>
+    <p:sldId id="280" r:id="rId23"/>
+    <p:sldId id="281" r:id="rId24"/>
   </p:sldIdLst>
   <p:sldSz cx="12192000" cy="6858000"/>
   <p:notesSz cx="6858000" cy="9144000"/>
@@ -216,7 +219,7 @@
           <a:p>
             <a:fld id="{DD3D37D4-9C9F-4041-B555-73D2DBC35CFF}" type="datetimeFigureOut">
               <a:rPr lang="hu-HU" smtClean="0"/>
-              <a:t>2023.10.16.</a:t>
+              <a:t>2023.10.25.</a:t>
             </a:fld>
             <a:endParaRPr lang="hu-HU"/>
           </a:p>
@@ -783,7 +786,7 @@
           <a:p>
             <a:fld id="{397604E0-0D2C-4780-BF54-3C57F83D7B51}" type="datetimeFigureOut">
               <a:rPr lang="hu-HU" smtClean="0"/>
-              <a:t>2023.10.16.</a:t>
+              <a:t>2023.10.25.</a:t>
             </a:fld>
             <a:endParaRPr lang="hu-HU"/>
           </a:p>
@@ -953,7 +956,7 @@
           <a:p>
             <a:fld id="{397604E0-0D2C-4780-BF54-3C57F83D7B51}" type="datetimeFigureOut">
               <a:rPr lang="hu-HU" smtClean="0"/>
-              <a:t>2023.10.16.</a:t>
+              <a:t>2023.10.25.</a:t>
             </a:fld>
             <a:endParaRPr lang="hu-HU"/>
           </a:p>
@@ -1133,7 +1136,7 @@
           <a:p>
             <a:fld id="{397604E0-0D2C-4780-BF54-3C57F83D7B51}" type="datetimeFigureOut">
               <a:rPr lang="hu-HU" smtClean="0"/>
-              <a:t>2023.10.16.</a:t>
+              <a:t>2023.10.25.</a:t>
             </a:fld>
             <a:endParaRPr lang="hu-HU"/>
           </a:p>
@@ -1303,7 +1306,7 @@
           <a:p>
             <a:fld id="{397604E0-0D2C-4780-BF54-3C57F83D7B51}" type="datetimeFigureOut">
               <a:rPr lang="hu-HU" smtClean="0"/>
-              <a:t>2023.10.16.</a:t>
+              <a:t>2023.10.25.</a:t>
             </a:fld>
             <a:endParaRPr lang="hu-HU"/>
           </a:p>
@@ -1549,7 +1552,7 @@
           <a:p>
             <a:fld id="{397604E0-0D2C-4780-BF54-3C57F83D7B51}" type="datetimeFigureOut">
               <a:rPr lang="hu-HU" smtClean="0"/>
-              <a:t>2023.10.16.</a:t>
+              <a:t>2023.10.25.</a:t>
             </a:fld>
             <a:endParaRPr lang="hu-HU"/>
           </a:p>
@@ -1781,7 +1784,7 @@
           <a:p>
             <a:fld id="{397604E0-0D2C-4780-BF54-3C57F83D7B51}" type="datetimeFigureOut">
               <a:rPr lang="hu-HU" smtClean="0"/>
-              <a:t>2023.10.16.</a:t>
+              <a:t>2023.10.25.</a:t>
             </a:fld>
             <a:endParaRPr lang="hu-HU"/>
           </a:p>
@@ -2148,7 +2151,7 @@
           <a:p>
             <a:fld id="{397604E0-0D2C-4780-BF54-3C57F83D7B51}" type="datetimeFigureOut">
               <a:rPr lang="hu-HU" smtClean="0"/>
-              <a:t>2023.10.16.</a:t>
+              <a:t>2023.10.25.</a:t>
             </a:fld>
             <a:endParaRPr lang="hu-HU"/>
           </a:p>
@@ -2266,7 +2269,7 @@
           <a:p>
             <a:fld id="{397604E0-0D2C-4780-BF54-3C57F83D7B51}" type="datetimeFigureOut">
               <a:rPr lang="hu-HU" smtClean="0"/>
-              <a:t>2023.10.16.</a:t>
+              <a:t>2023.10.25.</a:t>
             </a:fld>
             <a:endParaRPr lang="hu-HU"/>
           </a:p>
@@ -2361,7 +2364,7 @@
           <a:p>
             <a:fld id="{397604E0-0D2C-4780-BF54-3C57F83D7B51}" type="datetimeFigureOut">
               <a:rPr lang="hu-HU" smtClean="0"/>
-              <a:t>2023.10.16.</a:t>
+              <a:t>2023.10.25.</a:t>
             </a:fld>
             <a:endParaRPr lang="hu-HU"/>
           </a:p>
@@ -2638,7 +2641,7 @@
           <a:p>
             <a:fld id="{397604E0-0D2C-4780-BF54-3C57F83D7B51}" type="datetimeFigureOut">
               <a:rPr lang="hu-HU" smtClean="0"/>
-              <a:t>2023.10.16.</a:t>
+              <a:t>2023.10.25.</a:t>
             </a:fld>
             <a:endParaRPr lang="hu-HU"/>
           </a:p>
@@ -2891,7 +2894,7 @@
           <a:p>
             <a:fld id="{397604E0-0D2C-4780-BF54-3C57F83D7B51}" type="datetimeFigureOut">
               <a:rPr lang="hu-HU" smtClean="0"/>
-              <a:t>2023.10.16.</a:t>
+              <a:t>2023.10.25.</a:t>
             </a:fld>
             <a:endParaRPr lang="hu-HU"/>
           </a:p>
@@ -3113,7 +3116,7 @@
           <a:p>
             <a:fld id="{397604E0-0D2C-4780-BF54-3C57F83D7B51}" type="datetimeFigureOut">
               <a:rPr lang="hu-HU" smtClean="0"/>
-              <a:t>2023.10.16.</a:t>
+              <a:t>2023.10.25.</a:t>
             </a:fld>
             <a:endParaRPr lang="hu-HU"/>
           </a:p>
@@ -9225,11 +9228,6 @@
               </a:rPr>
               <a:t>gyorsítótár</a:t>
             </a:r>
-            <a:endParaRPr lang="hu-HU" dirty="0" smtClean="0">
-              <a:solidFill>
-                <a:schemeClr val="bg1"/>
-              </a:solidFill>
-            </a:endParaRPr>
           </a:p>
           <a:p>
             <a:pPr>
@@ -11433,6 +11431,3066 @@
                                           <p:spTgt spid="3">
                                             <p:txEl>
                                               <p:pRg st="4" end="4"/>
+                                            </p:txEl>
+                                          </p:spTgt>
+                                        </p:tgtEl>
+                                        <p:attrNameLst>
+                                          <p:attrName>ppt_y</p:attrName>
+                                        </p:attrNameLst>
+                                      </p:cBhvr>
+                                      <p:tavLst>
+                                        <p:tav tm="0">
+                                          <p:val>
+                                            <p:strVal val="#ppt_y+.1"/>
+                                          </p:val>
+                                        </p:tav>
+                                        <p:tav tm="100000">
+                                          <p:val>
+                                            <p:strVal val="#ppt_y"/>
+                                          </p:val>
+                                        </p:tav>
+                                      </p:tavLst>
+                                    </p:anim>
+                                  </p:childTnLst>
+                                </p:cTn>
+                              </p:par>
+                            </p:childTnLst>
+                          </p:cTn>
+                        </p:par>
+                      </p:childTnLst>
+                    </p:cTn>
+                  </p:par>
+                </p:childTnLst>
+              </p:cTn>
+              <p:prevCondLst>
+                <p:cond evt="onPrev" delay="0">
+                  <p:tgtEl>
+                    <p:sldTgt/>
+                  </p:tgtEl>
+                </p:cond>
+              </p:prevCondLst>
+              <p:nextCondLst>
+                <p:cond evt="onNext" delay="0">
+                  <p:tgtEl>
+                    <p:sldTgt/>
+                  </p:tgtEl>
+                </p:cond>
+              </p:nextCondLst>
+            </p:seq>
+          </p:childTnLst>
+        </p:cTn>
+      </p:par>
+    </p:tnLst>
+  </p:timing>
+</p:sld>
+</file>
+
+<file path=ppt/slides/slide21.xml><?xml version="1.0" encoding="utf-8"?>
+<p:sld xmlns:a="http://schemas.openxmlformats.org/drawingml/2006/main" xmlns:r="http://schemas.openxmlformats.org/officeDocument/2006/relationships" xmlns:p="http://schemas.openxmlformats.org/presentationml/2006/main">
+  <p:cSld>
+    <p:spTree>
+      <p:nvGrpSpPr>
+        <p:cNvPr id="1" name=""/>
+        <p:cNvGrpSpPr/>
+        <p:nvPr/>
+      </p:nvGrpSpPr>
+      <p:grpSpPr>
+        <a:xfrm>
+          <a:off x="0" y="0"/>
+          <a:ext cx="0" cy="0"/>
+          <a:chOff x="0" y="0"/>
+          <a:chExt cx="0" cy="0"/>
+        </a:xfrm>
+      </p:grpSpPr>
+      <p:sp>
+        <p:nvSpPr>
+          <p:cNvPr id="2" name="Cím 1"/>
+          <p:cNvSpPr>
+            <a:spLocks noGrp="1"/>
+          </p:cNvSpPr>
+          <p:nvPr>
+            <p:ph type="title"/>
+          </p:nvPr>
+        </p:nvSpPr>
+        <p:spPr>
+          <a:xfrm>
+            <a:off x="838200" y="283238"/>
+            <a:ext cx="10515600" cy="1325563"/>
+          </a:xfrm>
+        </p:spPr>
+        <p:txBody>
+          <a:bodyPr/>
+          <a:lstStyle/>
+          <a:p>
+            <a:r>
+              <a:rPr lang="hu-HU" dirty="0" smtClean="0">
+                <a:solidFill>
+                  <a:schemeClr val="bg1"/>
+                </a:solidFill>
+                <a:latin typeface="Algerian" panose="04020705040A02060702" pitchFamily="82" charset="0"/>
+              </a:rPr>
+              <a:t>PROCESSZOR </a:t>
+            </a:r>
+            <a:r>
+              <a:rPr lang="hu-HU" dirty="0" smtClean="0">
+                <a:solidFill>
+                  <a:schemeClr val="bg1"/>
+                </a:solidFill>
+                <a:latin typeface="Algerian" panose="04020705040A02060702" pitchFamily="82" charset="0"/>
+              </a:rPr>
+              <a:t>mag</a:t>
+            </a:r>
+            <a:endParaRPr lang="hu-HU" dirty="0">
+              <a:solidFill>
+                <a:schemeClr val="bg1"/>
+              </a:solidFill>
+              <a:latin typeface="Algerian" panose="04020705040A02060702" pitchFamily="82" charset="0"/>
+            </a:endParaRPr>
+          </a:p>
+        </p:txBody>
+      </p:sp>
+      <p:sp>
+        <p:nvSpPr>
+          <p:cNvPr id="3" name="Tartalom helye 2"/>
+          <p:cNvSpPr>
+            <a:spLocks noGrp="1"/>
+          </p:cNvSpPr>
+          <p:nvPr>
+            <p:ph idx="1"/>
+          </p:nvPr>
+        </p:nvSpPr>
+        <p:spPr>
+          <a:xfrm>
+            <a:off x="838200" y="2743376"/>
+            <a:ext cx="10515600" cy="1884380"/>
+          </a:xfrm>
+        </p:spPr>
+        <p:txBody>
+          <a:bodyPr/>
+          <a:lstStyle/>
+          <a:p>
+            <a:pPr>
+              <a:lnSpc>
+                <a:spcPct val="100000"/>
+              </a:lnSpc>
+            </a:pPr>
+            <a:r>
+              <a:rPr lang="hu-HU" b="1" dirty="0" smtClean="0">
+                <a:solidFill>
+                  <a:schemeClr val="bg1"/>
+                </a:solidFill>
+              </a:rPr>
+              <a:t>Különálló számítási egységek</a:t>
+            </a:r>
+            <a:endParaRPr lang="hu-HU" dirty="0">
+              <a:solidFill>
+                <a:schemeClr val="bg1"/>
+              </a:solidFill>
+            </a:endParaRPr>
+          </a:p>
+          <a:p>
+            <a:pPr>
+              <a:lnSpc>
+                <a:spcPct val="100000"/>
+              </a:lnSpc>
+            </a:pPr>
+            <a:r>
+              <a:rPr lang="hu-HU" dirty="0" smtClean="0">
+                <a:solidFill>
+                  <a:schemeClr val="bg1"/>
+                </a:solidFill>
+              </a:rPr>
+              <a:t>Több programot tud kezelni egyszerre</a:t>
+            </a:r>
+            <a:endParaRPr lang="hu-HU" dirty="0" smtClean="0">
+              <a:solidFill>
+                <a:schemeClr val="bg1"/>
+              </a:solidFill>
+            </a:endParaRPr>
+          </a:p>
+          <a:p>
+            <a:pPr>
+              <a:lnSpc>
+                <a:spcPct val="100000"/>
+              </a:lnSpc>
+            </a:pPr>
+            <a:r>
+              <a:rPr lang="hu-HU" dirty="0" err="1" smtClean="0">
+                <a:solidFill>
+                  <a:schemeClr val="bg1"/>
+                </a:solidFill>
+              </a:rPr>
+              <a:t>Multitasking</a:t>
+            </a:r>
+            <a:endParaRPr lang="hu-HU" dirty="0" smtClean="0">
+              <a:solidFill>
+                <a:schemeClr val="bg1"/>
+              </a:solidFill>
+            </a:endParaRPr>
+          </a:p>
+        </p:txBody>
+      </p:sp>
+    </p:spTree>
+    <p:extLst>
+      <p:ext uri="{BB962C8B-B14F-4D97-AF65-F5344CB8AC3E}">
+        <p14:creationId xmlns:p14="http://schemas.microsoft.com/office/powerpoint/2010/main" val="2687578653"/>
+      </p:ext>
+    </p:extLst>
+  </p:cSld>
+  <p:clrMapOvr>
+    <a:masterClrMapping/>
+  </p:clrMapOvr>
+  <mc:AlternateContent xmlns:mc="http://schemas.openxmlformats.org/markup-compatibility/2006" xmlns:p14="http://schemas.microsoft.com/office/powerpoint/2010/main">
+    <mc:Choice Requires="p14">
+      <p:transition spd="slow" p14:dur="3400">
+        <p14:reveal/>
+      </p:transition>
+    </mc:Choice>
+    <mc:Fallback xmlns="">
+      <p:transition spd="slow">
+        <p:fade/>
+      </p:transition>
+    </mc:Fallback>
+  </mc:AlternateContent>
+  <p:timing>
+    <p:tnLst>
+      <p:par>
+        <p:cTn id="1" dur="indefinite" restart="never" nodeType="tmRoot">
+          <p:childTnLst>
+            <p:seq concurrent="1" nextAc="seek">
+              <p:cTn id="2" dur="indefinite" nodeType="mainSeq">
+                <p:childTnLst>
+                  <p:par>
+                    <p:cTn id="3" fill="hold">
+                      <p:stCondLst>
+                        <p:cond delay="indefinite"/>
+                        <p:cond evt="onBegin" delay="0">
+                          <p:tn val="2"/>
+                        </p:cond>
+                      </p:stCondLst>
+                      <p:childTnLst>
+                        <p:par>
+                          <p:cTn id="4" fill="hold">
+                            <p:stCondLst>
+                              <p:cond delay="0"/>
+                            </p:stCondLst>
+                            <p:childTnLst>
+                              <p:par>
+                                <p:cTn id="5" presetID="42" presetClass="entr" presetSubtype="0" fill="hold" nodeType="afterEffect">
+                                  <p:stCondLst>
+                                    <p:cond delay="0"/>
+                                  </p:stCondLst>
+                                  <p:childTnLst>
+                                    <p:set>
+                                      <p:cBhvr>
+                                        <p:cTn id="6" dur="1" fill="hold">
+                                          <p:stCondLst>
+                                            <p:cond delay="0"/>
+                                          </p:stCondLst>
+                                        </p:cTn>
+                                        <p:tgtEl>
+                                          <p:spTgt spid="3">
+                                            <p:txEl>
+                                              <p:pRg st="0" end="0"/>
+                                            </p:txEl>
+                                          </p:spTgt>
+                                        </p:tgtEl>
+                                        <p:attrNameLst>
+                                          <p:attrName>style.visibility</p:attrName>
+                                        </p:attrNameLst>
+                                      </p:cBhvr>
+                                      <p:to>
+                                        <p:strVal val="visible"/>
+                                      </p:to>
+                                    </p:set>
+                                    <p:animEffect transition="in" filter="fade">
+                                      <p:cBhvr>
+                                        <p:cTn id="7" dur="1000"/>
+                                        <p:tgtEl>
+                                          <p:spTgt spid="3">
+                                            <p:txEl>
+                                              <p:pRg st="0" end="0"/>
+                                            </p:txEl>
+                                          </p:spTgt>
+                                        </p:tgtEl>
+                                      </p:cBhvr>
+                                    </p:animEffect>
+                                    <p:anim calcmode="lin" valueType="num">
+                                      <p:cBhvr>
+                                        <p:cTn id="8" dur="1000" fill="hold"/>
+                                        <p:tgtEl>
+                                          <p:spTgt spid="3">
+                                            <p:txEl>
+                                              <p:pRg st="0" end="0"/>
+                                            </p:txEl>
+                                          </p:spTgt>
+                                        </p:tgtEl>
+                                        <p:attrNameLst>
+                                          <p:attrName>ppt_x</p:attrName>
+                                        </p:attrNameLst>
+                                      </p:cBhvr>
+                                      <p:tavLst>
+                                        <p:tav tm="0">
+                                          <p:val>
+                                            <p:strVal val="#ppt_x"/>
+                                          </p:val>
+                                        </p:tav>
+                                        <p:tav tm="100000">
+                                          <p:val>
+                                            <p:strVal val="#ppt_x"/>
+                                          </p:val>
+                                        </p:tav>
+                                      </p:tavLst>
+                                    </p:anim>
+                                    <p:anim calcmode="lin" valueType="num">
+                                      <p:cBhvr>
+                                        <p:cTn id="9" dur="1000" fill="hold"/>
+                                        <p:tgtEl>
+                                          <p:spTgt spid="3">
+                                            <p:txEl>
+                                              <p:pRg st="0" end="0"/>
+                                            </p:txEl>
+                                          </p:spTgt>
+                                        </p:tgtEl>
+                                        <p:attrNameLst>
+                                          <p:attrName>ppt_y</p:attrName>
+                                        </p:attrNameLst>
+                                      </p:cBhvr>
+                                      <p:tavLst>
+                                        <p:tav tm="0">
+                                          <p:val>
+                                            <p:strVal val="#ppt_y+.1"/>
+                                          </p:val>
+                                        </p:tav>
+                                        <p:tav tm="100000">
+                                          <p:val>
+                                            <p:strVal val="#ppt_y"/>
+                                          </p:val>
+                                        </p:tav>
+                                      </p:tavLst>
+                                    </p:anim>
+                                  </p:childTnLst>
+                                </p:cTn>
+                              </p:par>
+                            </p:childTnLst>
+                          </p:cTn>
+                        </p:par>
+                        <p:par>
+                          <p:cTn id="10" fill="hold">
+                            <p:stCondLst>
+                              <p:cond delay="1000"/>
+                            </p:stCondLst>
+                            <p:childTnLst>
+                              <p:par>
+                                <p:cTn id="11" presetID="42" presetClass="entr" presetSubtype="0" fill="hold" nodeType="afterEffect">
+                                  <p:stCondLst>
+                                    <p:cond delay="0"/>
+                                  </p:stCondLst>
+                                  <p:childTnLst>
+                                    <p:set>
+                                      <p:cBhvr>
+                                        <p:cTn id="12" dur="1" fill="hold">
+                                          <p:stCondLst>
+                                            <p:cond delay="0"/>
+                                          </p:stCondLst>
+                                        </p:cTn>
+                                        <p:tgtEl>
+                                          <p:spTgt spid="3">
+                                            <p:txEl>
+                                              <p:pRg st="1" end="1"/>
+                                            </p:txEl>
+                                          </p:spTgt>
+                                        </p:tgtEl>
+                                        <p:attrNameLst>
+                                          <p:attrName>style.visibility</p:attrName>
+                                        </p:attrNameLst>
+                                      </p:cBhvr>
+                                      <p:to>
+                                        <p:strVal val="visible"/>
+                                      </p:to>
+                                    </p:set>
+                                    <p:animEffect transition="in" filter="fade">
+                                      <p:cBhvr>
+                                        <p:cTn id="13" dur="1000"/>
+                                        <p:tgtEl>
+                                          <p:spTgt spid="3">
+                                            <p:txEl>
+                                              <p:pRg st="1" end="1"/>
+                                            </p:txEl>
+                                          </p:spTgt>
+                                        </p:tgtEl>
+                                      </p:cBhvr>
+                                    </p:animEffect>
+                                    <p:anim calcmode="lin" valueType="num">
+                                      <p:cBhvr>
+                                        <p:cTn id="14" dur="1000" fill="hold"/>
+                                        <p:tgtEl>
+                                          <p:spTgt spid="3">
+                                            <p:txEl>
+                                              <p:pRg st="1" end="1"/>
+                                            </p:txEl>
+                                          </p:spTgt>
+                                        </p:tgtEl>
+                                        <p:attrNameLst>
+                                          <p:attrName>ppt_x</p:attrName>
+                                        </p:attrNameLst>
+                                      </p:cBhvr>
+                                      <p:tavLst>
+                                        <p:tav tm="0">
+                                          <p:val>
+                                            <p:strVal val="#ppt_x"/>
+                                          </p:val>
+                                        </p:tav>
+                                        <p:tav tm="100000">
+                                          <p:val>
+                                            <p:strVal val="#ppt_x"/>
+                                          </p:val>
+                                        </p:tav>
+                                      </p:tavLst>
+                                    </p:anim>
+                                    <p:anim calcmode="lin" valueType="num">
+                                      <p:cBhvr>
+                                        <p:cTn id="15" dur="1000" fill="hold"/>
+                                        <p:tgtEl>
+                                          <p:spTgt spid="3">
+                                            <p:txEl>
+                                              <p:pRg st="1" end="1"/>
+                                            </p:txEl>
+                                          </p:spTgt>
+                                        </p:tgtEl>
+                                        <p:attrNameLst>
+                                          <p:attrName>ppt_y</p:attrName>
+                                        </p:attrNameLst>
+                                      </p:cBhvr>
+                                      <p:tavLst>
+                                        <p:tav tm="0">
+                                          <p:val>
+                                            <p:strVal val="#ppt_y+.1"/>
+                                          </p:val>
+                                        </p:tav>
+                                        <p:tav tm="100000">
+                                          <p:val>
+                                            <p:strVal val="#ppt_y"/>
+                                          </p:val>
+                                        </p:tav>
+                                      </p:tavLst>
+                                    </p:anim>
+                                  </p:childTnLst>
+                                </p:cTn>
+                              </p:par>
+                            </p:childTnLst>
+                          </p:cTn>
+                        </p:par>
+                        <p:par>
+                          <p:cTn id="16" fill="hold">
+                            <p:stCondLst>
+                              <p:cond delay="2000"/>
+                            </p:stCondLst>
+                            <p:childTnLst>
+                              <p:par>
+                                <p:cTn id="17" presetID="42" presetClass="entr" presetSubtype="0" fill="hold" nodeType="afterEffect">
+                                  <p:stCondLst>
+                                    <p:cond delay="0"/>
+                                  </p:stCondLst>
+                                  <p:childTnLst>
+                                    <p:set>
+                                      <p:cBhvr>
+                                        <p:cTn id="18" dur="1" fill="hold">
+                                          <p:stCondLst>
+                                            <p:cond delay="0"/>
+                                          </p:stCondLst>
+                                        </p:cTn>
+                                        <p:tgtEl>
+                                          <p:spTgt spid="3">
+                                            <p:txEl>
+                                              <p:pRg st="2" end="2"/>
+                                            </p:txEl>
+                                          </p:spTgt>
+                                        </p:tgtEl>
+                                        <p:attrNameLst>
+                                          <p:attrName>style.visibility</p:attrName>
+                                        </p:attrNameLst>
+                                      </p:cBhvr>
+                                      <p:to>
+                                        <p:strVal val="visible"/>
+                                      </p:to>
+                                    </p:set>
+                                    <p:animEffect transition="in" filter="fade">
+                                      <p:cBhvr>
+                                        <p:cTn id="19" dur="1000"/>
+                                        <p:tgtEl>
+                                          <p:spTgt spid="3">
+                                            <p:txEl>
+                                              <p:pRg st="2" end="2"/>
+                                            </p:txEl>
+                                          </p:spTgt>
+                                        </p:tgtEl>
+                                      </p:cBhvr>
+                                    </p:animEffect>
+                                    <p:anim calcmode="lin" valueType="num">
+                                      <p:cBhvr>
+                                        <p:cTn id="20" dur="1000" fill="hold"/>
+                                        <p:tgtEl>
+                                          <p:spTgt spid="3">
+                                            <p:txEl>
+                                              <p:pRg st="2" end="2"/>
+                                            </p:txEl>
+                                          </p:spTgt>
+                                        </p:tgtEl>
+                                        <p:attrNameLst>
+                                          <p:attrName>ppt_x</p:attrName>
+                                        </p:attrNameLst>
+                                      </p:cBhvr>
+                                      <p:tavLst>
+                                        <p:tav tm="0">
+                                          <p:val>
+                                            <p:strVal val="#ppt_x"/>
+                                          </p:val>
+                                        </p:tav>
+                                        <p:tav tm="100000">
+                                          <p:val>
+                                            <p:strVal val="#ppt_x"/>
+                                          </p:val>
+                                        </p:tav>
+                                      </p:tavLst>
+                                    </p:anim>
+                                    <p:anim calcmode="lin" valueType="num">
+                                      <p:cBhvr>
+                                        <p:cTn id="21" dur="1000" fill="hold"/>
+                                        <p:tgtEl>
+                                          <p:spTgt spid="3">
+                                            <p:txEl>
+                                              <p:pRg st="2" end="2"/>
+                                            </p:txEl>
+                                          </p:spTgt>
+                                        </p:tgtEl>
+                                        <p:attrNameLst>
+                                          <p:attrName>ppt_y</p:attrName>
+                                        </p:attrNameLst>
+                                      </p:cBhvr>
+                                      <p:tavLst>
+                                        <p:tav tm="0">
+                                          <p:val>
+                                            <p:strVal val="#ppt_y+.1"/>
+                                          </p:val>
+                                        </p:tav>
+                                        <p:tav tm="100000">
+                                          <p:val>
+                                            <p:strVal val="#ppt_y"/>
+                                          </p:val>
+                                        </p:tav>
+                                      </p:tavLst>
+                                    </p:anim>
+                                  </p:childTnLst>
+                                </p:cTn>
+                              </p:par>
+                            </p:childTnLst>
+                          </p:cTn>
+                        </p:par>
+                      </p:childTnLst>
+                    </p:cTn>
+                  </p:par>
+                </p:childTnLst>
+              </p:cTn>
+              <p:prevCondLst>
+                <p:cond evt="onPrev" delay="0">
+                  <p:tgtEl>
+                    <p:sldTgt/>
+                  </p:tgtEl>
+                </p:cond>
+              </p:prevCondLst>
+              <p:nextCondLst>
+                <p:cond evt="onNext" delay="0">
+                  <p:tgtEl>
+                    <p:sldTgt/>
+                  </p:tgtEl>
+                </p:cond>
+              </p:nextCondLst>
+            </p:seq>
+          </p:childTnLst>
+        </p:cTn>
+      </p:par>
+    </p:tnLst>
+  </p:timing>
+</p:sld>
+</file>
+
+<file path=ppt/slides/slide22.xml><?xml version="1.0" encoding="utf-8"?>
+<p:sld xmlns:a="http://schemas.openxmlformats.org/drawingml/2006/main" xmlns:r="http://schemas.openxmlformats.org/officeDocument/2006/relationships" xmlns:p="http://schemas.openxmlformats.org/presentationml/2006/main">
+  <p:cSld>
+    <p:spTree>
+      <p:nvGrpSpPr>
+        <p:cNvPr id="1" name=""/>
+        <p:cNvGrpSpPr/>
+        <p:nvPr/>
+      </p:nvGrpSpPr>
+      <p:grpSpPr>
+        <a:xfrm>
+          <a:off x="0" y="0"/>
+          <a:ext cx="0" cy="0"/>
+          <a:chOff x="0" y="0"/>
+          <a:chExt cx="0" cy="0"/>
+        </a:xfrm>
+      </p:grpSpPr>
+      <p:sp>
+        <p:nvSpPr>
+          <p:cNvPr id="2" name="Cím 1"/>
+          <p:cNvSpPr>
+            <a:spLocks noGrp="1"/>
+          </p:cNvSpPr>
+          <p:nvPr>
+            <p:ph type="title"/>
+          </p:nvPr>
+        </p:nvSpPr>
+        <p:spPr>
+          <a:xfrm>
+            <a:off x="838200" y="283238"/>
+            <a:ext cx="10515600" cy="1325563"/>
+          </a:xfrm>
+        </p:spPr>
+        <p:txBody>
+          <a:bodyPr/>
+          <a:lstStyle/>
+          <a:p>
+            <a:r>
+              <a:rPr lang="hu-HU" dirty="0" smtClean="0">
+                <a:solidFill>
+                  <a:schemeClr val="bg1"/>
+                </a:solidFill>
+                <a:latin typeface="Algerian" panose="04020705040A02060702" pitchFamily="82" charset="0"/>
+              </a:rPr>
+              <a:t>Főbb processzor gyártók</a:t>
+            </a:r>
+            <a:endParaRPr lang="hu-HU" dirty="0">
+              <a:solidFill>
+                <a:schemeClr val="bg1"/>
+              </a:solidFill>
+              <a:latin typeface="Algerian" panose="04020705040A02060702" pitchFamily="82" charset="0"/>
+            </a:endParaRPr>
+          </a:p>
+        </p:txBody>
+      </p:sp>
+      <p:sp>
+        <p:nvSpPr>
+          <p:cNvPr id="3" name="Tartalom helye 2"/>
+          <p:cNvSpPr>
+            <a:spLocks noGrp="1"/>
+          </p:cNvSpPr>
+          <p:nvPr>
+            <p:ph idx="1"/>
+          </p:nvPr>
+        </p:nvSpPr>
+        <p:spPr>
+          <a:xfrm>
+            <a:off x="838200" y="1637131"/>
+            <a:ext cx="10515600" cy="1326819"/>
+          </a:xfrm>
+        </p:spPr>
+        <p:txBody>
+          <a:bodyPr>
+            <a:normAutofit lnSpcReduction="10000"/>
+          </a:bodyPr>
+          <a:lstStyle/>
+          <a:p>
+            <a:pPr>
+              <a:lnSpc>
+                <a:spcPct val="100000"/>
+              </a:lnSpc>
+            </a:pPr>
+            <a:r>
+              <a:rPr lang="hu-HU" b="1" dirty="0" smtClean="0">
+                <a:solidFill>
+                  <a:schemeClr val="bg1"/>
+                </a:solidFill>
+              </a:rPr>
+              <a:t>PC/Laptop:</a:t>
+            </a:r>
+          </a:p>
+          <a:p>
+            <a:pPr lvl="1">
+              <a:lnSpc>
+                <a:spcPct val="100000"/>
+              </a:lnSpc>
+            </a:pPr>
+            <a:r>
+              <a:rPr lang="hu-HU" b="1" dirty="0" smtClean="0">
+                <a:solidFill>
+                  <a:schemeClr val="bg1"/>
+                </a:solidFill>
+              </a:rPr>
+              <a:t>Intel (FŐ: Intel </a:t>
+            </a:r>
+            <a:r>
+              <a:rPr lang="hu-HU" b="1" dirty="0" err="1" smtClean="0">
+                <a:solidFill>
+                  <a:schemeClr val="bg1"/>
+                </a:solidFill>
+              </a:rPr>
+              <a:t>Core</a:t>
+            </a:r>
+            <a:r>
+              <a:rPr lang="hu-HU" b="1" dirty="0" smtClean="0">
+                <a:solidFill>
+                  <a:schemeClr val="bg1"/>
+                </a:solidFill>
+              </a:rPr>
+              <a:t> (i3, i5, i7, i9)</a:t>
+            </a:r>
+          </a:p>
+          <a:p>
+            <a:pPr lvl="1">
+              <a:lnSpc>
+                <a:spcPct val="100000"/>
+              </a:lnSpc>
+            </a:pPr>
+            <a:r>
+              <a:rPr lang="hu-HU" b="1" dirty="0" smtClean="0">
+                <a:solidFill>
+                  <a:schemeClr val="bg1"/>
+                </a:solidFill>
+              </a:rPr>
+              <a:t>AMD (FŐ: </a:t>
+            </a:r>
+            <a:r>
+              <a:rPr lang="hu-HU" b="1" dirty="0" err="1" smtClean="0">
+                <a:solidFill>
+                  <a:schemeClr val="bg1"/>
+                </a:solidFill>
+              </a:rPr>
+              <a:t>Ryzen</a:t>
+            </a:r>
+            <a:r>
+              <a:rPr lang="hu-HU" b="1" dirty="0" smtClean="0">
+                <a:solidFill>
+                  <a:schemeClr val="bg1"/>
+                </a:solidFill>
+              </a:rPr>
+              <a:t> (3, 5, 7, </a:t>
+            </a:r>
+            <a:r>
+              <a:rPr lang="hu-HU" b="1" dirty="0">
+                <a:solidFill>
+                  <a:schemeClr val="bg1"/>
+                </a:solidFill>
+              </a:rPr>
+              <a:t>9</a:t>
+            </a:r>
+            <a:r>
+              <a:rPr lang="hu-HU" b="1" dirty="0" smtClean="0">
+                <a:solidFill>
+                  <a:schemeClr val="bg1"/>
+                </a:solidFill>
+              </a:rPr>
+              <a:t>))</a:t>
+            </a:r>
+            <a:endParaRPr lang="hu-HU" b="1" dirty="0" smtClean="0">
+              <a:solidFill>
+                <a:schemeClr val="bg1"/>
+              </a:solidFill>
+            </a:endParaRPr>
+          </a:p>
+        </p:txBody>
+      </p:sp>
+      <p:sp>
+        <p:nvSpPr>
+          <p:cNvPr id="4" name="Tartalom helye 2"/>
+          <p:cNvSpPr txBox="1">
+            <a:spLocks/>
+          </p:cNvSpPr>
+          <p:nvPr/>
+        </p:nvSpPr>
+        <p:spPr>
+          <a:xfrm>
+            <a:off x="838200" y="4921208"/>
+            <a:ext cx="10515600" cy="1326819"/>
+          </a:xfrm>
+          <a:prstGeom prst="rect">
+            <a:avLst/>
+          </a:prstGeom>
+        </p:spPr>
+        <p:txBody>
+          <a:bodyPr vert="horz" lIns="91440" tIns="45720" rIns="91440" bIns="45720" rtlCol="0">
+            <a:normAutofit lnSpcReduction="10000"/>
+          </a:bodyPr>
+          <a:lstStyle>
+            <a:lvl1pPr marL="228600" indent="-228600" algn="l" defTabSz="914400" rtl="0" eaLnBrk="1" latinLnBrk="0" hangingPunct="1">
+              <a:lnSpc>
+                <a:spcPct val="90000"/>
+              </a:lnSpc>
+              <a:spcBef>
+                <a:spcPts val="1000"/>
+              </a:spcBef>
+              <a:buFont typeface="Arial" panose="020B0604020202020204" pitchFamily="34" charset="0"/>
+              <a:buChar char="•"/>
+              <a:defRPr sz="2800" kern="1200">
+                <a:solidFill>
+                  <a:schemeClr val="tx1"/>
+                </a:solidFill>
+                <a:latin typeface="+mn-lt"/>
+                <a:ea typeface="+mn-ea"/>
+                <a:cs typeface="+mn-cs"/>
+              </a:defRPr>
+            </a:lvl1pPr>
+            <a:lvl2pPr marL="685800" indent="-228600" algn="l" defTabSz="914400" rtl="0" eaLnBrk="1" latinLnBrk="0" hangingPunct="1">
+              <a:lnSpc>
+                <a:spcPct val="90000"/>
+              </a:lnSpc>
+              <a:spcBef>
+                <a:spcPts val="500"/>
+              </a:spcBef>
+              <a:buFont typeface="Arial" panose="020B0604020202020204" pitchFamily="34" charset="0"/>
+              <a:buChar char="•"/>
+              <a:defRPr sz="2400" kern="1200">
+                <a:solidFill>
+                  <a:schemeClr val="tx1"/>
+                </a:solidFill>
+                <a:latin typeface="+mn-lt"/>
+                <a:ea typeface="+mn-ea"/>
+                <a:cs typeface="+mn-cs"/>
+              </a:defRPr>
+            </a:lvl2pPr>
+            <a:lvl3pPr marL="1143000" indent="-228600" algn="l" defTabSz="914400" rtl="0" eaLnBrk="1" latinLnBrk="0" hangingPunct="1">
+              <a:lnSpc>
+                <a:spcPct val="90000"/>
+              </a:lnSpc>
+              <a:spcBef>
+                <a:spcPts val="500"/>
+              </a:spcBef>
+              <a:buFont typeface="Arial" panose="020B0604020202020204" pitchFamily="34" charset="0"/>
+              <a:buChar char="•"/>
+              <a:defRPr sz="2000" kern="1200">
+                <a:solidFill>
+                  <a:schemeClr val="tx1"/>
+                </a:solidFill>
+                <a:latin typeface="+mn-lt"/>
+                <a:ea typeface="+mn-ea"/>
+                <a:cs typeface="+mn-cs"/>
+              </a:defRPr>
+            </a:lvl3pPr>
+            <a:lvl4pPr marL="1600200" indent="-228600" algn="l" defTabSz="914400" rtl="0" eaLnBrk="1" latinLnBrk="0" hangingPunct="1">
+              <a:lnSpc>
+                <a:spcPct val="90000"/>
+              </a:lnSpc>
+              <a:spcBef>
+                <a:spcPts val="500"/>
+              </a:spcBef>
+              <a:buFont typeface="Arial" panose="020B0604020202020204" pitchFamily="34" charset="0"/>
+              <a:buChar char="•"/>
+              <a:defRPr sz="1800" kern="1200">
+                <a:solidFill>
+                  <a:schemeClr val="tx1"/>
+                </a:solidFill>
+                <a:latin typeface="+mn-lt"/>
+                <a:ea typeface="+mn-ea"/>
+                <a:cs typeface="+mn-cs"/>
+              </a:defRPr>
+            </a:lvl4pPr>
+            <a:lvl5pPr marL="2057400" indent="-228600" algn="l" defTabSz="914400" rtl="0" eaLnBrk="1" latinLnBrk="0" hangingPunct="1">
+              <a:lnSpc>
+                <a:spcPct val="90000"/>
+              </a:lnSpc>
+              <a:spcBef>
+                <a:spcPts val="500"/>
+              </a:spcBef>
+              <a:buFont typeface="Arial" panose="020B0604020202020204" pitchFamily="34" charset="0"/>
+              <a:buChar char="•"/>
+              <a:defRPr sz="1800" kern="1200">
+                <a:solidFill>
+                  <a:schemeClr val="tx1"/>
+                </a:solidFill>
+                <a:latin typeface="+mn-lt"/>
+                <a:ea typeface="+mn-ea"/>
+                <a:cs typeface="+mn-cs"/>
+              </a:defRPr>
+            </a:lvl5pPr>
+            <a:lvl6pPr marL="2514600" indent="-228600" algn="l" defTabSz="914400" rtl="0" eaLnBrk="1" latinLnBrk="0" hangingPunct="1">
+              <a:lnSpc>
+                <a:spcPct val="90000"/>
+              </a:lnSpc>
+              <a:spcBef>
+                <a:spcPts val="500"/>
+              </a:spcBef>
+              <a:buFont typeface="Arial" panose="020B0604020202020204" pitchFamily="34" charset="0"/>
+              <a:buChar char="•"/>
+              <a:defRPr sz="1800" kern="1200">
+                <a:solidFill>
+                  <a:schemeClr val="tx1"/>
+                </a:solidFill>
+                <a:latin typeface="+mn-lt"/>
+                <a:ea typeface="+mn-ea"/>
+                <a:cs typeface="+mn-cs"/>
+              </a:defRPr>
+            </a:lvl6pPr>
+            <a:lvl7pPr marL="2971800" indent="-228600" algn="l" defTabSz="914400" rtl="0" eaLnBrk="1" latinLnBrk="0" hangingPunct="1">
+              <a:lnSpc>
+                <a:spcPct val="90000"/>
+              </a:lnSpc>
+              <a:spcBef>
+                <a:spcPts val="500"/>
+              </a:spcBef>
+              <a:buFont typeface="Arial" panose="020B0604020202020204" pitchFamily="34" charset="0"/>
+              <a:buChar char="•"/>
+              <a:defRPr sz="1800" kern="1200">
+                <a:solidFill>
+                  <a:schemeClr val="tx1"/>
+                </a:solidFill>
+                <a:latin typeface="+mn-lt"/>
+                <a:ea typeface="+mn-ea"/>
+                <a:cs typeface="+mn-cs"/>
+              </a:defRPr>
+            </a:lvl7pPr>
+            <a:lvl8pPr marL="3429000" indent="-228600" algn="l" defTabSz="914400" rtl="0" eaLnBrk="1" latinLnBrk="0" hangingPunct="1">
+              <a:lnSpc>
+                <a:spcPct val="90000"/>
+              </a:lnSpc>
+              <a:spcBef>
+                <a:spcPts val="500"/>
+              </a:spcBef>
+              <a:buFont typeface="Arial" panose="020B0604020202020204" pitchFamily="34" charset="0"/>
+              <a:buChar char="•"/>
+              <a:defRPr sz="1800" kern="1200">
+                <a:solidFill>
+                  <a:schemeClr val="tx1"/>
+                </a:solidFill>
+                <a:latin typeface="+mn-lt"/>
+                <a:ea typeface="+mn-ea"/>
+                <a:cs typeface="+mn-cs"/>
+              </a:defRPr>
+            </a:lvl8pPr>
+            <a:lvl9pPr marL="3886200" indent="-228600" algn="l" defTabSz="914400" rtl="0" eaLnBrk="1" latinLnBrk="0" hangingPunct="1">
+              <a:lnSpc>
+                <a:spcPct val="90000"/>
+              </a:lnSpc>
+              <a:spcBef>
+                <a:spcPts val="500"/>
+              </a:spcBef>
+              <a:buFont typeface="Arial" panose="020B0604020202020204" pitchFamily="34" charset="0"/>
+              <a:buChar char="•"/>
+              <a:defRPr sz="1800" kern="1200">
+                <a:solidFill>
+                  <a:schemeClr val="tx1"/>
+                </a:solidFill>
+                <a:latin typeface="+mn-lt"/>
+                <a:ea typeface="+mn-ea"/>
+                <a:cs typeface="+mn-cs"/>
+              </a:defRPr>
+            </a:lvl9pPr>
+          </a:lstStyle>
+          <a:p>
+            <a:pPr>
+              <a:lnSpc>
+                <a:spcPct val="100000"/>
+              </a:lnSpc>
+            </a:pPr>
+            <a:r>
+              <a:rPr lang="hu-HU" b="1" dirty="0" err="1" smtClean="0">
+                <a:solidFill>
+                  <a:schemeClr val="bg1"/>
+                </a:solidFill>
+              </a:rPr>
+              <a:t>Mobiltelenok</a:t>
+            </a:r>
+            <a:r>
+              <a:rPr lang="hu-HU" b="1" dirty="0" smtClean="0">
+                <a:solidFill>
+                  <a:schemeClr val="bg1"/>
+                </a:solidFill>
+              </a:rPr>
+              <a:t>/</a:t>
+            </a:r>
+            <a:r>
+              <a:rPr lang="hu-HU" b="1" dirty="0" err="1" smtClean="0">
+                <a:solidFill>
+                  <a:schemeClr val="bg1"/>
+                </a:solidFill>
+              </a:rPr>
+              <a:t>tabletek</a:t>
+            </a:r>
+            <a:r>
+              <a:rPr lang="hu-HU" b="1" dirty="0" smtClean="0">
+                <a:solidFill>
+                  <a:schemeClr val="bg1"/>
+                </a:solidFill>
+              </a:rPr>
+              <a:t>:</a:t>
+            </a:r>
+          </a:p>
+          <a:p>
+            <a:pPr lvl="1">
+              <a:lnSpc>
+                <a:spcPct val="100000"/>
+              </a:lnSpc>
+            </a:pPr>
+            <a:r>
+              <a:rPr lang="hu-HU" b="1" dirty="0" err="1" smtClean="0">
+                <a:solidFill>
+                  <a:schemeClr val="bg1"/>
+                </a:solidFill>
+              </a:rPr>
+              <a:t>Snapdragon</a:t>
+            </a:r>
+            <a:endParaRPr lang="hu-HU" b="1" dirty="0" smtClean="0">
+              <a:solidFill>
+                <a:schemeClr val="bg1"/>
+              </a:solidFill>
+            </a:endParaRPr>
+          </a:p>
+          <a:p>
+            <a:pPr lvl="1">
+              <a:lnSpc>
+                <a:spcPct val="100000"/>
+              </a:lnSpc>
+            </a:pPr>
+            <a:r>
+              <a:rPr lang="hu-HU" b="1" dirty="0" smtClean="0">
+                <a:solidFill>
+                  <a:schemeClr val="bg1"/>
+                </a:solidFill>
+              </a:rPr>
+              <a:t>Apple (Apple A)</a:t>
+            </a:r>
+            <a:endParaRPr lang="hu-HU" b="1" dirty="0" smtClean="0">
+              <a:solidFill>
+                <a:schemeClr val="bg1"/>
+              </a:solidFill>
+            </a:endParaRPr>
+          </a:p>
+        </p:txBody>
+      </p:sp>
+      <p:pic>
+        <p:nvPicPr>
+          <p:cNvPr id="6" name="Kép 5"/>
+          <p:cNvPicPr>
+            <a:picLocks noChangeAspect="1"/>
+          </p:cNvPicPr>
+          <p:nvPr/>
+        </p:nvPicPr>
+        <p:blipFill>
+          <a:blip r:embed="rId2">
+            <a:extLst>
+              <a:ext uri="{28A0092B-C50C-407E-A947-70E740481C1C}">
+                <a14:useLocalDpi xmlns:a14="http://schemas.microsoft.com/office/drawing/2010/main" val="0"/>
+              </a:ext>
+            </a:extLst>
+          </a:blip>
+          <a:stretch>
+            <a:fillRect/>
+          </a:stretch>
+        </p:blipFill>
+        <p:spPr>
+          <a:xfrm>
+            <a:off x="6415203" y="1496852"/>
+            <a:ext cx="3098646" cy="2057501"/>
+          </a:xfrm>
+          <a:prstGeom prst="rect">
+            <a:avLst/>
+          </a:prstGeom>
+        </p:spPr>
+      </p:pic>
+      <p:pic>
+        <p:nvPicPr>
+          <p:cNvPr id="9" name="Kép 8"/>
+          <p:cNvPicPr>
+            <a:picLocks noChangeAspect="1"/>
+          </p:cNvPicPr>
+          <p:nvPr/>
+        </p:nvPicPr>
+        <p:blipFill>
+          <a:blip r:embed="rId3">
+            <a:extLst>
+              <a:ext uri="{28A0092B-C50C-407E-A947-70E740481C1C}">
+                <a14:useLocalDpi xmlns:a14="http://schemas.microsoft.com/office/drawing/2010/main" val="0"/>
+              </a:ext>
+            </a:extLst>
+          </a:blip>
+          <a:stretch>
+            <a:fillRect/>
+          </a:stretch>
+        </p:blipFill>
+        <p:spPr>
+          <a:xfrm>
+            <a:off x="5291254" y="5053693"/>
+            <a:ext cx="1609491" cy="1749447"/>
+          </a:xfrm>
+          <a:prstGeom prst="rect">
+            <a:avLst/>
+          </a:prstGeom>
+        </p:spPr>
+      </p:pic>
+      <p:pic>
+        <p:nvPicPr>
+          <p:cNvPr id="10" name="Kép 9"/>
+          <p:cNvPicPr>
+            <a:picLocks noChangeAspect="1"/>
+          </p:cNvPicPr>
+          <p:nvPr/>
+        </p:nvPicPr>
+        <p:blipFill>
+          <a:blip r:embed="rId4" cstate="print">
+            <a:extLst>
+              <a:ext uri="{28A0092B-C50C-407E-A947-70E740481C1C}">
+                <a14:useLocalDpi xmlns:a14="http://schemas.microsoft.com/office/drawing/2010/main" val="0"/>
+              </a:ext>
+            </a:extLst>
+          </a:blip>
+          <a:stretch>
+            <a:fillRect/>
+          </a:stretch>
+        </p:blipFill>
+        <p:spPr>
+          <a:xfrm>
+            <a:off x="8347616" y="4767967"/>
+            <a:ext cx="1524464" cy="1810528"/>
+          </a:xfrm>
+          <a:prstGeom prst="rect">
+            <a:avLst/>
+          </a:prstGeom>
+        </p:spPr>
+      </p:pic>
+      <p:pic>
+        <p:nvPicPr>
+          <p:cNvPr id="11" name="Kép 10"/>
+          <p:cNvPicPr>
+            <a:picLocks noChangeAspect="1"/>
+          </p:cNvPicPr>
+          <p:nvPr/>
+        </p:nvPicPr>
+        <p:blipFill>
+          <a:blip r:embed="rId5">
+            <a:extLst>
+              <a:ext uri="{28A0092B-C50C-407E-A947-70E740481C1C}">
+                <a14:useLocalDpi xmlns:a14="http://schemas.microsoft.com/office/drawing/2010/main" val="0"/>
+              </a:ext>
+            </a:extLst>
+          </a:blip>
+          <a:stretch>
+            <a:fillRect/>
+          </a:stretch>
+        </p:blipFill>
+        <p:spPr>
+          <a:xfrm>
+            <a:off x="1729925" y="2948400"/>
+            <a:ext cx="4545145" cy="1752481"/>
+          </a:xfrm>
+          <a:prstGeom prst="rect">
+            <a:avLst/>
+          </a:prstGeom>
+        </p:spPr>
+      </p:pic>
+    </p:spTree>
+    <p:extLst>
+      <p:ext uri="{BB962C8B-B14F-4D97-AF65-F5344CB8AC3E}">
+        <p14:creationId xmlns:p14="http://schemas.microsoft.com/office/powerpoint/2010/main" val="1230725337"/>
+      </p:ext>
+    </p:extLst>
+  </p:cSld>
+  <p:clrMapOvr>
+    <a:masterClrMapping/>
+  </p:clrMapOvr>
+  <mc:AlternateContent xmlns:mc="http://schemas.openxmlformats.org/markup-compatibility/2006" xmlns:p14="http://schemas.microsoft.com/office/powerpoint/2010/main">
+    <mc:Choice Requires="p14">
+      <p:transition spd="slow" p14:dur="3400">
+        <p14:reveal/>
+      </p:transition>
+    </mc:Choice>
+    <mc:Fallback xmlns="">
+      <p:transition spd="slow">
+        <p:fade/>
+      </p:transition>
+    </mc:Fallback>
+  </mc:AlternateContent>
+  <p:timing>
+    <p:tnLst>
+      <p:par>
+        <p:cTn id="1" dur="indefinite" restart="never" nodeType="tmRoot">
+          <p:childTnLst>
+            <p:seq concurrent="1" nextAc="seek">
+              <p:cTn id="2" dur="indefinite" nodeType="mainSeq">
+                <p:childTnLst>
+                  <p:par>
+                    <p:cTn id="3" fill="hold">
+                      <p:stCondLst>
+                        <p:cond delay="indefinite"/>
+                        <p:cond evt="onBegin" delay="0">
+                          <p:tn val="2"/>
+                        </p:cond>
+                      </p:stCondLst>
+                      <p:childTnLst>
+                        <p:par>
+                          <p:cTn id="4" fill="hold">
+                            <p:stCondLst>
+                              <p:cond delay="0"/>
+                            </p:stCondLst>
+                            <p:childTnLst>
+                              <p:par>
+                                <p:cTn id="5" presetID="42" presetClass="entr" presetSubtype="0" fill="hold" nodeType="afterEffect">
+                                  <p:stCondLst>
+                                    <p:cond delay="0"/>
+                                  </p:stCondLst>
+                                  <p:childTnLst>
+                                    <p:set>
+                                      <p:cBhvr>
+                                        <p:cTn id="6" dur="1" fill="hold">
+                                          <p:stCondLst>
+                                            <p:cond delay="0"/>
+                                          </p:stCondLst>
+                                        </p:cTn>
+                                        <p:tgtEl>
+                                          <p:spTgt spid="3">
+                                            <p:txEl>
+                                              <p:pRg st="0" end="0"/>
+                                            </p:txEl>
+                                          </p:spTgt>
+                                        </p:tgtEl>
+                                        <p:attrNameLst>
+                                          <p:attrName>style.visibility</p:attrName>
+                                        </p:attrNameLst>
+                                      </p:cBhvr>
+                                      <p:to>
+                                        <p:strVal val="visible"/>
+                                      </p:to>
+                                    </p:set>
+                                    <p:animEffect transition="in" filter="fade">
+                                      <p:cBhvr>
+                                        <p:cTn id="7" dur="1000"/>
+                                        <p:tgtEl>
+                                          <p:spTgt spid="3">
+                                            <p:txEl>
+                                              <p:pRg st="0" end="0"/>
+                                            </p:txEl>
+                                          </p:spTgt>
+                                        </p:tgtEl>
+                                      </p:cBhvr>
+                                    </p:animEffect>
+                                    <p:anim calcmode="lin" valueType="num">
+                                      <p:cBhvr>
+                                        <p:cTn id="8" dur="1000" fill="hold"/>
+                                        <p:tgtEl>
+                                          <p:spTgt spid="3">
+                                            <p:txEl>
+                                              <p:pRg st="0" end="0"/>
+                                            </p:txEl>
+                                          </p:spTgt>
+                                        </p:tgtEl>
+                                        <p:attrNameLst>
+                                          <p:attrName>ppt_x</p:attrName>
+                                        </p:attrNameLst>
+                                      </p:cBhvr>
+                                      <p:tavLst>
+                                        <p:tav tm="0">
+                                          <p:val>
+                                            <p:strVal val="#ppt_x"/>
+                                          </p:val>
+                                        </p:tav>
+                                        <p:tav tm="100000">
+                                          <p:val>
+                                            <p:strVal val="#ppt_x"/>
+                                          </p:val>
+                                        </p:tav>
+                                      </p:tavLst>
+                                    </p:anim>
+                                    <p:anim calcmode="lin" valueType="num">
+                                      <p:cBhvr>
+                                        <p:cTn id="9" dur="1000" fill="hold"/>
+                                        <p:tgtEl>
+                                          <p:spTgt spid="3">
+                                            <p:txEl>
+                                              <p:pRg st="0" end="0"/>
+                                            </p:txEl>
+                                          </p:spTgt>
+                                        </p:tgtEl>
+                                        <p:attrNameLst>
+                                          <p:attrName>ppt_y</p:attrName>
+                                        </p:attrNameLst>
+                                      </p:cBhvr>
+                                      <p:tavLst>
+                                        <p:tav tm="0">
+                                          <p:val>
+                                            <p:strVal val="#ppt_y+.1"/>
+                                          </p:val>
+                                        </p:tav>
+                                        <p:tav tm="100000">
+                                          <p:val>
+                                            <p:strVal val="#ppt_y"/>
+                                          </p:val>
+                                        </p:tav>
+                                      </p:tavLst>
+                                    </p:anim>
+                                  </p:childTnLst>
+                                </p:cTn>
+                              </p:par>
+                            </p:childTnLst>
+                          </p:cTn>
+                        </p:par>
+                        <p:par>
+                          <p:cTn id="10" fill="hold">
+                            <p:stCondLst>
+                              <p:cond delay="1000"/>
+                            </p:stCondLst>
+                            <p:childTnLst>
+                              <p:par>
+                                <p:cTn id="11" presetID="42" presetClass="entr" presetSubtype="0" fill="hold" nodeType="afterEffect">
+                                  <p:stCondLst>
+                                    <p:cond delay="0"/>
+                                  </p:stCondLst>
+                                  <p:childTnLst>
+                                    <p:set>
+                                      <p:cBhvr>
+                                        <p:cTn id="12" dur="1" fill="hold">
+                                          <p:stCondLst>
+                                            <p:cond delay="0"/>
+                                          </p:stCondLst>
+                                        </p:cTn>
+                                        <p:tgtEl>
+                                          <p:spTgt spid="3">
+                                            <p:txEl>
+                                              <p:pRg st="1" end="1"/>
+                                            </p:txEl>
+                                          </p:spTgt>
+                                        </p:tgtEl>
+                                        <p:attrNameLst>
+                                          <p:attrName>style.visibility</p:attrName>
+                                        </p:attrNameLst>
+                                      </p:cBhvr>
+                                      <p:to>
+                                        <p:strVal val="visible"/>
+                                      </p:to>
+                                    </p:set>
+                                    <p:animEffect transition="in" filter="fade">
+                                      <p:cBhvr>
+                                        <p:cTn id="13" dur="1000"/>
+                                        <p:tgtEl>
+                                          <p:spTgt spid="3">
+                                            <p:txEl>
+                                              <p:pRg st="1" end="1"/>
+                                            </p:txEl>
+                                          </p:spTgt>
+                                        </p:tgtEl>
+                                      </p:cBhvr>
+                                    </p:animEffect>
+                                    <p:anim calcmode="lin" valueType="num">
+                                      <p:cBhvr>
+                                        <p:cTn id="14" dur="1000" fill="hold"/>
+                                        <p:tgtEl>
+                                          <p:spTgt spid="3">
+                                            <p:txEl>
+                                              <p:pRg st="1" end="1"/>
+                                            </p:txEl>
+                                          </p:spTgt>
+                                        </p:tgtEl>
+                                        <p:attrNameLst>
+                                          <p:attrName>ppt_x</p:attrName>
+                                        </p:attrNameLst>
+                                      </p:cBhvr>
+                                      <p:tavLst>
+                                        <p:tav tm="0">
+                                          <p:val>
+                                            <p:strVal val="#ppt_x"/>
+                                          </p:val>
+                                        </p:tav>
+                                        <p:tav tm="100000">
+                                          <p:val>
+                                            <p:strVal val="#ppt_x"/>
+                                          </p:val>
+                                        </p:tav>
+                                      </p:tavLst>
+                                    </p:anim>
+                                    <p:anim calcmode="lin" valueType="num">
+                                      <p:cBhvr>
+                                        <p:cTn id="15" dur="1000" fill="hold"/>
+                                        <p:tgtEl>
+                                          <p:spTgt spid="3">
+                                            <p:txEl>
+                                              <p:pRg st="1" end="1"/>
+                                            </p:txEl>
+                                          </p:spTgt>
+                                        </p:tgtEl>
+                                        <p:attrNameLst>
+                                          <p:attrName>ppt_y</p:attrName>
+                                        </p:attrNameLst>
+                                      </p:cBhvr>
+                                      <p:tavLst>
+                                        <p:tav tm="0">
+                                          <p:val>
+                                            <p:strVal val="#ppt_y+.1"/>
+                                          </p:val>
+                                        </p:tav>
+                                        <p:tav tm="100000">
+                                          <p:val>
+                                            <p:strVal val="#ppt_y"/>
+                                          </p:val>
+                                        </p:tav>
+                                      </p:tavLst>
+                                    </p:anim>
+                                  </p:childTnLst>
+                                </p:cTn>
+                              </p:par>
+                            </p:childTnLst>
+                          </p:cTn>
+                        </p:par>
+                        <p:par>
+                          <p:cTn id="16" fill="hold">
+                            <p:stCondLst>
+                              <p:cond delay="2000"/>
+                            </p:stCondLst>
+                            <p:childTnLst>
+                              <p:par>
+                                <p:cTn id="17" presetID="42" presetClass="entr" presetSubtype="0" fill="hold" nodeType="afterEffect">
+                                  <p:stCondLst>
+                                    <p:cond delay="0"/>
+                                  </p:stCondLst>
+                                  <p:childTnLst>
+                                    <p:set>
+                                      <p:cBhvr>
+                                        <p:cTn id="18" dur="1" fill="hold">
+                                          <p:stCondLst>
+                                            <p:cond delay="0"/>
+                                          </p:stCondLst>
+                                        </p:cTn>
+                                        <p:tgtEl>
+                                          <p:spTgt spid="3">
+                                            <p:txEl>
+                                              <p:pRg st="2" end="2"/>
+                                            </p:txEl>
+                                          </p:spTgt>
+                                        </p:tgtEl>
+                                        <p:attrNameLst>
+                                          <p:attrName>style.visibility</p:attrName>
+                                        </p:attrNameLst>
+                                      </p:cBhvr>
+                                      <p:to>
+                                        <p:strVal val="visible"/>
+                                      </p:to>
+                                    </p:set>
+                                    <p:animEffect transition="in" filter="fade">
+                                      <p:cBhvr>
+                                        <p:cTn id="19" dur="1000"/>
+                                        <p:tgtEl>
+                                          <p:spTgt spid="3">
+                                            <p:txEl>
+                                              <p:pRg st="2" end="2"/>
+                                            </p:txEl>
+                                          </p:spTgt>
+                                        </p:tgtEl>
+                                      </p:cBhvr>
+                                    </p:animEffect>
+                                    <p:anim calcmode="lin" valueType="num">
+                                      <p:cBhvr>
+                                        <p:cTn id="20" dur="1000" fill="hold"/>
+                                        <p:tgtEl>
+                                          <p:spTgt spid="3">
+                                            <p:txEl>
+                                              <p:pRg st="2" end="2"/>
+                                            </p:txEl>
+                                          </p:spTgt>
+                                        </p:tgtEl>
+                                        <p:attrNameLst>
+                                          <p:attrName>ppt_x</p:attrName>
+                                        </p:attrNameLst>
+                                      </p:cBhvr>
+                                      <p:tavLst>
+                                        <p:tav tm="0">
+                                          <p:val>
+                                            <p:strVal val="#ppt_x"/>
+                                          </p:val>
+                                        </p:tav>
+                                        <p:tav tm="100000">
+                                          <p:val>
+                                            <p:strVal val="#ppt_x"/>
+                                          </p:val>
+                                        </p:tav>
+                                      </p:tavLst>
+                                    </p:anim>
+                                    <p:anim calcmode="lin" valueType="num">
+                                      <p:cBhvr>
+                                        <p:cTn id="21" dur="1000" fill="hold"/>
+                                        <p:tgtEl>
+                                          <p:spTgt spid="3">
+                                            <p:txEl>
+                                              <p:pRg st="2" end="2"/>
+                                            </p:txEl>
+                                          </p:spTgt>
+                                        </p:tgtEl>
+                                        <p:attrNameLst>
+                                          <p:attrName>ppt_y</p:attrName>
+                                        </p:attrNameLst>
+                                      </p:cBhvr>
+                                      <p:tavLst>
+                                        <p:tav tm="0">
+                                          <p:val>
+                                            <p:strVal val="#ppt_y+.1"/>
+                                          </p:val>
+                                        </p:tav>
+                                        <p:tav tm="100000">
+                                          <p:val>
+                                            <p:strVal val="#ppt_y"/>
+                                          </p:val>
+                                        </p:tav>
+                                      </p:tavLst>
+                                    </p:anim>
+                                  </p:childTnLst>
+                                </p:cTn>
+                              </p:par>
+                            </p:childTnLst>
+                          </p:cTn>
+                        </p:par>
+                        <p:par>
+                          <p:cTn id="22" fill="hold">
+                            <p:stCondLst>
+                              <p:cond delay="3000"/>
+                            </p:stCondLst>
+                            <p:childTnLst>
+                              <p:par>
+                                <p:cTn id="23" presetID="42" presetClass="entr" presetSubtype="0" fill="hold" nodeType="afterEffect">
+                                  <p:stCondLst>
+                                    <p:cond delay="0"/>
+                                  </p:stCondLst>
+                                  <p:childTnLst>
+                                    <p:set>
+                                      <p:cBhvr>
+                                        <p:cTn id="24" dur="1" fill="hold">
+                                          <p:stCondLst>
+                                            <p:cond delay="0"/>
+                                          </p:stCondLst>
+                                        </p:cTn>
+                                        <p:tgtEl>
+                                          <p:spTgt spid="4">
+                                            <p:txEl>
+                                              <p:pRg st="0" end="0"/>
+                                            </p:txEl>
+                                          </p:spTgt>
+                                        </p:tgtEl>
+                                        <p:attrNameLst>
+                                          <p:attrName>style.visibility</p:attrName>
+                                        </p:attrNameLst>
+                                      </p:cBhvr>
+                                      <p:to>
+                                        <p:strVal val="visible"/>
+                                      </p:to>
+                                    </p:set>
+                                    <p:animEffect transition="in" filter="fade">
+                                      <p:cBhvr>
+                                        <p:cTn id="25" dur="1000"/>
+                                        <p:tgtEl>
+                                          <p:spTgt spid="4">
+                                            <p:txEl>
+                                              <p:pRg st="0" end="0"/>
+                                            </p:txEl>
+                                          </p:spTgt>
+                                        </p:tgtEl>
+                                      </p:cBhvr>
+                                    </p:animEffect>
+                                    <p:anim calcmode="lin" valueType="num">
+                                      <p:cBhvr>
+                                        <p:cTn id="26" dur="1000" fill="hold"/>
+                                        <p:tgtEl>
+                                          <p:spTgt spid="4">
+                                            <p:txEl>
+                                              <p:pRg st="0" end="0"/>
+                                            </p:txEl>
+                                          </p:spTgt>
+                                        </p:tgtEl>
+                                        <p:attrNameLst>
+                                          <p:attrName>ppt_x</p:attrName>
+                                        </p:attrNameLst>
+                                      </p:cBhvr>
+                                      <p:tavLst>
+                                        <p:tav tm="0">
+                                          <p:val>
+                                            <p:strVal val="#ppt_x"/>
+                                          </p:val>
+                                        </p:tav>
+                                        <p:tav tm="100000">
+                                          <p:val>
+                                            <p:strVal val="#ppt_x"/>
+                                          </p:val>
+                                        </p:tav>
+                                      </p:tavLst>
+                                    </p:anim>
+                                    <p:anim calcmode="lin" valueType="num">
+                                      <p:cBhvr>
+                                        <p:cTn id="27" dur="1000" fill="hold"/>
+                                        <p:tgtEl>
+                                          <p:spTgt spid="4">
+                                            <p:txEl>
+                                              <p:pRg st="0" end="0"/>
+                                            </p:txEl>
+                                          </p:spTgt>
+                                        </p:tgtEl>
+                                        <p:attrNameLst>
+                                          <p:attrName>ppt_y</p:attrName>
+                                        </p:attrNameLst>
+                                      </p:cBhvr>
+                                      <p:tavLst>
+                                        <p:tav tm="0">
+                                          <p:val>
+                                            <p:strVal val="#ppt_y+.1"/>
+                                          </p:val>
+                                        </p:tav>
+                                        <p:tav tm="100000">
+                                          <p:val>
+                                            <p:strVal val="#ppt_y"/>
+                                          </p:val>
+                                        </p:tav>
+                                      </p:tavLst>
+                                    </p:anim>
+                                  </p:childTnLst>
+                                </p:cTn>
+                              </p:par>
+                            </p:childTnLst>
+                          </p:cTn>
+                        </p:par>
+                        <p:par>
+                          <p:cTn id="28" fill="hold">
+                            <p:stCondLst>
+                              <p:cond delay="4000"/>
+                            </p:stCondLst>
+                            <p:childTnLst>
+                              <p:par>
+                                <p:cTn id="29" presetID="42" presetClass="entr" presetSubtype="0" fill="hold" nodeType="afterEffect">
+                                  <p:stCondLst>
+                                    <p:cond delay="0"/>
+                                  </p:stCondLst>
+                                  <p:childTnLst>
+                                    <p:set>
+                                      <p:cBhvr>
+                                        <p:cTn id="30" dur="1" fill="hold">
+                                          <p:stCondLst>
+                                            <p:cond delay="0"/>
+                                          </p:stCondLst>
+                                        </p:cTn>
+                                        <p:tgtEl>
+                                          <p:spTgt spid="4">
+                                            <p:txEl>
+                                              <p:pRg st="1" end="1"/>
+                                            </p:txEl>
+                                          </p:spTgt>
+                                        </p:tgtEl>
+                                        <p:attrNameLst>
+                                          <p:attrName>style.visibility</p:attrName>
+                                        </p:attrNameLst>
+                                      </p:cBhvr>
+                                      <p:to>
+                                        <p:strVal val="visible"/>
+                                      </p:to>
+                                    </p:set>
+                                    <p:animEffect transition="in" filter="fade">
+                                      <p:cBhvr>
+                                        <p:cTn id="31" dur="1000"/>
+                                        <p:tgtEl>
+                                          <p:spTgt spid="4">
+                                            <p:txEl>
+                                              <p:pRg st="1" end="1"/>
+                                            </p:txEl>
+                                          </p:spTgt>
+                                        </p:tgtEl>
+                                      </p:cBhvr>
+                                    </p:animEffect>
+                                    <p:anim calcmode="lin" valueType="num">
+                                      <p:cBhvr>
+                                        <p:cTn id="32" dur="1000" fill="hold"/>
+                                        <p:tgtEl>
+                                          <p:spTgt spid="4">
+                                            <p:txEl>
+                                              <p:pRg st="1" end="1"/>
+                                            </p:txEl>
+                                          </p:spTgt>
+                                        </p:tgtEl>
+                                        <p:attrNameLst>
+                                          <p:attrName>ppt_x</p:attrName>
+                                        </p:attrNameLst>
+                                      </p:cBhvr>
+                                      <p:tavLst>
+                                        <p:tav tm="0">
+                                          <p:val>
+                                            <p:strVal val="#ppt_x"/>
+                                          </p:val>
+                                        </p:tav>
+                                        <p:tav tm="100000">
+                                          <p:val>
+                                            <p:strVal val="#ppt_x"/>
+                                          </p:val>
+                                        </p:tav>
+                                      </p:tavLst>
+                                    </p:anim>
+                                    <p:anim calcmode="lin" valueType="num">
+                                      <p:cBhvr>
+                                        <p:cTn id="33" dur="1000" fill="hold"/>
+                                        <p:tgtEl>
+                                          <p:spTgt spid="4">
+                                            <p:txEl>
+                                              <p:pRg st="1" end="1"/>
+                                            </p:txEl>
+                                          </p:spTgt>
+                                        </p:tgtEl>
+                                        <p:attrNameLst>
+                                          <p:attrName>ppt_y</p:attrName>
+                                        </p:attrNameLst>
+                                      </p:cBhvr>
+                                      <p:tavLst>
+                                        <p:tav tm="0">
+                                          <p:val>
+                                            <p:strVal val="#ppt_y+.1"/>
+                                          </p:val>
+                                        </p:tav>
+                                        <p:tav tm="100000">
+                                          <p:val>
+                                            <p:strVal val="#ppt_y"/>
+                                          </p:val>
+                                        </p:tav>
+                                      </p:tavLst>
+                                    </p:anim>
+                                  </p:childTnLst>
+                                </p:cTn>
+                              </p:par>
+                            </p:childTnLst>
+                          </p:cTn>
+                        </p:par>
+                        <p:par>
+                          <p:cTn id="34" fill="hold">
+                            <p:stCondLst>
+                              <p:cond delay="5000"/>
+                            </p:stCondLst>
+                            <p:childTnLst>
+                              <p:par>
+                                <p:cTn id="35" presetID="42" presetClass="entr" presetSubtype="0" fill="hold" nodeType="afterEffect">
+                                  <p:stCondLst>
+                                    <p:cond delay="0"/>
+                                  </p:stCondLst>
+                                  <p:childTnLst>
+                                    <p:set>
+                                      <p:cBhvr>
+                                        <p:cTn id="36" dur="1" fill="hold">
+                                          <p:stCondLst>
+                                            <p:cond delay="0"/>
+                                          </p:stCondLst>
+                                        </p:cTn>
+                                        <p:tgtEl>
+                                          <p:spTgt spid="4">
+                                            <p:txEl>
+                                              <p:pRg st="2" end="2"/>
+                                            </p:txEl>
+                                          </p:spTgt>
+                                        </p:tgtEl>
+                                        <p:attrNameLst>
+                                          <p:attrName>style.visibility</p:attrName>
+                                        </p:attrNameLst>
+                                      </p:cBhvr>
+                                      <p:to>
+                                        <p:strVal val="visible"/>
+                                      </p:to>
+                                    </p:set>
+                                    <p:animEffect transition="in" filter="fade">
+                                      <p:cBhvr>
+                                        <p:cTn id="37" dur="1000"/>
+                                        <p:tgtEl>
+                                          <p:spTgt spid="4">
+                                            <p:txEl>
+                                              <p:pRg st="2" end="2"/>
+                                            </p:txEl>
+                                          </p:spTgt>
+                                        </p:tgtEl>
+                                      </p:cBhvr>
+                                    </p:animEffect>
+                                    <p:anim calcmode="lin" valueType="num">
+                                      <p:cBhvr>
+                                        <p:cTn id="38" dur="1000" fill="hold"/>
+                                        <p:tgtEl>
+                                          <p:spTgt spid="4">
+                                            <p:txEl>
+                                              <p:pRg st="2" end="2"/>
+                                            </p:txEl>
+                                          </p:spTgt>
+                                        </p:tgtEl>
+                                        <p:attrNameLst>
+                                          <p:attrName>ppt_x</p:attrName>
+                                        </p:attrNameLst>
+                                      </p:cBhvr>
+                                      <p:tavLst>
+                                        <p:tav tm="0">
+                                          <p:val>
+                                            <p:strVal val="#ppt_x"/>
+                                          </p:val>
+                                        </p:tav>
+                                        <p:tav tm="100000">
+                                          <p:val>
+                                            <p:strVal val="#ppt_x"/>
+                                          </p:val>
+                                        </p:tav>
+                                      </p:tavLst>
+                                    </p:anim>
+                                    <p:anim calcmode="lin" valueType="num">
+                                      <p:cBhvr>
+                                        <p:cTn id="39" dur="1000" fill="hold"/>
+                                        <p:tgtEl>
+                                          <p:spTgt spid="4">
+                                            <p:txEl>
+                                              <p:pRg st="2" end="2"/>
+                                            </p:txEl>
+                                          </p:spTgt>
+                                        </p:tgtEl>
+                                        <p:attrNameLst>
+                                          <p:attrName>ppt_y</p:attrName>
+                                        </p:attrNameLst>
+                                      </p:cBhvr>
+                                      <p:tavLst>
+                                        <p:tav tm="0">
+                                          <p:val>
+                                            <p:strVal val="#ppt_y+.1"/>
+                                          </p:val>
+                                        </p:tav>
+                                        <p:tav tm="100000">
+                                          <p:val>
+                                            <p:strVal val="#ppt_y"/>
+                                          </p:val>
+                                        </p:tav>
+                                      </p:tavLst>
+                                    </p:anim>
+                                  </p:childTnLst>
+                                </p:cTn>
+                              </p:par>
+                            </p:childTnLst>
+                          </p:cTn>
+                        </p:par>
+                      </p:childTnLst>
+                    </p:cTn>
+                  </p:par>
+                </p:childTnLst>
+              </p:cTn>
+              <p:prevCondLst>
+                <p:cond evt="onPrev" delay="0">
+                  <p:tgtEl>
+                    <p:sldTgt/>
+                  </p:tgtEl>
+                </p:cond>
+              </p:prevCondLst>
+              <p:nextCondLst>
+                <p:cond evt="onNext" delay="0">
+                  <p:tgtEl>
+                    <p:sldTgt/>
+                  </p:tgtEl>
+                </p:cond>
+              </p:nextCondLst>
+            </p:seq>
+          </p:childTnLst>
+        </p:cTn>
+      </p:par>
+    </p:tnLst>
+  </p:timing>
+</p:sld>
+</file>
+
+<file path=ppt/slides/slide23.xml><?xml version="1.0" encoding="utf-8"?>
+<p:sld xmlns:a="http://schemas.openxmlformats.org/drawingml/2006/main" xmlns:r="http://schemas.openxmlformats.org/officeDocument/2006/relationships" xmlns:p="http://schemas.openxmlformats.org/presentationml/2006/main">
+  <p:cSld>
+    <p:spTree>
+      <p:nvGrpSpPr>
+        <p:cNvPr id="1" name=""/>
+        <p:cNvGrpSpPr/>
+        <p:nvPr/>
+      </p:nvGrpSpPr>
+      <p:grpSpPr>
+        <a:xfrm>
+          <a:off x="0" y="0"/>
+          <a:ext cx="0" cy="0"/>
+          <a:chOff x="0" y="0"/>
+          <a:chExt cx="0" cy="0"/>
+        </a:xfrm>
+      </p:grpSpPr>
+      <p:sp>
+        <p:nvSpPr>
+          <p:cNvPr id="2" name="Cím 1"/>
+          <p:cNvSpPr>
+            <a:spLocks noGrp="1"/>
+          </p:cNvSpPr>
+          <p:nvPr>
+            <p:ph type="title"/>
+          </p:nvPr>
+        </p:nvSpPr>
+        <p:spPr>
+          <a:xfrm>
+            <a:off x="838200" y="283238"/>
+            <a:ext cx="10515600" cy="1325563"/>
+          </a:xfrm>
+        </p:spPr>
+        <p:txBody>
+          <a:bodyPr/>
+          <a:lstStyle/>
+          <a:p>
+            <a:r>
+              <a:rPr lang="hu-HU" dirty="0" smtClean="0">
+                <a:solidFill>
+                  <a:schemeClr val="bg1"/>
+                </a:solidFill>
+                <a:latin typeface="Algerian" panose="04020705040A02060702" pitchFamily="82" charset="0"/>
+              </a:rPr>
+              <a:t>PROCESSZOR FOGLALATOK</a:t>
+            </a:r>
+            <a:endParaRPr lang="hu-HU" dirty="0">
+              <a:solidFill>
+                <a:schemeClr val="bg1"/>
+              </a:solidFill>
+              <a:latin typeface="Algerian" panose="04020705040A02060702" pitchFamily="82" charset="0"/>
+            </a:endParaRPr>
+          </a:p>
+        </p:txBody>
+      </p:sp>
+      <p:sp>
+        <p:nvSpPr>
+          <p:cNvPr id="3" name="Tartalom helye 2"/>
+          <p:cNvSpPr>
+            <a:spLocks noGrp="1"/>
+          </p:cNvSpPr>
+          <p:nvPr>
+            <p:ph idx="1"/>
+          </p:nvPr>
+        </p:nvSpPr>
+        <p:spPr>
+          <a:xfrm>
+            <a:off x="838200" y="1637131"/>
+            <a:ext cx="10515600" cy="1326819"/>
+          </a:xfrm>
+        </p:spPr>
+        <p:txBody>
+          <a:bodyPr>
+            <a:normAutofit lnSpcReduction="10000"/>
+          </a:bodyPr>
+          <a:lstStyle/>
+          <a:p>
+            <a:pPr>
+              <a:lnSpc>
+                <a:spcPct val="100000"/>
+              </a:lnSpc>
+            </a:pPr>
+            <a:r>
+              <a:rPr lang="hu-HU" b="1" dirty="0" smtClean="0">
+                <a:solidFill>
+                  <a:schemeClr val="bg1"/>
+                </a:solidFill>
+              </a:rPr>
+              <a:t>PC/Laptop:</a:t>
+            </a:r>
+          </a:p>
+          <a:p>
+            <a:pPr lvl="1">
+              <a:lnSpc>
+                <a:spcPct val="100000"/>
+              </a:lnSpc>
+            </a:pPr>
+            <a:r>
+              <a:rPr lang="hu-HU" b="1" dirty="0" smtClean="0">
+                <a:solidFill>
+                  <a:schemeClr val="bg1"/>
+                </a:solidFill>
+              </a:rPr>
+              <a:t>Intel (FŐ: Intel </a:t>
+            </a:r>
+            <a:r>
+              <a:rPr lang="hu-HU" b="1" dirty="0" err="1" smtClean="0">
+                <a:solidFill>
+                  <a:schemeClr val="bg1"/>
+                </a:solidFill>
+              </a:rPr>
+              <a:t>Core</a:t>
+            </a:r>
+            <a:r>
+              <a:rPr lang="hu-HU" b="1" dirty="0" smtClean="0">
+                <a:solidFill>
+                  <a:schemeClr val="bg1"/>
+                </a:solidFill>
+              </a:rPr>
+              <a:t> (i3, i5, i7, i9)</a:t>
+            </a:r>
+          </a:p>
+          <a:p>
+            <a:pPr lvl="1">
+              <a:lnSpc>
+                <a:spcPct val="100000"/>
+              </a:lnSpc>
+            </a:pPr>
+            <a:r>
+              <a:rPr lang="hu-HU" b="1" dirty="0" smtClean="0">
+                <a:solidFill>
+                  <a:schemeClr val="bg1"/>
+                </a:solidFill>
+              </a:rPr>
+              <a:t>AMD (FŐ: </a:t>
+            </a:r>
+            <a:r>
+              <a:rPr lang="hu-HU" b="1" dirty="0" err="1" smtClean="0">
+                <a:solidFill>
+                  <a:schemeClr val="bg1"/>
+                </a:solidFill>
+              </a:rPr>
+              <a:t>Ryzen</a:t>
+            </a:r>
+            <a:r>
+              <a:rPr lang="hu-HU" b="1" dirty="0" smtClean="0">
+                <a:solidFill>
+                  <a:schemeClr val="bg1"/>
+                </a:solidFill>
+              </a:rPr>
+              <a:t> (3, 5, 7, </a:t>
+            </a:r>
+            <a:r>
+              <a:rPr lang="hu-HU" b="1" dirty="0">
+                <a:solidFill>
+                  <a:schemeClr val="bg1"/>
+                </a:solidFill>
+              </a:rPr>
+              <a:t>9</a:t>
+            </a:r>
+            <a:r>
+              <a:rPr lang="hu-HU" b="1" dirty="0" smtClean="0">
+                <a:solidFill>
+                  <a:schemeClr val="bg1"/>
+                </a:solidFill>
+              </a:rPr>
+              <a:t>))</a:t>
+            </a:r>
+            <a:endParaRPr lang="hu-HU" b="1" dirty="0" smtClean="0">
+              <a:solidFill>
+                <a:schemeClr val="bg1"/>
+              </a:solidFill>
+            </a:endParaRPr>
+          </a:p>
+        </p:txBody>
+      </p:sp>
+      <p:sp>
+        <p:nvSpPr>
+          <p:cNvPr id="4" name="Tartalom helye 2"/>
+          <p:cNvSpPr txBox="1">
+            <a:spLocks/>
+          </p:cNvSpPr>
+          <p:nvPr/>
+        </p:nvSpPr>
+        <p:spPr>
+          <a:xfrm>
+            <a:off x="838200" y="4921208"/>
+            <a:ext cx="10515600" cy="1326819"/>
+          </a:xfrm>
+          <a:prstGeom prst="rect">
+            <a:avLst/>
+          </a:prstGeom>
+        </p:spPr>
+        <p:txBody>
+          <a:bodyPr vert="horz" lIns="91440" tIns="45720" rIns="91440" bIns="45720" rtlCol="0">
+            <a:normAutofit lnSpcReduction="10000"/>
+          </a:bodyPr>
+          <a:lstStyle>
+            <a:lvl1pPr marL="228600" indent="-228600" algn="l" defTabSz="914400" rtl="0" eaLnBrk="1" latinLnBrk="0" hangingPunct="1">
+              <a:lnSpc>
+                <a:spcPct val="90000"/>
+              </a:lnSpc>
+              <a:spcBef>
+                <a:spcPts val="1000"/>
+              </a:spcBef>
+              <a:buFont typeface="Arial" panose="020B0604020202020204" pitchFamily="34" charset="0"/>
+              <a:buChar char="•"/>
+              <a:defRPr sz="2800" kern="1200">
+                <a:solidFill>
+                  <a:schemeClr val="tx1"/>
+                </a:solidFill>
+                <a:latin typeface="+mn-lt"/>
+                <a:ea typeface="+mn-ea"/>
+                <a:cs typeface="+mn-cs"/>
+              </a:defRPr>
+            </a:lvl1pPr>
+            <a:lvl2pPr marL="685800" indent="-228600" algn="l" defTabSz="914400" rtl="0" eaLnBrk="1" latinLnBrk="0" hangingPunct="1">
+              <a:lnSpc>
+                <a:spcPct val="90000"/>
+              </a:lnSpc>
+              <a:spcBef>
+                <a:spcPts val="500"/>
+              </a:spcBef>
+              <a:buFont typeface="Arial" panose="020B0604020202020204" pitchFamily="34" charset="0"/>
+              <a:buChar char="•"/>
+              <a:defRPr sz="2400" kern="1200">
+                <a:solidFill>
+                  <a:schemeClr val="tx1"/>
+                </a:solidFill>
+                <a:latin typeface="+mn-lt"/>
+                <a:ea typeface="+mn-ea"/>
+                <a:cs typeface="+mn-cs"/>
+              </a:defRPr>
+            </a:lvl2pPr>
+            <a:lvl3pPr marL="1143000" indent="-228600" algn="l" defTabSz="914400" rtl="0" eaLnBrk="1" latinLnBrk="0" hangingPunct="1">
+              <a:lnSpc>
+                <a:spcPct val="90000"/>
+              </a:lnSpc>
+              <a:spcBef>
+                <a:spcPts val="500"/>
+              </a:spcBef>
+              <a:buFont typeface="Arial" panose="020B0604020202020204" pitchFamily="34" charset="0"/>
+              <a:buChar char="•"/>
+              <a:defRPr sz="2000" kern="1200">
+                <a:solidFill>
+                  <a:schemeClr val="tx1"/>
+                </a:solidFill>
+                <a:latin typeface="+mn-lt"/>
+                <a:ea typeface="+mn-ea"/>
+                <a:cs typeface="+mn-cs"/>
+              </a:defRPr>
+            </a:lvl3pPr>
+            <a:lvl4pPr marL="1600200" indent="-228600" algn="l" defTabSz="914400" rtl="0" eaLnBrk="1" latinLnBrk="0" hangingPunct="1">
+              <a:lnSpc>
+                <a:spcPct val="90000"/>
+              </a:lnSpc>
+              <a:spcBef>
+                <a:spcPts val="500"/>
+              </a:spcBef>
+              <a:buFont typeface="Arial" panose="020B0604020202020204" pitchFamily="34" charset="0"/>
+              <a:buChar char="•"/>
+              <a:defRPr sz="1800" kern="1200">
+                <a:solidFill>
+                  <a:schemeClr val="tx1"/>
+                </a:solidFill>
+                <a:latin typeface="+mn-lt"/>
+                <a:ea typeface="+mn-ea"/>
+                <a:cs typeface="+mn-cs"/>
+              </a:defRPr>
+            </a:lvl4pPr>
+            <a:lvl5pPr marL="2057400" indent="-228600" algn="l" defTabSz="914400" rtl="0" eaLnBrk="1" latinLnBrk="0" hangingPunct="1">
+              <a:lnSpc>
+                <a:spcPct val="90000"/>
+              </a:lnSpc>
+              <a:spcBef>
+                <a:spcPts val="500"/>
+              </a:spcBef>
+              <a:buFont typeface="Arial" panose="020B0604020202020204" pitchFamily="34" charset="0"/>
+              <a:buChar char="•"/>
+              <a:defRPr sz="1800" kern="1200">
+                <a:solidFill>
+                  <a:schemeClr val="tx1"/>
+                </a:solidFill>
+                <a:latin typeface="+mn-lt"/>
+                <a:ea typeface="+mn-ea"/>
+                <a:cs typeface="+mn-cs"/>
+              </a:defRPr>
+            </a:lvl5pPr>
+            <a:lvl6pPr marL="2514600" indent="-228600" algn="l" defTabSz="914400" rtl="0" eaLnBrk="1" latinLnBrk="0" hangingPunct="1">
+              <a:lnSpc>
+                <a:spcPct val="90000"/>
+              </a:lnSpc>
+              <a:spcBef>
+                <a:spcPts val="500"/>
+              </a:spcBef>
+              <a:buFont typeface="Arial" panose="020B0604020202020204" pitchFamily="34" charset="0"/>
+              <a:buChar char="•"/>
+              <a:defRPr sz="1800" kern="1200">
+                <a:solidFill>
+                  <a:schemeClr val="tx1"/>
+                </a:solidFill>
+                <a:latin typeface="+mn-lt"/>
+                <a:ea typeface="+mn-ea"/>
+                <a:cs typeface="+mn-cs"/>
+              </a:defRPr>
+            </a:lvl6pPr>
+            <a:lvl7pPr marL="2971800" indent="-228600" algn="l" defTabSz="914400" rtl="0" eaLnBrk="1" latinLnBrk="0" hangingPunct="1">
+              <a:lnSpc>
+                <a:spcPct val="90000"/>
+              </a:lnSpc>
+              <a:spcBef>
+                <a:spcPts val="500"/>
+              </a:spcBef>
+              <a:buFont typeface="Arial" panose="020B0604020202020204" pitchFamily="34" charset="0"/>
+              <a:buChar char="•"/>
+              <a:defRPr sz="1800" kern="1200">
+                <a:solidFill>
+                  <a:schemeClr val="tx1"/>
+                </a:solidFill>
+                <a:latin typeface="+mn-lt"/>
+                <a:ea typeface="+mn-ea"/>
+                <a:cs typeface="+mn-cs"/>
+              </a:defRPr>
+            </a:lvl7pPr>
+            <a:lvl8pPr marL="3429000" indent="-228600" algn="l" defTabSz="914400" rtl="0" eaLnBrk="1" latinLnBrk="0" hangingPunct="1">
+              <a:lnSpc>
+                <a:spcPct val="90000"/>
+              </a:lnSpc>
+              <a:spcBef>
+                <a:spcPts val="500"/>
+              </a:spcBef>
+              <a:buFont typeface="Arial" panose="020B0604020202020204" pitchFamily="34" charset="0"/>
+              <a:buChar char="•"/>
+              <a:defRPr sz="1800" kern="1200">
+                <a:solidFill>
+                  <a:schemeClr val="tx1"/>
+                </a:solidFill>
+                <a:latin typeface="+mn-lt"/>
+                <a:ea typeface="+mn-ea"/>
+                <a:cs typeface="+mn-cs"/>
+              </a:defRPr>
+            </a:lvl8pPr>
+            <a:lvl9pPr marL="3886200" indent="-228600" algn="l" defTabSz="914400" rtl="0" eaLnBrk="1" latinLnBrk="0" hangingPunct="1">
+              <a:lnSpc>
+                <a:spcPct val="90000"/>
+              </a:lnSpc>
+              <a:spcBef>
+                <a:spcPts val="500"/>
+              </a:spcBef>
+              <a:buFont typeface="Arial" panose="020B0604020202020204" pitchFamily="34" charset="0"/>
+              <a:buChar char="•"/>
+              <a:defRPr sz="1800" kern="1200">
+                <a:solidFill>
+                  <a:schemeClr val="tx1"/>
+                </a:solidFill>
+                <a:latin typeface="+mn-lt"/>
+                <a:ea typeface="+mn-ea"/>
+                <a:cs typeface="+mn-cs"/>
+              </a:defRPr>
+            </a:lvl9pPr>
+          </a:lstStyle>
+          <a:p>
+            <a:pPr>
+              <a:lnSpc>
+                <a:spcPct val="100000"/>
+              </a:lnSpc>
+            </a:pPr>
+            <a:r>
+              <a:rPr lang="hu-HU" b="1" dirty="0" err="1" smtClean="0">
+                <a:solidFill>
+                  <a:schemeClr val="bg1"/>
+                </a:solidFill>
+              </a:rPr>
+              <a:t>Mobiltelenok</a:t>
+            </a:r>
+            <a:r>
+              <a:rPr lang="hu-HU" b="1" dirty="0" smtClean="0">
+                <a:solidFill>
+                  <a:schemeClr val="bg1"/>
+                </a:solidFill>
+              </a:rPr>
+              <a:t>/</a:t>
+            </a:r>
+            <a:r>
+              <a:rPr lang="hu-HU" b="1" dirty="0" err="1" smtClean="0">
+                <a:solidFill>
+                  <a:schemeClr val="bg1"/>
+                </a:solidFill>
+              </a:rPr>
+              <a:t>tabletek</a:t>
+            </a:r>
+            <a:r>
+              <a:rPr lang="hu-HU" b="1" dirty="0" smtClean="0">
+                <a:solidFill>
+                  <a:schemeClr val="bg1"/>
+                </a:solidFill>
+              </a:rPr>
+              <a:t>:</a:t>
+            </a:r>
+          </a:p>
+          <a:p>
+            <a:pPr lvl="1">
+              <a:lnSpc>
+                <a:spcPct val="100000"/>
+              </a:lnSpc>
+            </a:pPr>
+            <a:r>
+              <a:rPr lang="hu-HU" b="1" dirty="0" err="1" smtClean="0">
+                <a:solidFill>
+                  <a:schemeClr val="bg1"/>
+                </a:solidFill>
+              </a:rPr>
+              <a:t>Snapdragon</a:t>
+            </a:r>
+            <a:endParaRPr lang="hu-HU" b="1" dirty="0" smtClean="0">
+              <a:solidFill>
+                <a:schemeClr val="bg1"/>
+              </a:solidFill>
+            </a:endParaRPr>
+          </a:p>
+          <a:p>
+            <a:pPr lvl="1">
+              <a:lnSpc>
+                <a:spcPct val="100000"/>
+              </a:lnSpc>
+            </a:pPr>
+            <a:r>
+              <a:rPr lang="hu-HU" b="1" dirty="0" smtClean="0">
+                <a:solidFill>
+                  <a:schemeClr val="bg1"/>
+                </a:solidFill>
+              </a:rPr>
+              <a:t>Apple (Apple A)</a:t>
+            </a:r>
+            <a:endParaRPr lang="hu-HU" b="1" dirty="0" smtClean="0">
+              <a:solidFill>
+                <a:schemeClr val="bg1"/>
+              </a:solidFill>
+            </a:endParaRPr>
+          </a:p>
+        </p:txBody>
+      </p:sp>
+      <p:pic>
+        <p:nvPicPr>
+          <p:cNvPr id="6" name="Kép 5"/>
+          <p:cNvPicPr>
+            <a:picLocks noChangeAspect="1"/>
+          </p:cNvPicPr>
+          <p:nvPr/>
+        </p:nvPicPr>
+        <p:blipFill>
+          <a:blip r:embed="rId2">
+            <a:extLst>
+              <a:ext uri="{28A0092B-C50C-407E-A947-70E740481C1C}">
+                <a14:useLocalDpi xmlns:a14="http://schemas.microsoft.com/office/drawing/2010/main" val="0"/>
+              </a:ext>
+            </a:extLst>
+          </a:blip>
+          <a:stretch>
+            <a:fillRect/>
+          </a:stretch>
+        </p:blipFill>
+        <p:spPr>
+          <a:xfrm>
+            <a:off x="6415203" y="1496852"/>
+            <a:ext cx="3098646" cy="2057501"/>
+          </a:xfrm>
+          <a:prstGeom prst="rect">
+            <a:avLst/>
+          </a:prstGeom>
+        </p:spPr>
+      </p:pic>
+      <p:pic>
+        <p:nvPicPr>
+          <p:cNvPr id="9" name="Kép 8"/>
+          <p:cNvPicPr>
+            <a:picLocks noChangeAspect="1"/>
+          </p:cNvPicPr>
+          <p:nvPr/>
+        </p:nvPicPr>
+        <p:blipFill>
+          <a:blip r:embed="rId3">
+            <a:extLst>
+              <a:ext uri="{28A0092B-C50C-407E-A947-70E740481C1C}">
+                <a14:useLocalDpi xmlns:a14="http://schemas.microsoft.com/office/drawing/2010/main" val="0"/>
+              </a:ext>
+            </a:extLst>
+          </a:blip>
+          <a:stretch>
+            <a:fillRect/>
+          </a:stretch>
+        </p:blipFill>
+        <p:spPr>
+          <a:xfrm>
+            <a:off x="5291254" y="5053693"/>
+            <a:ext cx="1609491" cy="1749447"/>
+          </a:xfrm>
+          <a:prstGeom prst="rect">
+            <a:avLst/>
+          </a:prstGeom>
+        </p:spPr>
+      </p:pic>
+      <p:pic>
+        <p:nvPicPr>
+          <p:cNvPr id="10" name="Kép 9"/>
+          <p:cNvPicPr>
+            <a:picLocks noChangeAspect="1"/>
+          </p:cNvPicPr>
+          <p:nvPr/>
+        </p:nvPicPr>
+        <p:blipFill>
+          <a:blip r:embed="rId4" cstate="print">
+            <a:extLst>
+              <a:ext uri="{28A0092B-C50C-407E-A947-70E740481C1C}">
+                <a14:useLocalDpi xmlns:a14="http://schemas.microsoft.com/office/drawing/2010/main" val="0"/>
+              </a:ext>
+            </a:extLst>
+          </a:blip>
+          <a:stretch>
+            <a:fillRect/>
+          </a:stretch>
+        </p:blipFill>
+        <p:spPr>
+          <a:xfrm>
+            <a:off x="8347616" y="4767967"/>
+            <a:ext cx="1524464" cy="1810528"/>
+          </a:xfrm>
+          <a:prstGeom prst="rect">
+            <a:avLst/>
+          </a:prstGeom>
+        </p:spPr>
+      </p:pic>
+      <p:pic>
+        <p:nvPicPr>
+          <p:cNvPr id="11" name="Kép 10"/>
+          <p:cNvPicPr>
+            <a:picLocks noChangeAspect="1"/>
+          </p:cNvPicPr>
+          <p:nvPr/>
+        </p:nvPicPr>
+        <p:blipFill>
+          <a:blip r:embed="rId5">
+            <a:extLst>
+              <a:ext uri="{28A0092B-C50C-407E-A947-70E740481C1C}">
+                <a14:useLocalDpi xmlns:a14="http://schemas.microsoft.com/office/drawing/2010/main" val="0"/>
+              </a:ext>
+            </a:extLst>
+          </a:blip>
+          <a:stretch>
+            <a:fillRect/>
+          </a:stretch>
+        </p:blipFill>
+        <p:spPr>
+          <a:xfrm>
+            <a:off x="1729925" y="2948400"/>
+            <a:ext cx="4545145" cy="1752481"/>
+          </a:xfrm>
+          <a:prstGeom prst="rect">
+            <a:avLst/>
+          </a:prstGeom>
+        </p:spPr>
+      </p:pic>
+    </p:spTree>
+    <p:extLst>
+      <p:ext uri="{BB962C8B-B14F-4D97-AF65-F5344CB8AC3E}">
+        <p14:creationId xmlns:p14="http://schemas.microsoft.com/office/powerpoint/2010/main" val="1051618584"/>
+      </p:ext>
+    </p:extLst>
+  </p:cSld>
+  <p:clrMapOvr>
+    <a:masterClrMapping/>
+  </p:clrMapOvr>
+  <mc:AlternateContent xmlns:mc="http://schemas.openxmlformats.org/markup-compatibility/2006" xmlns:p14="http://schemas.microsoft.com/office/powerpoint/2010/main">
+    <mc:Choice Requires="p14">
+      <p:transition spd="slow" p14:dur="3400">
+        <p14:reveal/>
+      </p:transition>
+    </mc:Choice>
+    <mc:Fallback xmlns="">
+      <p:transition spd="slow">
+        <p:fade/>
+      </p:transition>
+    </mc:Fallback>
+  </mc:AlternateContent>
+  <p:timing>
+    <p:tnLst>
+      <p:par>
+        <p:cTn id="1" dur="indefinite" restart="never" nodeType="tmRoot">
+          <p:childTnLst>
+            <p:seq concurrent="1" nextAc="seek">
+              <p:cTn id="2" dur="indefinite" nodeType="mainSeq">
+                <p:childTnLst>
+                  <p:par>
+                    <p:cTn id="3" fill="hold">
+                      <p:stCondLst>
+                        <p:cond delay="indefinite"/>
+                        <p:cond evt="onBegin" delay="0">
+                          <p:tn val="2"/>
+                        </p:cond>
+                      </p:stCondLst>
+                      <p:childTnLst>
+                        <p:par>
+                          <p:cTn id="4" fill="hold">
+                            <p:stCondLst>
+                              <p:cond delay="0"/>
+                            </p:stCondLst>
+                            <p:childTnLst>
+                              <p:par>
+                                <p:cTn id="5" presetID="42" presetClass="entr" presetSubtype="0" fill="hold" nodeType="afterEffect">
+                                  <p:stCondLst>
+                                    <p:cond delay="0"/>
+                                  </p:stCondLst>
+                                  <p:childTnLst>
+                                    <p:set>
+                                      <p:cBhvr>
+                                        <p:cTn id="6" dur="1" fill="hold">
+                                          <p:stCondLst>
+                                            <p:cond delay="0"/>
+                                          </p:stCondLst>
+                                        </p:cTn>
+                                        <p:tgtEl>
+                                          <p:spTgt spid="3">
+                                            <p:txEl>
+                                              <p:pRg st="0" end="0"/>
+                                            </p:txEl>
+                                          </p:spTgt>
+                                        </p:tgtEl>
+                                        <p:attrNameLst>
+                                          <p:attrName>style.visibility</p:attrName>
+                                        </p:attrNameLst>
+                                      </p:cBhvr>
+                                      <p:to>
+                                        <p:strVal val="visible"/>
+                                      </p:to>
+                                    </p:set>
+                                    <p:animEffect transition="in" filter="fade">
+                                      <p:cBhvr>
+                                        <p:cTn id="7" dur="1000"/>
+                                        <p:tgtEl>
+                                          <p:spTgt spid="3">
+                                            <p:txEl>
+                                              <p:pRg st="0" end="0"/>
+                                            </p:txEl>
+                                          </p:spTgt>
+                                        </p:tgtEl>
+                                      </p:cBhvr>
+                                    </p:animEffect>
+                                    <p:anim calcmode="lin" valueType="num">
+                                      <p:cBhvr>
+                                        <p:cTn id="8" dur="1000" fill="hold"/>
+                                        <p:tgtEl>
+                                          <p:spTgt spid="3">
+                                            <p:txEl>
+                                              <p:pRg st="0" end="0"/>
+                                            </p:txEl>
+                                          </p:spTgt>
+                                        </p:tgtEl>
+                                        <p:attrNameLst>
+                                          <p:attrName>ppt_x</p:attrName>
+                                        </p:attrNameLst>
+                                      </p:cBhvr>
+                                      <p:tavLst>
+                                        <p:tav tm="0">
+                                          <p:val>
+                                            <p:strVal val="#ppt_x"/>
+                                          </p:val>
+                                        </p:tav>
+                                        <p:tav tm="100000">
+                                          <p:val>
+                                            <p:strVal val="#ppt_x"/>
+                                          </p:val>
+                                        </p:tav>
+                                      </p:tavLst>
+                                    </p:anim>
+                                    <p:anim calcmode="lin" valueType="num">
+                                      <p:cBhvr>
+                                        <p:cTn id="9" dur="1000" fill="hold"/>
+                                        <p:tgtEl>
+                                          <p:spTgt spid="3">
+                                            <p:txEl>
+                                              <p:pRg st="0" end="0"/>
+                                            </p:txEl>
+                                          </p:spTgt>
+                                        </p:tgtEl>
+                                        <p:attrNameLst>
+                                          <p:attrName>ppt_y</p:attrName>
+                                        </p:attrNameLst>
+                                      </p:cBhvr>
+                                      <p:tavLst>
+                                        <p:tav tm="0">
+                                          <p:val>
+                                            <p:strVal val="#ppt_y+.1"/>
+                                          </p:val>
+                                        </p:tav>
+                                        <p:tav tm="100000">
+                                          <p:val>
+                                            <p:strVal val="#ppt_y"/>
+                                          </p:val>
+                                        </p:tav>
+                                      </p:tavLst>
+                                    </p:anim>
+                                  </p:childTnLst>
+                                </p:cTn>
+                              </p:par>
+                            </p:childTnLst>
+                          </p:cTn>
+                        </p:par>
+                        <p:par>
+                          <p:cTn id="10" fill="hold">
+                            <p:stCondLst>
+                              <p:cond delay="1000"/>
+                            </p:stCondLst>
+                            <p:childTnLst>
+                              <p:par>
+                                <p:cTn id="11" presetID="42" presetClass="entr" presetSubtype="0" fill="hold" nodeType="afterEffect">
+                                  <p:stCondLst>
+                                    <p:cond delay="0"/>
+                                  </p:stCondLst>
+                                  <p:childTnLst>
+                                    <p:set>
+                                      <p:cBhvr>
+                                        <p:cTn id="12" dur="1" fill="hold">
+                                          <p:stCondLst>
+                                            <p:cond delay="0"/>
+                                          </p:stCondLst>
+                                        </p:cTn>
+                                        <p:tgtEl>
+                                          <p:spTgt spid="3">
+                                            <p:txEl>
+                                              <p:pRg st="1" end="1"/>
+                                            </p:txEl>
+                                          </p:spTgt>
+                                        </p:tgtEl>
+                                        <p:attrNameLst>
+                                          <p:attrName>style.visibility</p:attrName>
+                                        </p:attrNameLst>
+                                      </p:cBhvr>
+                                      <p:to>
+                                        <p:strVal val="visible"/>
+                                      </p:to>
+                                    </p:set>
+                                    <p:animEffect transition="in" filter="fade">
+                                      <p:cBhvr>
+                                        <p:cTn id="13" dur="1000"/>
+                                        <p:tgtEl>
+                                          <p:spTgt spid="3">
+                                            <p:txEl>
+                                              <p:pRg st="1" end="1"/>
+                                            </p:txEl>
+                                          </p:spTgt>
+                                        </p:tgtEl>
+                                      </p:cBhvr>
+                                    </p:animEffect>
+                                    <p:anim calcmode="lin" valueType="num">
+                                      <p:cBhvr>
+                                        <p:cTn id="14" dur="1000" fill="hold"/>
+                                        <p:tgtEl>
+                                          <p:spTgt spid="3">
+                                            <p:txEl>
+                                              <p:pRg st="1" end="1"/>
+                                            </p:txEl>
+                                          </p:spTgt>
+                                        </p:tgtEl>
+                                        <p:attrNameLst>
+                                          <p:attrName>ppt_x</p:attrName>
+                                        </p:attrNameLst>
+                                      </p:cBhvr>
+                                      <p:tavLst>
+                                        <p:tav tm="0">
+                                          <p:val>
+                                            <p:strVal val="#ppt_x"/>
+                                          </p:val>
+                                        </p:tav>
+                                        <p:tav tm="100000">
+                                          <p:val>
+                                            <p:strVal val="#ppt_x"/>
+                                          </p:val>
+                                        </p:tav>
+                                      </p:tavLst>
+                                    </p:anim>
+                                    <p:anim calcmode="lin" valueType="num">
+                                      <p:cBhvr>
+                                        <p:cTn id="15" dur="1000" fill="hold"/>
+                                        <p:tgtEl>
+                                          <p:spTgt spid="3">
+                                            <p:txEl>
+                                              <p:pRg st="1" end="1"/>
+                                            </p:txEl>
+                                          </p:spTgt>
+                                        </p:tgtEl>
+                                        <p:attrNameLst>
+                                          <p:attrName>ppt_y</p:attrName>
+                                        </p:attrNameLst>
+                                      </p:cBhvr>
+                                      <p:tavLst>
+                                        <p:tav tm="0">
+                                          <p:val>
+                                            <p:strVal val="#ppt_y+.1"/>
+                                          </p:val>
+                                        </p:tav>
+                                        <p:tav tm="100000">
+                                          <p:val>
+                                            <p:strVal val="#ppt_y"/>
+                                          </p:val>
+                                        </p:tav>
+                                      </p:tavLst>
+                                    </p:anim>
+                                  </p:childTnLst>
+                                </p:cTn>
+                              </p:par>
+                            </p:childTnLst>
+                          </p:cTn>
+                        </p:par>
+                        <p:par>
+                          <p:cTn id="16" fill="hold">
+                            <p:stCondLst>
+                              <p:cond delay="2000"/>
+                            </p:stCondLst>
+                            <p:childTnLst>
+                              <p:par>
+                                <p:cTn id="17" presetID="42" presetClass="entr" presetSubtype="0" fill="hold" nodeType="afterEffect">
+                                  <p:stCondLst>
+                                    <p:cond delay="0"/>
+                                  </p:stCondLst>
+                                  <p:childTnLst>
+                                    <p:set>
+                                      <p:cBhvr>
+                                        <p:cTn id="18" dur="1" fill="hold">
+                                          <p:stCondLst>
+                                            <p:cond delay="0"/>
+                                          </p:stCondLst>
+                                        </p:cTn>
+                                        <p:tgtEl>
+                                          <p:spTgt spid="3">
+                                            <p:txEl>
+                                              <p:pRg st="2" end="2"/>
+                                            </p:txEl>
+                                          </p:spTgt>
+                                        </p:tgtEl>
+                                        <p:attrNameLst>
+                                          <p:attrName>style.visibility</p:attrName>
+                                        </p:attrNameLst>
+                                      </p:cBhvr>
+                                      <p:to>
+                                        <p:strVal val="visible"/>
+                                      </p:to>
+                                    </p:set>
+                                    <p:animEffect transition="in" filter="fade">
+                                      <p:cBhvr>
+                                        <p:cTn id="19" dur="1000"/>
+                                        <p:tgtEl>
+                                          <p:spTgt spid="3">
+                                            <p:txEl>
+                                              <p:pRg st="2" end="2"/>
+                                            </p:txEl>
+                                          </p:spTgt>
+                                        </p:tgtEl>
+                                      </p:cBhvr>
+                                    </p:animEffect>
+                                    <p:anim calcmode="lin" valueType="num">
+                                      <p:cBhvr>
+                                        <p:cTn id="20" dur="1000" fill="hold"/>
+                                        <p:tgtEl>
+                                          <p:spTgt spid="3">
+                                            <p:txEl>
+                                              <p:pRg st="2" end="2"/>
+                                            </p:txEl>
+                                          </p:spTgt>
+                                        </p:tgtEl>
+                                        <p:attrNameLst>
+                                          <p:attrName>ppt_x</p:attrName>
+                                        </p:attrNameLst>
+                                      </p:cBhvr>
+                                      <p:tavLst>
+                                        <p:tav tm="0">
+                                          <p:val>
+                                            <p:strVal val="#ppt_x"/>
+                                          </p:val>
+                                        </p:tav>
+                                        <p:tav tm="100000">
+                                          <p:val>
+                                            <p:strVal val="#ppt_x"/>
+                                          </p:val>
+                                        </p:tav>
+                                      </p:tavLst>
+                                    </p:anim>
+                                    <p:anim calcmode="lin" valueType="num">
+                                      <p:cBhvr>
+                                        <p:cTn id="21" dur="1000" fill="hold"/>
+                                        <p:tgtEl>
+                                          <p:spTgt spid="3">
+                                            <p:txEl>
+                                              <p:pRg st="2" end="2"/>
+                                            </p:txEl>
+                                          </p:spTgt>
+                                        </p:tgtEl>
+                                        <p:attrNameLst>
+                                          <p:attrName>ppt_y</p:attrName>
+                                        </p:attrNameLst>
+                                      </p:cBhvr>
+                                      <p:tavLst>
+                                        <p:tav tm="0">
+                                          <p:val>
+                                            <p:strVal val="#ppt_y+.1"/>
+                                          </p:val>
+                                        </p:tav>
+                                        <p:tav tm="100000">
+                                          <p:val>
+                                            <p:strVal val="#ppt_y"/>
+                                          </p:val>
+                                        </p:tav>
+                                      </p:tavLst>
+                                    </p:anim>
+                                  </p:childTnLst>
+                                </p:cTn>
+                              </p:par>
+                            </p:childTnLst>
+                          </p:cTn>
+                        </p:par>
+                        <p:par>
+                          <p:cTn id="22" fill="hold">
+                            <p:stCondLst>
+                              <p:cond delay="3000"/>
+                            </p:stCondLst>
+                            <p:childTnLst>
+                              <p:par>
+                                <p:cTn id="23" presetID="42" presetClass="entr" presetSubtype="0" fill="hold" nodeType="afterEffect">
+                                  <p:stCondLst>
+                                    <p:cond delay="0"/>
+                                  </p:stCondLst>
+                                  <p:childTnLst>
+                                    <p:set>
+                                      <p:cBhvr>
+                                        <p:cTn id="24" dur="1" fill="hold">
+                                          <p:stCondLst>
+                                            <p:cond delay="0"/>
+                                          </p:stCondLst>
+                                        </p:cTn>
+                                        <p:tgtEl>
+                                          <p:spTgt spid="4">
+                                            <p:txEl>
+                                              <p:pRg st="0" end="0"/>
+                                            </p:txEl>
+                                          </p:spTgt>
+                                        </p:tgtEl>
+                                        <p:attrNameLst>
+                                          <p:attrName>style.visibility</p:attrName>
+                                        </p:attrNameLst>
+                                      </p:cBhvr>
+                                      <p:to>
+                                        <p:strVal val="visible"/>
+                                      </p:to>
+                                    </p:set>
+                                    <p:animEffect transition="in" filter="fade">
+                                      <p:cBhvr>
+                                        <p:cTn id="25" dur="1000"/>
+                                        <p:tgtEl>
+                                          <p:spTgt spid="4">
+                                            <p:txEl>
+                                              <p:pRg st="0" end="0"/>
+                                            </p:txEl>
+                                          </p:spTgt>
+                                        </p:tgtEl>
+                                      </p:cBhvr>
+                                    </p:animEffect>
+                                    <p:anim calcmode="lin" valueType="num">
+                                      <p:cBhvr>
+                                        <p:cTn id="26" dur="1000" fill="hold"/>
+                                        <p:tgtEl>
+                                          <p:spTgt spid="4">
+                                            <p:txEl>
+                                              <p:pRg st="0" end="0"/>
+                                            </p:txEl>
+                                          </p:spTgt>
+                                        </p:tgtEl>
+                                        <p:attrNameLst>
+                                          <p:attrName>ppt_x</p:attrName>
+                                        </p:attrNameLst>
+                                      </p:cBhvr>
+                                      <p:tavLst>
+                                        <p:tav tm="0">
+                                          <p:val>
+                                            <p:strVal val="#ppt_x"/>
+                                          </p:val>
+                                        </p:tav>
+                                        <p:tav tm="100000">
+                                          <p:val>
+                                            <p:strVal val="#ppt_x"/>
+                                          </p:val>
+                                        </p:tav>
+                                      </p:tavLst>
+                                    </p:anim>
+                                    <p:anim calcmode="lin" valueType="num">
+                                      <p:cBhvr>
+                                        <p:cTn id="27" dur="1000" fill="hold"/>
+                                        <p:tgtEl>
+                                          <p:spTgt spid="4">
+                                            <p:txEl>
+                                              <p:pRg st="0" end="0"/>
+                                            </p:txEl>
+                                          </p:spTgt>
+                                        </p:tgtEl>
+                                        <p:attrNameLst>
+                                          <p:attrName>ppt_y</p:attrName>
+                                        </p:attrNameLst>
+                                      </p:cBhvr>
+                                      <p:tavLst>
+                                        <p:tav tm="0">
+                                          <p:val>
+                                            <p:strVal val="#ppt_y+.1"/>
+                                          </p:val>
+                                        </p:tav>
+                                        <p:tav tm="100000">
+                                          <p:val>
+                                            <p:strVal val="#ppt_y"/>
+                                          </p:val>
+                                        </p:tav>
+                                      </p:tavLst>
+                                    </p:anim>
+                                  </p:childTnLst>
+                                </p:cTn>
+                              </p:par>
+                            </p:childTnLst>
+                          </p:cTn>
+                        </p:par>
+                        <p:par>
+                          <p:cTn id="28" fill="hold">
+                            <p:stCondLst>
+                              <p:cond delay="4000"/>
+                            </p:stCondLst>
+                            <p:childTnLst>
+                              <p:par>
+                                <p:cTn id="29" presetID="42" presetClass="entr" presetSubtype="0" fill="hold" nodeType="afterEffect">
+                                  <p:stCondLst>
+                                    <p:cond delay="0"/>
+                                  </p:stCondLst>
+                                  <p:childTnLst>
+                                    <p:set>
+                                      <p:cBhvr>
+                                        <p:cTn id="30" dur="1" fill="hold">
+                                          <p:stCondLst>
+                                            <p:cond delay="0"/>
+                                          </p:stCondLst>
+                                        </p:cTn>
+                                        <p:tgtEl>
+                                          <p:spTgt spid="4">
+                                            <p:txEl>
+                                              <p:pRg st="1" end="1"/>
+                                            </p:txEl>
+                                          </p:spTgt>
+                                        </p:tgtEl>
+                                        <p:attrNameLst>
+                                          <p:attrName>style.visibility</p:attrName>
+                                        </p:attrNameLst>
+                                      </p:cBhvr>
+                                      <p:to>
+                                        <p:strVal val="visible"/>
+                                      </p:to>
+                                    </p:set>
+                                    <p:animEffect transition="in" filter="fade">
+                                      <p:cBhvr>
+                                        <p:cTn id="31" dur="1000"/>
+                                        <p:tgtEl>
+                                          <p:spTgt spid="4">
+                                            <p:txEl>
+                                              <p:pRg st="1" end="1"/>
+                                            </p:txEl>
+                                          </p:spTgt>
+                                        </p:tgtEl>
+                                      </p:cBhvr>
+                                    </p:animEffect>
+                                    <p:anim calcmode="lin" valueType="num">
+                                      <p:cBhvr>
+                                        <p:cTn id="32" dur="1000" fill="hold"/>
+                                        <p:tgtEl>
+                                          <p:spTgt spid="4">
+                                            <p:txEl>
+                                              <p:pRg st="1" end="1"/>
+                                            </p:txEl>
+                                          </p:spTgt>
+                                        </p:tgtEl>
+                                        <p:attrNameLst>
+                                          <p:attrName>ppt_x</p:attrName>
+                                        </p:attrNameLst>
+                                      </p:cBhvr>
+                                      <p:tavLst>
+                                        <p:tav tm="0">
+                                          <p:val>
+                                            <p:strVal val="#ppt_x"/>
+                                          </p:val>
+                                        </p:tav>
+                                        <p:tav tm="100000">
+                                          <p:val>
+                                            <p:strVal val="#ppt_x"/>
+                                          </p:val>
+                                        </p:tav>
+                                      </p:tavLst>
+                                    </p:anim>
+                                    <p:anim calcmode="lin" valueType="num">
+                                      <p:cBhvr>
+                                        <p:cTn id="33" dur="1000" fill="hold"/>
+                                        <p:tgtEl>
+                                          <p:spTgt spid="4">
+                                            <p:txEl>
+                                              <p:pRg st="1" end="1"/>
+                                            </p:txEl>
+                                          </p:spTgt>
+                                        </p:tgtEl>
+                                        <p:attrNameLst>
+                                          <p:attrName>ppt_y</p:attrName>
+                                        </p:attrNameLst>
+                                      </p:cBhvr>
+                                      <p:tavLst>
+                                        <p:tav tm="0">
+                                          <p:val>
+                                            <p:strVal val="#ppt_y+.1"/>
+                                          </p:val>
+                                        </p:tav>
+                                        <p:tav tm="100000">
+                                          <p:val>
+                                            <p:strVal val="#ppt_y"/>
+                                          </p:val>
+                                        </p:tav>
+                                      </p:tavLst>
+                                    </p:anim>
+                                  </p:childTnLst>
+                                </p:cTn>
+                              </p:par>
+                            </p:childTnLst>
+                          </p:cTn>
+                        </p:par>
+                        <p:par>
+                          <p:cTn id="34" fill="hold">
+                            <p:stCondLst>
+                              <p:cond delay="5000"/>
+                            </p:stCondLst>
+                            <p:childTnLst>
+                              <p:par>
+                                <p:cTn id="35" presetID="42" presetClass="entr" presetSubtype="0" fill="hold" nodeType="afterEffect">
+                                  <p:stCondLst>
+                                    <p:cond delay="0"/>
+                                  </p:stCondLst>
+                                  <p:childTnLst>
+                                    <p:set>
+                                      <p:cBhvr>
+                                        <p:cTn id="36" dur="1" fill="hold">
+                                          <p:stCondLst>
+                                            <p:cond delay="0"/>
+                                          </p:stCondLst>
+                                        </p:cTn>
+                                        <p:tgtEl>
+                                          <p:spTgt spid="4">
+                                            <p:txEl>
+                                              <p:pRg st="2" end="2"/>
+                                            </p:txEl>
+                                          </p:spTgt>
+                                        </p:tgtEl>
+                                        <p:attrNameLst>
+                                          <p:attrName>style.visibility</p:attrName>
+                                        </p:attrNameLst>
+                                      </p:cBhvr>
+                                      <p:to>
+                                        <p:strVal val="visible"/>
+                                      </p:to>
+                                    </p:set>
+                                    <p:animEffect transition="in" filter="fade">
+                                      <p:cBhvr>
+                                        <p:cTn id="37" dur="1000"/>
+                                        <p:tgtEl>
+                                          <p:spTgt spid="4">
+                                            <p:txEl>
+                                              <p:pRg st="2" end="2"/>
+                                            </p:txEl>
+                                          </p:spTgt>
+                                        </p:tgtEl>
+                                      </p:cBhvr>
+                                    </p:animEffect>
+                                    <p:anim calcmode="lin" valueType="num">
+                                      <p:cBhvr>
+                                        <p:cTn id="38" dur="1000" fill="hold"/>
+                                        <p:tgtEl>
+                                          <p:spTgt spid="4">
+                                            <p:txEl>
+                                              <p:pRg st="2" end="2"/>
+                                            </p:txEl>
+                                          </p:spTgt>
+                                        </p:tgtEl>
+                                        <p:attrNameLst>
+                                          <p:attrName>ppt_x</p:attrName>
+                                        </p:attrNameLst>
+                                      </p:cBhvr>
+                                      <p:tavLst>
+                                        <p:tav tm="0">
+                                          <p:val>
+                                            <p:strVal val="#ppt_x"/>
+                                          </p:val>
+                                        </p:tav>
+                                        <p:tav tm="100000">
+                                          <p:val>
+                                            <p:strVal val="#ppt_x"/>
+                                          </p:val>
+                                        </p:tav>
+                                      </p:tavLst>
+                                    </p:anim>
+                                    <p:anim calcmode="lin" valueType="num">
+                                      <p:cBhvr>
+                                        <p:cTn id="39" dur="1000" fill="hold"/>
+                                        <p:tgtEl>
+                                          <p:spTgt spid="4">
+                                            <p:txEl>
+                                              <p:pRg st="2" end="2"/>
                                             </p:txEl>
                                           </p:spTgt>
                                         </p:tgtEl>

</xml_diff>